<commit_message>
update slides and add 08_mock section
</commit_message>
<xml_diff>
--- a/UnitTestingSlides.pptx
+++ b/UnitTestingSlides.pptx
@@ -5,7 +5,7 @@
     <p:sldMasterId id="2147483648" r:id="rId1"/>
   </p:sldMasterIdLst>
   <p:notesMasterIdLst>
-    <p:notesMasterId r:id="rId15"/>
+    <p:notesMasterId r:id="rId17"/>
   </p:notesMasterIdLst>
   <p:sldIdLst>
     <p:sldId id="256" r:id="rId2"/>
@@ -21,6 +21,8 @@
     <p:sldId id="266" r:id="rId12"/>
     <p:sldId id="267" r:id="rId13"/>
     <p:sldId id="268" r:id="rId14"/>
+    <p:sldId id="269" r:id="rId15"/>
+    <p:sldId id="270" r:id="rId16"/>
   </p:sldIdLst>
   <p:sldSz cx="12192000" cy="6858000"/>
   <p:notesSz cx="6858000" cy="9144000"/>
@@ -209,7 +211,7 @@
           <a:p>
             <a:fld id="{EF6A6A60-C693-BC49-85A7-98B318EF45A1}" type="datetimeFigureOut">
               <a:rPr lang="en-US" smtClean="0"/>
-              <a:t>10/19/22</a:t>
+              <a:t>10/20/22</a:t>
             </a:fld>
             <a:endParaRPr lang="en-US"/>
           </a:p>
@@ -1254,7 +1256,7 @@
           <a:p>
             <a:fld id="{78ABE3C1-DBE1-495D-B57B-2849774B866A}" type="datetimeFigureOut">
               <a:rPr lang="en-US" dirty="0"/>
-              <a:t>10/19/22</a:t>
+              <a:t>10/20/22</a:t>
             </a:fld>
             <a:endParaRPr lang="en-US" dirty="0"/>
           </a:p>
@@ -1663,7 +1665,7 @@
           <a:p>
             <a:fld id="{446C117F-5CCF-4837-BE5F-2B92066CAFAF}" type="datetimeFigureOut">
               <a:rPr lang="en-US" dirty="0"/>
-              <a:t>10/19/22</a:t>
+              <a:t>10/20/22</a:t>
             </a:fld>
             <a:endParaRPr lang="en-US" dirty="0"/>
           </a:p>
@@ -1994,7 +1996,7 @@
           <a:p>
             <a:fld id="{84EB90BD-B6CE-46B7-997F-7313B992CCDC}" type="datetimeFigureOut">
               <a:rPr lang="en-US" dirty="0"/>
-              <a:t>10/19/22</a:t>
+              <a:t>10/20/22</a:t>
             </a:fld>
             <a:endParaRPr lang="en-US" dirty="0"/>
           </a:p>
@@ -2394,7 +2396,7 @@
           <a:p>
             <a:fld id="{CDB9D11F-B188-461D-B23F-39381795C052}" type="datetimeFigureOut">
               <a:rPr lang="en-US" dirty="0"/>
-              <a:t>10/19/22</a:t>
+              <a:t>10/20/22</a:t>
             </a:fld>
             <a:endParaRPr lang="en-US" dirty="0"/>
           </a:p>
@@ -2957,7 +2959,7 @@
           <a:p>
             <a:fld id="{52E6D8D9-55A2-4063-B0F3-121F44549695}" type="datetimeFigureOut">
               <a:rPr lang="en-US" dirty="0"/>
-              <a:t>10/19/22</a:t>
+              <a:t>10/20/22</a:t>
             </a:fld>
             <a:endParaRPr lang="en-US" dirty="0"/>
           </a:p>
@@ -3633,7 +3635,7 @@
           <a:p>
             <a:fld id="{D4B24536-994D-4021-A283-9F449C0DB509}" type="datetimeFigureOut">
               <a:rPr lang="en-US" dirty="0"/>
-              <a:t>10/19/22</a:t>
+              <a:t>10/20/22</a:t>
             </a:fld>
             <a:endParaRPr lang="en-US" dirty="0"/>
           </a:p>
@@ -4541,7 +4543,7 @@
           <a:p>
             <a:fld id="{3CBBBB78-C96F-47B7-AB17-D852CA960AC9}" type="datetimeFigureOut">
               <a:rPr lang="en-US" dirty="0"/>
-              <a:t>10/19/22</a:t>
+              <a:t>10/20/22</a:t>
             </a:fld>
             <a:endParaRPr lang="en-US" dirty="0"/>
           </a:p>
@@ -4849,7 +4851,7 @@
           <a:p>
             <a:fld id="{1FA3F48C-C7C6-4055-9F49-3777875E72AE}" type="datetimeFigureOut">
               <a:rPr lang="en-US" dirty="0"/>
-              <a:t>10/19/22</a:t>
+              <a:t>10/20/22</a:t>
             </a:fld>
             <a:endParaRPr lang="en-US" dirty="0"/>
           </a:p>
@@ -5108,7 +5110,7 @@
           <a:p>
             <a:fld id="{6178E61D-D431-422C-9764-11DAFE33AB63}" type="datetimeFigureOut">
               <a:rPr lang="en-US" dirty="0"/>
-              <a:t>10/19/22</a:t>
+              <a:t>10/20/22</a:t>
             </a:fld>
             <a:endParaRPr lang="en-US" dirty="0"/>
           </a:p>
@@ -5427,7 +5429,7 @@
           <a:p>
             <a:fld id="{12DE42F4-6EEF-4EF7-8ED4-2208F0F89A08}" type="datetimeFigureOut">
               <a:rPr lang="en-US" dirty="0"/>
-              <a:t>10/19/22</a:t>
+              <a:t>10/20/22</a:t>
             </a:fld>
             <a:endParaRPr lang="en-US" dirty="0"/>
           </a:p>
@@ -5811,7 +5813,7 @@
           <a:p>
             <a:fld id="{30578ACC-22D6-47C1-A373-4FD133E34F3C}" type="datetimeFigureOut">
               <a:rPr lang="en-US" dirty="0"/>
-              <a:t>10/19/22</a:t>
+              <a:t>10/20/22</a:t>
             </a:fld>
             <a:endParaRPr lang="en-US" dirty="0"/>
           </a:p>
@@ -6182,7 +6184,7 @@
           <a:p>
             <a:fld id="{4E5A6C69-6797-4E8A-BF37-F2C3751466E9}" type="datetimeFigureOut">
               <a:rPr lang="en-US" dirty="0"/>
-              <a:t>10/19/22</a:t>
+              <a:t>10/20/22</a:t>
             </a:fld>
             <a:endParaRPr lang="en-US" dirty="0"/>
           </a:p>
@@ -6683,7 +6685,7 @@
           <a:p>
             <a:fld id="{D82014A1-A632-4878-A0D3-F52BA7563730}" type="datetimeFigureOut">
               <a:rPr lang="en-US" dirty="0"/>
-              <a:t>10/19/22</a:t>
+              <a:t>10/20/22</a:t>
             </a:fld>
             <a:endParaRPr lang="en-US" dirty="0"/>
           </a:p>
@@ -6935,7 +6937,7 @@
           <a:p>
             <a:fld id="{CE99F462-093F-4566-844B-4C71F2739DA5}" type="datetimeFigureOut">
               <a:rPr lang="en-US" dirty="0"/>
-              <a:t>10/19/22</a:t>
+              <a:t>10/20/22</a:t>
             </a:fld>
             <a:endParaRPr lang="en-US" dirty="0"/>
           </a:p>
@@ -7093,7 +7095,7 @@
           <a:p>
             <a:fld id="{3D24A7AC-904D-4781-85BA-7D10C17ED021}" type="datetimeFigureOut">
               <a:rPr lang="en-US" dirty="0"/>
-              <a:t>10/19/22</a:t>
+              <a:t>10/20/22</a:t>
             </a:fld>
             <a:endParaRPr lang="en-US" dirty="0"/>
           </a:p>
@@ -7478,7 +7480,7 @@
           <a:p>
             <a:fld id="{E331444B-B92B-4E27-8C94-BB93EAF5CB18}" type="datetimeFigureOut">
               <a:rPr lang="en-US" dirty="0"/>
-              <a:t>10/19/22</a:t>
+              <a:t>10/20/22</a:t>
             </a:fld>
             <a:endParaRPr lang="en-US" dirty="0"/>
           </a:p>
@@ -7882,7 +7884,7 @@
           <a:p>
             <a:fld id="{363EFA5E-FA76-400D-B3DC-F0BA90E6D107}" type="datetimeFigureOut">
               <a:rPr lang="en-US" dirty="0"/>
-              <a:t>10/19/22</a:t>
+              <a:t>10/20/22</a:t>
             </a:fld>
             <a:endParaRPr lang="en-US" dirty="0"/>
           </a:p>
@@ -8121,7 +8123,7 @@
           <a:p>
             <a:fld id="{9D6E9DEC-419B-4CC5-A080-3B06BD5A8291}" type="datetimeFigureOut">
               <a:rPr lang="en-US" dirty="0"/>
-              <a:t>10/19/22</a:t>
+              <a:t>10/20/22</a:t>
             </a:fld>
             <a:endParaRPr lang="en-US" dirty="0"/>
           </a:p>
@@ -8687,7 +8689,7 @@
             </a:pPr>
             <a:r>
               <a:rPr lang="en-US" dirty="0"/>
-              <a:t>	How do you write unit tests when your code?</a:t>
+              <a:t>	How do you write unit tests when your code…</a:t>
             </a:r>
           </a:p>
           <a:p>
@@ -8714,7 +8716,7 @@
             </a:pPr>
             <a:r>
               <a:rPr lang="en-US" dirty="0"/>
-              <a:t>		* Makes API calls to an external servers.</a:t>
+              <a:t>		* Makes API calls to an external server.</a:t>
             </a:r>
           </a:p>
           <a:p>
@@ -8896,7 +8898,12 @@
             <p:ph idx="1"/>
           </p:nvPr>
         </p:nvSpPr>
-        <p:spPr/>
+        <p:spPr>
+          <a:xfrm>
+            <a:off x="680321" y="2336873"/>
+            <a:ext cx="10248234" cy="3599316"/>
+          </a:xfrm>
+        </p:spPr>
         <p:txBody>
           <a:bodyPr/>
           <a:lstStyle/>
@@ -8951,8 +8958,13 @@
             </a:pPr>
             <a:r>
               <a:rPr lang="en-US" sz="2200" dirty="0"/>
-              <a:t>(b) In a tests directory with parallel structure to source code</a:t>
-            </a:r>
+              <a:t>(b) In a tests directory with parallel structure with project root </a:t>
+            </a:r>
+            <a:r>
+              <a:rPr lang="en-US" sz="2200" dirty="0" err="1"/>
+              <a:t>dir</a:t>
+            </a:r>
+            <a:endParaRPr lang="en-US" sz="2200" dirty="0"/>
           </a:p>
           <a:p>
             <a:pPr marL="914400" lvl="2" indent="0">
@@ -8969,7 +8981,15 @@
             </a:pPr>
             <a:r>
               <a:rPr lang="en-US" sz="2200" dirty="0"/>
-              <a:t>     Disadvantage – harder to find tests. May have to set apps path. </a:t>
+              <a:t>     Disadvantage – harder to find tests. May have to append </a:t>
+            </a:r>
+            <a:r>
+              <a:rPr lang="en-US" sz="2200" dirty="0" err="1"/>
+              <a:t>sys.path</a:t>
+            </a:r>
+            <a:r>
+              <a:rPr lang="en-US" sz="2200" dirty="0"/>
+              <a:t>.</a:t>
             </a:r>
           </a:p>
         </p:txBody>
@@ -9345,6 +9365,12 @@
             <a:r>
               <a:rPr lang="en-US" dirty="0"/>
               <a:t>Negative tests</a:t>
+            </a:r>
+          </a:p>
+          <a:p>
+            <a:r>
+              <a:rPr lang="en-US" dirty="0"/>
+              <a:t>Non-Functional Tests (performance, security, scalability,…)</a:t>
             </a:r>
           </a:p>
           <a:p>
@@ -9667,6 +9693,55 @@
                       </p:childTnLst>
                     </p:cTn>
                   </p:par>
+                  <p:par>
+                    <p:cTn id="27" fill="hold">
+                      <p:stCondLst>
+                        <p:cond delay="indefinite"/>
+                      </p:stCondLst>
+                      <p:childTnLst>
+                        <p:par>
+                          <p:cTn id="28" fill="hold">
+                            <p:stCondLst>
+                              <p:cond delay="0"/>
+                            </p:stCondLst>
+                            <p:childTnLst>
+                              <p:par>
+                                <p:cTn id="29" presetID="1" presetClass="entr" presetSubtype="0" fill="hold" nodeType="clickEffect">
+                                  <p:stCondLst>
+                                    <p:cond delay="0"/>
+                                  </p:stCondLst>
+                                  <p:childTnLst>
+                                    <p:set>
+                                      <p:cBhvr>
+                                        <p:cTn id="30" dur="1" fill="hold">
+                                          <p:stCondLst>
+                                            <p:cond delay="0"/>
+                                          </p:stCondLst>
+                                        </p:cTn>
+                                        <p:tgtEl>
+                                          <p:spTgt spid="3">
+                                            <p:txEl>
+                                              <p:pRg st="6" end="6"/>
+                                            </p:txEl>
+                                          </p:spTgt>
+                                        </p:tgtEl>
+                                        <p:attrNameLst>
+                                          <p:attrName>style.visibility</p:attrName>
+                                        </p:attrNameLst>
+                                      </p:cBhvr>
+                                      <p:to>
+                                        <p:strVal val="visible"/>
+                                      </p:to>
+                                    </p:set>
+                                  </p:childTnLst>
+                                </p:cTn>
+                              </p:par>
+                            </p:childTnLst>
+                          </p:cTn>
+                        </p:par>
+                      </p:childTnLst>
+                    </p:cTn>
+                  </p:par>
                 </p:childTnLst>
               </p:cTn>
               <p:prevCondLst>
@@ -9827,7 +9902,7 @@
             </a:pPr>
             <a:r>
               <a:rPr lang="en-US" dirty="0"/>
-              <a:t>	Share utility packages with test cases.</a:t>
+              <a:t>	Share utility package with test cases.</a:t>
             </a:r>
           </a:p>
         </p:txBody>
@@ -9986,6 +10061,261 @@
 </p:sld>
 </file>
 
+<file path=ppt/slides/slide14.xml><?xml version="1.0" encoding="utf-8"?>
+<p:sld xmlns:a="http://schemas.openxmlformats.org/drawingml/2006/main" xmlns:r="http://schemas.openxmlformats.org/officeDocument/2006/relationships" xmlns:p="http://schemas.openxmlformats.org/presentationml/2006/main">
+  <p:cSld>
+    <p:spTree>
+      <p:nvGrpSpPr>
+        <p:cNvPr id="1" name=""/>
+        <p:cNvGrpSpPr/>
+        <p:nvPr/>
+      </p:nvGrpSpPr>
+      <p:grpSpPr>
+        <a:xfrm>
+          <a:off x="0" y="0"/>
+          <a:ext cx="0" cy="0"/>
+          <a:chOff x="0" y="0"/>
+          <a:chExt cx="0" cy="0"/>
+        </a:xfrm>
+      </p:grpSpPr>
+      <p:sp>
+        <p:nvSpPr>
+          <p:cNvPr id="2" name="Title 1">
+            <a:extLst>
+              <a:ext uri="{FF2B5EF4-FFF2-40B4-BE49-F238E27FC236}">
+                <a16:creationId xmlns:a16="http://schemas.microsoft.com/office/drawing/2014/main" id="{0584A545-6FA8-C91A-FCC4-AAB0B775D43F}"/>
+              </a:ext>
+            </a:extLst>
+          </p:cNvPr>
+          <p:cNvSpPr>
+            <a:spLocks noGrp="1"/>
+          </p:cNvSpPr>
+          <p:nvPr>
+            <p:ph type="title"/>
+          </p:nvPr>
+        </p:nvSpPr>
+        <p:spPr/>
+        <p:txBody>
+          <a:bodyPr/>
+          <a:lstStyle/>
+          <a:p>
+            <a:r>
+              <a:rPr lang="en-US" dirty="0"/>
+              <a:t>Continuous Integration</a:t>
+            </a:r>
+          </a:p>
+        </p:txBody>
+      </p:sp>
+      <p:sp>
+        <p:nvSpPr>
+          <p:cNvPr id="3" name="Content Placeholder 2">
+            <a:extLst>
+              <a:ext uri="{FF2B5EF4-FFF2-40B4-BE49-F238E27FC236}">
+                <a16:creationId xmlns:a16="http://schemas.microsoft.com/office/drawing/2014/main" id="{8D645834-C049-7179-9280-BB2B0F2430CC}"/>
+              </a:ext>
+            </a:extLst>
+          </p:cNvPr>
+          <p:cNvSpPr>
+            <a:spLocks noGrp="1"/>
+          </p:cNvSpPr>
+          <p:nvPr>
+            <p:ph idx="1"/>
+          </p:nvPr>
+        </p:nvSpPr>
+        <p:spPr>
+          <a:xfrm>
+            <a:off x="680321" y="2336873"/>
+            <a:ext cx="10115498" cy="3599316"/>
+          </a:xfrm>
+        </p:spPr>
+        <p:txBody>
+          <a:bodyPr>
+            <a:normAutofit lnSpcReduction="10000"/>
+          </a:bodyPr>
+          <a:lstStyle/>
+          <a:p>
+            <a:pPr marL="0" indent="0">
+              <a:buNone/>
+            </a:pPr>
+            <a:r>
+              <a:rPr lang="en-US" dirty="0"/>
+              <a:t>When to run tests?</a:t>
+            </a:r>
+          </a:p>
+          <a:p>
+            <a:pPr lvl="1"/>
+            <a:r>
+              <a:rPr lang="en-US" sz="2400" dirty="0"/>
+              <a:t>Manually run tests after you make changes.</a:t>
+            </a:r>
+          </a:p>
+          <a:p>
+            <a:pPr lvl="1"/>
+            <a:r>
+              <a:rPr lang="en-US" sz="2400" dirty="0"/>
+              <a:t>Write tests to replicate a bug and run test before you fix the bug.</a:t>
+            </a:r>
+          </a:p>
+          <a:p>
+            <a:pPr lvl="1"/>
+            <a:r>
+              <a:rPr lang="en-US" sz="2400" dirty="0"/>
+              <a:t>Run all tests before you release or commit code.</a:t>
+            </a:r>
+          </a:p>
+          <a:p>
+            <a:pPr lvl="1"/>
+            <a:endParaRPr lang="en-US" sz="2400" dirty="0"/>
+          </a:p>
+          <a:p>
+            <a:pPr marL="0" indent="0">
+              <a:buNone/>
+            </a:pPr>
+            <a:r>
+              <a:rPr lang="en-US" sz="2800" dirty="0"/>
+              <a:t>Continuous Integration</a:t>
+            </a:r>
+          </a:p>
+          <a:p>
+            <a:pPr lvl="1"/>
+            <a:r>
+              <a:rPr lang="en-US" sz="2400" dirty="0"/>
+              <a:t>Jenkins, GitHub Actions, Circle CI, ….</a:t>
+            </a:r>
+          </a:p>
+          <a:p>
+            <a:pPr lvl="1"/>
+            <a:r>
+              <a:rPr lang="en-US" sz="2400" dirty="0"/>
+              <a:t>Tools to automate the build and release of your project.</a:t>
+            </a:r>
+          </a:p>
+          <a:p>
+            <a:pPr lvl="1"/>
+            <a:r>
+              <a:rPr lang="en-US" sz="2400" dirty="0"/>
+              <a:t>Can run your unit tests to validate before a release.</a:t>
+            </a:r>
+          </a:p>
+        </p:txBody>
+      </p:sp>
+    </p:spTree>
+    <p:extLst>
+      <p:ext uri="{BB962C8B-B14F-4D97-AF65-F5344CB8AC3E}">
+        <p14:creationId xmlns:p14="http://schemas.microsoft.com/office/powerpoint/2010/main" val="466547344"/>
+      </p:ext>
+    </p:extLst>
+  </p:cSld>
+  <p:clrMapOvr>
+    <a:masterClrMapping/>
+  </p:clrMapOvr>
+</p:sld>
+</file>
+
+<file path=ppt/slides/slide15.xml><?xml version="1.0" encoding="utf-8"?>
+<p:sld xmlns:a="http://schemas.openxmlformats.org/drawingml/2006/main" xmlns:r="http://schemas.openxmlformats.org/officeDocument/2006/relationships" xmlns:p="http://schemas.openxmlformats.org/presentationml/2006/main">
+  <p:cSld>
+    <p:spTree>
+      <p:nvGrpSpPr>
+        <p:cNvPr id="1" name=""/>
+        <p:cNvGrpSpPr/>
+        <p:nvPr/>
+      </p:nvGrpSpPr>
+      <p:grpSpPr>
+        <a:xfrm>
+          <a:off x="0" y="0"/>
+          <a:ext cx="0" cy="0"/>
+          <a:chOff x="0" y="0"/>
+          <a:chExt cx="0" cy="0"/>
+        </a:xfrm>
+      </p:grpSpPr>
+      <p:sp>
+        <p:nvSpPr>
+          <p:cNvPr id="2" name="Title 1">
+            <a:extLst>
+              <a:ext uri="{FF2B5EF4-FFF2-40B4-BE49-F238E27FC236}">
+                <a16:creationId xmlns:a16="http://schemas.microsoft.com/office/drawing/2014/main" id="{7174E1C3-D64C-7DF6-AC08-417C3A2F99A2}"/>
+              </a:ext>
+            </a:extLst>
+          </p:cNvPr>
+          <p:cNvSpPr>
+            <a:spLocks noGrp="1"/>
+          </p:cNvSpPr>
+          <p:nvPr>
+            <p:ph type="title"/>
+          </p:nvPr>
+        </p:nvSpPr>
+        <p:spPr/>
+        <p:txBody>
+          <a:bodyPr/>
+          <a:lstStyle/>
+          <a:p>
+            <a:r>
+              <a:rPr lang="en-US" dirty="0"/>
+              <a:t>Questions?</a:t>
+            </a:r>
+          </a:p>
+        </p:txBody>
+      </p:sp>
+      <p:sp>
+        <p:nvSpPr>
+          <p:cNvPr id="3" name="Content Placeholder 2">
+            <a:extLst>
+              <a:ext uri="{FF2B5EF4-FFF2-40B4-BE49-F238E27FC236}">
+                <a16:creationId xmlns:a16="http://schemas.microsoft.com/office/drawing/2014/main" id="{E2E1EDA2-F5B8-476D-94C6-5094D6D6BDF6}"/>
+              </a:ext>
+            </a:extLst>
+          </p:cNvPr>
+          <p:cNvSpPr>
+            <a:spLocks noGrp="1"/>
+          </p:cNvSpPr>
+          <p:nvPr>
+            <p:ph idx="1"/>
+          </p:nvPr>
+        </p:nvSpPr>
+        <p:spPr/>
+        <p:txBody>
+          <a:bodyPr/>
+          <a:lstStyle/>
+          <a:p>
+            <a:pPr marL="0" indent="0">
+              <a:buNone/>
+            </a:pPr>
+            <a:r>
+              <a:rPr lang="en-US" dirty="0"/>
+              <a:t>Any other questions?</a:t>
+            </a:r>
+          </a:p>
+          <a:p>
+            <a:pPr marL="0" indent="0">
+              <a:buNone/>
+            </a:pPr>
+            <a:endParaRPr lang="en-US" dirty="0"/>
+          </a:p>
+          <a:p>
+            <a:pPr marL="0" indent="0">
+              <a:buNone/>
+            </a:pPr>
+            <a:r>
+              <a:rPr lang="en-US" dirty="0"/>
+              <a:t>Go out and write great code !</a:t>
+            </a:r>
+          </a:p>
+        </p:txBody>
+      </p:sp>
+    </p:spTree>
+    <p:extLst>
+      <p:ext uri="{BB962C8B-B14F-4D97-AF65-F5344CB8AC3E}">
+        <p14:creationId xmlns:p14="http://schemas.microsoft.com/office/powerpoint/2010/main" val="3562025551"/>
+      </p:ext>
+    </p:extLst>
+  </p:cSld>
+  <p:clrMapOvr>
+    <a:masterClrMapping/>
+  </p:clrMapOvr>
+</p:sld>
+</file>
+
 <file path=ppt/slides/slide2.xml><?xml version="1.0" encoding="utf-8"?>
 <p:sld xmlns:a="http://schemas.openxmlformats.org/drawingml/2006/main" xmlns:r="http://schemas.openxmlformats.org/officeDocument/2006/relationships" xmlns:p="http://schemas.openxmlformats.org/presentationml/2006/main">
   <p:cSld>
@@ -10097,6 +10427,13 @@
             <a:endParaRPr lang="en-US" dirty="0"/>
           </a:p>
           <a:p>
+            <a:pPr lvl="1"/>
+            <a:r>
+              <a:rPr lang="en-US" dirty="0"/>
+              <a:t>Other computer languages</a:t>
+            </a:r>
+          </a:p>
+          <a:p>
             <a:r>
               <a:rPr lang="en-US" dirty="0"/>
               <a:t>Mocking</a:t>
@@ -10105,13 +10442,7 @@
           <a:p>
             <a:r>
               <a:rPr lang="en-US" dirty="0"/>
-              <a:t>Other Computer Languages</a:t>
-            </a:r>
-          </a:p>
-          <a:p>
-            <a:r>
-              <a:rPr lang="en-US" dirty="0"/>
-              <a:t>Other Types of Testing</a:t>
+              <a:t>Types of Testing</a:t>
             </a:r>
           </a:p>
         </p:txBody>
@@ -10248,7 +10579,13 @@
           <a:p>
             <a:r>
               <a:rPr lang="en-US" dirty="0"/>
-              <a:t>Unit tests can help evaluate your code structure and design choices.</a:t>
+              <a:t>Unit tests increase the quality of your code.</a:t>
+            </a:r>
+          </a:p>
+          <a:p>
+            <a:r>
+              <a:rPr lang="en-US" dirty="0"/>
+              <a:t>Unit tests can help you evaluate your code structure and design choices.</a:t>
             </a:r>
           </a:p>
           <a:p>
@@ -10529,33 +10866,15 @@
                                   </p:childTnLst>
                                 </p:cTn>
                               </p:par>
-                            </p:childTnLst>
-                          </p:cTn>
-                        </p:par>
-                      </p:childTnLst>
-                    </p:cTn>
-                  </p:par>
-                  <p:par>
-                    <p:cTn id="23" fill="hold">
-                      <p:stCondLst>
-                        <p:cond delay="indefinite"/>
-                      </p:stCondLst>
-                      <p:childTnLst>
-                        <p:par>
-                          <p:cTn id="24" fill="hold">
-                            <p:stCondLst>
-                              <p:cond delay="0"/>
-                            </p:stCondLst>
-                            <p:childTnLst>
                               <p:par>
-                                <p:cTn id="25" presetID="1" presetClass="entr" presetSubtype="0" fill="hold" nodeType="clickEffect">
+                                <p:cTn id="23" presetID="1" presetClass="entr" presetSubtype="0" fill="hold" nodeType="withEffect">
                                   <p:stCondLst>
                                     <p:cond delay="0"/>
                                   </p:stCondLst>
                                   <p:childTnLst>
                                     <p:set>
                                       <p:cBhvr>
-                                        <p:cTn id="26" dur="1" fill="hold">
+                                        <p:cTn id="24" dur="1" fill="hold">
                                           <p:stCondLst>
                                             <p:cond delay="0"/>
                                           </p:stCondLst>
@@ -10564,6 +10883,55 @@
                                           <p:spTgt spid="3">
                                             <p:txEl>
                                               <p:pRg st="7" end="7"/>
+                                            </p:txEl>
+                                          </p:spTgt>
+                                        </p:tgtEl>
+                                        <p:attrNameLst>
+                                          <p:attrName>style.visibility</p:attrName>
+                                        </p:attrNameLst>
+                                      </p:cBhvr>
+                                      <p:to>
+                                        <p:strVal val="visible"/>
+                                      </p:to>
+                                    </p:set>
+                                  </p:childTnLst>
+                                </p:cTn>
+                              </p:par>
+                            </p:childTnLst>
+                          </p:cTn>
+                        </p:par>
+                      </p:childTnLst>
+                    </p:cTn>
+                  </p:par>
+                  <p:par>
+                    <p:cTn id="25" fill="hold">
+                      <p:stCondLst>
+                        <p:cond delay="indefinite"/>
+                      </p:stCondLst>
+                      <p:childTnLst>
+                        <p:par>
+                          <p:cTn id="26" fill="hold">
+                            <p:stCondLst>
+                              <p:cond delay="0"/>
+                            </p:stCondLst>
+                            <p:childTnLst>
+                              <p:par>
+                                <p:cTn id="27" presetID="1" presetClass="entr" presetSubtype="0" fill="hold" nodeType="clickEffect">
+                                  <p:stCondLst>
+                                    <p:cond delay="0"/>
+                                  </p:stCondLst>
+                                  <p:childTnLst>
+                                    <p:set>
+                                      <p:cBhvr>
+                                        <p:cTn id="28" dur="1" fill="hold">
+                                          <p:stCondLst>
+                                            <p:cond delay="0"/>
+                                          </p:stCondLst>
+                                        </p:cTn>
+                                        <p:tgtEl>
+                                          <p:spTgt spid="3">
+                                            <p:txEl>
+                                              <p:pRg st="8" end="8"/>
                                             </p:txEl>
                                           </p:spTgt>
                                         </p:tgtEl>
@@ -10702,7 +11070,7 @@
             </a:pPr>
             <a:r>
               <a:rPr lang="en-US" dirty="0"/>
-              <a:t>All unit tests do the following (some steps optional)</a:t>
+              <a:t>All tests do the following (some steps optional)</a:t>
             </a:r>
           </a:p>
           <a:p>
@@ -11317,7 +11685,7 @@
         </p:spPr>
         <p:txBody>
           <a:bodyPr>
-            <a:normAutofit lnSpcReduction="10000"/>
+            <a:normAutofit fontScale="92500" lnSpcReduction="10000"/>
           </a:bodyPr>
           <a:lstStyle/>
           <a:p>
@@ -11326,7 +11694,7 @@
             </a:pPr>
             <a:r>
               <a:rPr lang="en-US" dirty="0"/>
-              <a:t>Now we get to play with some examples !</a:t>
+              <a:t>Now let’s play with some examples !</a:t>
             </a:r>
           </a:p>
           <a:p>
@@ -11391,6 +11759,15 @@
             <a:r>
               <a:rPr lang="en-US" dirty="0"/>
               <a:t>	04_doctest</a:t>
+            </a:r>
+          </a:p>
+          <a:p>
+            <a:pPr marL="0" indent="0">
+              <a:buNone/>
+            </a:pPr>
+            <a:r>
+              <a:rPr lang="en-US" dirty="0"/>
+              <a:t>	05_c++</a:t>
             </a:r>
           </a:p>
         </p:txBody>
@@ -11560,6 +11937,55 @@
                       </p:childTnLst>
                     </p:cTn>
                   </p:par>
+                  <p:par>
+                    <p:cTn id="15" fill="hold">
+                      <p:stCondLst>
+                        <p:cond delay="indefinite"/>
+                      </p:stCondLst>
+                      <p:childTnLst>
+                        <p:par>
+                          <p:cTn id="16" fill="hold">
+                            <p:stCondLst>
+                              <p:cond delay="0"/>
+                            </p:stCondLst>
+                            <p:childTnLst>
+                              <p:par>
+                                <p:cTn id="17" presetID="1" presetClass="entr" presetSubtype="0" fill="hold" nodeType="clickEffect">
+                                  <p:stCondLst>
+                                    <p:cond delay="0"/>
+                                  </p:stCondLst>
+                                  <p:childTnLst>
+                                    <p:set>
+                                      <p:cBhvr>
+                                        <p:cTn id="18" dur="1" fill="hold">
+                                          <p:stCondLst>
+                                            <p:cond delay="0"/>
+                                          </p:stCondLst>
+                                        </p:cTn>
+                                        <p:tgtEl>
+                                          <p:spTgt spid="3">
+                                            <p:txEl>
+                                              <p:pRg st="8" end="8"/>
+                                            </p:txEl>
+                                          </p:spTgt>
+                                        </p:tgtEl>
+                                        <p:attrNameLst>
+                                          <p:attrName>style.visibility</p:attrName>
+                                        </p:attrNameLst>
+                                      </p:cBhvr>
+                                      <p:to>
+                                        <p:strVal val="visible"/>
+                                      </p:to>
+                                    </p:set>
+                                  </p:childTnLst>
+                                </p:cTn>
+                              </p:par>
+                            </p:childTnLst>
+                          </p:cTn>
+                        </p:par>
+                      </p:childTnLst>
+                    </p:cTn>
+                  </p:par>
                 </p:childTnLst>
               </p:cTn>
               <p:prevCondLst>
@@ -11665,13 +12091,13 @@
           <a:p>
             <a:r>
               <a:rPr lang="en-US" dirty="0"/>
-              <a:t>Is part of standard python library</a:t>
+              <a:t>Is part of standard python library.</a:t>
             </a:r>
           </a:p>
           <a:p>
             <a:r>
               <a:rPr lang="en-US" dirty="0"/>
-              <a:t>Tests written with python Classes</a:t>
+              <a:t>Tests written with python Classes.</a:t>
             </a:r>
           </a:p>
           <a:p>
@@ -11685,7 +12111,7 @@
             </a:r>
             <a:r>
               <a:rPr lang="en-US" dirty="0"/>
-              <a:t> class</a:t>
+              <a:t> class.</a:t>
             </a:r>
           </a:p>
         </p:txBody>
@@ -12184,7 +12610,12 @@
             <p:ph idx="1"/>
           </p:nvPr>
         </p:nvSpPr>
-        <p:spPr/>
+        <p:spPr>
+          <a:xfrm>
+            <a:off x="680321" y="2336873"/>
+            <a:ext cx="9613861" cy="4034430"/>
+          </a:xfrm>
+        </p:spPr>
         <p:txBody>
           <a:bodyPr/>
           <a:lstStyle/>
@@ -12199,7 +12630,7 @@
             </a:r>
             <a:r>
               <a:rPr lang="en-US" dirty="0"/>
-              <a:t> package</a:t>
+              <a:t> package.</a:t>
             </a:r>
           </a:p>
           <a:p>
@@ -12213,13 +12644,13 @@
             </a:r>
             <a:r>
               <a:rPr lang="en-US" dirty="0"/>
-              <a:t> command line</a:t>
+              <a:t> command line.</a:t>
             </a:r>
           </a:p>
           <a:p>
             <a:r>
               <a:rPr lang="en-US" dirty="0"/>
-              <a:t>Tests written with functions using standard python assert()</a:t>
+              <a:t>Tests written with functions. Assertions with python assert().</a:t>
             </a:r>
           </a:p>
         </p:txBody>
@@ -12353,19 +12784,7 @@
               <a:rPr lang="en-US" sz="2400" dirty="0">
                 <a:latin typeface="Courier" pitchFamily="2" charset="0"/>
               </a:rPr>
-              <a:t>	</a:t>
-            </a:r>
-            <a:r>
-              <a:rPr lang="en-US" sz="2400" dirty="0" err="1">
-                <a:latin typeface="Courier" pitchFamily="2" charset="0"/>
-              </a:rPr>
-              <a:t>assertEqual</a:t>
-            </a:r>
-            <a:r>
-              <a:rPr lang="en-US" sz="2400" dirty="0">
-                <a:latin typeface="Courier" pitchFamily="2" charset="0"/>
-              </a:rPr>
-              <a:t>(1, result)</a:t>
+              <a:t>	assert result==1</a:t>
             </a:r>
           </a:p>
         </p:txBody>

</xml_diff>

<commit_message>
update slides and examples
</commit_message>
<xml_diff>
--- a/UnitTestingSlides.pptx
+++ b/UnitTestingSlides.pptx
@@ -5,26 +5,29 @@
     <p:sldMasterId id="2147483648" r:id="rId1"/>
   </p:sldMasterIdLst>
   <p:notesMasterIdLst>
-    <p:notesMasterId r:id="rId19"/>
+    <p:notesMasterId r:id="rId22"/>
   </p:notesMasterIdLst>
   <p:sldIdLst>
     <p:sldId id="256" r:id="rId2"/>
     <p:sldId id="257" r:id="rId3"/>
-    <p:sldId id="258" r:id="rId4"/>
-    <p:sldId id="259" r:id="rId5"/>
-    <p:sldId id="260" r:id="rId6"/>
-    <p:sldId id="261" r:id="rId7"/>
-    <p:sldId id="262" r:id="rId8"/>
-    <p:sldId id="271" r:id="rId9"/>
-    <p:sldId id="263" r:id="rId10"/>
-    <p:sldId id="272" r:id="rId11"/>
-    <p:sldId id="264" r:id="rId12"/>
-    <p:sldId id="265" r:id="rId13"/>
-    <p:sldId id="266" r:id="rId14"/>
-    <p:sldId id="267" r:id="rId15"/>
-    <p:sldId id="268" r:id="rId16"/>
-    <p:sldId id="269" r:id="rId17"/>
-    <p:sldId id="270" r:id="rId18"/>
+    <p:sldId id="273" r:id="rId4"/>
+    <p:sldId id="258" r:id="rId5"/>
+    <p:sldId id="259" r:id="rId6"/>
+    <p:sldId id="260" r:id="rId7"/>
+    <p:sldId id="261" r:id="rId8"/>
+    <p:sldId id="262" r:id="rId9"/>
+    <p:sldId id="274" r:id="rId10"/>
+    <p:sldId id="271" r:id="rId11"/>
+    <p:sldId id="263" r:id="rId12"/>
+    <p:sldId id="272" r:id="rId13"/>
+    <p:sldId id="264" r:id="rId14"/>
+    <p:sldId id="275" r:id="rId15"/>
+    <p:sldId id="265" r:id="rId16"/>
+    <p:sldId id="266" r:id="rId17"/>
+    <p:sldId id="267" r:id="rId18"/>
+    <p:sldId id="268" r:id="rId19"/>
+    <p:sldId id="269" r:id="rId20"/>
+    <p:sldId id="270" r:id="rId21"/>
   </p:sldIdLst>
   <p:sldSz cx="12192000" cy="6858000"/>
   <p:notesSz cx="6858000" cy="9144000"/>
@@ -213,7 +216,7 @@
           <a:p>
             <a:fld id="{EF6A6A60-C693-BC49-85A7-98B318EF45A1}" type="datetimeFigureOut">
               <a:rPr lang="en-US" smtClean="0"/>
-              <a:t>1/3/23</a:t>
+              <a:t>1/14/23</a:t>
             </a:fld>
             <a:endParaRPr lang="en-US"/>
           </a:p>
@@ -713,7 +716,7 @@
           <a:p>
             <a:fld id="{36CD89F0-D00C-704A-A77B-5E0A27D974ED}" type="slidenum">
               <a:rPr lang="en-US" smtClean="0"/>
-              <a:t>3</a:t>
+              <a:t>4</a:t>
             </a:fld>
             <a:endParaRPr lang="en-US"/>
           </a:p>
@@ -797,7 +800,7 @@
           <a:p>
             <a:fld id="{36CD89F0-D00C-704A-A77B-5E0A27D974ED}" type="slidenum">
               <a:rPr lang="en-US" smtClean="0"/>
-              <a:t>4</a:t>
+              <a:t>5</a:t>
             </a:fld>
             <a:endParaRPr lang="en-US"/>
           </a:p>
@@ -881,7 +884,7 @@
           <a:p>
             <a:fld id="{36CD89F0-D00C-704A-A77B-5E0A27D974ED}" type="slidenum">
               <a:rPr lang="en-US" smtClean="0"/>
-              <a:t>5</a:t>
+              <a:t>6</a:t>
             </a:fld>
             <a:endParaRPr lang="en-US"/>
           </a:p>
@@ -965,7 +968,7 @@
           <a:p>
             <a:fld id="{36CD89F0-D00C-704A-A77B-5E0A27D974ED}" type="slidenum">
               <a:rPr lang="en-US" smtClean="0"/>
-              <a:t>6</a:t>
+              <a:t>7</a:t>
             </a:fld>
             <a:endParaRPr lang="en-US"/>
           </a:p>
@@ -1049,7 +1052,7 @@
           <a:p>
             <a:fld id="{36CD89F0-D00C-704A-A77B-5E0A27D974ED}" type="slidenum">
               <a:rPr lang="en-US" smtClean="0"/>
-              <a:t>10</a:t>
+              <a:t>12</a:t>
             </a:fld>
             <a:endParaRPr lang="en-US"/>
           </a:p>
@@ -1342,7 +1345,7 @@
           <a:p>
             <a:fld id="{78ABE3C1-DBE1-495D-B57B-2849774B866A}" type="datetimeFigureOut">
               <a:rPr lang="en-US" dirty="0"/>
-              <a:t>1/3/23</a:t>
+              <a:t>1/14/23</a:t>
             </a:fld>
             <a:endParaRPr lang="en-US" dirty="0"/>
           </a:p>
@@ -1751,7 +1754,7 @@
           <a:p>
             <a:fld id="{446C117F-5CCF-4837-BE5F-2B92066CAFAF}" type="datetimeFigureOut">
               <a:rPr lang="en-US" dirty="0"/>
-              <a:t>1/3/23</a:t>
+              <a:t>1/14/23</a:t>
             </a:fld>
             <a:endParaRPr lang="en-US" dirty="0"/>
           </a:p>
@@ -2082,7 +2085,7 @@
           <a:p>
             <a:fld id="{84EB90BD-B6CE-46B7-997F-7313B992CCDC}" type="datetimeFigureOut">
               <a:rPr lang="en-US" dirty="0"/>
-              <a:t>1/3/23</a:t>
+              <a:t>1/14/23</a:t>
             </a:fld>
             <a:endParaRPr lang="en-US" dirty="0"/>
           </a:p>
@@ -2482,7 +2485,7 @@
           <a:p>
             <a:fld id="{CDB9D11F-B188-461D-B23F-39381795C052}" type="datetimeFigureOut">
               <a:rPr lang="en-US" dirty="0"/>
-              <a:t>1/3/23</a:t>
+              <a:t>1/14/23</a:t>
             </a:fld>
             <a:endParaRPr lang="en-US" dirty="0"/>
           </a:p>
@@ -3045,7 +3048,7 @@
           <a:p>
             <a:fld id="{52E6D8D9-55A2-4063-B0F3-121F44549695}" type="datetimeFigureOut">
               <a:rPr lang="en-US" dirty="0"/>
-              <a:t>1/3/23</a:t>
+              <a:t>1/14/23</a:t>
             </a:fld>
             <a:endParaRPr lang="en-US" dirty="0"/>
           </a:p>
@@ -3721,7 +3724,7 @@
           <a:p>
             <a:fld id="{D4B24536-994D-4021-A283-9F449C0DB509}" type="datetimeFigureOut">
               <a:rPr lang="en-US" dirty="0"/>
-              <a:t>1/3/23</a:t>
+              <a:t>1/14/23</a:t>
             </a:fld>
             <a:endParaRPr lang="en-US" dirty="0"/>
           </a:p>
@@ -4629,7 +4632,7 @@
           <a:p>
             <a:fld id="{3CBBBB78-C96F-47B7-AB17-D852CA960AC9}" type="datetimeFigureOut">
               <a:rPr lang="en-US" dirty="0"/>
-              <a:t>1/3/23</a:t>
+              <a:t>1/14/23</a:t>
             </a:fld>
             <a:endParaRPr lang="en-US" dirty="0"/>
           </a:p>
@@ -4937,7 +4940,7 @@
           <a:p>
             <a:fld id="{1FA3F48C-C7C6-4055-9F49-3777875E72AE}" type="datetimeFigureOut">
               <a:rPr lang="en-US" dirty="0"/>
-              <a:t>1/3/23</a:t>
+              <a:t>1/14/23</a:t>
             </a:fld>
             <a:endParaRPr lang="en-US" dirty="0"/>
           </a:p>
@@ -5196,7 +5199,7 @@
           <a:p>
             <a:fld id="{6178E61D-D431-422C-9764-11DAFE33AB63}" type="datetimeFigureOut">
               <a:rPr lang="en-US" dirty="0"/>
-              <a:t>1/3/23</a:t>
+              <a:t>1/14/23</a:t>
             </a:fld>
             <a:endParaRPr lang="en-US" dirty="0"/>
           </a:p>
@@ -5515,7 +5518,7 @@
           <a:p>
             <a:fld id="{12DE42F4-6EEF-4EF7-8ED4-2208F0F89A08}" type="datetimeFigureOut">
               <a:rPr lang="en-US" dirty="0"/>
-              <a:t>1/3/23</a:t>
+              <a:t>1/14/23</a:t>
             </a:fld>
             <a:endParaRPr lang="en-US" dirty="0"/>
           </a:p>
@@ -5899,7 +5902,7 @@
           <a:p>
             <a:fld id="{30578ACC-22D6-47C1-A373-4FD133E34F3C}" type="datetimeFigureOut">
               <a:rPr lang="en-US" dirty="0"/>
-              <a:t>1/3/23</a:t>
+              <a:t>1/14/23</a:t>
             </a:fld>
             <a:endParaRPr lang="en-US" dirty="0"/>
           </a:p>
@@ -6270,7 +6273,7 @@
           <a:p>
             <a:fld id="{4E5A6C69-6797-4E8A-BF37-F2C3751466E9}" type="datetimeFigureOut">
               <a:rPr lang="en-US" dirty="0"/>
-              <a:t>1/3/23</a:t>
+              <a:t>1/14/23</a:t>
             </a:fld>
             <a:endParaRPr lang="en-US" dirty="0"/>
           </a:p>
@@ -6771,7 +6774,7 @@
           <a:p>
             <a:fld id="{D82014A1-A632-4878-A0D3-F52BA7563730}" type="datetimeFigureOut">
               <a:rPr lang="en-US" dirty="0"/>
-              <a:t>1/3/23</a:t>
+              <a:t>1/14/23</a:t>
             </a:fld>
             <a:endParaRPr lang="en-US" dirty="0"/>
           </a:p>
@@ -7023,7 +7026,7 @@
           <a:p>
             <a:fld id="{CE99F462-093F-4566-844B-4C71F2739DA5}" type="datetimeFigureOut">
               <a:rPr lang="en-US" dirty="0"/>
-              <a:t>1/3/23</a:t>
+              <a:t>1/14/23</a:t>
             </a:fld>
             <a:endParaRPr lang="en-US" dirty="0"/>
           </a:p>
@@ -7181,7 +7184,7 @@
           <a:p>
             <a:fld id="{3D24A7AC-904D-4781-85BA-7D10C17ED021}" type="datetimeFigureOut">
               <a:rPr lang="en-US" dirty="0"/>
-              <a:t>1/3/23</a:t>
+              <a:t>1/14/23</a:t>
             </a:fld>
             <a:endParaRPr lang="en-US" dirty="0"/>
           </a:p>
@@ -7566,7 +7569,7 @@
           <a:p>
             <a:fld id="{E331444B-B92B-4E27-8C94-BB93EAF5CB18}" type="datetimeFigureOut">
               <a:rPr lang="en-US" dirty="0"/>
-              <a:t>1/3/23</a:t>
+              <a:t>1/14/23</a:t>
             </a:fld>
             <a:endParaRPr lang="en-US" dirty="0"/>
           </a:p>
@@ -7970,7 +7973,7 @@
           <a:p>
             <a:fld id="{363EFA5E-FA76-400D-B3DC-F0BA90E6D107}" type="datetimeFigureOut">
               <a:rPr lang="en-US" dirty="0"/>
-              <a:t>1/3/23</a:t>
+              <a:t>1/14/23</a:t>
             </a:fld>
             <a:endParaRPr lang="en-US" dirty="0"/>
           </a:p>
@@ -8209,7 +8212,7 @@
           <a:p>
             <a:fld id="{9D6E9DEC-419B-4CC5-A080-3B06BD5A8291}" type="datetimeFigureOut">
               <a:rPr lang="en-US" dirty="0"/>
-              <a:t>1/3/23</a:t>
+              <a:t>1/14/23</a:t>
             </a:fld>
             <a:endParaRPr lang="en-US" dirty="0"/>
           </a:p>
@@ -8675,7 +8678,15 @@
           <a:p>
             <a:r>
               <a:rPr lang="en-US" dirty="0"/>
-              <a:t>Princeton University Spring 2023</a:t>
+              <a:t>Princeton University </a:t>
+            </a:r>
+            <a:r>
+              <a:rPr lang="en-US" dirty="0" err="1"/>
+              <a:t>Wintersession</a:t>
+            </a:r>
+            <a:r>
+              <a:rPr lang="en-US" dirty="0"/>
+              <a:t> 2023</a:t>
             </a:r>
           </a:p>
           <a:p>
@@ -8683,6 +8694,61 @@
               <a:rPr lang="en-US" dirty="0"/>
               <a:t>Instructor: Bill Hasling (Princeton RSE Staff)</a:t>
             </a:r>
+          </a:p>
+        </p:txBody>
+      </p:sp>
+      <p:sp>
+        <p:nvSpPr>
+          <p:cNvPr id="4" name="TextBox 3">
+            <a:extLst>
+              <a:ext uri="{FF2B5EF4-FFF2-40B4-BE49-F238E27FC236}">
+                <a16:creationId xmlns:a16="http://schemas.microsoft.com/office/drawing/2014/main" id="{8467745C-1E08-7DC5-90B8-E80AC1B79759}"/>
+              </a:ext>
+            </a:extLst>
+          </p:cNvPr>
+          <p:cNvSpPr txBox="1"/>
+          <p:nvPr/>
+        </p:nvSpPr>
+        <p:spPr>
+          <a:xfrm>
+            <a:off x="0" y="5677981"/>
+            <a:ext cx="12192000" cy="523220"/>
+          </a:xfrm>
+          <a:prstGeom prst="rect">
+            <a:avLst/>
+          </a:prstGeom>
+          <a:noFill/>
+        </p:spPr>
+        <p:txBody>
+          <a:bodyPr wrap="square" rtlCol="0">
+            <a:spAutoFit/>
+          </a:bodyPr>
+          <a:lstStyle/>
+          <a:p>
+            <a:pPr marL="0" indent="0">
+              <a:buNone/>
+            </a:pPr>
+            <a:r>
+              <a:rPr lang="en-US" sz="2800" dirty="0">
+                <a:solidFill>
+                  <a:schemeClr val="bg1"/>
+                </a:solidFill>
+              </a:rPr>
+              <a:t>git clone </a:t>
+            </a:r>
+            <a:r>
+              <a:rPr lang="en-US" sz="2800" dirty="0">
+                <a:hlinkClick r:id="rId3">
+                  <a:extLst>
+                    <a:ext uri="{A12FA001-AC4F-418D-AE19-62706E023703}">
+                      <ahyp:hlinkClr xmlns:ahyp="http://schemas.microsoft.com/office/drawing/2018/hyperlinkcolor" val="tx"/>
+                    </a:ext>
+                  </a:extLst>
+                </a:hlinkClick>
+              </a:rPr>
+              <a:t>https://github.com/PrincetonUniversity/software_testing.git</a:t>
+            </a:r>
+            <a:endParaRPr lang="en-US" sz="2800" dirty="0"/>
           </a:p>
         </p:txBody>
       </p:sp>
@@ -8721,6 +8787,703 @@
           <p:cNvPr id="2" name="Title 1">
             <a:extLst>
               <a:ext uri="{FF2B5EF4-FFF2-40B4-BE49-F238E27FC236}">
+                <a16:creationId xmlns:a16="http://schemas.microsoft.com/office/drawing/2014/main" id="{508FB2AD-B5D4-D217-BB7C-5149AE41CA7D}"/>
+              </a:ext>
+            </a:extLst>
+          </p:cNvPr>
+          <p:cNvSpPr>
+            <a:spLocks noGrp="1"/>
+          </p:cNvSpPr>
+          <p:nvPr>
+            <p:ph type="title"/>
+          </p:nvPr>
+        </p:nvSpPr>
+        <p:spPr/>
+        <p:txBody>
+          <a:bodyPr/>
+          <a:lstStyle/>
+          <a:p>
+            <a:r>
+              <a:rPr lang="en-US" dirty="0"/>
+              <a:t>02 </a:t>
+            </a:r>
+            <a:r>
+              <a:rPr lang="en-US" dirty="0" err="1"/>
+              <a:t>UnitTest</a:t>
+            </a:r>
+            <a:r>
+              <a:rPr lang="en-US" dirty="0"/>
+              <a:t> setup </a:t>
+            </a:r>
+            <a:r>
+              <a:rPr lang="en-US" dirty="0" err="1"/>
+              <a:t>tearDown</a:t>
+            </a:r>
+            <a:endParaRPr lang="en-US" dirty="0"/>
+          </a:p>
+        </p:txBody>
+      </p:sp>
+      <p:sp>
+        <p:nvSpPr>
+          <p:cNvPr id="3" name="Content Placeholder 2">
+            <a:extLst>
+              <a:ext uri="{FF2B5EF4-FFF2-40B4-BE49-F238E27FC236}">
+                <a16:creationId xmlns:a16="http://schemas.microsoft.com/office/drawing/2014/main" id="{3651E43C-8E94-B0ED-1A01-F8E3B543F7BA}"/>
+              </a:ext>
+            </a:extLst>
+          </p:cNvPr>
+          <p:cNvSpPr>
+            <a:spLocks noGrp="1"/>
+          </p:cNvSpPr>
+          <p:nvPr>
+            <p:ph idx="1"/>
+          </p:nvPr>
+        </p:nvSpPr>
+        <p:spPr>
+          <a:xfrm>
+            <a:off x="680321" y="2115199"/>
+            <a:ext cx="9613861" cy="4521128"/>
+          </a:xfrm>
+        </p:spPr>
+        <p:txBody>
+          <a:bodyPr>
+            <a:normAutofit lnSpcReduction="10000"/>
+          </a:bodyPr>
+          <a:lstStyle/>
+          <a:p>
+            <a:pPr marL="0" indent="0">
+              <a:buNone/>
+            </a:pPr>
+            <a:r>
+              <a:rPr lang="en-US" dirty="0"/>
+              <a:t>In a unit test you can add a method to setup and teardown an environment that runs before/after each test.</a:t>
+            </a:r>
+          </a:p>
+          <a:p>
+            <a:pPr marL="0" indent="0">
+              <a:buNone/>
+            </a:pPr>
+            <a:endParaRPr lang="en-US" dirty="0"/>
+          </a:p>
+          <a:p>
+            <a:pPr marL="457200" lvl="1" indent="0">
+              <a:buNone/>
+            </a:pPr>
+            <a:r>
+              <a:rPr lang="en-US" sz="2400" dirty="0"/>
+              <a:t>class </a:t>
+            </a:r>
+            <a:r>
+              <a:rPr lang="en-US" sz="2400" dirty="0" err="1"/>
+              <a:t>Mytest</a:t>
+            </a:r>
+            <a:r>
+              <a:rPr lang="en-US" sz="2400" dirty="0"/>
+              <a:t>(</a:t>
+            </a:r>
+            <a:r>
+              <a:rPr lang="en-US" sz="2400" dirty="0" err="1"/>
+              <a:t>unittest.TestCase</a:t>
+            </a:r>
+            <a:r>
+              <a:rPr lang="en-US" sz="2400" dirty="0"/>
+              <a:t>):</a:t>
+            </a:r>
+          </a:p>
+          <a:p>
+            <a:pPr marL="457200" lvl="1" indent="0">
+              <a:buNone/>
+            </a:pPr>
+            <a:r>
+              <a:rPr lang="en-US" sz="2400" dirty="0"/>
+              <a:t>	def setup(self):</a:t>
+            </a:r>
+          </a:p>
+          <a:p>
+            <a:pPr marL="457200" lvl="1" indent="0">
+              <a:buNone/>
+            </a:pPr>
+            <a:r>
+              <a:rPr lang="en-US" sz="2400" dirty="0"/>
+              <a:t>		”””Run before each test”””</a:t>
+            </a:r>
+          </a:p>
+          <a:p>
+            <a:pPr marL="457200" lvl="1" indent="0">
+              <a:buNone/>
+            </a:pPr>
+            <a:r>
+              <a:rPr lang="en-US" sz="2400" dirty="0"/>
+              <a:t>	def </a:t>
+            </a:r>
+            <a:r>
+              <a:rPr lang="en-US" sz="2400" dirty="0" err="1"/>
+              <a:t>tearDown</a:t>
+            </a:r>
+            <a:r>
+              <a:rPr lang="en-US" sz="2400" dirty="0"/>
+              <a:t>(self):</a:t>
+            </a:r>
+          </a:p>
+          <a:p>
+            <a:pPr marL="457200" lvl="1" indent="0">
+              <a:buNone/>
+            </a:pPr>
+            <a:r>
+              <a:rPr lang="en-US" sz="2400" dirty="0"/>
+              <a:t>		“””Run after each test”””</a:t>
+            </a:r>
+          </a:p>
+          <a:p>
+            <a:pPr marL="457200" lvl="1" indent="0">
+              <a:buNone/>
+            </a:pPr>
+            <a:r>
+              <a:rPr lang="en-US" sz="2400" dirty="0"/>
+              <a:t>	def </a:t>
+            </a:r>
+            <a:r>
+              <a:rPr lang="en-US" sz="2400" dirty="0" err="1"/>
+              <a:t>setUpClass</a:t>
+            </a:r>
+            <a:r>
+              <a:rPr lang="en-US" sz="2400" dirty="0"/>
+              <a:t>(self):</a:t>
+            </a:r>
+          </a:p>
+          <a:p>
+            <a:pPr marL="457200" lvl="1" indent="0">
+              <a:buNone/>
+            </a:pPr>
+            <a:r>
+              <a:rPr lang="en-US" sz="2400" dirty="0"/>
+              <a:t>		”””Run once before all tests”””</a:t>
+            </a:r>
+          </a:p>
+          <a:p>
+            <a:pPr marL="457200" lvl="1" indent="0">
+              <a:buNone/>
+            </a:pPr>
+            <a:r>
+              <a:rPr lang="en-US" sz="2400" dirty="0"/>
+              <a:t>	def </a:t>
+            </a:r>
+            <a:r>
+              <a:rPr lang="en-US" sz="2400" dirty="0" err="1"/>
+              <a:t>tearDownClass</a:t>
+            </a:r>
+            <a:r>
+              <a:rPr lang="en-US" sz="2400" dirty="0"/>
+              <a:t>(self):</a:t>
+            </a:r>
+          </a:p>
+          <a:p>
+            <a:pPr marL="457200" lvl="1" indent="0">
+              <a:buNone/>
+            </a:pPr>
+            <a:r>
+              <a:rPr lang="en-US" sz="2400" dirty="0"/>
+              <a:t>		“””Run once after all tests”””</a:t>
+            </a:r>
+          </a:p>
+        </p:txBody>
+      </p:sp>
+    </p:spTree>
+    <p:extLst>
+      <p:ext uri="{BB962C8B-B14F-4D97-AF65-F5344CB8AC3E}">
+        <p14:creationId xmlns:p14="http://schemas.microsoft.com/office/powerpoint/2010/main" val="1666096593"/>
+      </p:ext>
+    </p:extLst>
+  </p:cSld>
+  <p:clrMapOvr>
+    <a:masterClrMapping/>
+  </p:clrMapOvr>
+</p:sld>
+</file>
+
+<file path=ppt/slides/slide11.xml><?xml version="1.0" encoding="utf-8"?>
+<p:sld xmlns:a="http://schemas.openxmlformats.org/drawingml/2006/main" xmlns:r="http://schemas.openxmlformats.org/officeDocument/2006/relationships" xmlns:p="http://schemas.openxmlformats.org/presentationml/2006/main">
+  <p:cSld>
+    <p:spTree>
+      <p:nvGrpSpPr>
+        <p:cNvPr id="1" name=""/>
+        <p:cNvGrpSpPr/>
+        <p:nvPr/>
+      </p:nvGrpSpPr>
+      <p:grpSpPr>
+        <a:xfrm>
+          <a:off x="0" y="0"/>
+          <a:ext cx="0" cy="0"/>
+          <a:chOff x="0" y="0"/>
+          <a:chExt cx="0" cy="0"/>
+        </a:xfrm>
+      </p:grpSpPr>
+      <p:sp>
+        <p:nvSpPr>
+          <p:cNvPr id="2" name="Title 1">
+            <a:extLst>
+              <a:ext uri="{FF2B5EF4-FFF2-40B4-BE49-F238E27FC236}">
+                <a16:creationId xmlns:a16="http://schemas.microsoft.com/office/drawing/2014/main" id="{7B1BC8CA-23DC-00F6-9485-97991DED6A35}"/>
+              </a:ext>
+            </a:extLst>
+          </p:cNvPr>
+          <p:cNvSpPr>
+            <a:spLocks noGrp="1"/>
+          </p:cNvSpPr>
+          <p:nvPr>
+            <p:ph type="title"/>
+          </p:nvPr>
+        </p:nvSpPr>
+        <p:spPr/>
+        <p:txBody>
+          <a:bodyPr/>
+          <a:lstStyle/>
+          <a:p>
+            <a:r>
+              <a:rPr lang="en-US" dirty="0"/>
+              <a:t>03 </a:t>
+            </a:r>
+            <a:r>
+              <a:rPr lang="en-US" dirty="0" err="1"/>
+              <a:t>PyTest</a:t>
+            </a:r>
+            <a:endParaRPr lang="en-US" dirty="0"/>
+          </a:p>
+        </p:txBody>
+      </p:sp>
+      <p:sp>
+        <p:nvSpPr>
+          <p:cNvPr id="3" name="Content Placeholder 2">
+            <a:extLst>
+              <a:ext uri="{FF2B5EF4-FFF2-40B4-BE49-F238E27FC236}">
+                <a16:creationId xmlns:a16="http://schemas.microsoft.com/office/drawing/2014/main" id="{D133F77E-93E8-297B-19D0-2CEFDBCB06FD}"/>
+              </a:ext>
+            </a:extLst>
+          </p:cNvPr>
+          <p:cNvSpPr>
+            <a:spLocks noGrp="1"/>
+          </p:cNvSpPr>
+          <p:nvPr>
+            <p:ph idx="1"/>
+          </p:nvPr>
+        </p:nvSpPr>
+        <p:spPr>
+          <a:xfrm>
+            <a:off x="680321" y="2336873"/>
+            <a:ext cx="9613861" cy="4034430"/>
+          </a:xfrm>
+        </p:spPr>
+        <p:txBody>
+          <a:bodyPr/>
+          <a:lstStyle/>
+          <a:p>
+            <a:r>
+              <a:rPr lang="en-US" dirty="0"/>
+              <a:t>Requires PIP install of </a:t>
+            </a:r>
+            <a:r>
+              <a:rPr lang="en-US" dirty="0" err="1"/>
+              <a:t>pytest</a:t>
+            </a:r>
+            <a:r>
+              <a:rPr lang="en-US" dirty="0"/>
+              <a:t> package.</a:t>
+            </a:r>
+          </a:p>
+          <a:p>
+            <a:r>
+              <a:rPr lang="en-US" dirty="0"/>
+              <a:t>Can be executed with </a:t>
+            </a:r>
+            <a:r>
+              <a:rPr lang="en-US" dirty="0" err="1"/>
+              <a:t>pytest</a:t>
+            </a:r>
+            <a:r>
+              <a:rPr lang="en-US" dirty="0"/>
+              <a:t> command line.</a:t>
+            </a:r>
+          </a:p>
+          <a:p>
+            <a:r>
+              <a:rPr lang="en-US" dirty="0"/>
+              <a:t>Tests written with functions. Assertions with python assert().</a:t>
+            </a:r>
+          </a:p>
+        </p:txBody>
+      </p:sp>
+      <p:sp>
+        <p:nvSpPr>
+          <p:cNvPr id="4" name="TextBox 3">
+            <a:extLst>
+              <a:ext uri="{FF2B5EF4-FFF2-40B4-BE49-F238E27FC236}">
+                <a16:creationId xmlns:a16="http://schemas.microsoft.com/office/drawing/2014/main" id="{E07ED173-C2F9-18B9-8090-CCB1DFE7FA10}"/>
+              </a:ext>
+            </a:extLst>
+          </p:cNvPr>
+          <p:cNvSpPr txBox="1"/>
+          <p:nvPr/>
+        </p:nvSpPr>
+        <p:spPr>
+          <a:xfrm>
+            <a:off x="1289069" y="3869673"/>
+            <a:ext cx="9613861" cy="2308324"/>
+          </a:xfrm>
+          <a:prstGeom prst="rect">
+            <a:avLst/>
+          </a:prstGeom>
+          <a:noFill/>
+        </p:spPr>
+        <p:txBody>
+          <a:bodyPr wrap="square" rtlCol="0">
+            <a:spAutoFit/>
+          </a:bodyPr>
+          <a:lstStyle/>
+          <a:p>
+            <a:pPr marL="0" indent="0">
+              <a:buNone/>
+            </a:pPr>
+            <a:r>
+              <a:rPr lang="en-US" sz="2400" dirty="0">
+                <a:latin typeface="Courier" pitchFamily="2" charset="0"/>
+              </a:rPr>
+              <a:t>import </a:t>
+            </a:r>
+            <a:r>
+              <a:rPr lang="en-US" sz="2400" dirty="0" err="1">
+                <a:latin typeface="Courier" pitchFamily="2" charset="0"/>
+              </a:rPr>
+              <a:t>pytest</a:t>
+            </a:r>
+            <a:endParaRPr lang="en-US" sz="2400" dirty="0">
+              <a:latin typeface="Courier" pitchFamily="2" charset="0"/>
+            </a:endParaRPr>
+          </a:p>
+          <a:p>
+            <a:pPr marL="0" indent="0">
+              <a:buNone/>
+            </a:pPr>
+            <a:r>
+              <a:rPr lang="en-US" sz="2400" dirty="0">
+                <a:latin typeface="Courier" pitchFamily="2" charset="0"/>
+              </a:rPr>
+              <a:t>from </a:t>
+            </a:r>
+            <a:r>
+              <a:rPr lang="en-US" sz="2400" dirty="0" err="1">
+                <a:latin typeface="Courier" pitchFamily="2" charset="0"/>
+              </a:rPr>
+              <a:t>myfunc</a:t>
+            </a:r>
+            <a:r>
+              <a:rPr lang="en-US" sz="2400" dirty="0">
+                <a:latin typeface="Courier" pitchFamily="2" charset="0"/>
+              </a:rPr>
+              <a:t> import </a:t>
+            </a:r>
+            <a:r>
+              <a:rPr lang="en-US" sz="2400" dirty="0" err="1">
+                <a:latin typeface="Courier" pitchFamily="2" charset="0"/>
+              </a:rPr>
+              <a:t>my_func</a:t>
+            </a:r>
+            <a:endParaRPr lang="en-US" sz="2400" dirty="0">
+              <a:latin typeface="Courier" pitchFamily="2" charset="0"/>
+            </a:endParaRPr>
+          </a:p>
+          <a:p>
+            <a:pPr marL="0" indent="0">
+              <a:buNone/>
+            </a:pPr>
+            <a:endParaRPr lang="en-US" sz="2400" dirty="0">
+              <a:latin typeface="Courier" pitchFamily="2" charset="0"/>
+            </a:endParaRPr>
+          </a:p>
+          <a:p>
+            <a:pPr marL="0" indent="0">
+              <a:buNone/>
+            </a:pPr>
+            <a:r>
+              <a:rPr lang="en-US" sz="2400" dirty="0">
+                <a:latin typeface="Courier" pitchFamily="2" charset="0"/>
+              </a:rPr>
+              <a:t>def test01(self):</a:t>
+            </a:r>
+          </a:p>
+          <a:p>
+            <a:pPr marL="0" indent="0">
+              <a:buNone/>
+            </a:pPr>
+            <a:r>
+              <a:rPr lang="en-US" sz="2400" dirty="0">
+                <a:latin typeface="Courier" pitchFamily="2" charset="0"/>
+              </a:rPr>
+              <a:t>	result = </a:t>
+            </a:r>
+            <a:r>
+              <a:rPr lang="en-US" sz="2400" dirty="0" err="1">
+                <a:latin typeface="Courier" pitchFamily="2" charset="0"/>
+              </a:rPr>
+              <a:t>my_func</a:t>
+            </a:r>
+            <a:r>
+              <a:rPr lang="en-US" sz="2400" dirty="0">
+                <a:latin typeface="Courier" pitchFamily="2" charset="0"/>
+              </a:rPr>
+              <a:t>(0)</a:t>
+            </a:r>
+          </a:p>
+          <a:p>
+            <a:pPr marL="0" indent="0">
+              <a:buNone/>
+            </a:pPr>
+            <a:r>
+              <a:rPr lang="en-US" sz="2400" dirty="0">
+                <a:latin typeface="Courier" pitchFamily="2" charset="0"/>
+              </a:rPr>
+              <a:t>	assert result==1</a:t>
+            </a:r>
+          </a:p>
+        </p:txBody>
+      </p:sp>
+    </p:spTree>
+    <p:extLst>
+      <p:ext uri="{BB962C8B-B14F-4D97-AF65-F5344CB8AC3E}">
+        <p14:creationId xmlns:p14="http://schemas.microsoft.com/office/powerpoint/2010/main" val="376151755"/>
+      </p:ext>
+    </p:extLst>
+  </p:cSld>
+  <p:clrMapOvr>
+    <a:masterClrMapping/>
+  </p:clrMapOvr>
+  <p:timing>
+    <p:tnLst>
+      <p:par>
+        <p:cTn id="1" dur="indefinite" restart="never" nodeType="tmRoot">
+          <p:childTnLst>
+            <p:seq concurrent="1" nextAc="seek">
+              <p:cTn id="2" dur="indefinite" nodeType="mainSeq">
+                <p:childTnLst>
+                  <p:par>
+                    <p:cTn id="3" fill="hold">
+                      <p:stCondLst>
+                        <p:cond delay="indefinite"/>
+                      </p:stCondLst>
+                      <p:childTnLst>
+                        <p:par>
+                          <p:cTn id="4" fill="hold">
+                            <p:stCondLst>
+                              <p:cond delay="0"/>
+                            </p:stCondLst>
+                            <p:childTnLst>
+                              <p:par>
+                                <p:cTn id="5" presetID="1" presetClass="entr" presetSubtype="0" fill="hold" nodeType="clickEffect">
+                                  <p:stCondLst>
+                                    <p:cond delay="0"/>
+                                  </p:stCondLst>
+                                  <p:childTnLst>
+                                    <p:set>
+                                      <p:cBhvr>
+                                        <p:cTn id="6" dur="1" fill="hold">
+                                          <p:stCondLst>
+                                            <p:cond delay="0"/>
+                                          </p:stCondLst>
+                                        </p:cTn>
+                                        <p:tgtEl>
+                                          <p:spTgt spid="4">
+                                            <p:txEl>
+                                              <p:pRg st="0" end="0"/>
+                                            </p:txEl>
+                                          </p:spTgt>
+                                        </p:tgtEl>
+                                        <p:attrNameLst>
+                                          <p:attrName>style.visibility</p:attrName>
+                                        </p:attrNameLst>
+                                      </p:cBhvr>
+                                      <p:to>
+                                        <p:strVal val="visible"/>
+                                      </p:to>
+                                    </p:set>
+                                  </p:childTnLst>
+                                </p:cTn>
+                              </p:par>
+                              <p:par>
+                                <p:cTn id="7" presetID="1" presetClass="entr" presetSubtype="0" fill="hold" nodeType="withEffect">
+                                  <p:stCondLst>
+                                    <p:cond delay="0"/>
+                                  </p:stCondLst>
+                                  <p:childTnLst>
+                                    <p:set>
+                                      <p:cBhvr>
+                                        <p:cTn id="8" dur="1" fill="hold">
+                                          <p:stCondLst>
+                                            <p:cond delay="0"/>
+                                          </p:stCondLst>
+                                        </p:cTn>
+                                        <p:tgtEl>
+                                          <p:spTgt spid="4">
+                                            <p:txEl>
+                                              <p:pRg st="1" end="1"/>
+                                            </p:txEl>
+                                          </p:spTgt>
+                                        </p:tgtEl>
+                                        <p:attrNameLst>
+                                          <p:attrName>style.visibility</p:attrName>
+                                        </p:attrNameLst>
+                                      </p:cBhvr>
+                                      <p:to>
+                                        <p:strVal val="visible"/>
+                                      </p:to>
+                                    </p:set>
+                                  </p:childTnLst>
+                                </p:cTn>
+                              </p:par>
+                              <p:par>
+                                <p:cTn id="9" presetID="1" presetClass="entr" presetSubtype="0" fill="hold" nodeType="withEffect">
+                                  <p:stCondLst>
+                                    <p:cond delay="0"/>
+                                  </p:stCondLst>
+                                  <p:childTnLst>
+                                    <p:set>
+                                      <p:cBhvr>
+                                        <p:cTn id="10" dur="1" fill="hold">
+                                          <p:stCondLst>
+                                            <p:cond delay="0"/>
+                                          </p:stCondLst>
+                                        </p:cTn>
+                                        <p:tgtEl>
+                                          <p:spTgt spid="4">
+                                            <p:txEl>
+                                              <p:pRg st="3" end="3"/>
+                                            </p:txEl>
+                                          </p:spTgt>
+                                        </p:tgtEl>
+                                        <p:attrNameLst>
+                                          <p:attrName>style.visibility</p:attrName>
+                                        </p:attrNameLst>
+                                      </p:cBhvr>
+                                      <p:to>
+                                        <p:strVal val="visible"/>
+                                      </p:to>
+                                    </p:set>
+                                  </p:childTnLst>
+                                </p:cTn>
+                              </p:par>
+                              <p:par>
+                                <p:cTn id="11" presetID="1" presetClass="entr" presetSubtype="0" fill="hold" nodeType="withEffect">
+                                  <p:stCondLst>
+                                    <p:cond delay="0"/>
+                                  </p:stCondLst>
+                                  <p:childTnLst>
+                                    <p:set>
+                                      <p:cBhvr>
+                                        <p:cTn id="12" dur="1" fill="hold">
+                                          <p:stCondLst>
+                                            <p:cond delay="0"/>
+                                          </p:stCondLst>
+                                        </p:cTn>
+                                        <p:tgtEl>
+                                          <p:spTgt spid="4">
+                                            <p:txEl>
+                                              <p:pRg st="4" end="4"/>
+                                            </p:txEl>
+                                          </p:spTgt>
+                                        </p:tgtEl>
+                                        <p:attrNameLst>
+                                          <p:attrName>style.visibility</p:attrName>
+                                        </p:attrNameLst>
+                                      </p:cBhvr>
+                                      <p:to>
+                                        <p:strVal val="visible"/>
+                                      </p:to>
+                                    </p:set>
+                                  </p:childTnLst>
+                                </p:cTn>
+                              </p:par>
+                              <p:par>
+                                <p:cTn id="13" presetID="1" presetClass="entr" presetSubtype="0" fill="hold" nodeType="withEffect">
+                                  <p:stCondLst>
+                                    <p:cond delay="0"/>
+                                  </p:stCondLst>
+                                  <p:childTnLst>
+                                    <p:set>
+                                      <p:cBhvr>
+                                        <p:cTn id="14" dur="1" fill="hold">
+                                          <p:stCondLst>
+                                            <p:cond delay="0"/>
+                                          </p:stCondLst>
+                                        </p:cTn>
+                                        <p:tgtEl>
+                                          <p:spTgt spid="4">
+                                            <p:txEl>
+                                              <p:pRg st="5" end="5"/>
+                                            </p:txEl>
+                                          </p:spTgt>
+                                        </p:tgtEl>
+                                        <p:attrNameLst>
+                                          <p:attrName>style.visibility</p:attrName>
+                                        </p:attrNameLst>
+                                      </p:cBhvr>
+                                      <p:to>
+                                        <p:strVal val="visible"/>
+                                      </p:to>
+                                    </p:set>
+                                  </p:childTnLst>
+                                </p:cTn>
+                              </p:par>
+                            </p:childTnLst>
+                          </p:cTn>
+                        </p:par>
+                      </p:childTnLst>
+                    </p:cTn>
+                  </p:par>
+                </p:childTnLst>
+              </p:cTn>
+              <p:prevCondLst>
+                <p:cond evt="onPrev" delay="0">
+                  <p:tgtEl>
+                    <p:sldTgt/>
+                  </p:tgtEl>
+                </p:cond>
+              </p:prevCondLst>
+              <p:nextCondLst>
+                <p:cond evt="onNext" delay="0">
+                  <p:tgtEl>
+                    <p:sldTgt/>
+                  </p:tgtEl>
+                </p:cond>
+              </p:nextCondLst>
+            </p:seq>
+          </p:childTnLst>
+        </p:cTn>
+      </p:par>
+    </p:tnLst>
+  </p:timing>
+</p:sld>
+</file>
+
+<file path=ppt/slides/slide12.xml><?xml version="1.0" encoding="utf-8"?>
+<p:sld xmlns:a="http://schemas.openxmlformats.org/drawingml/2006/main" xmlns:r="http://schemas.openxmlformats.org/officeDocument/2006/relationships" xmlns:p="http://schemas.openxmlformats.org/presentationml/2006/main">
+  <p:cSld>
+    <p:spTree>
+      <p:nvGrpSpPr>
+        <p:cNvPr id="1" name=""/>
+        <p:cNvGrpSpPr/>
+        <p:nvPr/>
+      </p:nvGrpSpPr>
+      <p:grpSpPr>
+        <a:xfrm>
+          <a:off x="0" y="0"/>
+          <a:ext cx="0" cy="0"/>
+          <a:chOff x="0" y="0"/>
+          <a:chExt cx="0" cy="0"/>
+        </a:xfrm>
+      </p:grpSpPr>
+      <p:sp>
+        <p:nvSpPr>
+          <p:cNvPr id="2" name="Title 1">
+            <a:extLst>
+              <a:ext uri="{FF2B5EF4-FFF2-40B4-BE49-F238E27FC236}">
                 <a16:creationId xmlns:a16="http://schemas.microsoft.com/office/drawing/2014/main" id="{73616EDE-C681-FF0F-08B5-A0FCB45FC85D}"/>
               </a:ext>
             </a:extLst>
@@ -8906,7 +9669,7 @@
 </p:sld>
 </file>
 
-<file path=ppt/slides/slide11.xml><?xml version="1.0" encoding="utf-8"?>
+<file path=ppt/slides/slide13.xml><?xml version="1.0" encoding="utf-8"?>
 <p:sld xmlns:a="http://schemas.openxmlformats.org/drawingml/2006/main" xmlns:r="http://schemas.openxmlformats.org/officeDocument/2006/relationships" xmlns:p="http://schemas.openxmlformats.org/presentationml/2006/main">
   <p:cSld>
     <p:spTree>
@@ -9532,7 +10295,692 @@
 </p:sld>
 </file>
 
-<file path=ppt/slides/slide12.xml><?xml version="1.0" encoding="utf-8"?>
+<file path=ppt/slides/slide14.xml><?xml version="1.0" encoding="utf-8"?>
+<p:sld xmlns:a="http://schemas.openxmlformats.org/drawingml/2006/main" xmlns:r="http://schemas.openxmlformats.org/officeDocument/2006/relationships" xmlns:p="http://schemas.openxmlformats.org/presentationml/2006/main">
+  <p:cSld>
+    <p:spTree>
+      <p:nvGrpSpPr>
+        <p:cNvPr id="1" name=""/>
+        <p:cNvGrpSpPr/>
+        <p:nvPr/>
+      </p:nvGrpSpPr>
+      <p:grpSpPr>
+        <a:xfrm>
+          <a:off x="0" y="0"/>
+          <a:ext cx="0" cy="0"/>
+          <a:chOff x="0" y="0"/>
+          <a:chExt cx="0" cy="0"/>
+        </a:xfrm>
+      </p:grpSpPr>
+      <p:sp>
+        <p:nvSpPr>
+          <p:cNvPr id="2" name="Title 1">
+            <a:extLst>
+              <a:ext uri="{FF2B5EF4-FFF2-40B4-BE49-F238E27FC236}">
+                <a16:creationId xmlns:a16="http://schemas.microsoft.com/office/drawing/2014/main" id="{13126664-8BE4-65A1-D9DD-B7A77299AC05}"/>
+              </a:ext>
+            </a:extLst>
+          </p:cNvPr>
+          <p:cNvSpPr>
+            <a:spLocks noGrp="1"/>
+          </p:cNvSpPr>
+          <p:nvPr>
+            <p:ph type="title"/>
+          </p:nvPr>
+        </p:nvSpPr>
+        <p:spPr/>
+        <p:txBody>
+          <a:bodyPr/>
+          <a:lstStyle/>
+          <a:p>
+            <a:r>
+              <a:rPr lang="en-US" dirty="0"/>
+              <a:t>05 C++ Testing</a:t>
+            </a:r>
+          </a:p>
+        </p:txBody>
+      </p:sp>
+      <p:sp>
+        <p:nvSpPr>
+          <p:cNvPr id="3" name="Content Placeholder 2">
+            <a:extLst>
+              <a:ext uri="{FF2B5EF4-FFF2-40B4-BE49-F238E27FC236}">
+                <a16:creationId xmlns:a16="http://schemas.microsoft.com/office/drawing/2014/main" id="{8E996BD5-C477-7FE7-4BEA-9FCB725D42EF}"/>
+              </a:ext>
+            </a:extLst>
+          </p:cNvPr>
+          <p:cNvSpPr>
+            <a:spLocks noGrp="1"/>
+          </p:cNvSpPr>
+          <p:nvPr>
+            <p:ph idx="1"/>
+          </p:nvPr>
+        </p:nvSpPr>
+        <p:spPr>
+          <a:xfrm>
+            <a:off x="658434" y="2092372"/>
+            <a:ext cx="9613861" cy="697272"/>
+          </a:xfrm>
+        </p:spPr>
+        <p:txBody>
+          <a:bodyPr/>
+          <a:lstStyle/>
+          <a:p>
+            <a:pPr marL="0" indent="0">
+              <a:buNone/>
+            </a:pPr>
+            <a:r>
+              <a:rPr lang="en-US" dirty="0"/>
+              <a:t>Boost Test is a Popular Testing Framework for C++</a:t>
+            </a:r>
+          </a:p>
+          <a:p>
+            <a:pPr marL="0" indent="0">
+              <a:buNone/>
+            </a:pPr>
+            <a:endParaRPr lang="en-US" dirty="0"/>
+          </a:p>
+          <a:p>
+            <a:pPr marL="0" indent="0">
+              <a:buNone/>
+            </a:pPr>
+            <a:endParaRPr lang="en-US" dirty="0"/>
+          </a:p>
+        </p:txBody>
+      </p:sp>
+      <p:sp>
+        <p:nvSpPr>
+          <p:cNvPr id="4" name="TextBox 3">
+            <a:extLst>
+              <a:ext uri="{FF2B5EF4-FFF2-40B4-BE49-F238E27FC236}">
+                <a16:creationId xmlns:a16="http://schemas.microsoft.com/office/drawing/2014/main" id="{C93011BF-2B2E-1AE5-C772-7470F25E00E1}"/>
+              </a:ext>
+            </a:extLst>
+          </p:cNvPr>
+          <p:cNvSpPr txBox="1"/>
+          <p:nvPr/>
+        </p:nvSpPr>
+        <p:spPr>
+          <a:xfrm>
+            <a:off x="1919705" y="2531194"/>
+            <a:ext cx="7135091" cy="2585323"/>
+          </a:xfrm>
+          <a:prstGeom prst="rect">
+            <a:avLst/>
+          </a:prstGeom>
+          <a:noFill/>
+        </p:spPr>
+        <p:txBody>
+          <a:bodyPr wrap="square" rtlCol="0">
+            <a:spAutoFit/>
+          </a:bodyPr>
+          <a:lstStyle/>
+          <a:p>
+            <a:r>
+              <a:rPr lang="en-US" b="0" dirty="0">
+                <a:solidFill>
+                  <a:srgbClr val="0000FF"/>
+                </a:solidFill>
+                <a:effectLst/>
+                <a:latin typeface="Menlo" panose="020B0609030804020204" pitchFamily="49" charset="0"/>
+              </a:rPr>
+              <a:t>#define BOOST_TEST_MODULE My Test</a:t>
+            </a:r>
+            <a:endParaRPr lang="en-US" b="0" dirty="0">
+              <a:solidFill>
+                <a:srgbClr val="000000"/>
+              </a:solidFill>
+              <a:effectLst/>
+              <a:latin typeface="Menlo" panose="020B0609030804020204" pitchFamily="49" charset="0"/>
+            </a:endParaRPr>
+          </a:p>
+          <a:p>
+            <a:r>
+              <a:rPr lang="en-US" b="0" dirty="0">
+                <a:solidFill>
+                  <a:srgbClr val="0000FF"/>
+                </a:solidFill>
+                <a:effectLst/>
+                <a:latin typeface="Menlo" panose="020B0609030804020204" pitchFamily="49" charset="0"/>
+              </a:rPr>
+              <a:t>#include </a:t>
+            </a:r>
+            <a:r>
+              <a:rPr lang="en-US" b="0" dirty="0">
+                <a:solidFill>
+                  <a:srgbClr val="A31515"/>
+                </a:solidFill>
+                <a:effectLst/>
+                <a:latin typeface="Menlo" panose="020B0609030804020204" pitchFamily="49" charset="0"/>
+              </a:rPr>
+              <a:t>&lt;boost/test/included/</a:t>
+            </a:r>
+            <a:r>
+              <a:rPr lang="en-US" b="0" dirty="0" err="1">
+                <a:solidFill>
+                  <a:srgbClr val="A31515"/>
+                </a:solidFill>
+                <a:effectLst/>
+                <a:latin typeface="Menlo" panose="020B0609030804020204" pitchFamily="49" charset="0"/>
+              </a:rPr>
+              <a:t>unit_test.hpp</a:t>
+            </a:r>
+            <a:r>
+              <a:rPr lang="en-US" b="0" dirty="0">
+                <a:solidFill>
+                  <a:srgbClr val="A31515"/>
+                </a:solidFill>
+                <a:effectLst/>
+                <a:latin typeface="Menlo" panose="020B0609030804020204" pitchFamily="49" charset="0"/>
+              </a:rPr>
+              <a:t>&gt;</a:t>
+            </a:r>
+            <a:endParaRPr lang="en-US" b="0" dirty="0">
+              <a:solidFill>
+                <a:srgbClr val="000000"/>
+              </a:solidFill>
+              <a:effectLst/>
+              <a:latin typeface="Menlo" panose="020B0609030804020204" pitchFamily="49" charset="0"/>
+            </a:endParaRPr>
+          </a:p>
+          <a:p>
+            <a:br>
+              <a:rPr lang="en-US" b="0" dirty="0">
+                <a:solidFill>
+                  <a:srgbClr val="000000"/>
+                </a:solidFill>
+                <a:effectLst/>
+                <a:latin typeface="Menlo" panose="020B0609030804020204" pitchFamily="49" charset="0"/>
+              </a:rPr>
+            </a:br>
+            <a:r>
+              <a:rPr lang="en-US" b="0" dirty="0">
+                <a:solidFill>
+                  <a:srgbClr val="000000"/>
+                </a:solidFill>
+                <a:effectLst/>
+                <a:latin typeface="Menlo" panose="020B0609030804020204" pitchFamily="49" charset="0"/>
+              </a:rPr>
+              <a:t>BOOST_AUTO_TEST_CASE(</a:t>
+            </a:r>
+            <a:r>
+              <a:rPr lang="en-US" b="0" dirty="0" err="1">
+                <a:solidFill>
+                  <a:srgbClr val="000000"/>
+                </a:solidFill>
+                <a:effectLst/>
+                <a:latin typeface="Menlo" panose="020B0609030804020204" pitchFamily="49" charset="0"/>
+              </a:rPr>
+              <a:t>first_test</a:t>
+            </a:r>
+            <a:r>
+              <a:rPr lang="en-US" b="0" dirty="0">
+                <a:solidFill>
+                  <a:srgbClr val="000000"/>
+                </a:solidFill>
+                <a:effectLst/>
+                <a:latin typeface="Menlo" panose="020B0609030804020204" pitchFamily="49" charset="0"/>
+              </a:rPr>
+              <a:t>)</a:t>
+            </a:r>
+          </a:p>
+          <a:p>
+            <a:r>
+              <a:rPr lang="en-US" b="0" dirty="0">
+                <a:solidFill>
+                  <a:srgbClr val="000000"/>
+                </a:solidFill>
+                <a:effectLst/>
+                <a:latin typeface="Menlo" panose="020B0609030804020204" pitchFamily="49" charset="0"/>
+              </a:rPr>
+              <a:t>{</a:t>
+            </a:r>
+          </a:p>
+          <a:p>
+            <a:r>
+              <a:rPr lang="en-US" b="0" dirty="0">
+                <a:solidFill>
+                  <a:srgbClr val="0000FF"/>
+                </a:solidFill>
+                <a:effectLst/>
+                <a:latin typeface="Menlo" panose="020B0609030804020204" pitchFamily="49" charset="0"/>
+              </a:rPr>
+              <a:t>    int</a:t>
+            </a:r>
+            <a:r>
+              <a:rPr lang="en-US" b="0" dirty="0">
+                <a:solidFill>
+                  <a:srgbClr val="000000"/>
+                </a:solidFill>
+                <a:effectLst/>
+                <a:latin typeface="Menlo" panose="020B0609030804020204" pitchFamily="49" charset="0"/>
+              </a:rPr>
+              <a:t> </a:t>
+            </a:r>
+            <a:r>
+              <a:rPr lang="en-US" b="0" dirty="0" err="1">
+                <a:solidFill>
+                  <a:srgbClr val="000000"/>
+                </a:solidFill>
+                <a:effectLst/>
+                <a:latin typeface="Menlo" panose="020B0609030804020204" pitchFamily="49" charset="0"/>
+              </a:rPr>
+              <a:t>i</a:t>
+            </a:r>
+            <a:r>
+              <a:rPr lang="en-US" b="0" dirty="0">
+                <a:solidFill>
+                  <a:srgbClr val="000000"/>
+                </a:solidFill>
+                <a:effectLst/>
+                <a:latin typeface="Menlo" panose="020B0609030804020204" pitchFamily="49" charset="0"/>
+              </a:rPr>
+              <a:t> = </a:t>
+            </a:r>
+            <a:r>
+              <a:rPr lang="en-US" b="0" dirty="0">
+                <a:solidFill>
+                  <a:srgbClr val="098658"/>
+                </a:solidFill>
+                <a:effectLst/>
+                <a:latin typeface="Menlo" panose="020B0609030804020204" pitchFamily="49" charset="0"/>
+              </a:rPr>
+              <a:t>1</a:t>
+            </a:r>
+            <a:r>
+              <a:rPr lang="en-US" b="0" dirty="0">
+                <a:solidFill>
+                  <a:srgbClr val="000000"/>
+                </a:solidFill>
+                <a:effectLst/>
+                <a:latin typeface="Menlo" panose="020B0609030804020204" pitchFamily="49" charset="0"/>
+              </a:rPr>
+              <a:t>;</a:t>
+            </a:r>
+          </a:p>
+          <a:p>
+            <a:r>
+              <a:rPr lang="en-US" b="0" dirty="0">
+                <a:solidFill>
+                  <a:srgbClr val="000000"/>
+                </a:solidFill>
+                <a:effectLst/>
+                <a:latin typeface="Menlo" panose="020B0609030804020204" pitchFamily="49" charset="0"/>
+              </a:rPr>
+              <a:t>    BOOST_TEST(</a:t>
+            </a:r>
+            <a:r>
+              <a:rPr lang="en-US" b="0" dirty="0" err="1">
+                <a:solidFill>
+                  <a:srgbClr val="000000"/>
+                </a:solidFill>
+                <a:effectLst/>
+                <a:latin typeface="Menlo" panose="020B0609030804020204" pitchFamily="49" charset="0"/>
+              </a:rPr>
+              <a:t>i</a:t>
+            </a:r>
+            <a:r>
+              <a:rPr lang="en-US" b="0" dirty="0">
+                <a:solidFill>
+                  <a:srgbClr val="000000"/>
+                </a:solidFill>
+                <a:effectLst/>
+                <a:latin typeface="Menlo" panose="020B0609030804020204" pitchFamily="49" charset="0"/>
+              </a:rPr>
+              <a:t>);</a:t>
+            </a:r>
+          </a:p>
+          <a:p>
+            <a:r>
+              <a:rPr lang="en-US" b="0" dirty="0">
+                <a:solidFill>
+                  <a:srgbClr val="000000"/>
+                </a:solidFill>
+                <a:effectLst/>
+                <a:latin typeface="Menlo" panose="020B0609030804020204" pitchFamily="49" charset="0"/>
+              </a:rPr>
+              <a:t>    BOOST_TEST(</a:t>
+            </a:r>
+            <a:r>
+              <a:rPr lang="en-US" b="0" dirty="0" err="1">
+                <a:solidFill>
+                  <a:srgbClr val="000000"/>
+                </a:solidFill>
+                <a:effectLst/>
+                <a:latin typeface="Menlo" panose="020B0609030804020204" pitchFamily="49" charset="0"/>
+              </a:rPr>
+              <a:t>i</a:t>
+            </a:r>
+            <a:r>
+              <a:rPr lang="en-US" b="0" dirty="0">
+                <a:solidFill>
+                  <a:srgbClr val="000000"/>
+                </a:solidFill>
+                <a:effectLst/>
+                <a:latin typeface="Menlo" panose="020B0609030804020204" pitchFamily="49" charset="0"/>
+              </a:rPr>
+              <a:t> == </a:t>
+            </a:r>
+            <a:r>
+              <a:rPr lang="en-US" b="0" dirty="0">
+                <a:solidFill>
+                  <a:srgbClr val="098658"/>
+                </a:solidFill>
+                <a:effectLst/>
+                <a:latin typeface="Menlo" panose="020B0609030804020204" pitchFamily="49" charset="0"/>
+              </a:rPr>
+              <a:t>2</a:t>
+            </a:r>
+            <a:r>
+              <a:rPr lang="en-US" b="0" dirty="0">
+                <a:solidFill>
+                  <a:srgbClr val="000000"/>
+                </a:solidFill>
+                <a:effectLst/>
+                <a:latin typeface="Menlo" panose="020B0609030804020204" pitchFamily="49" charset="0"/>
+              </a:rPr>
+              <a:t>);</a:t>
+            </a:r>
+          </a:p>
+          <a:p>
+            <a:r>
+              <a:rPr lang="en-US" b="0" dirty="0">
+                <a:solidFill>
+                  <a:srgbClr val="000000"/>
+                </a:solidFill>
+                <a:effectLst/>
+                <a:latin typeface="Menlo" panose="020B0609030804020204" pitchFamily="49" charset="0"/>
+              </a:rPr>
+              <a:t>}</a:t>
+            </a:r>
+          </a:p>
+        </p:txBody>
+      </p:sp>
+      <p:sp>
+        <p:nvSpPr>
+          <p:cNvPr id="5" name="TextBox 4">
+            <a:extLst>
+              <a:ext uri="{FF2B5EF4-FFF2-40B4-BE49-F238E27FC236}">
+                <a16:creationId xmlns:a16="http://schemas.microsoft.com/office/drawing/2014/main" id="{75A8009C-2A09-68C6-F2C7-4DD46FDB2A1A}"/>
+              </a:ext>
+            </a:extLst>
+          </p:cNvPr>
+          <p:cNvSpPr txBox="1"/>
+          <p:nvPr/>
+        </p:nvSpPr>
+        <p:spPr>
+          <a:xfrm>
+            <a:off x="472503" y="5023835"/>
+            <a:ext cx="10504799" cy="2031325"/>
+          </a:xfrm>
+          <a:prstGeom prst="rect">
+            <a:avLst/>
+          </a:prstGeom>
+          <a:noFill/>
+        </p:spPr>
+        <p:txBody>
+          <a:bodyPr wrap="none" rtlCol="0">
+            <a:spAutoFit/>
+          </a:bodyPr>
+          <a:lstStyle/>
+          <a:p>
+            <a:r>
+              <a:rPr lang="en-US" b="0" dirty="0">
+                <a:solidFill>
+                  <a:srgbClr val="000000"/>
+                </a:solidFill>
+                <a:effectLst/>
+                <a:latin typeface="Menlo" panose="020B0609030804020204" pitchFamily="49" charset="0"/>
+              </a:rPr>
+              <a:t>$ g++ </a:t>
+            </a:r>
+            <a:r>
+              <a:rPr lang="en-US" b="0" dirty="0" err="1">
+                <a:solidFill>
+                  <a:srgbClr val="000000"/>
+                </a:solidFill>
+                <a:effectLst/>
+                <a:latin typeface="Menlo" panose="020B0609030804020204" pitchFamily="49" charset="0"/>
+              </a:rPr>
+              <a:t>test_file.cpp</a:t>
+            </a:r>
+            <a:r>
+              <a:rPr lang="en-US" b="0" dirty="0">
+                <a:solidFill>
+                  <a:srgbClr val="000000"/>
+                </a:solidFill>
+                <a:effectLst/>
+                <a:latin typeface="Menlo" panose="020B0609030804020204" pitchFamily="49" charset="0"/>
+              </a:rPr>
+              <a:t> </a:t>
+            </a:r>
+          </a:p>
+          <a:p>
+            <a:r>
+              <a:rPr lang="en-US" b="0" dirty="0">
+                <a:solidFill>
+                  <a:srgbClr val="000000"/>
+                </a:solidFill>
+                <a:effectLst/>
+                <a:latin typeface="Menlo" panose="020B0609030804020204" pitchFamily="49" charset="0"/>
+              </a:rPr>
+              <a:t>$ ./</a:t>
+            </a:r>
+            <a:r>
+              <a:rPr lang="en-US" b="0" dirty="0" err="1">
+                <a:solidFill>
+                  <a:srgbClr val="000000"/>
+                </a:solidFill>
+                <a:effectLst/>
+                <a:latin typeface="Menlo" panose="020B0609030804020204" pitchFamily="49" charset="0"/>
+              </a:rPr>
+              <a:t>a.out</a:t>
+            </a:r>
+            <a:r>
+              <a:rPr lang="en-US" b="0" dirty="0">
+                <a:solidFill>
+                  <a:srgbClr val="000000"/>
+                </a:solidFill>
+                <a:effectLst/>
+                <a:latin typeface="Menlo" panose="020B0609030804020204" pitchFamily="49" charset="0"/>
+              </a:rPr>
+              <a:t> </a:t>
+            </a:r>
+          </a:p>
+          <a:p>
+            <a:r>
+              <a:rPr lang="en-US" b="0" dirty="0">
+                <a:solidFill>
+                  <a:srgbClr val="000000"/>
+                </a:solidFill>
+                <a:effectLst/>
+                <a:latin typeface="Menlo" panose="020B0609030804020204" pitchFamily="49" charset="0"/>
+              </a:rPr>
+              <a:t>Running 1 test case...</a:t>
+            </a:r>
+          </a:p>
+          <a:p>
+            <a:r>
+              <a:rPr lang="en-US" b="0" dirty="0" err="1">
+                <a:solidFill>
+                  <a:srgbClr val="000000"/>
+                </a:solidFill>
+                <a:effectLst/>
+                <a:latin typeface="Menlo" panose="020B0609030804020204" pitchFamily="49" charset="0"/>
+              </a:rPr>
+              <a:t>test_file.cpp</a:t>
+            </a:r>
+            <a:r>
+              <a:rPr lang="en-US" b="0" dirty="0">
+                <a:solidFill>
+                  <a:srgbClr val="000000"/>
+                </a:solidFill>
+                <a:effectLst/>
+                <a:latin typeface="Menlo" panose="020B0609030804020204" pitchFamily="49" charset="0"/>
+              </a:rPr>
+              <a:t>(8): error: </a:t>
+            </a:r>
+            <a:r>
+              <a:rPr lang="en-US" b="0" dirty="0">
+                <a:solidFill>
+                  <a:srgbClr val="0000FF"/>
+                </a:solidFill>
+                <a:effectLst/>
+                <a:latin typeface="Menlo" panose="020B0609030804020204" pitchFamily="49" charset="0"/>
+              </a:rPr>
+              <a:t>in</a:t>
+            </a:r>
+            <a:r>
+              <a:rPr lang="en-US" b="0" dirty="0">
+                <a:solidFill>
+                  <a:srgbClr val="000000"/>
+                </a:solidFill>
+                <a:effectLst/>
+                <a:latin typeface="Menlo" panose="020B0609030804020204" pitchFamily="49" charset="0"/>
+              </a:rPr>
+              <a:t> </a:t>
+            </a:r>
+            <a:r>
+              <a:rPr lang="en-US" b="0" dirty="0">
+                <a:solidFill>
+                  <a:srgbClr val="A31515"/>
+                </a:solidFill>
+                <a:effectLst/>
+                <a:latin typeface="Menlo" panose="020B0609030804020204" pitchFamily="49" charset="0"/>
+              </a:rPr>
+              <a:t>"</a:t>
+            </a:r>
+            <a:r>
+              <a:rPr lang="en-US" b="0" dirty="0" err="1">
+                <a:solidFill>
+                  <a:srgbClr val="A31515"/>
+                </a:solidFill>
+                <a:effectLst/>
+                <a:latin typeface="Menlo" panose="020B0609030804020204" pitchFamily="49" charset="0"/>
+              </a:rPr>
+              <a:t>first_test</a:t>
+            </a:r>
+            <a:r>
+              <a:rPr lang="en-US" b="0" dirty="0">
+                <a:solidFill>
+                  <a:srgbClr val="A31515"/>
+                </a:solidFill>
+                <a:effectLst/>
+                <a:latin typeface="Menlo" panose="020B0609030804020204" pitchFamily="49" charset="0"/>
+              </a:rPr>
+              <a:t>"</a:t>
+            </a:r>
+            <a:r>
+              <a:rPr lang="en-US" b="0" dirty="0">
+                <a:solidFill>
+                  <a:srgbClr val="000000"/>
+                </a:solidFill>
+                <a:effectLst/>
+                <a:latin typeface="Menlo" panose="020B0609030804020204" pitchFamily="49" charset="0"/>
+              </a:rPr>
+              <a:t>: check </a:t>
+            </a:r>
+            <a:r>
+              <a:rPr lang="en-US" b="0" dirty="0" err="1">
+                <a:solidFill>
+                  <a:srgbClr val="000000"/>
+                </a:solidFill>
+                <a:effectLst/>
+                <a:latin typeface="Menlo" panose="020B0609030804020204" pitchFamily="49" charset="0"/>
+              </a:rPr>
+              <a:t>i</a:t>
+            </a:r>
+            <a:r>
+              <a:rPr lang="en-US" b="0" dirty="0">
+                <a:solidFill>
+                  <a:srgbClr val="000000"/>
+                </a:solidFill>
+                <a:effectLst/>
+                <a:latin typeface="Menlo" panose="020B0609030804020204" pitchFamily="49" charset="0"/>
+              </a:rPr>
+              <a:t> == 2 has failed [1 != 2]</a:t>
+            </a:r>
+          </a:p>
+          <a:p>
+            <a:br>
+              <a:rPr lang="en-US" b="0" dirty="0">
+                <a:solidFill>
+                  <a:srgbClr val="000000"/>
+                </a:solidFill>
+                <a:effectLst/>
+                <a:latin typeface="Menlo" panose="020B0609030804020204" pitchFamily="49" charset="0"/>
+              </a:rPr>
+            </a:br>
+            <a:r>
+              <a:rPr lang="en-US" b="0" dirty="0">
+                <a:solidFill>
+                  <a:srgbClr val="000000"/>
+                </a:solidFill>
+                <a:effectLst/>
+                <a:latin typeface="Menlo" panose="020B0609030804020204" pitchFamily="49" charset="0"/>
+              </a:rPr>
+              <a:t>*** 1 failure is detected </a:t>
+            </a:r>
+            <a:r>
+              <a:rPr lang="en-US" b="0" dirty="0">
+                <a:solidFill>
+                  <a:srgbClr val="0000FF"/>
+                </a:solidFill>
+                <a:effectLst/>
+                <a:latin typeface="Menlo" panose="020B0609030804020204" pitchFamily="49" charset="0"/>
+              </a:rPr>
+              <a:t>in</a:t>
+            </a:r>
+            <a:r>
+              <a:rPr lang="en-US" b="0" dirty="0">
+                <a:solidFill>
+                  <a:srgbClr val="000000"/>
+                </a:solidFill>
+                <a:effectLst/>
+                <a:latin typeface="Menlo" panose="020B0609030804020204" pitchFamily="49" charset="0"/>
+              </a:rPr>
+              <a:t> the test module </a:t>
+            </a:r>
+            <a:r>
+              <a:rPr lang="en-US" b="0" dirty="0">
+                <a:solidFill>
+                  <a:srgbClr val="A31515"/>
+                </a:solidFill>
+                <a:effectLst/>
+                <a:latin typeface="Menlo" panose="020B0609030804020204" pitchFamily="49" charset="0"/>
+              </a:rPr>
+              <a:t>"My Test"</a:t>
+            </a:r>
+            <a:r>
+              <a:rPr lang="en-US" b="0" dirty="0">
+                <a:solidFill>
+                  <a:srgbClr val="000000"/>
+                </a:solidFill>
+                <a:effectLst/>
+                <a:latin typeface="Menlo" panose="020B0609030804020204" pitchFamily="49" charset="0"/>
+              </a:rPr>
+              <a:t> </a:t>
+            </a:r>
+          </a:p>
+          <a:p>
+            <a:endParaRPr lang="en-US" dirty="0"/>
+          </a:p>
+        </p:txBody>
+      </p:sp>
+    </p:spTree>
+    <p:extLst>
+      <p:ext uri="{BB962C8B-B14F-4D97-AF65-F5344CB8AC3E}">
+        <p14:creationId xmlns:p14="http://schemas.microsoft.com/office/powerpoint/2010/main" val="404222977"/>
+      </p:ext>
+    </p:extLst>
+  </p:cSld>
+  <p:clrMapOvr>
+    <a:masterClrMapping/>
+  </p:clrMapOvr>
+</p:sld>
+</file>
+
+<file path=ppt/slides/slide15.xml><?xml version="1.0" encoding="utf-8"?>
 <p:sld xmlns:a="http://schemas.openxmlformats.org/drawingml/2006/main" xmlns:r="http://schemas.openxmlformats.org/officeDocument/2006/relationships" xmlns:p="http://schemas.openxmlformats.org/presentationml/2006/main">
   <p:cSld>
     <p:spTree>
@@ -9762,7 +11210,7 @@
 </p:sld>
 </file>
 
-<file path=ppt/slides/slide13.xml><?xml version="1.0" encoding="utf-8"?>
+<file path=ppt/slides/slide16.xml><?xml version="1.0" encoding="utf-8"?>
 <p:sld xmlns:a="http://schemas.openxmlformats.org/drawingml/2006/main" xmlns:r="http://schemas.openxmlformats.org/officeDocument/2006/relationships" xmlns:p="http://schemas.openxmlformats.org/presentationml/2006/main">
   <p:cSld>
     <p:spTree>
@@ -10197,7 +11645,7 @@
 </p:sld>
 </file>
 
-<file path=ppt/slides/slide14.xml><?xml version="1.0" encoding="utf-8"?>
+<file path=ppt/slides/slide17.xml><?xml version="1.0" encoding="utf-8"?>
 <p:sld xmlns:a="http://schemas.openxmlformats.org/drawingml/2006/main" xmlns:r="http://schemas.openxmlformats.org/officeDocument/2006/relationships" xmlns:p="http://schemas.openxmlformats.org/presentationml/2006/main">
   <p:cSld>
     <p:spTree>
@@ -10692,7 +12140,7 @@
 </p:sld>
 </file>
 
-<file path=ppt/slides/slide15.xml><?xml version="1.0" encoding="utf-8"?>
+<file path=ppt/slides/slide18.xml><?xml version="1.0" encoding="utf-8"?>
 <p:sld xmlns:a="http://schemas.openxmlformats.org/drawingml/2006/main" xmlns:r="http://schemas.openxmlformats.org/officeDocument/2006/relationships" xmlns:p="http://schemas.openxmlformats.org/presentationml/2006/main">
   <p:cSld>
     <p:spTree>
@@ -10986,7 +12434,7 @@
 </p:sld>
 </file>
 
-<file path=ppt/slides/slide16.xml><?xml version="1.0" encoding="utf-8"?>
+<file path=ppt/slides/slide19.xml><?xml version="1.0" encoding="utf-8"?>
 <p:sld xmlns:a="http://schemas.openxmlformats.org/drawingml/2006/main" xmlns:r="http://schemas.openxmlformats.org/officeDocument/2006/relationships" xmlns:p="http://schemas.openxmlformats.org/presentationml/2006/main">
   <p:cSld>
     <p:spTree>
@@ -11128,110 +12576,6 @@
     <p:extLst>
       <p:ext uri="{BB962C8B-B14F-4D97-AF65-F5344CB8AC3E}">
         <p14:creationId xmlns:p14="http://schemas.microsoft.com/office/powerpoint/2010/main" val="466547344"/>
-      </p:ext>
-    </p:extLst>
-  </p:cSld>
-  <p:clrMapOvr>
-    <a:masterClrMapping/>
-  </p:clrMapOvr>
-</p:sld>
-</file>
-
-<file path=ppt/slides/slide17.xml><?xml version="1.0" encoding="utf-8"?>
-<p:sld xmlns:a="http://schemas.openxmlformats.org/drawingml/2006/main" xmlns:r="http://schemas.openxmlformats.org/officeDocument/2006/relationships" xmlns:p="http://schemas.openxmlformats.org/presentationml/2006/main">
-  <p:cSld>
-    <p:spTree>
-      <p:nvGrpSpPr>
-        <p:cNvPr id="1" name=""/>
-        <p:cNvGrpSpPr/>
-        <p:nvPr/>
-      </p:nvGrpSpPr>
-      <p:grpSpPr>
-        <a:xfrm>
-          <a:off x="0" y="0"/>
-          <a:ext cx="0" cy="0"/>
-          <a:chOff x="0" y="0"/>
-          <a:chExt cx="0" cy="0"/>
-        </a:xfrm>
-      </p:grpSpPr>
-      <p:sp>
-        <p:nvSpPr>
-          <p:cNvPr id="2" name="Title 1">
-            <a:extLst>
-              <a:ext uri="{FF2B5EF4-FFF2-40B4-BE49-F238E27FC236}">
-                <a16:creationId xmlns:a16="http://schemas.microsoft.com/office/drawing/2014/main" id="{7174E1C3-D64C-7DF6-AC08-417C3A2F99A2}"/>
-              </a:ext>
-            </a:extLst>
-          </p:cNvPr>
-          <p:cNvSpPr>
-            <a:spLocks noGrp="1"/>
-          </p:cNvSpPr>
-          <p:nvPr>
-            <p:ph type="title"/>
-          </p:nvPr>
-        </p:nvSpPr>
-        <p:spPr/>
-        <p:txBody>
-          <a:bodyPr/>
-          <a:lstStyle/>
-          <a:p>
-            <a:r>
-              <a:rPr lang="en-US" dirty="0"/>
-              <a:t>Questions?</a:t>
-            </a:r>
-          </a:p>
-        </p:txBody>
-      </p:sp>
-      <p:sp>
-        <p:nvSpPr>
-          <p:cNvPr id="3" name="Content Placeholder 2">
-            <a:extLst>
-              <a:ext uri="{FF2B5EF4-FFF2-40B4-BE49-F238E27FC236}">
-                <a16:creationId xmlns:a16="http://schemas.microsoft.com/office/drawing/2014/main" id="{E2E1EDA2-F5B8-476D-94C6-5094D6D6BDF6}"/>
-              </a:ext>
-            </a:extLst>
-          </p:cNvPr>
-          <p:cNvSpPr>
-            <a:spLocks noGrp="1"/>
-          </p:cNvSpPr>
-          <p:nvPr>
-            <p:ph idx="1"/>
-          </p:nvPr>
-        </p:nvSpPr>
-        <p:spPr/>
-        <p:txBody>
-          <a:bodyPr/>
-          <a:lstStyle/>
-          <a:p>
-            <a:pPr marL="0" indent="0">
-              <a:buNone/>
-            </a:pPr>
-            <a:r>
-              <a:rPr lang="en-US" dirty="0"/>
-              <a:t>Any other questions?</a:t>
-            </a:r>
-          </a:p>
-          <a:p>
-            <a:pPr marL="0" indent="0">
-              <a:buNone/>
-            </a:pPr>
-            <a:endParaRPr lang="en-US" dirty="0"/>
-          </a:p>
-          <a:p>
-            <a:pPr marL="0" indent="0">
-              <a:buNone/>
-            </a:pPr>
-            <a:r>
-              <a:rPr lang="en-US" dirty="0"/>
-              <a:t>Go out and write great code !</a:t>
-            </a:r>
-          </a:p>
-        </p:txBody>
-      </p:sp>
-    </p:spTree>
-    <p:extLst>
-      <p:ext uri="{BB962C8B-B14F-4D97-AF65-F5344CB8AC3E}">
-        <p14:creationId xmlns:p14="http://schemas.microsoft.com/office/powerpoint/2010/main" val="3562025551"/>
       </p:ext>
     </p:extLst>
   </p:cSld>
@@ -11385,7 +12729,319 @@
 </p:sld>
 </file>
 
+<file path=ppt/slides/slide20.xml><?xml version="1.0" encoding="utf-8"?>
+<p:sld xmlns:a="http://schemas.openxmlformats.org/drawingml/2006/main" xmlns:r="http://schemas.openxmlformats.org/officeDocument/2006/relationships" xmlns:p="http://schemas.openxmlformats.org/presentationml/2006/main">
+  <p:cSld>
+    <p:spTree>
+      <p:nvGrpSpPr>
+        <p:cNvPr id="1" name=""/>
+        <p:cNvGrpSpPr/>
+        <p:nvPr/>
+      </p:nvGrpSpPr>
+      <p:grpSpPr>
+        <a:xfrm>
+          <a:off x="0" y="0"/>
+          <a:ext cx="0" cy="0"/>
+          <a:chOff x="0" y="0"/>
+          <a:chExt cx="0" cy="0"/>
+        </a:xfrm>
+      </p:grpSpPr>
+      <p:sp>
+        <p:nvSpPr>
+          <p:cNvPr id="2" name="Title 1">
+            <a:extLst>
+              <a:ext uri="{FF2B5EF4-FFF2-40B4-BE49-F238E27FC236}">
+                <a16:creationId xmlns:a16="http://schemas.microsoft.com/office/drawing/2014/main" id="{7174E1C3-D64C-7DF6-AC08-417C3A2F99A2}"/>
+              </a:ext>
+            </a:extLst>
+          </p:cNvPr>
+          <p:cNvSpPr>
+            <a:spLocks noGrp="1"/>
+          </p:cNvSpPr>
+          <p:nvPr>
+            <p:ph type="title"/>
+          </p:nvPr>
+        </p:nvSpPr>
+        <p:spPr/>
+        <p:txBody>
+          <a:bodyPr/>
+          <a:lstStyle/>
+          <a:p>
+            <a:r>
+              <a:rPr lang="en-US" dirty="0"/>
+              <a:t>Questions?</a:t>
+            </a:r>
+          </a:p>
+        </p:txBody>
+      </p:sp>
+      <p:sp>
+        <p:nvSpPr>
+          <p:cNvPr id="3" name="Content Placeholder 2">
+            <a:extLst>
+              <a:ext uri="{FF2B5EF4-FFF2-40B4-BE49-F238E27FC236}">
+                <a16:creationId xmlns:a16="http://schemas.microsoft.com/office/drawing/2014/main" id="{E2E1EDA2-F5B8-476D-94C6-5094D6D6BDF6}"/>
+              </a:ext>
+            </a:extLst>
+          </p:cNvPr>
+          <p:cNvSpPr>
+            <a:spLocks noGrp="1"/>
+          </p:cNvSpPr>
+          <p:nvPr>
+            <p:ph idx="1"/>
+          </p:nvPr>
+        </p:nvSpPr>
+        <p:spPr>
+          <a:xfrm>
+            <a:off x="680321" y="2336873"/>
+            <a:ext cx="9613861" cy="4147054"/>
+          </a:xfrm>
+        </p:spPr>
+        <p:txBody>
+          <a:bodyPr/>
+          <a:lstStyle/>
+          <a:p>
+            <a:pPr marL="0" indent="0">
+              <a:buNone/>
+            </a:pPr>
+            <a:r>
+              <a:rPr lang="en-US" dirty="0"/>
+              <a:t>Any other questions?</a:t>
+            </a:r>
+          </a:p>
+          <a:p>
+            <a:pPr marL="0" indent="0">
+              <a:buNone/>
+            </a:pPr>
+            <a:endParaRPr lang="en-US" dirty="0"/>
+          </a:p>
+          <a:p>
+            <a:pPr marL="0" indent="0">
+              <a:buNone/>
+            </a:pPr>
+            <a:r>
+              <a:rPr lang="en-US" dirty="0"/>
+              <a:t>Go out and write great code !</a:t>
+            </a:r>
+          </a:p>
+          <a:p>
+            <a:pPr marL="0" indent="0">
+              <a:buNone/>
+            </a:pPr>
+            <a:endParaRPr lang="en-US" dirty="0"/>
+          </a:p>
+          <a:p>
+            <a:pPr marL="0" indent="0">
+              <a:buNone/>
+            </a:pPr>
+            <a:endParaRPr lang="en-US" dirty="0"/>
+          </a:p>
+          <a:p>
+            <a:pPr marL="0" indent="0">
+              <a:buNone/>
+            </a:pPr>
+            <a:endParaRPr lang="en-US" dirty="0"/>
+          </a:p>
+          <a:p>
+            <a:pPr marL="0" indent="0">
+              <a:buNone/>
+            </a:pPr>
+            <a:endParaRPr lang="en-US" dirty="0"/>
+          </a:p>
+          <a:p>
+            <a:pPr marL="0" indent="0">
+              <a:buNone/>
+            </a:pPr>
+            <a:r>
+              <a:rPr lang="en-US" dirty="0"/>
+              <a:t>FILL OUT EVALUTION FORMS. Put in BOX before you leave!</a:t>
+            </a:r>
+          </a:p>
+          <a:p>
+            <a:pPr marL="0" indent="0">
+              <a:buNone/>
+            </a:pPr>
+            <a:endParaRPr lang="en-US" dirty="0"/>
+          </a:p>
+        </p:txBody>
+      </p:sp>
+    </p:spTree>
+    <p:extLst>
+      <p:ext uri="{BB962C8B-B14F-4D97-AF65-F5344CB8AC3E}">
+        <p14:creationId xmlns:p14="http://schemas.microsoft.com/office/powerpoint/2010/main" val="3562025551"/>
+      </p:ext>
+    </p:extLst>
+  </p:cSld>
+  <p:clrMapOvr>
+    <a:masterClrMapping/>
+  </p:clrMapOvr>
+</p:sld>
+</file>
+
 <file path=ppt/slides/slide3.xml><?xml version="1.0" encoding="utf-8"?>
+<p:sld xmlns:a="http://schemas.openxmlformats.org/drawingml/2006/main" xmlns:r="http://schemas.openxmlformats.org/officeDocument/2006/relationships" xmlns:p="http://schemas.openxmlformats.org/presentationml/2006/main">
+  <p:cSld>
+    <p:spTree>
+      <p:nvGrpSpPr>
+        <p:cNvPr id="1" name=""/>
+        <p:cNvGrpSpPr/>
+        <p:nvPr/>
+      </p:nvGrpSpPr>
+      <p:grpSpPr>
+        <a:xfrm>
+          <a:off x="0" y="0"/>
+          <a:ext cx="0" cy="0"/>
+          <a:chOff x="0" y="0"/>
+          <a:chExt cx="0" cy="0"/>
+        </a:xfrm>
+      </p:grpSpPr>
+      <p:sp>
+        <p:nvSpPr>
+          <p:cNvPr id="2" name="Title 1">
+            <a:extLst>
+              <a:ext uri="{FF2B5EF4-FFF2-40B4-BE49-F238E27FC236}">
+                <a16:creationId xmlns:a16="http://schemas.microsoft.com/office/drawing/2014/main" id="{4E02D287-EA3E-BB81-91C5-7A627B55F92D}"/>
+              </a:ext>
+            </a:extLst>
+          </p:cNvPr>
+          <p:cNvSpPr>
+            <a:spLocks noGrp="1"/>
+          </p:cNvSpPr>
+          <p:nvPr>
+            <p:ph type="title"/>
+          </p:nvPr>
+        </p:nvSpPr>
+        <p:spPr/>
+        <p:txBody>
+          <a:bodyPr/>
+          <a:lstStyle/>
+          <a:p>
+            <a:r>
+              <a:rPr lang="en-US" dirty="0"/>
+              <a:t>Clone GIT Repository For Slides and Examples</a:t>
+            </a:r>
+          </a:p>
+        </p:txBody>
+      </p:sp>
+      <p:sp>
+        <p:nvSpPr>
+          <p:cNvPr id="3" name="Content Placeholder 2">
+            <a:extLst>
+              <a:ext uri="{FF2B5EF4-FFF2-40B4-BE49-F238E27FC236}">
+                <a16:creationId xmlns:a16="http://schemas.microsoft.com/office/drawing/2014/main" id="{AC81859C-49C0-2DD5-94A0-05955D10B73C}"/>
+              </a:ext>
+            </a:extLst>
+          </p:cNvPr>
+          <p:cNvSpPr>
+            <a:spLocks noGrp="1"/>
+          </p:cNvSpPr>
+          <p:nvPr>
+            <p:ph idx="1"/>
+          </p:nvPr>
+        </p:nvSpPr>
+        <p:spPr>
+          <a:xfrm>
+            <a:off x="235527" y="2336873"/>
+            <a:ext cx="11734800" cy="4285600"/>
+          </a:xfrm>
+        </p:spPr>
+        <p:txBody>
+          <a:bodyPr>
+            <a:normAutofit/>
+          </a:bodyPr>
+          <a:lstStyle/>
+          <a:p>
+            <a:r>
+              <a:rPr lang="en-US" sz="2800" dirty="0"/>
+              <a:t>Clone Public Repo</a:t>
+            </a:r>
+          </a:p>
+          <a:p>
+            <a:pPr marL="0" indent="0">
+              <a:buNone/>
+            </a:pPr>
+            <a:r>
+              <a:rPr lang="en-US" sz="2800" dirty="0"/>
+              <a:t>  git clone </a:t>
+            </a:r>
+            <a:r>
+              <a:rPr lang="en-US" sz="2800" dirty="0">
+                <a:hlinkClick r:id="rId2"/>
+              </a:rPr>
+              <a:t>https://github.com/PrincetonUniversity/software_testing.git</a:t>
+            </a:r>
+            <a:endParaRPr lang="en-US" sz="2800" dirty="0"/>
+          </a:p>
+          <a:p>
+            <a:pPr marL="0" indent="0">
+              <a:buNone/>
+            </a:pPr>
+            <a:r>
+              <a:rPr lang="en-US" sz="2800" dirty="0"/>
+              <a:t>OR SSH</a:t>
+            </a:r>
+          </a:p>
+          <a:p>
+            <a:pPr marL="0" indent="0">
+              <a:buNone/>
+            </a:pPr>
+            <a:r>
+              <a:rPr lang="en-US" sz="2800" dirty="0"/>
+              <a:t>  git clone	</a:t>
+            </a:r>
+            <a:r>
+              <a:rPr lang="en-US" sz="2800" dirty="0">
+                <a:hlinkClick r:id="rId3"/>
+              </a:rPr>
+              <a:t>git@github.com:PrincetonUniversity/software_testing.git</a:t>
+            </a:r>
+            <a:endParaRPr lang="en-US" sz="2800" dirty="0"/>
+          </a:p>
+          <a:p>
+            <a:pPr marL="0" indent="0">
+              <a:buNone/>
+            </a:pPr>
+            <a:endParaRPr lang="en-US" sz="2800" dirty="0"/>
+          </a:p>
+          <a:p>
+            <a:pPr marL="0" indent="0">
+              <a:buNone/>
+            </a:pPr>
+            <a:endParaRPr lang="en-US" sz="2800" dirty="0"/>
+          </a:p>
+          <a:p>
+            <a:pPr marL="0" indent="0">
+              <a:buNone/>
+            </a:pPr>
+            <a:r>
+              <a:rPr lang="en-US" sz="2800" dirty="0"/>
+              <a:t>Slides in Root Folder *.pptx</a:t>
+            </a:r>
+          </a:p>
+          <a:p>
+            <a:pPr marL="0" indent="0">
+              <a:buNone/>
+            </a:pPr>
+            <a:r>
+              <a:rPr lang="en-US" dirty="0"/>
+              <a:t>Examples are in */examples</a:t>
+            </a:r>
+          </a:p>
+        </p:txBody>
+      </p:sp>
+    </p:spTree>
+    <p:extLst>
+      <p:ext uri="{BB962C8B-B14F-4D97-AF65-F5344CB8AC3E}">
+        <p14:creationId xmlns:p14="http://schemas.microsoft.com/office/powerpoint/2010/main" val="2275561635"/>
+      </p:ext>
+    </p:extLst>
+  </p:cSld>
+  <p:clrMapOvr>
+    <a:masterClrMapping/>
+  </p:clrMapOvr>
+</p:sld>
+</file>
+
+<file path=ppt/slides/slide4.xml><?xml version="1.0" encoding="utf-8"?>
 <p:sld xmlns:a="http://schemas.openxmlformats.org/drawingml/2006/main" xmlns:r="http://schemas.openxmlformats.org/officeDocument/2006/relationships" xmlns:p="http://schemas.openxmlformats.org/presentationml/2006/main">
   <p:cSld>
     <p:spTree>
@@ -11902,7 +13558,7 @@
 </p:sld>
 </file>
 
-<file path=ppt/slides/slide4.xml><?xml version="1.0" encoding="utf-8"?>
+<file path=ppt/slides/slide5.xml><?xml version="1.0" encoding="utf-8"?>
 <p:sld xmlns:a="http://schemas.openxmlformats.org/drawingml/2006/main" xmlns:r="http://schemas.openxmlformats.org/officeDocument/2006/relationships" xmlns:p="http://schemas.openxmlformats.org/presentationml/2006/main">
   <p:cSld>
     <p:spTree>
@@ -11995,7 +13651,7 @@
             </a:pPr>
             <a:r>
               <a:rPr lang="en-US" dirty="0"/>
-              <a:t>All tests do the following (some steps optional)</a:t>
+              <a:t>Test Structure - All tests do the following (some steps optional)</a:t>
             </a:r>
           </a:p>
           <a:p>
@@ -12411,7 +14067,7 @@
 </p:sld>
 </file>
 
-<file path=ppt/slides/slide5.xml><?xml version="1.0" encoding="utf-8"?>
+<file path=ppt/slides/slide6.xml><?xml version="1.0" encoding="utf-8"?>
 <p:sld xmlns:a="http://schemas.openxmlformats.org/drawingml/2006/main" xmlns:r="http://schemas.openxmlformats.org/officeDocument/2006/relationships" xmlns:p="http://schemas.openxmlformats.org/presentationml/2006/main">
   <p:cSld>
     <p:spTree>
@@ -12541,7 +14197,7 @@
 </p:sld>
 </file>
 
-<file path=ppt/slides/slide6.xml><?xml version="1.0" encoding="utf-8"?>
+<file path=ppt/slides/slide7.xml><?xml version="1.0" encoding="utf-8"?>
 <p:sld xmlns:a="http://schemas.openxmlformats.org/drawingml/2006/main" xmlns:r="http://schemas.openxmlformats.org/officeDocument/2006/relationships" xmlns:p="http://schemas.openxmlformats.org/presentationml/2006/main">
   <p:cSld>
     <p:spTree>
@@ -12921,7 +14577,7 @@
 </p:sld>
 </file>
 
-<file path=ppt/slides/slide7.xml><?xml version="1.0" encoding="utf-8"?>
+<file path=ppt/slides/slide8.xml><?xml version="1.0" encoding="utf-8"?>
 <p:sld xmlns:a="http://schemas.openxmlformats.org/drawingml/2006/main" xmlns:r="http://schemas.openxmlformats.org/officeDocument/2006/relationships" xmlns:p="http://schemas.openxmlformats.org/presentationml/2006/main">
   <p:cSld>
     <p:spTree>
@@ -13454,242 +15110,6 @@
 </p:sld>
 </file>
 
-<file path=ppt/slides/slide8.xml><?xml version="1.0" encoding="utf-8"?>
-<p:sld xmlns:a="http://schemas.openxmlformats.org/drawingml/2006/main" xmlns:r="http://schemas.openxmlformats.org/officeDocument/2006/relationships" xmlns:p="http://schemas.openxmlformats.org/presentationml/2006/main">
-  <p:cSld>
-    <p:spTree>
-      <p:nvGrpSpPr>
-        <p:cNvPr id="1" name=""/>
-        <p:cNvGrpSpPr/>
-        <p:nvPr/>
-      </p:nvGrpSpPr>
-      <p:grpSpPr>
-        <a:xfrm>
-          <a:off x="0" y="0"/>
-          <a:ext cx="0" cy="0"/>
-          <a:chOff x="0" y="0"/>
-          <a:chExt cx="0" cy="0"/>
-        </a:xfrm>
-      </p:grpSpPr>
-      <p:sp>
-        <p:nvSpPr>
-          <p:cNvPr id="2" name="Title 1">
-            <a:extLst>
-              <a:ext uri="{FF2B5EF4-FFF2-40B4-BE49-F238E27FC236}">
-                <a16:creationId xmlns:a16="http://schemas.microsoft.com/office/drawing/2014/main" id="{508FB2AD-B5D4-D217-BB7C-5149AE41CA7D}"/>
-              </a:ext>
-            </a:extLst>
-          </p:cNvPr>
-          <p:cNvSpPr>
-            <a:spLocks noGrp="1"/>
-          </p:cNvSpPr>
-          <p:nvPr>
-            <p:ph type="title"/>
-          </p:nvPr>
-        </p:nvSpPr>
-        <p:spPr/>
-        <p:txBody>
-          <a:bodyPr/>
-          <a:lstStyle/>
-          <a:p>
-            <a:r>
-              <a:rPr lang="en-US" dirty="0"/>
-              <a:t>02 </a:t>
-            </a:r>
-            <a:r>
-              <a:rPr lang="en-US" dirty="0" err="1"/>
-              <a:t>UnitTest</a:t>
-            </a:r>
-            <a:r>
-              <a:rPr lang="en-US" dirty="0"/>
-              <a:t> setup </a:t>
-            </a:r>
-            <a:r>
-              <a:rPr lang="en-US" dirty="0" err="1"/>
-              <a:t>tearDown</a:t>
-            </a:r>
-            <a:endParaRPr lang="en-US" dirty="0"/>
-          </a:p>
-        </p:txBody>
-      </p:sp>
-      <p:sp>
-        <p:nvSpPr>
-          <p:cNvPr id="3" name="Content Placeholder 2">
-            <a:extLst>
-              <a:ext uri="{FF2B5EF4-FFF2-40B4-BE49-F238E27FC236}">
-                <a16:creationId xmlns:a16="http://schemas.microsoft.com/office/drawing/2014/main" id="{3651E43C-8E94-B0ED-1A01-F8E3B543F7BA}"/>
-              </a:ext>
-            </a:extLst>
-          </p:cNvPr>
-          <p:cNvSpPr>
-            <a:spLocks noGrp="1"/>
-          </p:cNvSpPr>
-          <p:nvPr>
-            <p:ph idx="1"/>
-          </p:nvPr>
-        </p:nvSpPr>
-        <p:spPr>
-          <a:xfrm>
-            <a:off x="680321" y="2115199"/>
-            <a:ext cx="9613861" cy="4521128"/>
-          </a:xfrm>
-        </p:spPr>
-        <p:txBody>
-          <a:bodyPr>
-            <a:normAutofit lnSpcReduction="10000"/>
-          </a:bodyPr>
-          <a:lstStyle/>
-          <a:p>
-            <a:pPr marL="0" indent="0">
-              <a:buNone/>
-            </a:pPr>
-            <a:r>
-              <a:rPr lang="en-US" dirty="0"/>
-              <a:t>In a unit test you can add a method to setup and teardown an environment that runs before/after each test.</a:t>
-            </a:r>
-          </a:p>
-          <a:p>
-            <a:pPr marL="0" indent="0">
-              <a:buNone/>
-            </a:pPr>
-            <a:endParaRPr lang="en-US" dirty="0"/>
-          </a:p>
-          <a:p>
-            <a:pPr marL="457200" lvl="1" indent="0">
-              <a:buNone/>
-            </a:pPr>
-            <a:r>
-              <a:rPr lang="en-US" sz="2400" dirty="0"/>
-              <a:t>class </a:t>
-            </a:r>
-            <a:r>
-              <a:rPr lang="en-US" sz="2400" dirty="0" err="1"/>
-              <a:t>Mytest</a:t>
-            </a:r>
-            <a:r>
-              <a:rPr lang="en-US" sz="2400" dirty="0"/>
-              <a:t>(</a:t>
-            </a:r>
-            <a:r>
-              <a:rPr lang="en-US" sz="2400" dirty="0" err="1"/>
-              <a:t>unittest.TestCase</a:t>
-            </a:r>
-            <a:r>
-              <a:rPr lang="en-US" sz="2400" dirty="0"/>
-              <a:t>):</a:t>
-            </a:r>
-          </a:p>
-          <a:p>
-            <a:pPr marL="457200" lvl="1" indent="0">
-              <a:buNone/>
-            </a:pPr>
-            <a:r>
-              <a:rPr lang="en-US" sz="2400" dirty="0"/>
-              <a:t>	def setup(self):</a:t>
-            </a:r>
-          </a:p>
-          <a:p>
-            <a:pPr marL="457200" lvl="1" indent="0">
-              <a:buNone/>
-            </a:pPr>
-            <a:r>
-              <a:rPr lang="en-US" sz="2400" dirty="0"/>
-              <a:t>		”””Run before each test”””</a:t>
-            </a:r>
-          </a:p>
-          <a:p>
-            <a:pPr marL="457200" lvl="1" indent="0">
-              <a:buNone/>
-            </a:pPr>
-            <a:r>
-              <a:rPr lang="en-US" sz="2400" dirty="0"/>
-              <a:t>	def </a:t>
-            </a:r>
-            <a:r>
-              <a:rPr lang="en-US" sz="2400" dirty="0" err="1"/>
-              <a:t>tearDown</a:t>
-            </a:r>
-            <a:r>
-              <a:rPr lang="en-US" sz="2400" dirty="0"/>
-              <a:t>(self):</a:t>
-            </a:r>
-          </a:p>
-          <a:p>
-            <a:pPr marL="457200" lvl="1" indent="0">
-              <a:buNone/>
-            </a:pPr>
-            <a:r>
-              <a:rPr lang="en-US" sz="2400" dirty="0"/>
-              <a:t>		“””Run after each test”””</a:t>
-            </a:r>
-          </a:p>
-          <a:p>
-            <a:pPr marL="457200" lvl="1" indent="0">
-              <a:buNone/>
-            </a:pPr>
-            <a:r>
-              <a:rPr lang="en-US" sz="2400" dirty="0"/>
-              <a:t>	def </a:t>
-            </a:r>
-            <a:r>
-              <a:rPr lang="en-US" sz="2400" dirty="0" err="1"/>
-              <a:t>setUpClass</a:t>
-            </a:r>
-            <a:r>
-              <a:rPr lang="en-US" sz="2400" dirty="0"/>
-              <a:t>(self):</a:t>
-            </a:r>
-          </a:p>
-          <a:p>
-            <a:pPr marL="457200" lvl="1" indent="0">
-              <a:buNone/>
-            </a:pPr>
-            <a:r>
-              <a:rPr lang="en-US" sz="2400" dirty="0"/>
-              <a:t>		”””Run once before all tests”””</a:t>
-            </a:r>
-          </a:p>
-          <a:p>
-            <a:pPr marL="457200" lvl="1" indent="0">
-              <a:buNone/>
-            </a:pPr>
-            <a:r>
-              <a:rPr lang="en-US" sz="2400" dirty="0"/>
-              <a:t>	def </a:t>
-            </a:r>
-            <a:r>
-              <a:rPr lang="en-US" sz="2400" dirty="0" err="1"/>
-              <a:t>tearDownClass</a:t>
-            </a:r>
-            <a:r>
-              <a:rPr lang="en-US" sz="2400" dirty="0"/>
-              <a:t>(self):</a:t>
-            </a:r>
-          </a:p>
-          <a:p>
-            <a:pPr marL="457200" lvl="1" indent="0">
-              <a:buNone/>
-            </a:pPr>
-            <a:r>
-              <a:rPr lang="en-US" sz="2400" dirty="0"/>
-              <a:t>		“””Run once after all tests”””</a:t>
-            </a:r>
-          </a:p>
-        </p:txBody>
-      </p:sp>
-    </p:spTree>
-    <p:extLst>
-      <p:ext uri="{BB962C8B-B14F-4D97-AF65-F5344CB8AC3E}">
-        <p14:creationId xmlns:p14="http://schemas.microsoft.com/office/powerpoint/2010/main" val="1666096593"/>
-      </p:ext>
-    </p:extLst>
-  </p:cSld>
-  <p:clrMapOvr>
-    <a:masterClrMapping/>
-  </p:clrMapOvr>
-</p:sld>
-</file>
-
 <file path=ppt/slides/slide9.xml><?xml version="1.0" encoding="utf-8"?>
 <p:sld xmlns:a="http://schemas.openxmlformats.org/drawingml/2006/main" xmlns:r="http://schemas.openxmlformats.org/officeDocument/2006/relationships" xmlns:p="http://schemas.openxmlformats.org/presentationml/2006/main">
   <p:cSld>
@@ -13712,7 +15132,7 @@
           <p:cNvPr id="2" name="Title 1">
             <a:extLst>
               <a:ext uri="{FF2B5EF4-FFF2-40B4-BE49-F238E27FC236}">
-                <a16:creationId xmlns:a16="http://schemas.microsoft.com/office/drawing/2014/main" id="{7B1BC8CA-23DC-00F6-9485-97991DED6A35}"/>
+                <a16:creationId xmlns:a16="http://schemas.microsoft.com/office/drawing/2014/main" id="{1ACE1201-6411-2BA2-AB2D-E793E1C25471}"/>
               </a:ext>
             </a:extLst>
           </p:cNvPr>
@@ -13730,13 +15150,8 @@
           <a:p>
             <a:r>
               <a:rPr lang="en-US" dirty="0"/>
-              <a:t>03 </a:t>
-            </a:r>
-            <a:r>
-              <a:rPr lang="en-US" dirty="0" err="1"/>
-              <a:t>PyTest</a:t>
-            </a:r>
-            <a:endParaRPr lang="en-US" dirty="0"/>
+              <a:t>02 Unit Test Exceptions</a:t>
+            </a:r>
           </a:p>
         </p:txBody>
       </p:sp>
@@ -13745,7 +15160,7 @@
           <p:cNvPr id="3" name="Content Placeholder 2">
             <a:extLst>
               <a:ext uri="{FF2B5EF4-FFF2-40B4-BE49-F238E27FC236}">
-                <a16:creationId xmlns:a16="http://schemas.microsoft.com/office/drawing/2014/main" id="{D133F77E-93E8-297B-19D0-2CEFDBCB06FD}"/>
+                <a16:creationId xmlns:a16="http://schemas.microsoft.com/office/drawing/2014/main" id="{238D253A-E33A-9D73-3284-881AD85B8BDE}"/>
               </a:ext>
             </a:extLst>
           </p:cNvPr>
@@ -13759,54 +15174,35 @@
         <p:spPr>
           <a:xfrm>
             <a:off x="680321" y="2336873"/>
-            <a:ext cx="9613861" cy="4034430"/>
+            <a:ext cx="10387201" cy="932800"/>
           </a:xfrm>
         </p:spPr>
         <p:txBody>
           <a:bodyPr/>
           <a:lstStyle/>
           <a:p>
+            <a:pPr marL="0" indent="0">
+              <a:buNone/>
+            </a:pPr>
             <a:r>
               <a:rPr lang="en-US" dirty="0"/>
-              <a:t>Requires PIP install of </a:t>
-            </a:r>
-            <a:r>
-              <a:rPr lang="en-US" dirty="0" err="1"/>
-              <a:t>pytest</a:t>
-            </a:r>
-            <a:r>
-              <a:rPr lang="en-US" dirty="0"/>
-              <a:t> package.</a:t>
-            </a:r>
-          </a:p>
-          <a:p>
-            <a:r>
-              <a:rPr lang="en-US" dirty="0"/>
-              <a:t>Can be executed with </a:t>
-            </a:r>
-            <a:r>
-              <a:rPr lang="en-US" dirty="0" err="1"/>
-              <a:t>pytest</a:t>
-            </a:r>
-            <a:r>
-              <a:rPr lang="en-US" dirty="0"/>
-              <a:t> command line.</a:t>
-            </a:r>
-          </a:p>
-          <a:p>
-            <a:r>
-              <a:rPr lang="en-US" dirty="0"/>
-              <a:t>Tests written with functions. Assertions with python assert().</a:t>
-            </a:r>
-          </a:p>
-        </p:txBody>
-      </p:sp>
-      <p:sp>
-        <p:nvSpPr>
-          <p:cNvPr id="4" name="TextBox 3">
+              <a:t>It is useful to test for error conditions in addition to success conditions</a:t>
+            </a:r>
+          </a:p>
+          <a:p>
+            <a:pPr marL="0" indent="0">
+              <a:buNone/>
+            </a:pPr>
+            <a:endParaRPr lang="en-US" dirty="0"/>
+          </a:p>
+        </p:txBody>
+      </p:sp>
+      <p:sp>
+        <p:nvSpPr>
+          <p:cNvPr id="5" name="TextBox 4">
             <a:extLst>
               <a:ext uri="{FF2B5EF4-FFF2-40B4-BE49-F238E27FC236}">
-                <a16:creationId xmlns:a16="http://schemas.microsoft.com/office/drawing/2014/main" id="{E07ED173-C2F9-18B9-8090-CCB1DFE7FA10}"/>
+                <a16:creationId xmlns:a16="http://schemas.microsoft.com/office/drawing/2014/main" id="{B2B2361F-E3EF-E13E-A690-55F5A4469189}"/>
               </a:ext>
             </a:extLst>
           </p:cNvPr>
@@ -13815,8 +15211,8 @@
         </p:nvSpPr>
         <p:spPr>
           <a:xfrm>
-            <a:off x="1289069" y="3869673"/>
-            <a:ext cx="9613861" cy="2308324"/>
+            <a:off x="1453661" y="3427116"/>
+            <a:ext cx="9613861" cy="2677656"/>
           </a:xfrm>
           <a:prstGeom prst="rect">
             <a:avLst/>
@@ -13842,7 +15238,7 @@
               <a:rPr lang="en-US" sz="2400" dirty="0" err="1">
                 <a:latin typeface="Courier" pitchFamily="2" charset="0"/>
               </a:rPr>
-              <a:t>pytest</a:t>
+              <a:t>unittest</a:t>
             </a:r>
             <a:endParaRPr lang="en-US" sz="2400" dirty="0">
               <a:latin typeface="Courier" pitchFamily="2" charset="0"/>
@@ -13862,7 +15258,7 @@
               <a:rPr lang="en-US" sz="2400" dirty="0" err="1">
                 <a:latin typeface="Courier" pitchFamily="2" charset="0"/>
               </a:rPr>
-              <a:t>myfunc</a:t>
+              <a:t>bmi</a:t>
             </a:r>
             <a:r>
               <a:rPr lang="en-US" sz="2400" dirty="0">
@@ -13874,7 +15270,7 @@
               <a:rPr lang="en-US" sz="2400" dirty="0" err="1">
                 <a:latin typeface="Courier" pitchFamily="2" charset="0"/>
               </a:rPr>
-              <a:t>my_func</a:t>
+              <a:t>bmi</a:t>
             </a:r>
             <a:endParaRPr lang="en-US" sz="2400" dirty="0">
               <a:latin typeface="Courier" pitchFamily="2" charset="0"/>
@@ -13896,30 +15292,31 @@
               <a:rPr lang="en-US" sz="2400" dirty="0">
                 <a:latin typeface="Courier" pitchFamily="2" charset="0"/>
               </a:rPr>
-              <a:t>def test01(self):</a:t>
-            </a:r>
-          </a:p>
-          <a:p>
-            <a:pPr marL="0" indent="0">
-              <a:buNone/>
-            </a:pPr>
+              <a:t>class </a:t>
+            </a:r>
+            <a:r>
+              <a:rPr lang="en-US" sz="2400" dirty="0" err="1">
+                <a:latin typeface="Courier" pitchFamily="2" charset="0"/>
+              </a:rPr>
+              <a:t>MyTest</a:t>
+            </a:r>
             <a:r>
               <a:rPr lang="en-US" sz="2400" dirty="0">
                 <a:latin typeface="Courier" pitchFamily="2" charset="0"/>
               </a:rPr>
-              <a:t>	result = </a:t>
+              <a:t>(</a:t>
             </a:r>
             <a:r>
               <a:rPr lang="en-US" sz="2400" dirty="0" err="1">
                 <a:latin typeface="Courier" pitchFamily="2" charset="0"/>
               </a:rPr>
-              <a:t>my_func</a:t>
+              <a:t>unittest.TestCase</a:t>
             </a:r>
             <a:r>
               <a:rPr lang="en-US" sz="2400" dirty="0">
                 <a:latin typeface="Courier" pitchFamily="2" charset="0"/>
               </a:rPr>
-              <a:t>(0)</a:t>
+              <a:t>):</a:t>
             </a:r>
           </a:p>
           <a:p>
@@ -13930,7 +15327,77 @@
               <a:rPr lang="en-US" sz="2400" dirty="0">
                 <a:latin typeface="Courier" pitchFamily="2" charset="0"/>
               </a:rPr>
-              <a:t>	assert result==1</a:t>
+              <a:t>	def </a:t>
+            </a:r>
+            <a:r>
+              <a:rPr lang="en-US" sz="2400" dirty="0" err="1">
+                <a:latin typeface="Courier" pitchFamily="2" charset="0"/>
+              </a:rPr>
+              <a:t>test_values</a:t>
+            </a:r>
+            <a:r>
+              <a:rPr lang="en-US" sz="2400" dirty="0">
+                <a:latin typeface="Courier" pitchFamily="2" charset="0"/>
+              </a:rPr>
+              <a:t>(self):</a:t>
+            </a:r>
+          </a:p>
+          <a:p>
+            <a:pPr marL="0" indent="0">
+              <a:buNone/>
+            </a:pPr>
+            <a:r>
+              <a:rPr lang="en-US" sz="2400" dirty="0">
+                <a:latin typeface="Courier" pitchFamily="2" charset="0"/>
+              </a:rPr>
+              <a:t>		with </a:t>
+            </a:r>
+            <a:r>
+              <a:rPr lang="en-US" sz="2400" dirty="0" err="1">
+                <a:latin typeface="Courier" pitchFamily="2" charset="0"/>
+              </a:rPr>
+              <a:t>self.assertRaises</a:t>
+            </a:r>
+            <a:r>
+              <a:rPr lang="en-US" sz="2400" dirty="0">
+                <a:latin typeface="Courier" pitchFamily="2" charset="0"/>
+              </a:rPr>
+              <a:t>(</a:t>
+            </a:r>
+            <a:r>
+              <a:rPr lang="en-US" sz="2400" dirty="0" err="1">
+                <a:latin typeface="Courier" pitchFamily="2" charset="0"/>
+              </a:rPr>
+              <a:t>ValueError</a:t>
+            </a:r>
+            <a:r>
+              <a:rPr lang="en-US" sz="2400" dirty="0">
+                <a:latin typeface="Courier" pitchFamily="2" charset="0"/>
+              </a:rPr>
+              <a:t>):</a:t>
+            </a:r>
+          </a:p>
+          <a:p>
+            <a:pPr marL="0" indent="0">
+              <a:buNone/>
+            </a:pPr>
+            <a:r>
+              <a:rPr lang="en-US" sz="2400" dirty="0">
+                <a:latin typeface="Courier" pitchFamily="2" charset="0"/>
+              </a:rPr>
+              <a:t>			</a:t>
+            </a:r>
+            <a:r>
+              <a:rPr lang="en-US" sz="2400" dirty="0" err="1">
+                <a:latin typeface="Courier" pitchFamily="2" charset="0"/>
+              </a:rPr>
+              <a:t>bmi</a:t>
+            </a:r>
+            <a:r>
+              <a:rPr lang="en-US" sz="2400" dirty="0">
+                <a:latin typeface="Courier" pitchFamily="2" charset="0"/>
+              </a:rPr>
+              <a:t>(-1, 3)</a:t>
             </a:r>
           </a:p>
         </p:txBody>
@@ -13938,7 +15405,7 @@
     </p:spTree>
     <p:extLst>
       <p:ext uri="{BB962C8B-B14F-4D97-AF65-F5344CB8AC3E}">
-        <p14:creationId xmlns:p14="http://schemas.microsoft.com/office/powerpoint/2010/main" val="376151755"/>
+        <p14:creationId xmlns:p14="http://schemas.microsoft.com/office/powerpoint/2010/main" val="4112208798"/>
       </p:ext>
     </p:extLst>
   </p:cSld>
@@ -13979,7 +15446,7 @@
                                           </p:stCondLst>
                                         </p:cTn>
                                         <p:tgtEl>
-                                          <p:spTgt spid="4">
+                                          <p:spTgt spid="5">
                                             <p:txEl>
                                               <p:pRg st="0" end="0"/>
                                             </p:txEl>
@@ -14010,7 +15477,7 @@
                                           </p:stCondLst>
                                         </p:cTn>
                                         <p:tgtEl>
-                                          <p:spTgt spid="4">
+                                          <p:spTgt spid="5">
                                             <p:txEl>
                                               <p:pRg st="1" end="1"/>
                                             </p:txEl>
@@ -14041,7 +15508,7 @@
                                           </p:stCondLst>
                                         </p:cTn>
                                         <p:tgtEl>
-                                          <p:spTgt spid="4">
+                                          <p:spTgt spid="5">
                                             <p:txEl>
                                               <p:pRg st="3" end="3"/>
                                             </p:txEl>
@@ -14072,7 +15539,7 @@
                                           </p:stCondLst>
                                         </p:cTn>
                                         <p:tgtEl>
-                                          <p:spTgt spid="4">
+                                          <p:spTgt spid="5">
                                             <p:txEl>
                                               <p:pRg st="4" end="4"/>
                                             </p:txEl>
@@ -14103,9 +15570,40 @@
                                           </p:stCondLst>
                                         </p:cTn>
                                         <p:tgtEl>
-                                          <p:spTgt spid="4">
+                                          <p:spTgt spid="5">
                                             <p:txEl>
                                               <p:pRg st="5" end="5"/>
+                                            </p:txEl>
+                                          </p:spTgt>
+                                        </p:tgtEl>
+                                        <p:attrNameLst>
+                                          <p:attrName>style.visibility</p:attrName>
+                                        </p:attrNameLst>
+                                      </p:cBhvr>
+                                      <p:to>
+                                        <p:strVal val="visible"/>
+                                      </p:to>
+                                    </p:set>
+                                  </p:childTnLst>
+                                </p:cTn>
+                              </p:par>
+                              <p:par>
+                                <p:cTn id="15" presetID="1" presetClass="entr" presetSubtype="0" fill="hold" nodeType="withEffect">
+                                  <p:stCondLst>
+                                    <p:cond delay="0"/>
+                                  </p:stCondLst>
+                                  <p:childTnLst>
+                                    <p:set>
+                                      <p:cBhvr>
+                                        <p:cTn id="16" dur="1" fill="hold">
+                                          <p:stCondLst>
+                                            <p:cond delay="0"/>
+                                          </p:stCondLst>
+                                        </p:cTn>
+                                        <p:tgtEl>
+                                          <p:spTgt spid="5">
+                                            <p:txEl>
+                                              <p:pRg st="6" end="6"/>
                                             </p:txEl>
                                           </p:spTgt>
                                         </p:tgtEl>

</xml_diff>

<commit_message>
add QR code and fix circle_area to raise exceptions
</commit_message>
<xml_diff>
--- a/UnitTestingSlides.pptx
+++ b/UnitTestingSlides.pptx
@@ -216,7 +216,7 @@
           <a:p>
             <a:fld id="{EF6A6A60-C693-BC49-85A7-98B318EF45A1}" type="datetimeFigureOut">
               <a:rPr lang="en-US" smtClean="0"/>
-              <a:t>1/14/23</a:t>
+              <a:t>1/21/23</a:t>
             </a:fld>
             <a:endParaRPr lang="en-US"/>
           </a:p>
@@ -1345,7 +1345,7 @@
           <a:p>
             <a:fld id="{78ABE3C1-DBE1-495D-B57B-2849774B866A}" type="datetimeFigureOut">
               <a:rPr lang="en-US" dirty="0"/>
-              <a:t>1/14/23</a:t>
+              <a:t>1/21/23</a:t>
             </a:fld>
             <a:endParaRPr lang="en-US" dirty="0"/>
           </a:p>
@@ -1754,7 +1754,7 @@
           <a:p>
             <a:fld id="{446C117F-5CCF-4837-BE5F-2B92066CAFAF}" type="datetimeFigureOut">
               <a:rPr lang="en-US" dirty="0"/>
-              <a:t>1/14/23</a:t>
+              <a:t>1/21/23</a:t>
             </a:fld>
             <a:endParaRPr lang="en-US" dirty="0"/>
           </a:p>
@@ -2085,7 +2085,7 @@
           <a:p>
             <a:fld id="{84EB90BD-B6CE-46B7-997F-7313B992CCDC}" type="datetimeFigureOut">
               <a:rPr lang="en-US" dirty="0"/>
-              <a:t>1/14/23</a:t>
+              <a:t>1/21/23</a:t>
             </a:fld>
             <a:endParaRPr lang="en-US" dirty="0"/>
           </a:p>
@@ -2485,7 +2485,7 @@
           <a:p>
             <a:fld id="{CDB9D11F-B188-461D-B23F-39381795C052}" type="datetimeFigureOut">
               <a:rPr lang="en-US" dirty="0"/>
-              <a:t>1/14/23</a:t>
+              <a:t>1/21/23</a:t>
             </a:fld>
             <a:endParaRPr lang="en-US" dirty="0"/>
           </a:p>
@@ -3048,7 +3048,7 @@
           <a:p>
             <a:fld id="{52E6D8D9-55A2-4063-B0F3-121F44549695}" type="datetimeFigureOut">
               <a:rPr lang="en-US" dirty="0"/>
-              <a:t>1/14/23</a:t>
+              <a:t>1/21/23</a:t>
             </a:fld>
             <a:endParaRPr lang="en-US" dirty="0"/>
           </a:p>
@@ -3724,7 +3724,7 @@
           <a:p>
             <a:fld id="{D4B24536-994D-4021-A283-9F449C0DB509}" type="datetimeFigureOut">
               <a:rPr lang="en-US" dirty="0"/>
-              <a:t>1/14/23</a:t>
+              <a:t>1/21/23</a:t>
             </a:fld>
             <a:endParaRPr lang="en-US" dirty="0"/>
           </a:p>
@@ -4632,7 +4632,7 @@
           <a:p>
             <a:fld id="{3CBBBB78-C96F-47B7-AB17-D852CA960AC9}" type="datetimeFigureOut">
               <a:rPr lang="en-US" dirty="0"/>
-              <a:t>1/14/23</a:t>
+              <a:t>1/21/23</a:t>
             </a:fld>
             <a:endParaRPr lang="en-US" dirty="0"/>
           </a:p>
@@ -4940,7 +4940,7 @@
           <a:p>
             <a:fld id="{1FA3F48C-C7C6-4055-9F49-3777875E72AE}" type="datetimeFigureOut">
               <a:rPr lang="en-US" dirty="0"/>
-              <a:t>1/14/23</a:t>
+              <a:t>1/21/23</a:t>
             </a:fld>
             <a:endParaRPr lang="en-US" dirty="0"/>
           </a:p>
@@ -5199,7 +5199,7 @@
           <a:p>
             <a:fld id="{6178E61D-D431-422C-9764-11DAFE33AB63}" type="datetimeFigureOut">
               <a:rPr lang="en-US" dirty="0"/>
-              <a:t>1/14/23</a:t>
+              <a:t>1/21/23</a:t>
             </a:fld>
             <a:endParaRPr lang="en-US" dirty="0"/>
           </a:p>
@@ -5518,7 +5518,7 @@
           <a:p>
             <a:fld id="{12DE42F4-6EEF-4EF7-8ED4-2208F0F89A08}" type="datetimeFigureOut">
               <a:rPr lang="en-US" dirty="0"/>
-              <a:t>1/14/23</a:t>
+              <a:t>1/21/23</a:t>
             </a:fld>
             <a:endParaRPr lang="en-US" dirty="0"/>
           </a:p>
@@ -5902,7 +5902,7 @@
           <a:p>
             <a:fld id="{30578ACC-22D6-47C1-A373-4FD133E34F3C}" type="datetimeFigureOut">
               <a:rPr lang="en-US" dirty="0"/>
-              <a:t>1/14/23</a:t>
+              <a:t>1/21/23</a:t>
             </a:fld>
             <a:endParaRPr lang="en-US" dirty="0"/>
           </a:p>
@@ -6273,7 +6273,7 @@
           <a:p>
             <a:fld id="{4E5A6C69-6797-4E8A-BF37-F2C3751466E9}" type="datetimeFigureOut">
               <a:rPr lang="en-US" dirty="0"/>
-              <a:t>1/14/23</a:t>
+              <a:t>1/21/23</a:t>
             </a:fld>
             <a:endParaRPr lang="en-US" dirty="0"/>
           </a:p>
@@ -6774,7 +6774,7 @@
           <a:p>
             <a:fld id="{D82014A1-A632-4878-A0D3-F52BA7563730}" type="datetimeFigureOut">
               <a:rPr lang="en-US" dirty="0"/>
-              <a:t>1/14/23</a:t>
+              <a:t>1/21/23</a:t>
             </a:fld>
             <a:endParaRPr lang="en-US" dirty="0"/>
           </a:p>
@@ -7026,7 +7026,7 @@
           <a:p>
             <a:fld id="{CE99F462-093F-4566-844B-4C71F2739DA5}" type="datetimeFigureOut">
               <a:rPr lang="en-US" dirty="0"/>
-              <a:t>1/14/23</a:t>
+              <a:t>1/21/23</a:t>
             </a:fld>
             <a:endParaRPr lang="en-US" dirty="0"/>
           </a:p>
@@ -7184,7 +7184,7 @@
           <a:p>
             <a:fld id="{3D24A7AC-904D-4781-85BA-7D10C17ED021}" type="datetimeFigureOut">
               <a:rPr lang="en-US" dirty="0"/>
-              <a:t>1/14/23</a:t>
+              <a:t>1/21/23</a:t>
             </a:fld>
             <a:endParaRPr lang="en-US" dirty="0"/>
           </a:p>
@@ -7569,7 +7569,7 @@
           <a:p>
             <a:fld id="{E331444B-B92B-4E27-8C94-BB93EAF5CB18}" type="datetimeFigureOut">
               <a:rPr lang="en-US" dirty="0"/>
-              <a:t>1/14/23</a:t>
+              <a:t>1/21/23</a:t>
             </a:fld>
             <a:endParaRPr lang="en-US" dirty="0"/>
           </a:p>
@@ -7973,7 +7973,7 @@
           <a:p>
             <a:fld id="{363EFA5E-FA76-400D-B3DC-F0BA90E6D107}" type="datetimeFigureOut">
               <a:rPr lang="en-US" dirty="0"/>
-              <a:t>1/14/23</a:t>
+              <a:t>1/21/23</a:t>
             </a:fld>
             <a:endParaRPr lang="en-US" dirty="0"/>
           </a:p>
@@ -8212,7 +8212,7 @@
           <a:p>
             <a:fld id="{9D6E9DEC-419B-4CC5-A080-3B06BD5A8291}" type="datetimeFigureOut">
               <a:rPr lang="en-US" dirty="0"/>
-              <a:t>1/14/23</a:t>
+              <a:t>1/21/23</a:t>
             </a:fld>
             <a:endParaRPr lang="en-US" dirty="0"/>
           </a:p>
@@ -8636,21 +8636,19 @@
             <p:ph type="ctrTitle"/>
           </p:nvPr>
         </p:nvSpPr>
-        <p:spPr/>
+        <p:spPr>
+          <a:xfrm>
+            <a:off x="152400" y="2733709"/>
+            <a:ext cx="8672056" cy="1373070"/>
+          </a:xfrm>
+        </p:spPr>
         <p:txBody>
           <a:bodyPr/>
           <a:lstStyle/>
           <a:p>
             <a:r>
-              <a:rPr lang="en-US" dirty="0"/>
-              <a:t>Introduction to</a:t>
-            </a:r>
-            <a:br>
-              <a:rPr lang="en-US" dirty="0"/>
-            </a:br>
-            <a:r>
-              <a:rPr lang="en-US" dirty="0"/>
-              <a:t>Unit Testing</a:t>
+              <a:rPr lang="en-US" sz="4400" dirty="0"/>
+              <a:t>Gotcha! How to Write Software Tests to Improve Code Quality</a:t>
             </a:r>
           </a:p>
         </p:txBody>
@@ -8749,6 +8747,79 @@
               <a:t>https://github.com/PrincetonUniversity/software_testing.git</a:t>
             </a:r>
             <a:endParaRPr lang="en-US" sz="2800" dirty="0"/>
+          </a:p>
+        </p:txBody>
+      </p:sp>
+      <p:pic>
+        <p:nvPicPr>
+          <p:cNvPr id="5" name="Picture 4">
+            <a:extLst>
+              <a:ext uri="{FF2B5EF4-FFF2-40B4-BE49-F238E27FC236}">
+                <a16:creationId xmlns:a16="http://schemas.microsoft.com/office/drawing/2014/main" id="{3CD718CD-CAEA-60D2-08F1-E823D8FE571F}"/>
+              </a:ext>
+            </a:extLst>
+          </p:cNvPr>
+          <p:cNvPicPr>
+            <a:picLocks noChangeAspect="1"/>
+          </p:cNvPicPr>
+          <p:nvPr/>
+        </p:nvPicPr>
+        <p:blipFill>
+          <a:blip r:embed="rId4"/>
+          <a:stretch>
+            <a:fillRect/>
+          </a:stretch>
+        </p:blipFill>
+        <p:spPr>
+          <a:xfrm>
+            <a:off x="5248895" y="276624"/>
+            <a:ext cx="2311068" cy="2139299"/>
+          </a:xfrm>
+          <a:prstGeom prst="rect">
+            <a:avLst/>
+          </a:prstGeom>
+        </p:spPr>
+      </p:pic>
+      <p:sp>
+        <p:nvSpPr>
+          <p:cNvPr id="7" name="TextBox 6">
+            <a:extLst>
+              <a:ext uri="{FF2B5EF4-FFF2-40B4-BE49-F238E27FC236}">
+                <a16:creationId xmlns:a16="http://schemas.microsoft.com/office/drawing/2014/main" id="{B65024E7-AD5E-64E6-556F-D6D51B093CA0}"/>
+              </a:ext>
+            </a:extLst>
+          </p:cNvPr>
+          <p:cNvSpPr txBox="1"/>
+          <p:nvPr/>
+        </p:nvSpPr>
+        <p:spPr>
+          <a:xfrm>
+            <a:off x="-460498" y="992330"/>
+            <a:ext cx="6172200" cy="707886"/>
+          </a:xfrm>
+          <a:prstGeom prst="rect">
+            <a:avLst/>
+          </a:prstGeom>
+          <a:noFill/>
+        </p:spPr>
+        <p:txBody>
+          <a:bodyPr wrap="square">
+            <a:spAutoFit/>
+          </a:bodyPr>
+          <a:lstStyle/>
+          <a:p>
+            <a:pPr algn="ctr"/>
+            <a:r>
+              <a:rPr lang="en-US" sz="2000" dirty="0"/>
+              <a:t>SCAN THE QR CODE</a:t>
+            </a:r>
+          </a:p>
+          <a:p>
+            <a:pPr algn="ctr"/>
+            <a:r>
+              <a:rPr lang="en-US" sz="2000" dirty="0"/>
+              <a:t>And Login with your NET ID to SIGN-IN</a:t>
+            </a:r>
           </a:p>
         </p:txBody>
       </p:sp>

</xml_diff>

<commit_message>
Update slides with reminder for next talk
</commit_message>
<xml_diff>
--- a/UnitTestingSlides.pptx
+++ b/UnitTestingSlides.pptx
@@ -5,7 +5,7 @@
     <p:sldMasterId id="2147483648" r:id="rId1"/>
   </p:sldMasterIdLst>
   <p:notesMasterIdLst>
-    <p:notesMasterId r:id="rId22"/>
+    <p:notesMasterId r:id="rId23"/>
   </p:notesMasterIdLst>
   <p:sldIdLst>
     <p:sldId id="256" r:id="rId2"/>
@@ -16,18 +16,19 @@
     <p:sldId id="260" r:id="rId7"/>
     <p:sldId id="261" r:id="rId8"/>
     <p:sldId id="262" r:id="rId9"/>
-    <p:sldId id="274" r:id="rId10"/>
-    <p:sldId id="271" r:id="rId11"/>
-    <p:sldId id="263" r:id="rId12"/>
-    <p:sldId id="272" r:id="rId13"/>
-    <p:sldId id="264" r:id="rId14"/>
-    <p:sldId id="275" r:id="rId15"/>
-    <p:sldId id="265" r:id="rId16"/>
-    <p:sldId id="266" r:id="rId17"/>
-    <p:sldId id="267" r:id="rId18"/>
-    <p:sldId id="268" r:id="rId19"/>
-    <p:sldId id="269" r:id="rId20"/>
-    <p:sldId id="270" r:id="rId21"/>
+    <p:sldId id="276" r:id="rId10"/>
+    <p:sldId id="274" r:id="rId11"/>
+    <p:sldId id="271" r:id="rId12"/>
+    <p:sldId id="263" r:id="rId13"/>
+    <p:sldId id="272" r:id="rId14"/>
+    <p:sldId id="264" r:id="rId15"/>
+    <p:sldId id="275" r:id="rId16"/>
+    <p:sldId id="265" r:id="rId17"/>
+    <p:sldId id="266" r:id="rId18"/>
+    <p:sldId id="267" r:id="rId19"/>
+    <p:sldId id="268" r:id="rId20"/>
+    <p:sldId id="269" r:id="rId21"/>
+    <p:sldId id="270" r:id="rId22"/>
   </p:sldIdLst>
   <p:sldSz cx="12192000" cy="6858000"/>
   <p:notesSz cx="6858000" cy="9144000"/>
@@ -216,7 +217,7 @@
           <a:p>
             <a:fld id="{EF6A6A60-C693-BC49-85A7-98B318EF45A1}" type="datetimeFigureOut">
               <a:rPr lang="en-US" smtClean="0"/>
-              <a:t>1/21/23</a:t>
+              <a:t>1/22/23</a:t>
             </a:fld>
             <a:endParaRPr lang="en-US"/>
           </a:p>
@@ -1052,7 +1053,7 @@
           <a:p>
             <a:fld id="{36CD89F0-D00C-704A-A77B-5E0A27D974ED}" type="slidenum">
               <a:rPr lang="en-US" smtClean="0"/>
-              <a:t>12</a:t>
+              <a:t>13</a:t>
             </a:fld>
             <a:endParaRPr lang="en-US"/>
           </a:p>
@@ -1345,7 +1346,7 @@
           <a:p>
             <a:fld id="{78ABE3C1-DBE1-495D-B57B-2849774B866A}" type="datetimeFigureOut">
               <a:rPr lang="en-US" dirty="0"/>
-              <a:t>1/21/23</a:t>
+              <a:t>1/22/23</a:t>
             </a:fld>
             <a:endParaRPr lang="en-US" dirty="0"/>
           </a:p>
@@ -1754,7 +1755,7 @@
           <a:p>
             <a:fld id="{446C117F-5CCF-4837-BE5F-2B92066CAFAF}" type="datetimeFigureOut">
               <a:rPr lang="en-US" dirty="0"/>
-              <a:t>1/21/23</a:t>
+              <a:t>1/22/23</a:t>
             </a:fld>
             <a:endParaRPr lang="en-US" dirty="0"/>
           </a:p>
@@ -2085,7 +2086,7 @@
           <a:p>
             <a:fld id="{84EB90BD-B6CE-46B7-997F-7313B992CCDC}" type="datetimeFigureOut">
               <a:rPr lang="en-US" dirty="0"/>
-              <a:t>1/21/23</a:t>
+              <a:t>1/22/23</a:t>
             </a:fld>
             <a:endParaRPr lang="en-US" dirty="0"/>
           </a:p>
@@ -2485,7 +2486,7 @@
           <a:p>
             <a:fld id="{CDB9D11F-B188-461D-B23F-39381795C052}" type="datetimeFigureOut">
               <a:rPr lang="en-US" dirty="0"/>
-              <a:t>1/21/23</a:t>
+              <a:t>1/22/23</a:t>
             </a:fld>
             <a:endParaRPr lang="en-US" dirty="0"/>
           </a:p>
@@ -3048,7 +3049,7 @@
           <a:p>
             <a:fld id="{52E6D8D9-55A2-4063-B0F3-121F44549695}" type="datetimeFigureOut">
               <a:rPr lang="en-US" dirty="0"/>
-              <a:t>1/21/23</a:t>
+              <a:t>1/22/23</a:t>
             </a:fld>
             <a:endParaRPr lang="en-US" dirty="0"/>
           </a:p>
@@ -3724,7 +3725,7 @@
           <a:p>
             <a:fld id="{D4B24536-994D-4021-A283-9F449C0DB509}" type="datetimeFigureOut">
               <a:rPr lang="en-US" dirty="0"/>
-              <a:t>1/21/23</a:t>
+              <a:t>1/22/23</a:t>
             </a:fld>
             <a:endParaRPr lang="en-US" dirty="0"/>
           </a:p>
@@ -4632,7 +4633,7 @@
           <a:p>
             <a:fld id="{3CBBBB78-C96F-47B7-AB17-D852CA960AC9}" type="datetimeFigureOut">
               <a:rPr lang="en-US" dirty="0"/>
-              <a:t>1/21/23</a:t>
+              <a:t>1/22/23</a:t>
             </a:fld>
             <a:endParaRPr lang="en-US" dirty="0"/>
           </a:p>
@@ -4940,7 +4941,7 @@
           <a:p>
             <a:fld id="{1FA3F48C-C7C6-4055-9F49-3777875E72AE}" type="datetimeFigureOut">
               <a:rPr lang="en-US" dirty="0"/>
-              <a:t>1/21/23</a:t>
+              <a:t>1/22/23</a:t>
             </a:fld>
             <a:endParaRPr lang="en-US" dirty="0"/>
           </a:p>
@@ -5199,7 +5200,7 @@
           <a:p>
             <a:fld id="{6178E61D-D431-422C-9764-11DAFE33AB63}" type="datetimeFigureOut">
               <a:rPr lang="en-US" dirty="0"/>
-              <a:t>1/21/23</a:t>
+              <a:t>1/22/23</a:t>
             </a:fld>
             <a:endParaRPr lang="en-US" dirty="0"/>
           </a:p>
@@ -5518,7 +5519,7 @@
           <a:p>
             <a:fld id="{12DE42F4-6EEF-4EF7-8ED4-2208F0F89A08}" type="datetimeFigureOut">
               <a:rPr lang="en-US" dirty="0"/>
-              <a:t>1/21/23</a:t>
+              <a:t>1/22/23</a:t>
             </a:fld>
             <a:endParaRPr lang="en-US" dirty="0"/>
           </a:p>
@@ -5902,7 +5903,7 @@
           <a:p>
             <a:fld id="{30578ACC-22D6-47C1-A373-4FD133E34F3C}" type="datetimeFigureOut">
               <a:rPr lang="en-US" dirty="0"/>
-              <a:t>1/21/23</a:t>
+              <a:t>1/22/23</a:t>
             </a:fld>
             <a:endParaRPr lang="en-US" dirty="0"/>
           </a:p>
@@ -6273,7 +6274,7 @@
           <a:p>
             <a:fld id="{4E5A6C69-6797-4E8A-BF37-F2C3751466E9}" type="datetimeFigureOut">
               <a:rPr lang="en-US" dirty="0"/>
-              <a:t>1/21/23</a:t>
+              <a:t>1/22/23</a:t>
             </a:fld>
             <a:endParaRPr lang="en-US" dirty="0"/>
           </a:p>
@@ -6774,7 +6775,7 @@
           <a:p>
             <a:fld id="{D82014A1-A632-4878-A0D3-F52BA7563730}" type="datetimeFigureOut">
               <a:rPr lang="en-US" dirty="0"/>
-              <a:t>1/21/23</a:t>
+              <a:t>1/22/23</a:t>
             </a:fld>
             <a:endParaRPr lang="en-US" dirty="0"/>
           </a:p>
@@ -7026,7 +7027,7 @@
           <a:p>
             <a:fld id="{CE99F462-093F-4566-844B-4C71F2739DA5}" type="datetimeFigureOut">
               <a:rPr lang="en-US" dirty="0"/>
-              <a:t>1/21/23</a:t>
+              <a:t>1/22/23</a:t>
             </a:fld>
             <a:endParaRPr lang="en-US" dirty="0"/>
           </a:p>
@@ -7184,7 +7185,7 @@
           <a:p>
             <a:fld id="{3D24A7AC-904D-4781-85BA-7D10C17ED021}" type="datetimeFigureOut">
               <a:rPr lang="en-US" dirty="0"/>
-              <a:t>1/21/23</a:t>
+              <a:t>1/22/23</a:t>
             </a:fld>
             <a:endParaRPr lang="en-US" dirty="0"/>
           </a:p>
@@ -7569,7 +7570,7 @@
           <a:p>
             <a:fld id="{E331444B-B92B-4E27-8C94-BB93EAF5CB18}" type="datetimeFigureOut">
               <a:rPr lang="en-US" dirty="0"/>
-              <a:t>1/21/23</a:t>
+              <a:t>1/22/23</a:t>
             </a:fld>
             <a:endParaRPr lang="en-US" dirty="0"/>
           </a:p>
@@ -7973,7 +7974,7 @@
           <a:p>
             <a:fld id="{363EFA5E-FA76-400D-B3DC-F0BA90E6D107}" type="datetimeFigureOut">
               <a:rPr lang="en-US" dirty="0"/>
-              <a:t>1/21/23</a:t>
+              <a:t>1/22/23</a:t>
             </a:fld>
             <a:endParaRPr lang="en-US" dirty="0"/>
           </a:p>
@@ -8212,7 +8213,7 @@
           <a:p>
             <a:fld id="{9D6E9DEC-419B-4CC5-A080-3B06BD5A8291}" type="datetimeFigureOut">
               <a:rPr lang="en-US" dirty="0"/>
-              <a:t>1/21/23</a:t>
+              <a:t>1/22/23</a:t>
             </a:fld>
             <a:endParaRPr lang="en-US" dirty="0"/>
           </a:p>
@@ -8865,7 +8866,7 @@
           <p:cNvPr id="2" name="Title 1">
             <a:extLst>
               <a:ext uri="{FF2B5EF4-FFF2-40B4-BE49-F238E27FC236}">
-                <a16:creationId xmlns:a16="http://schemas.microsoft.com/office/drawing/2014/main" id="{508FB2AD-B5D4-D217-BB7C-5149AE41CA7D}"/>
+                <a16:creationId xmlns:a16="http://schemas.microsoft.com/office/drawing/2014/main" id="{1ACE1201-6411-2BA2-AB2D-E793E1C25471}"/>
               </a:ext>
             </a:extLst>
           </p:cNvPr>
@@ -8883,21 +8884,8 @@
           <a:p>
             <a:r>
               <a:rPr lang="en-US" dirty="0"/>
-              <a:t>02 </a:t>
-            </a:r>
-            <a:r>
-              <a:rPr lang="en-US" dirty="0" err="1"/>
-              <a:t>UnitTest</a:t>
-            </a:r>
-            <a:r>
-              <a:rPr lang="en-US" dirty="0"/>
-              <a:t> setup </a:t>
-            </a:r>
-            <a:r>
-              <a:rPr lang="en-US" dirty="0" err="1"/>
-              <a:t>tearDown</a:t>
-            </a:r>
-            <a:endParaRPr lang="en-US" dirty="0"/>
+              <a:t>02 Unit Test Exceptions</a:t>
+            </a:r>
           </a:p>
         </p:txBody>
       </p:sp>
@@ -8906,7 +8894,7 @@
           <p:cNvPr id="3" name="Content Placeholder 2">
             <a:extLst>
               <a:ext uri="{FF2B5EF4-FFF2-40B4-BE49-F238E27FC236}">
-                <a16:creationId xmlns:a16="http://schemas.microsoft.com/office/drawing/2014/main" id="{3651E43C-8E94-B0ED-1A01-F8E3B543F7BA}"/>
+                <a16:creationId xmlns:a16="http://schemas.microsoft.com/office/drawing/2014/main" id="{238D253A-E33A-9D73-3284-881AD85B8BDE}"/>
               </a:ext>
             </a:extLst>
           </p:cNvPr>
@@ -8919,13 +8907,55 @@
         </p:nvSpPr>
         <p:spPr>
           <a:xfrm>
-            <a:off x="680321" y="2115199"/>
-            <a:ext cx="9613861" cy="4521128"/>
+            <a:off x="680321" y="2336873"/>
+            <a:ext cx="10387201" cy="932800"/>
           </a:xfrm>
         </p:spPr>
         <p:txBody>
-          <a:bodyPr>
-            <a:normAutofit lnSpcReduction="10000"/>
+          <a:bodyPr/>
+          <a:lstStyle/>
+          <a:p>
+            <a:pPr marL="0" indent="0">
+              <a:buNone/>
+            </a:pPr>
+            <a:r>
+              <a:rPr lang="en-US" dirty="0"/>
+              <a:t>It is useful to test for error conditions in addition to success conditions</a:t>
+            </a:r>
+          </a:p>
+          <a:p>
+            <a:pPr marL="0" indent="0">
+              <a:buNone/>
+            </a:pPr>
+            <a:endParaRPr lang="en-US" dirty="0"/>
+          </a:p>
+        </p:txBody>
+      </p:sp>
+      <p:sp>
+        <p:nvSpPr>
+          <p:cNvPr id="5" name="TextBox 4">
+            <a:extLst>
+              <a:ext uri="{FF2B5EF4-FFF2-40B4-BE49-F238E27FC236}">
+                <a16:creationId xmlns:a16="http://schemas.microsoft.com/office/drawing/2014/main" id="{B2B2361F-E3EF-E13E-A690-55F5A4469189}"/>
+              </a:ext>
+            </a:extLst>
+          </p:cNvPr>
+          <p:cNvSpPr txBox="1"/>
+          <p:nvPr/>
+        </p:nvSpPr>
+        <p:spPr>
+          <a:xfrm>
+            <a:off x="1453661" y="3427116"/>
+            <a:ext cx="9613861" cy="2677656"/>
+          </a:xfrm>
+          <a:prstGeom prst="rect">
+            <a:avLst/>
+          </a:prstGeom>
+          <a:noFill/>
+        </p:spPr>
+        <p:txBody>
+          <a:bodyPr wrap="square" rtlCol="0">
+            <a:spAutoFit/>
           </a:bodyPr>
           <a:lstStyle/>
           <a:p>
@@ -8933,135 +8963,175 @@
               <a:buNone/>
             </a:pPr>
             <a:r>
-              <a:rPr lang="en-US" dirty="0"/>
-              <a:t>In a unit test you can add a method to setup and teardown an environment that runs before/after each test.</a:t>
-            </a:r>
+              <a:rPr lang="en-US" sz="2400" dirty="0">
+                <a:latin typeface="Courier" pitchFamily="2" charset="0"/>
+              </a:rPr>
+              <a:t>import </a:t>
+            </a:r>
+            <a:r>
+              <a:rPr lang="en-US" sz="2400" dirty="0" err="1">
+                <a:latin typeface="Courier" pitchFamily="2" charset="0"/>
+              </a:rPr>
+              <a:t>unittest</a:t>
+            </a:r>
+            <a:endParaRPr lang="en-US" sz="2400" dirty="0">
+              <a:latin typeface="Courier" pitchFamily="2" charset="0"/>
+            </a:endParaRPr>
           </a:p>
           <a:p>
             <a:pPr marL="0" indent="0">
               <a:buNone/>
             </a:pPr>
-            <a:endParaRPr lang="en-US" dirty="0"/>
-          </a:p>
-          <a:p>
-            <a:pPr marL="457200" lvl="1" indent="0">
+            <a:r>
+              <a:rPr lang="en-US" sz="2400" dirty="0">
+                <a:latin typeface="Courier" pitchFamily="2" charset="0"/>
+              </a:rPr>
+              <a:t>from </a:t>
+            </a:r>
+            <a:r>
+              <a:rPr lang="en-US" sz="2400" dirty="0" err="1">
+                <a:latin typeface="Courier" pitchFamily="2" charset="0"/>
+              </a:rPr>
+              <a:t>bmi</a:t>
+            </a:r>
+            <a:r>
+              <a:rPr lang="en-US" sz="2400" dirty="0">
+                <a:latin typeface="Courier" pitchFamily="2" charset="0"/>
+              </a:rPr>
+              <a:t> import </a:t>
+            </a:r>
+            <a:r>
+              <a:rPr lang="en-US" sz="2400" dirty="0" err="1">
+                <a:latin typeface="Courier" pitchFamily="2" charset="0"/>
+              </a:rPr>
+              <a:t>bmi</a:t>
+            </a:r>
+            <a:endParaRPr lang="en-US" sz="2400" dirty="0">
+              <a:latin typeface="Courier" pitchFamily="2" charset="0"/>
+            </a:endParaRPr>
+          </a:p>
+          <a:p>
+            <a:pPr marL="0" indent="0">
               <a:buNone/>
             </a:pPr>
-            <a:r>
-              <a:rPr lang="en-US" sz="2400" dirty="0"/>
+            <a:endParaRPr lang="en-US" sz="2400" dirty="0">
+              <a:latin typeface="Courier" pitchFamily="2" charset="0"/>
+            </a:endParaRPr>
+          </a:p>
+          <a:p>
+            <a:pPr marL="0" indent="0">
+              <a:buNone/>
+            </a:pPr>
+            <a:r>
+              <a:rPr lang="en-US" sz="2400" dirty="0">
+                <a:latin typeface="Courier" pitchFamily="2" charset="0"/>
+              </a:rPr>
               <a:t>class </a:t>
             </a:r>
             <a:r>
-              <a:rPr lang="en-US" sz="2400" dirty="0" err="1"/>
-              <a:t>Mytest</a:t>
-            </a:r>
-            <a:r>
-              <a:rPr lang="en-US" sz="2400" dirty="0"/>
+              <a:rPr lang="en-US" sz="2400" dirty="0" err="1">
+                <a:latin typeface="Courier" pitchFamily="2" charset="0"/>
+              </a:rPr>
+              <a:t>MyTest</a:t>
+            </a:r>
+            <a:r>
+              <a:rPr lang="en-US" sz="2400" dirty="0">
+                <a:latin typeface="Courier" pitchFamily="2" charset="0"/>
+              </a:rPr>
               <a:t>(</a:t>
             </a:r>
             <a:r>
-              <a:rPr lang="en-US" sz="2400" dirty="0" err="1"/>
+              <a:rPr lang="en-US" sz="2400" dirty="0" err="1">
+                <a:latin typeface="Courier" pitchFamily="2" charset="0"/>
+              </a:rPr>
               <a:t>unittest.TestCase</a:t>
             </a:r>
             <a:r>
-              <a:rPr lang="en-US" sz="2400" dirty="0"/>
+              <a:rPr lang="en-US" sz="2400" dirty="0">
+                <a:latin typeface="Courier" pitchFamily="2" charset="0"/>
+              </a:rPr>
               <a:t>):</a:t>
             </a:r>
           </a:p>
           <a:p>
-            <a:pPr marL="457200" lvl="1" indent="0">
+            <a:pPr marL="0" indent="0">
               <a:buNone/>
             </a:pPr>
             <a:r>
-              <a:rPr lang="en-US" sz="2400" dirty="0"/>
-              <a:t>	def setup(self):</a:t>
-            </a:r>
-          </a:p>
-          <a:p>
-            <a:pPr marL="457200" lvl="1" indent="0">
+              <a:rPr lang="en-US" sz="2400" dirty="0">
+                <a:latin typeface="Courier" pitchFamily="2" charset="0"/>
+              </a:rPr>
+              <a:t>	def </a:t>
+            </a:r>
+            <a:r>
+              <a:rPr lang="en-US" sz="2400" dirty="0" err="1">
+                <a:latin typeface="Courier" pitchFamily="2" charset="0"/>
+              </a:rPr>
+              <a:t>test_values</a:t>
+            </a:r>
+            <a:r>
+              <a:rPr lang="en-US" sz="2400" dirty="0">
+                <a:latin typeface="Courier" pitchFamily="2" charset="0"/>
+              </a:rPr>
+              <a:t>(self):</a:t>
+            </a:r>
+          </a:p>
+          <a:p>
+            <a:pPr marL="0" indent="0">
               <a:buNone/>
             </a:pPr>
             <a:r>
-              <a:rPr lang="en-US" sz="2400" dirty="0"/>
-              <a:t>		”””Run before each test”””</a:t>
-            </a:r>
-          </a:p>
-          <a:p>
-            <a:pPr marL="457200" lvl="1" indent="0">
+              <a:rPr lang="en-US" sz="2400" dirty="0">
+                <a:latin typeface="Courier" pitchFamily="2" charset="0"/>
+              </a:rPr>
+              <a:t>		with </a:t>
+            </a:r>
+            <a:r>
+              <a:rPr lang="en-US" sz="2400" dirty="0" err="1">
+                <a:latin typeface="Courier" pitchFamily="2" charset="0"/>
+              </a:rPr>
+              <a:t>self.assertRaises</a:t>
+            </a:r>
+            <a:r>
+              <a:rPr lang="en-US" sz="2400" dirty="0">
+                <a:latin typeface="Courier" pitchFamily="2" charset="0"/>
+              </a:rPr>
+              <a:t>(</a:t>
+            </a:r>
+            <a:r>
+              <a:rPr lang="en-US" sz="2400" dirty="0" err="1">
+                <a:latin typeface="Courier" pitchFamily="2" charset="0"/>
+              </a:rPr>
+              <a:t>ValueError</a:t>
+            </a:r>
+            <a:r>
+              <a:rPr lang="en-US" sz="2400" dirty="0">
+                <a:latin typeface="Courier" pitchFamily="2" charset="0"/>
+              </a:rPr>
+              <a:t>):</a:t>
+            </a:r>
+          </a:p>
+          <a:p>
+            <a:pPr marL="0" indent="0">
               <a:buNone/>
             </a:pPr>
             <a:r>
-              <a:rPr lang="en-US" sz="2400" dirty="0"/>
-              <a:t>	def </a:t>
-            </a:r>
-            <a:r>
-              <a:rPr lang="en-US" sz="2400" dirty="0" err="1"/>
-              <a:t>tearDown</a:t>
-            </a:r>
-            <a:r>
-              <a:rPr lang="en-US" sz="2400" dirty="0"/>
-              <a:t>(self):</a:t>
-            </a:r>
-          </a:p>
-          <a:p>
-            <a:pPr marL="457200" lvl="1" indent="0">
-              <a:buNone/>
-            </a:pPr>
-            <a:r>
-              <a:rPr lang="en-US" sz="2400" dirty="0"/>
-              <a:t>		“””Run after each test”””</a:t>
-            </a:r>
-          </a:p>
-          <a:p>
-            <a:pPr marL="457200" lvl="1" indent="0">
-              <a:buNone/>
-            </a:pPr>
-            <a:r>
-              <a:rPr lang="en-US" sz="2400" dirty="0"/>
-              <a:t>	def </a:t>
-            </a:r>
-            <a:r>
-              <a:rPr lang="en-US" sz="2400" dirty="0" err="1"/>
-              <a:t>setUpClass</a:t>
-            </a:r>
-            <a:r>
-              <a:rPr lang="en-US" sz="2400" dirty="0"/>
-              <a:t>(self):</a:t>
-            </a:r>
-          </a:p>
-          <a:p>
-            <a:pPr marL="457200" lvl="1" indent="0">
-              <a:buNone/>
-            </a:pPr>
-            <a:r>
-              <a:rPr lang="en-US" sz="2400" dirty="0"/>
-              <a:t>		”””Run once before all tests”””</a:t>
-            </a:r>
-          </a:p>
-          <a:p>
-            <a:pPr marL="457200" lvl="1" indent="0">
-              <a:buNone/>
-            </a:pPr>
-            <a:r>
-              <a:rPr lang="en-US" sz="2400" dirty="0"/>
-              <a:t>	def </a:t>
-            </a:r>
-            <a:r>
-              <a:rPr lang="en-US" sz="2400" dirty="0" err="1"/>
-              <a:t>tearDownClass</a:t>
-            </a:r>
-            <a:r>
-              <a:rPr lang="en-US" sz="2400" dirty="0"/>
-              <a:t>(self):</a:t>
-            </a:r>
-          </a:p>
-          <a:p>
-            <a:pPr marL="457200" lvl="1" indent="0">
-              <a:buNone/>
-            </a:pPr>
-            <a:r>
-              <a:rPr lang="en-US" sz="2400" dirty="0"/>
-              <a:t>		“””Run once after all tests”””</a:t>
+              <a:rPr lang="en-US" sz="2400" dirty="0">
+                <a:latin typeface="Courier" pitchFamily="2" charset="0"/>
+              </a:rPr>
+              <a:t>			</a:t>
+            </a:r>
+            <a:r>
+              <a:rPr lang="en-US" sz="2400" dirty="0" err="1">
+                <a:latin typeface="Courier" pitchFamily="2" charset="0"/>
+              </a:rPr>
+              <a:t>bmi</a:t>
+            </a:r>
+            <a:r>
+              <a:rPr lang="en-US" sz="2400" dirty="0">
+                <a:latin typeface="Courier" pitchFamily="2" charset="0"/>
+              </a:rPr>
+              <a:t>(-1, 3)</a:t>
             </a:r>
           </a:p>
         </p:txBody>
@@ -9069,13 +9139,247 @@
     </p:spTree>
     <p:extLst>
       <p:ext uri="{BB962C8B-B14F-4D97-AF65-F5344CB8AC3E}">
-        <p14:creationId xmlns:p14="http://schemas.microsoft.com/office/powerpoint/2010/main" val="1666096593"/>
+        <p14:creationId xmlns:p14="http://schemas.microsoft.com/office/powerpoint/2010/main" val="4112208798"/>
       </p:ext>
     </p:extLst>
   </p:cSld>
   <p:clrMapOvr>
     <a:masterClrMapping/>
   </p:clrMapOvr>
+  <p:timing>
+    <p:tnLst>
+      <p:par>
+        <p:cTn id="1" dur="indefinite" restart="never" nodeType="tmRoot">
+          <p:childTnLst>
+            <p:seq concurrent="1" nextAc="seek">
+              <p:cTn id="2" dur="indefinite" nodeType="mainSeq">
+                <p:childTnLst>
+                  <p:par>
+                    <p:cTn id="3" fill="hold">
+                      <p:stCondLst>
+                        <p:cond delay="indefinite"/>
+                      </p:stCondLst>
+                      <p:childTnLst>
+                        <p:par>
+                          <p:cTn id="4" fill="hold">
+                            <p:stCondLst>
+                              <p:cond delay="0"/>
+                            </p:stCondLst>
+                            <p:childTnLst>
+                              <p:par>
+                                <p:cTn id="5" presetID="1" presetClass="entr" presetSubtype="0" fill="hold" nodeType="clickEffect">
+                                  <p:stCondLst>
+                                    <p:cond delay="0"/>
+                                  </p:stCondLst>
+                                  <p:childTnLst>
+                                    <p:set>
+                                      <p:cBhvr>
+                                        <p:cTn id="6" dur="1" fill="hold">
+                                          <p:stCondLst>
+                                            <p:cond delay="0"/>
+                                          </p:stCondLst>
+                                        </p:cTn>
+                                        <p:tgtEl>
+                                          <p:spTgt spid="5">
+                                            <p:txEl>
+                                              <p:pRg st="0" end="0"/>
+                                            </p:txEl>
+                                          </p:spTgt>
+                                        </p:tgtEl>
+                                        <p:attrNameLst>
+                                          <p:attrName>style.visibility</p:attrName>
+                                        </p:attrNameLst>
+                                      </p:cBhvr>
+                                      <p:to>
+                                        <p:strVal val="visible"/>
+                                      </p:to>
+                                    </p:set>
+                                  </p:childTnLst>
+                                </p:cTn>
+                              </p:par>
+                              <p:par>
+                                <p:cTn id="7" presetID="1" presetClass="entr" presetSubtype="0" fill="hold" nodeType="withEffect">
+                                  <p:stCondLst>
+                                    <p:cond delay="0"/>
+                                  </p:stCondLst>
+                                  <p:childTnLst>
+                                    <p:set>
+                                      <p:cBhvr>
+                                        <p:cTn id="8" dur="1" fill="hold">
+                                          <p:stCondLst>
+                                            <p:cond delay="0"/>
+                                          </p:stCondLst>
+                                        </p:cTn>
+                                        <p:tgtEl>
+                                          <p:spTgt spid="5">
+                                            <p:txEl>
+                                              <p:pRg st="1" end="1"/>
+                                            </p:txEl>
+                                          </p:spTgt>
+                                        </p:tgtEl>
+                                        <p:attrNameLst>
+                                          <p:attrName>style.visibility</p:attrName>
+                                        </p:attrNameLst>
+                                      </p:cBhvr>
+                                      <p:to>
+                                        <p:strVal val="visible"/>
+                                      </p:to>
+                                    </p:set>
+                                  </p:childTnLst>
+                                </p:cTn>
+                              </p:par>
+                              <p:par>
+                                <p:cTn id="9" presetID="1" presetClass="entr" presetSubtype="0" fill="hold" nodeType="withEffect">
+                                  <p:stCondLst>
+                                    <p:cond delay="0"/>
+                                  </p:stCondLst>
+                                  <p:childTnLst>
+                                    <p:set>
+                                      <p:cBhvr>
+                                        <p:cTn id="10" dur="1" fill="hold">
+                                          <p:stCondLst>
+                                            <p:cond delay="0"/>
+                                          </p:stCondLst>
+                                        </p:cTn>
+                                        <p:tgtEl>
+                                          <p:spTgt spid="5">
+                                            <p:txEl>
+                                              <p:pRg st="3" end="3"/>
+                                            </p:txEl>
+                                          </p:spTgt>
+                                        </p:tgtEl>
+                                        <p:attrNameLst>
+                                          <p:attrName>style.visibility</p:attrName>
+                                        </p:attrNameLst>
+                                      </p:cBhvr>
+                                      <p:to>
+                                        <p:strVal val="visible"/>
+                                      </p:to>
+                                    </p:set>
+                                  </p:childTnLst>
+                                </p:cTn>
+                              </p:par>
+                              <p:par>
+                                <p:cTn id="11" presetID="1" presetClass="entr" presetSubtype="0" fill="hold" nodeType="withEffect">
+                                  <p:stCondLst>
+                                    <p:cond delay="0"/>
+                                  </p:stCondLst>
+                                  <p:childTnLst>
+                                    <p:set>
+                                      <p:cBhvr>
+                                        <p:cTn id="12" dur="1" fill="hold">
+                                          <p:stCondLst>
+                                            <p:cond delay="0"/>
+                                          </p:stCondLst>
+                                        </p:cTn>
+                                        <p:tgtEl>
+                                          <p:spTgt spid="5">
+                                            <p:txEl>
+                                              <p:pRg st="4" end="4"/>
+                                            </p:txEl>
+                                          </p:spTgt>
+                                        </p:tgtEl>
+                                        <p:attrNameLst>
+                                          <p:attrName>style.visibility</p:attrName>
+                                        </p:attrNameLst>
+                                      </p:cBhvr>
+                                      <p:to>
+                                        <p:strVal val="visible"/>
+                                      </p:to>
+                                    </p:set>
+                                  </p:childTnLst>
+                                </p:cTn>
+                              </p:par>
+                              <p:par>
+                                <p:cTn id="13" presetID="1" presetClass="entr" presetSubtype="0" fill="hold" nodeType="withEffect">
+                                  <p:stCondLst>
+                                    <p:cond delay="0"/>
+                                  </p:stCondLst>
+                                  <p:childTnLst>
+                                    <p:set>
+                                      <p:cBhvr>
+                                        <p:cTn id="14" dur="1" fill="hold">
+                                          <p:stCondLst>
+                                            <p:cond delay="0"/>
+                                          </p:stCondLst>
+                                        </p:cTn>
+                                        <p:tgtEl>
+                                          <p:spTgt spid="5">
+                                            <p:txEl>
+                                              <p:pRg st="5" end="5"/>
+                                            </p:txEl>
+                                          </p:spTgt>
+                                        </p:tgtEl>
+                                        <p:attrNameLst>
+                                          <p:attrName>style.visibility</p:attrName>
+                                        </p:attrNameLst>
+                                      </p:cBhvr>
+                                      <p:to>
+                                        <p:strVal val="visible"/>
+                                      </p:to>
+                                    </p:set>
+                                  </p:childTnLst>
+                                </p:cTn>
+                              </p:par>
+                              <p:par>
+                                <p:cTn id="15" presetID="1" presetClass="entr" presetSubtype="0" fill="hold" nodeType="withEffect">
+                                  <p:stCondLst>
+                                    <p:cond delay="0"/>
+                                  </p:stCondLst>
+                                  <p:childTnLst>
+                                    <p:set>
+                                      <p:cBhvr>
+                                        <p:cTn id="16" dur="1" fill="hold">
+                                          <p:stCondLst>
+                                            <p:cond delay="0"/>
+                                          </p:stCondLst>
+                                        </p:cTn>
+                                        <p:tgtEl>
+                                          <p:spTgt spid="5">
+                                            <p:txEl>
+                                              <p:pRg st="6" end="6"/>
+                                            </p:txEl>
+                                          </p:spTgt>
+                                        </p:tgtEl>
+                                        <p:attrNameLst>
+                                          <p:attrName>style.visibility</p:attrName>
+                                        </p:attrNameLst>
+                                      </p:cBhvr>
+                                      <p:to>
+                                        <p:strVal val="visible"/>
+                                      </p:to>
+                                    </p:set>
+                                  </p:childTnLst>
+                                </p:cTn>
+                              </p:par>
+                            </p:childTnLst>
+                          </p:cTn>
+                        </p:par>
+                      </p:childTnLst>
+                    </p:cTn>
+                  </p:par>
+                </p:childTnLst>
+              </p:cTn>
+              <p:prevCondLst>
+                <p:cond evt="onPrev" delay="0">
+                  <p:tgtEl>
+                    <p:sldTgt/>
+                  </p:tgtEl>
+                </p:cond>
+              </p:prevCondLst>
+              <p:nextCondLst>
+                <p:cond evt="onNext" delay="0">
+                  <p:tgtEl>
+                    <p:sldTgt/>
+                  </p:tgtEl>
+                </p:cond>
+              </p:nextCondLst>
+            </p:seq>
+          </p:childTnLst>
+        </p:cTn>
+      </p:par>
+    </p:tnLst>
+  </p:timing>
 </p:sld>
 </file>
 
@@ -9101,6 +9405,242 @@
           <p:cNvPr id="2" name="Title 1">
             <a:extLst>
               <a:ext uri="{FF2B5EF4-FFF2-40B4-BE49-F238E27FC236}">
+                <a16:creationId xmlns:a16="http://schemas.microsoft.com/office/drawing/2014/main" id="{508FB2AD-B5D4-D217-BB7C-5149AE41CA7D}"/>
+              </a:ext>
+            </a:extLst>
+          </p:cNvPr>
+          <p:cNvSpPr>
+            <a:spLocks noGrp="1"/>
+          </p:cNvSpPr>
+          <p:nvPr>
+            <p:ph type="title"/>
+          </p:nvPr>
+        </p:nvSpPr>
+        <p:spPr/>
+        <p:txBody>
+          <a:bodyPr/>
+          <a:lstStyle/>
+          <a:p>
+            <a:r>
+              <a:rPr lang="en-US" dirty="0"/>
+              <a:t>02 </a:t>
+            </a:r>
+            <a:r>
+              <a:rPr lang="en-US" dirty="0" err="1"/>
+              <a:t>UnitTest</a:t>
+            </a:r>
+            <a:r>
+              <a:rPr lang="en-US" dirty="0"/>
+              <a:t> setup </a:t>
+            </a:r>
+            <a:r>
+              <a:rPr lang="en-US" dirty="0" err="1"/>
+              <a:t>tearDown</a:t>
+            </a:r>
+            <a:endParaRPr lang="en-US" dirty="0"/>
+          </a:p>
+        </p:txBody>
+      </p:sp>
+      <p:sp>
+        <p:nvSpPr>
+          <p:cNvPr id="3" name="Content Placeholder 2">
+            <a:extLst>
+              <a:ext uri="{FF2B5EF4-FFF2-40B4-BE49-F238E27FC236}">
+                <a16:creationId xmlns:a16="http://schemas.microsoft.com/office/drawing/2014/main" id="{3651E43C-8E94-B0ED-1A01-F8E3B543F7BA}"/>
+              </a:ext>
+            </a:extLst>
+          </p:cNvPr>
+          <p:cNvSpPr>
+            <a:spLocks noGrp="1"/>
+          </p:cNvSpPr>
+          <p:nvPr>
+            <p:ph idx="1"/>
+          </p:nvPr>
+        </p:nvSpPr>
+        <p:spPr>
+          <a:xfrm>
+            <a:off x="680321" y="2115199"/>
+            <a:ext cx="9613861" cy="4521128"/>
+          </a:xfrm>
+        </p:spPr>
+        <p:txBody>
+          <a:bodyPr>
+            <a:normAutofit lnSpcReduction="10000"/>
+          </a:bodyPr>
+          <a:lstStyle/>
+          <a:p>
+            <a:pPr marL="0" indent="0">
+              <a:buNone/>
+            </a:pPr>
+            <a:r>
+              <a:rPr lang="en-US" dirty="0"/>
+              <a:t>In a unit test you can add a method to setup and teardown an environment that runs before/after each test.</a:t>
+            </a:r>
+          </a:p>
+          <a:p>
+            <a:pPr marL="0" indent="0">
+              <a:buNone/>
+            </a:pPr>
+            <a:endParaRPr lang="en-US" dirty="0"/>
+          </a:p>
+          <a:p>
+            <a:pPr marL="457200" lvl="1" indent="0">
+              <a:buNone/>
+            </a:pPr>
+            <a:r>
+              <a:rPr lang="en-US" sz="2400" dirty="0"/>
+              <a:t>class </a:t>
+            </a:r>
+            <a:r>
+              <a:rPr lang="en-US" sz="2400" dirty="0" err="1"/>
+              <a:t>Mytest</a:t>
+            </a:r>
+            <a:r>
+              <a:rPr lang="en-US" sz="2400" dirty="0"/>
+              <a:t>(</a:t>
+            </a:r>
+            <a:r>
+              <a:rPr lang="en-US" sz="2400" dirty="0" err="1"/>
+              <a:t>unittest.TestCase</a:t>
+            </a:r>
+            <a:r>
+              <a:rPr lang="en-US" sz="2400" dirty="0"/>
+              <a:t>):</a:t>
+            </a:r>
+          </a:p>
+          <a:p>
+            <a:pPr marL="457200" lvl="1" indent="0">
+              <a:buNone/>
+            </a:pPr>
+            <a:r>
+              <a:rPr lang="en-US" sz="2400" dirty="0"/>
+              <a:t>	def setup(self):</a:t>
+            </a:r>
+          </a:p>
+          <a:p>
+            <a:pPr marL="457200" lvl="1" indent="0">
+              <a:buNone/>
+            </a:pPr>
+            <a:r>
+              <a:rPr lang="en-US" sz="2400" dirty="0"/>
+              <a:t>		”””Run before each test”””</a:t>
+            </a:r>
+          </a:p>
+          <a:p>
+            <a:pPr marL="457200" lvl="1" indent="0">
+              <a:buNone/>
+            </a:pPr>
+            <a:r>
+              <a:rPr lang="en-US" sz="2400" dirty="0"/>
+              <a:t>	def </a:t>
+            </a:r>
+            <a:r>
+              <a:rPr lang="en-US" sz="2400" dirty="0" err="1"/>
+              <a:t>tearDown</a:t>
+            </a:r>
+            <a:r>
+              <a:rPr lang="en-US" sz="2400" dirty="0"/>
+              <a:t>(self):</a:t>
+            </a:r>
+          </a:p>
+          <a:p>
+            <a:pPr marL="457200" lvl="1" indent="0">
+              <a:buNone/>
+            </a:pPr>
+            <a:r>
+              <a:rPr lang="en-US" sz="2400" dirty="0"/>
+              <a:t>		“””Run after each test”””</a:t>
+            </a:r>
+          </a:p>
+          <a:p>
+            <a:pPr marL="457200" lvl="1" indent="0">
+              <a:buNone/>
+            </a:pPr>
+            <a:r>
+              <a:rPr lang="en-US" sz="2400" dirty="0"/>
+              <a:t>	def </a:t>
+            </a:r>
+            <a:r>
+              <a:rPr lang="en-US" sz="2400" dirty="0" err="1"/>
+              <a:t>setUpClass</a:t>
+            </a:r>
+            <a:r>
+              <a:rPr lang="en-US" sz="2400" dirty="0"/>
+              <a:t>(self):</a:t>
+            </a:r>
+          </a:p>
+          <a:p>
+            <a:pPr marL="457200" lvl="1" indent="0">
+              <a:buNone/>
+            </a:pPr>
+            <a:r>
+              <a:rPr lang="en-US" sz="2400" dirty="0"/>
+              <a:t>		”””Run once before all tests”””</a:t>
+            </a:r>
+          </a:p>
+          <a:p>
+            <a:pPr marL="457200" lvl="1" indent="0">
+              <a:buNone/>
+            </a:pPr>
+            <a:r>
+              <a:rPr lang="en-US" sz="2400" dirty="0"/>
+              <a:t>	def </a:t>
+            </a:r>
+            <a:r>
+              <a:rPr lang="en-US" sz="2400" dirty="0" err="1"/>
+              <a:t>tearDownClass</a:t>
+            </a:r>
+            <a:r>
+              <a:rPr lang="en-US" sz="2400" dirty="0"/>
+              <a:t>(self):</a:t>
+            </a:r>
+          </a:p>
+          <a:p>
+            <a:pPr marL="457200" lvl="1" indent="0">
+              <a:buNone/>
+            </a:pPr>
+            <a:r>
+              <a:rPr lang="en-US" sz="2400" dirty="0"/>
+              <a:t>		“””Run once after all tests”””</a:t>
+            </a:r>
+          </a:p>
+        </p:txBody>
+      </p:sp>
+    </p:spTree>
+    <p:extLst>
+      <p:ext uri="{BB962C8B-B14F-4D97-AF65-F5344CB8AC3E}">
+        <p14:creationId xmlns:p14="http://schemas.microsoft.com/office/powerpoint/2010/main" val="1666096593"/>
+      </p:ext>
+    </p:extLst>
+  </p:cSld>
+  <p:clrMapOvr>
+    <a:masterClrMapping/>
+  </p:clrMapOvr>
+</p:sld>
+</file>
+
+<file path=ppt/slides/slide12.xml><?xml version="1.0" encoding="utf-8"?>
+<p:sld xmlns:a="http://schemas.openxmlformats.org/drawingml/2006/main" xmlns:r="http://schemas.openxmlformats.org/officeDocument/2006/relationships" xmlns:p="http://schemas.openxmlformats.org/presentationml/2006/main">
+  <p:cSld>
+    <p:spTree>
+      <p:nvGrpSpPr>
+        <p:cNvPr id="1" name=""/>
+        <p:cNvGrpSpPr/>
+        <p:nvPr/>
+      </p:nvGrpSpPr>
+      <p:grpSpPr>
+        <a:xfrm>
+          <a:off x="0" y="0"/>
+          <a:ext cx="0" cy="0"/>
+          <a:chOff x="0" y="0"/>
+          <a:chExt cx="0" cy="0"/>
+        </a:xfrm>
+      </p:grpSpPr>
+      <p:sp>
+        <p:nvSpPr>
+          <p:cNvPr id="2" name="Title 1">
+            <a:extLst>
+              <a:ext uri="{FF2B5EF4-FFF2-40B4-BE49-F238E27FC236}">
                 <a16:creationId xmlns:a16="http://schemas.microsoft.com/office/drawing/2014/main" id="{7B1BC8CA-23DC-00F6-9485-97991DED6A35}"/>
               </a:ext>
             </a:extLst>
@@ -9157,7 +9697,7 @@
           <a:p>
             <a:r>
               <a:rPr lang="en-US" dirty="0"/>
-              <a:t>Requires PIP install of </a:t>
+              <a:t>Requires “pip install </a:t>
             </a:r>
             <a:r>
               <a:rPr lang="en-US" dirty="0" err="1"/>
@@ -9165,7 +9705,7 @@
             </a:r>
             <a:r>
               <a:rPr lang="en-US" dirty="0"/>
-              <a:t> package.</a:t>
+              <a:t>”</a:t>
             </a:r>
           </a:p>
           <a:p>
@@ -9540,7 +10080,7 @@
 </p:sld>
 </file>
 
-<file path=ppt/slides/slide12.xml><?xml version="1.0" encoding="utf-8"?>
+<file path=ppt/slides/slide13.xml><?xml version="1.0" encoding="utf-8"?>
 <p:sld xmlns:a="http://schemas.openxmlformats.org/drawingml/2006/main" xmlns:r="http://schemas.openxmlformats.org/officeDocument/2006/relationships" xmlns:p="http://schemas.openxmlformats.org/presentationml/2006/main">
   <p:cSld>
     <p:spTree>
@@ -9747,7 +10287,7 @@
 </p:sld>
 </file>
 
-<file path=ppt/slides/slide13.xml><?xml version="1.0" encoding="utf-8"?>
+<file path=ppt/slides/slide14.xml><?xml version="1.0" encoding="utf-8"?>
 <p:sld xmlns:a="http://schemas.openxmlformats.org/drawingml/2006/main" xmlns:r="http://schemas.openxmlformats.org/officeDocument/2006/relationships" xmlns:p="http://schemas.openxmlformats.org/presentationml/2006/main">
   <p:cSld>
     <p:spTree>
@@ -10373,7 +10913,7 @@
 </p:sld>
 </file>
 
-<file path=ppt/slides/slide14.xml><?xml version="1.0" encoding="utf-8"?>
+<file path=ppt/slides/slide15.xml><?xml version="1.0" encoding="utf-8"?>
 <p:sld xmlns:a="http://schemas.openxmlformats.org/drawingml/2006/main" xmlns:r="http://schemas.openxmlformats.org/officeDocument/2006/relationships" xmlns:p="http://schemas.openxmlformats.org/presentationml/2006/main">
   <p:cSld>
     <p:spTree>
@@ -11058,7 +11598,7 @@
 </p:sld>
 </file>
 
-<file path=ppt/slides/slide15.xml><?xml version="1.0" encoding="utf-8"?>
+<file path=ppt/slides/slide16.xml><?xml version="1.0" encoding="utf-8"?>
 <p:sld xmlns:a="http://schemas.openxmlformats.org/drawingml/2006/main" xmlns:r="http://schemas.openxmlformats.org/officeDocument/2006/relationships" xmlns:p="http://schemas.openxmlformats.org/presentationml/2006/main">
   <p:cSld>
     <p:spTree>
@@ -11288,7 +11828,7 @@
 </p:sld>
 </file>
 
-<file path=ppt/slides/slide16.xml><?xml version="1.0" encoding="utf-8"?>
+<file path=ppt/slides/slide17.xml><?xml version="1.0" encoding="utf-8"?>
 <p:sld xmlns:a="http://schemas.openxmlformats.org/drawingml/2006/main" xmlns:r="http://schemas.openxmlformats.org/officeDocument/2006/relationships" xmlns:p="http://schemas.openxmlformats.org/presentationml/2006/main">
   <p:cSld>
     <p:spTree>
@@ -11723,7 +12263,7 @@
 </p:sld>
 </file>
 
-<file path=ppt/slides/slide17.xml><?xml version="1.0" encoding="utf-8"?>
+<file path=ppt/slides/slide18.xml><?xml version="1.0" encoding="utf-8"?>
 <p:sld xmlns:a="http://schemas.openxmlformats.org/drawingml/2006/main" xmlns:r="http://schemas.openxmlformats.org/officeDocument/2006/relationships" xmlns:p="http://schemas.openxmlformats.org/presentationml/2006/main">
   <p:cSld>
     <p:spTree>
@@ -12218,7 +12758,7 @@
 </p:sld>
 </file>
 
-<file path=ppt/slides/slide18.xml><?xml version="1.0" encoding="utf-8"?>
+<file path=ppt/slides/slide19.xml><?xml version="1.0" encoding="utf-8"?>
 <p:sld xmlns:a="http://schemas.openxmlformats.org/drawingml/2006/main" xmlns:r="http://schemas.openxmlformats.org/officeDocument/2006/relationships" xmlns:p="http://schemas.openxmlformats.org/presentationml/2006/main">
   <p:cSld>
     <p:spTree>
@@ -12512,157 +13052,6 @@
 </p:sld>
 </file>
 
-<file path=ppt/slides/slide19.xml><?xml version="1.0" encoding="utf-8"?>
-<p:sld xmlns:a="http://schemas.openxmlformats.org/drawingml/2006/main" xmlns:r="http://schemas.openxmlformats.org/officeDocument/2006/relationships" xmlns:p="http://schemas.openxmlformats.org/presentationml/2006/main">
-  <p:cSld>
-    <p:spTree>
-      <p:nvGrpSpPr>
-        <p:cNvPr id="1" name=""/>
-        <p:cNvGrpSpPr/>
-        <p:nvPr/>
-      </p:nvGrpSpPr>
-      <p:grpSpPr>
-        <a:xfrm>
-          <a:off x="0" y="0"/>
-          <a:ext cx="0" cy="0"/>
-          <a:chOff x="0" y="0"/>
-          <a:chExt cx="0" cy="0"/>
-        </a:xfrm>
-      </p:grpSpPr>
-      <p:sp>
-        <p:nvSpPr>
-          <p:cNvPr id="2" name="Title 1">
-            <a:extLst>
-              <a:ext uri="{FF2B5EF4-FFF2-40B4-BE49-F238E27FC236}">
-                <a16:creationId xmlns:a16="http://schemas.microsoft.com/office/drawing/2014/main" id="{0584A545-6FA8-C91A-FCC4-AAB0B775D43F}"/>
-              </a:ext>
-            </a:extLst>
-          </p:cNvPr>
-          <p:cNvSpPr>
-            <a:spLocks noGrp="1"/>
-          </p:cNvSpPr>
-          <p:nvPr>
-            <p:ph type="title"/>
-          </p:nvPr>
-        </p:nvSpPr>
-        <p:spPr/>
-        <p:txBody>
-          <a:bodyPr/>
-          <a:lstStyle/>
-          <a:p>
-            <a:r>
-              <a:rPr lang="en-US" dirty="0"/>
-              <a:t>Continuous Integration</a:t>
-            </a:r>
-          </a:p>
-        </p:txBody>
-      </p:sp>
-      <p:sp>
-        <p:nvSpPr>
-          <p:cNvPr id="3" name="Content Placeholder 2">
-            <a:extLst>
-              <a:ext uri="{FF2B5EF4-FFF2-40B4-BE49-F238E27FC236}">
-                <a16:creationId xmlns:a16="http://schemas.microsoft.com/office/drawing/2014/main" id="{8D645834-C049-7179-9280-BB2B0F2430CC}"/>
-              </a:ext>
-            </a:extLst>
-          </p:cNvPr>
-          <p:cNvSpPr>
-            <a:spLocks noGrp="1"/>
-          </p:cNvSpPr>
-          <p:nvPr>
-            <p:ph idx="1"/>
-          </p:nvPr>
-        </p:nvSpPr>
-        <p:spPr>
-          <a:xfrm>
-            <a:off x="680321" y="2336873"/>
-            <a:ext cx="10115498" cy="3599316"/>
-          </a:xfrm>
-        </p:spPr>
-        <p:txBody>
-          <a:bodyPr>
-            <a:normAutofit lnSpcReduction="10000"/>
-          </a:bodyPr>
-          <a:lstStyle/>
-          <a:p>
-            <a:pPr marL="0" indent="0">
-              <a:buNone/>
-            </a:pPr>
-            <a:r>
-              <a:rPr lang="en-US" dirty="0"/>
-              <a:t>When to run tests?</a:t>
-            </a:r>
-          </a:p>
-          <a:p>
-            <a:pPr lvl="1"/>
-            <a:r>
-              <a:rPr lang="en-US" sz="2400" dirty="0"/>
-              <a:t>Manually run tests after you make changes.</a:t>
-            </a:r>
-          </a:p>
-          <a:p>
-            <a:pPr lvl="1"/>
-            <a:r>
-              <a:rPr lang="en-US" sz="2400" dirty="0"/>
-              <a:t>Write tests to replicate a bug and run test before you fix the bug.</a:t>
-            </a:r>
-          </a:p>
-          <a:p>
-            <a:pPr lvl="1"/>
-            <a:r>
-              <a:rPr lang="en-US" sz="2400" dirty="0"/>
-              <a:t>Run all tests before you release or commit code.</a:t>
-            </a:r>
-          </a:p>
-          <a:p>
-            <a:pPr lvl="1"/>
-            <a:endParaRPr lang="en-US" sz="2400" dirty="0"/>
-          </a:p>
-          <a:p>
-            <a:pPr marL="0" indent="0">
-              <a:buNone/>
-            </a:pPr>
-            <a:r>
-              <a:rPr lang="en-US" sz="2800" dirty="0"/>
-              <a:t>Continuous Integration</a:t>
-            </a:r>
-          </a:p>
-          <a:p>
-            <a:pPr lvl="1"/>
-            <a:r>
-              <a:rPr lang="en-US" sz="2400" dirty="0"/>
-              <a:t>Jenkins, GitHub Actions, Circle CI, ….</a:t>
-            </a:r>
-          </a:p>
-          <a:p>
-            <a:pPr lvl="1"/>
-            <a:r>
-              <a:rPr lang="en-US" sz="2400" dirty="0"/>
-              <a:t>Tools to automate the build and release of your project.</a:t>
-            </a:r>
-          </a:p>
-          <a:p>
-            <a:pPr lvl="1"/>
-            <a:r>
-              <a:rPr lang="en-US" sz="2400" dirty="0"/>
-              <a:t>Can run your unit tests to validate before a release.</a:t>
-            </a:r>
-          </a:p>
-        </p:txBody>
-      </p:sp>
-    </p:spTree>
-    <p:extLst>
-      <p:ext uri="{BB962C8B-B14F-4D97-AF65-F5344CB8AC3E}">
-        <p14:creationId xmlns:p14="http://schemas.microsoft.com/office/powerpoint/2010/main" val="466547344"/>
-      </p:ext>
-    </p:extLst>
-  </p:cSld>
-  <p:clrMapOvr>
-    <a:masterClrMapping/>
-  </p:clrMapOvr>
-</p:sld>
-</file>
-
 <file path=ppt/slides/slide2.xml><?xml version="1.0" encoding="utf-8"?>
 <p:sld xmlns:a="http://schemas.openxmlformats.org/drawingml/2006/main" xmlns:r="http://schemas.openxmlformats.org/officeDocument/2006/relationships" xmlns:p="http://schemas.openxmlformats.org/presentationml/2006/main">
   <p:cSld>
@@ -12829,6 +13218,157 @@
           <p:cNvPr id="2" name="Title 1">
             <a:extLst>
               <a:ext uri="{FF2B5EF4-FFF2-40B4-BE49-F238E27FC236}">
+                <a16:creationId xmlns:a16="http://schemas.microsoft.com/office/drawing/2014/main" id="{0584A545-6FA8-C91A-FCC4-AAB0B775D43F}"/>
+              </a:ext>
+            </a:extLst>
+          </p:cNvPr>
+          <p:cNvSpPr>
+            <a:spLocks noGrp="1"/>
+          </p:cNvSpPr>
+          <p:nvPr>
+            <p:ph type="title"/>
+          </p:nvPr>
+        </p:nvSpPr>
+        <p:spPr/>
+        <p:txBody>
+          <a:bodyPr/>
+          <a:lstStyle/>
+          <a:p>
+            <a:r>
+              <a:rPr lang="en-US" dirty="0"/>
+              <a:t>Continuous Integration</a:t>
+            </a:r>
+          </a:p>
+        </p:txBody>
+      </p:sp>
+      <p:sp>
+        <p:nvSpPr>
+          <p:cNvPr id="3" name="Content Placeholder 2">
+            <a:extLst>
+              <a:ext uri="{FF2B5EF4-FFF2-40B4-BE49-F238E27FC236}">
+                <a16:creationId xmlns:a16="http://schemas.microsoft.com/office/drawing/2014/main" id="{8D645834-C049-7179-9280-BB2B0F2430CC}"/>
+              </a:ext>
+            </a:extLst>
+          </p:cNvPr>
+          <p:cNvSpPr>
+            <a:spLocks noGrp="1"/>
+          </p:cNvSpPr>
+          <p:nvPr>
+            <p:ph idx="1"/>
+          </p:nvPr>
+        </p:nvSpPr>
+        <p:spPr>
+          <a:xfrm>
+            <a:off x="680321" y="2336873"/>
+            <a:ext cx="10115498" cy="3599316"/>
+          </a:xfrm>
+        </p:spPr>
+        <p:txBody>
+          <a:bodyPr>
+            <a:normAutofit lnSpcReduction="10000"/>
+          </a:bodyPr>
+          <a:lstStyle/>
+          <a:p>
+            <a:pPr marL="0" indent="0">
+              <a:buNone/>
+            </a:pPr>
+            <a:r>
+              <a:rPr lang="en-US" dirty="0"/>
+              <a:t>When to run tests?</a:t>
+            </a:r>
+          </a:p>
+          <a:p>
+            <a:pPr lvl="1"/>
+            <a:r>
+              <a:rPr lang="en-US" sz="2400" dirty="0"/>
+              <a:t>Manually run tests after you make changes.</a:t>
+            </a:r>
+          </a:p>
+          <a:p>
+            <a:pPr lvl="1"/>
+            <a:r>
+              <a:rPr lang="en-US" sz="2400" dirty="0"/>
+              <a:t>Write tests to replicate a bug and run test before you fix the bug.</a:t>
+            </a:r>
+          </a:p>
+          <a:p>
+            <a:pPr lvl="1"/>
+            <a:r>
+              <a:rPr lang="en-US" sz="2400" dirty="0"/>
+              <a:t>Run all tests before you release or commit code.</a:t>
+            </a:r>
+          </a:p>
+          <a:p>
+            <a:pPr lvl="1"/>
+            <a:endParaRPr lang="en-US" sz="2400" dirty="0"/>
+          </a:p>
+          <a:p>
+            <a:pPr marL="0" indent="0">
+              <a:buNone/>
+            </a:pPr>
+            <a:r>
+              <a:rPr lang="en-US" sz="2800" dirty="0"/>
+              <a:t>Continuous Integration</a:t>
+            </a:r>
+          </a:p>
+          <a:p>
+            <a:pPr lvl="1"/>
+            <a:r>
+              <a:rPr lang="en-US" sz="2400" dirty="0"/>
+              <a:t>Jenkins, GitHub Actions, Circle CI, ….</a:t>
+            </a:r>
+          </a:p>
+          <a:p>
+            <a:pPr lvl="1"/>
+            <a:r>
+              <a:rPr lang="en-US" sz="2400" dirty="0"/>
+              <a:t>Tools to automate the build and release of your project.</a:t>
+            </a:r>
+          </a:p>
+          <a:p>
+            <a:pPr lvl="1"/>
+            <a:r>
+              <a:rPr lang="en-US" sz="2400" dirty="0"/>
+              <a:t>Can run your unit tests to validate before a release.</a:t>
+            </a:r>
+          </a:p>
+        </p:txBody>
+      </p:sp>
+    </p:spTree>
+    <p:extLst>
+      <p:ext uri="{BB962C8B-B14F-4D97-AF65-F5344CB8AC3E}">
+        <p14:creationId xmlns:p14="http://schemas.microsoft.com/office/powerpoint/2010/main" val="466547344"/>
+      </p:ext>
+    </p:extLst>
+  </p:cSld>
+  <p:clrMapOvr>
+    <a:masterClrMapping/>
+  </p:clrMapOvr>
+</p:sld>
+</file>
+
+<file path=ppt/slides/slide21.xml><?xml version="1.0" encoding="utf-8"?>
+<p:sld xmlns:a="http://schemas.openxmlformats.org/drawingml/2006/main" xmlns:r="http://schemas.openxmlformats.org/officeDocument/2006/relationships" xmlns:p="http://schemas.openxmlformats.org/presentationml/2006/main">
+  <p:cSld>
+    <p:spTree>
+      <p:nvGrpSpPr>
+        <p:cNvPr id="1" name=""/>
+        <p:cNvGrpSpPr/>
+        <p:nvPr/>
+      </p:nvGrpSpPr>
+      <p:grpSpPr>
+        <a:xfrm>
+          <a:off x="0" y="0"/>
+          <a:ext cx="0" cy="0"/>
+          <a:chOff x="0" y="0"/>
+          <a:chExt cx="0" cy="0"/>
+        </a:xfrm>
+      </p:grpSpPr>
+      <p:sp>
+        <p:nvSpPr>
+          <p:cNvPr id="2" name="Title 1">
+            <a:extLst>
+              <a:ext uri="{FF2B5EF4-FFF2-40B4-BE49-F238E27FC236}">
                 <a16:creationId xmlns:a16="http://schemas.microsoft.com/office/drawing/2014/main" id="{7174E1C3-D64C-7DF6-AC08-417C3A2F99A2}"/>
               </a:ext>
             </a:extLst>
@@ -12875,7 +13415,9 @@
           </a:xfrm>
         </p:spPr>
         <p:txBody>
-          <a:bodyPr/>
+          <a:bodyPr>
+            <a:normAutofit/>
+          </a:bodyPr>
           <a:lstStyle/>
           <a:p>
             <a:pPr marL="0" indent="0">
@@ -12923,15 +13465,18 @@
             <a:pPr marL="0" indent="0">
               <a:buNone/>
             </a:pPr>
-            <a:endParaRPr lang="en-US" dirty="0"/>
-          </a:p>
-          <a:p>
-            <a:pPr marL="0" indent="0">
-              <a:buNone/>
-            </a:pPr>
             <a:r>
               <a:rPr lang="en-US" dirty="0"/>
               <a:t>FILL OUT EVALUTION FORMS. Put in BOX before you leave!</a:t>
+            </a:r>
+          </a:p>
+          <a:p>
+            <a:pPr marL="0" indent="0">
+              <a:buNone/>
+            </a:pPr>
+            <a:r>
+              <a:rPr lang="en-US" dirty="0"/>
+              <a:t>Reminder: The next talk on “Quality Assistance Tooling” in this room right after and is related and useful too.</a:t>
             </a:r>
           </a:p>
           <a:p>
@@ -13024,7 +13569,7 @@
         </p:spPr>
         <p:txBody>
           <a:bodyPr>
-            <a:normAutofit/>
+            <a:normAutofit lnSpcReduction="10000"/>
           </a:bodyPr>
           <a:lstStyle/>
           <a:p>
@@ -13084,16 +13629,16 @@
             <a:pPr marL="0" indent="0">
               <a:buNone/>
             </a:pPr>
-            <a:endParaRPr lang="en-US" sz="2800" dirty="0"/>
+            <a:r>
+              <a:rPr lang="en-US" sz="2800" dirty="0"/>
+              <a:t>Slides in Root Folder *.pptx, examples in */examples</a:t>
+            </a:r>
           </a:p>
           <a:p>
             <a:pPr marL="0" indent="0">
               <a:buNone/>
             </a:pPr>
-            <a:r>
-              <a:rPr lang="en-US" sz="2800" dirty="0"/>
-              <a:t>Slides in Root Folder *.pptx</a:t>
-            </a:r>
+            <a:endParaRPr lang="en-US" dirty="0"/>
           </a:p>
           <a:p>
             <a:pPr marL="0" indent="0">
@@ -13101,8 +13646,30 @@
             </a:pPr>
             <a:r>
               <a:rPr lang="en-US" dirty="0"/>
-              <a:t>Examples are in */examples</a:t>
-            </a:r>
+              <a:t>On Adroit execute:</a:t>
+            </a:r>
+          </a:p>
+          <a:p>
+            <a:pPr marL="0" indent="0">
+              <a:buNone/>
+            </a:pPr>
+            <a:r>
+              <a:rPr lang="en-US" dirty="0"/>
+              <a:t>	</a:t>
+            </a:r>
+            <a:r>
+              <a:rPr lang="en-US" b="0" dirty="0">
+                <a:effectLst/>
+                <a:latin typeface="Menlo" panose="020B0609030804020204" pitchFamily="49" charset="0"/>
+              </a:rPr>
+              <a:t>module load anaconda3/2022.5</a:t>
+            </a:r>
+          </a:p>
+          <a:p>
+            <a:pPr marL="0" indent="0">
+              <a:buNone/>
+            </a:pPr>
+            <a:endParaRPr lang="en-US" dirty="0"/>
           </a:p>
         </p:txBody>
       </p:sp>
@@ -15210,7 +15777,7 @@
           <p:cNvPr id="2" name="Title 1">
             <a:extLst>
               <a:ext uri="{FF2B5EF4-FFF2-40B4-BE49-F238E27FC236}">
-                <a16:creationId xmlns:a16="http://schemas.microsoft.com/office/drawing/2014/main" id="{1ACE1201-6411-2BA2-AB2D-E793E1C25471}"/>
+                <a16:creationId xmlns:a16="http://schemas.microsoft.com/office/drawing/2014/main" id="{BC9FF478-6F99-D45F-AB47-B407C21C95E4}"/>
               </a:ext>
             </a:extLst>
           </p:cNvPr>
@@ -15228,7 +15795,7 @@
           <a:p>
             <a:r>
               <a:rPr lang="en-US" dirty="0"/>
-              <a:t>02 Unit Test Exceptions</a:t>
+              <a:t>Executing Unit test</a:t>
             </a:r>
           </a:p>
         </p:txBody>
@@ -15238,7 +15805,7 @@
           <p:cNvPr id="3" name="Content Placeholder 2">
             <a:extLst>
               <a:ext uri="{FF2B5EF4-FFF2-40B4-BE49-F238E27FC236}">
-                <a16:creationId xmlns:a16="http://schemas.microsoft.com/office/drawing/2014/main" id="{238D253A-E33A-9D73-3284-881AD85B8BDE}"/>
+                <a16:creationId xmlns:a16="http://schemas.microsoft.com/office/drawing/2014/main" id="{ACA4E9D1-F822-1238-D8B5-01D1A36167DF}"/>
               </a:ext>
             </a:extLst>
           </p:cNvPr>
@@ -15251,12 +15818,14 @@
         </p:nvSpPr>
         <p:spPr>
           <a:xfrm>
-            <a:off x="680321" y="2336873"/>
-            <a:ext cx="10387201" cy="932800"/>
+            <a:off x="680321" y="2050472"/>
+            <a:ext cx="9613861" cy="4655127"/>
           </a:xfrm>
         </p:spPr>
         <p:txBody>
-          <a:bodyPr/>
+          <a:bodyPr>
+            <a:normAutofit/>
+          </a:bodyPr>
           <a:lstStyle/>
           <a:p>
             <a:pPr marL="0" indent="0">
@@ -15264,8 +15833,66 @@
             </a:pPr>
             <a:r>
               <a:rPr lang="en-US" dirty="0"/>
-              <a:t>It is useful to test for error conditions in addition to success conditions</a:t>
-            </a:r>
+              <a:t>There are several ways to execute a unit test:</a:t>
+            </a:r>
+          </a:p>
+          <a:p>
+            <a:pPr marL="0" indent="0">
+              <a:buNone/>
+            </a:pPr>
+            <a:r>
+              <a:rPr lang="en-US" dirty="0"/>
+              <a:t>	$ python –m </a:t>
+            </a:r>
+            <a:r>
+              <a:rPr lang="en-US" dirty="0" err="1"/>
+              <a:t>unittest</a:t>
+            </a:r>
+            <a:r>
+              <a:rPr lang="en-US" dirty="0"/>
+              <a:t> </a:t>
+            </a:r>
+            <a:r>
+              <a:rPr lang="en-US" dirty="0" err="1"/>
+              <a:t>test_circle_area.py</a:t>
+            </a:r>
+            <a:endParaRPr lang="en-US" dirty="0"/>
+          </a:p>
+          <a:p>
+            <a:pPr marL="0" indent="0">
+              <a:buNone/>
+            </a:pPr>
+            <a:r>
+              <a:rPr lang="en-US" dirty="0"/>
+              <a:t>	$ python </a:t>
+            </a:r>
+            <a:r>
+              <a:rPr lang="en-US" dirty="0" err="1"/>
+              <a:t>test_circle_area.py</a:t>
+            </a:r>
+            <a:endParaRPr lang="en-US" dirty="0"/>
+          </a:p>
+          <a:p>
+            <a:pPr marL="0" indent="0">
+              <a:buNone/>
+            </a:pPr>
+            <a:r>
+              <a:rPr lang="en-US" dirty="0"/>
+              <a:t>	$ </a:t>
+            </a:r>
+            <a:r>
+              <a:rPr lang="en-US" dirty="0" err="1"/>
+              <a:t>pytest</a:t>
+            </a:r>
+            <a:r>
+              <a:rPr lang="en-US" dirty="0"/>
+              <a:t> </a:t>
+            </a:r>
+            <a:r>
+              <a:rPr lang="en-US" dirty="0" err="1"/>
+              <a:t>test_circle_area.py</a:t>
+            </a:r>
+            <a:endParaRPr lang="en-US" dirty="0"/>
           </a:p>
           <a:p>
             <a:pPr marL="0" indent="0">
@@ -15273,457 +15900,55 @@
             </a:pPr>
             <a:endParaRPr lang="en-US" dirty="0"/>
           </a:p>
-        </p:txBody>
-      </p:sp>
-      <p:sp>
-        <p:nvSpPr>
-          <p:cNvPr id="5" name="TextBox 4">
-            <a:extLst>
-              <a:ext uri="{FF2B5EF4-FFF2-40B4-BE49-F238E27FC236}">
-                <a16:creationId xmlns:a16="http://schemas.microsoft.com/office/drawing/2014/main" id="{B2B2361F-E3EF-E13E-A690-55F5A4469189}"/>
-              </a:ext>
-            </a:extLst>
-          </p:cNvPr>
-          <p:cNvSpPr txBox="1"/>
-          <p:nvPr/>
-        </p:nvSpPr>
-        <p:spPr>
-          <a:xfrm>
-            <a:off x="1453661" y="3427116"/>
-            <a:ext cx="9613861" cy="2677656"/>
-          </a:xfrm>
-          <a:prstGeom prst="rect">
-            <a:avLst/>
-          </a:prstGeom>
-          <a:noFill/>
-        </p:spPr>
-        <p:txBody>
-          <a:bodyPr wrap="square" rtlCol="0">
-            <a:spAutoFit/>
-          </a:bodyPr>
-          <a:lstStyle/>
           <a:p>
             <a:pPr marL="0" indent="0">
               <a:buNone/>
             </a:pPr>
             <a:r>
-              <a:rPr lang="en-US" sz="2400" dirty="0">
-                <a:latin typeface="Courier" pitchFamily="2" charset="0"/>
-              </a:rPr>
-              <a:t>import </a:t>
-            </a:r>
-            <a:r>
-              <a:rPr lang="en-US" sz="2400" dirty="0" err="1">
-                <a:latin typeface="Courier" pitchFamily="2" charset="0"/>
-              </a:rPr>
+              <a:rPr lang="en-US" dirty="0"/>
+              <a:t>You can run a test suite with:</a:t>
+            </a:r>
+          </a:p>
+          <a:p>
+            <a:pPr marL="0" indent="0">
+              <a:buNone/>
+            </a:pPr>
+            <a:r>
+              <a:rPr lang="en-US" dirty="0"/>
+              <a:t>	$ python –m </a:t>
+            </a:r>
+            <a:r>
+              <a:rPr lang="en-US" dirty="0" err="1"/>
               <a:t>unittest</a:t>
             </a:r>
-            <a:endParaRPr lang="en-US" sz="2400" dirty="0">
-              <a:latin typeface="Courier" pitchFamily="2" charset="0"/>
-            </a:endParaRPr>
+            <a:endParaRPr lang="en-US" dirty="0"/>
           </a:p>
           <a:p>
             <a:pPr marL="0" indent="0">
               <a:buNone/>
             </a:pPr>
             <a:r>
-              <a:rPr lang="en-US" sz="2400" dirty="0">
-                <a:latin typeface="Courier" pitchFamily="2" charset="0"/>
-              </a:rPr>
-              <a:t>from </a:t>
-            </a:r>
-            <a:r>
-              <a:rPr lang="en-US" sz="2400" dirty="0" err="1">
-                <a:latin typeface="Courier" pitchFamily="2" charset="0"/>
-              </a:rPr>
-              <a:t>bmi</a:t>
-            </a:r>
-            <a:r>
-              <a:rPr lang="en-US" sz="2400" dirty="0">
-                <a:latin typeface="Courier" pitchFamily="2" charset="0"/>
-              </a:rPr>
-              <a:t> import </a:t>
-            </a:r>
-            <a:r>
-              <a:rPr lang="en-US" sz="2400" dirty="0" err="1">
-                <a:latin typeface="Courier" pitchFamily="2" charset="0"/>
-              </a:rPr>
-              <a:t>bmi</a:t>
-            </a:r>
-            <a:endParaRPr lang="en-US" sz="2400" dirty="0">
-              <a:latin typeface="Courier" pitchFamily="2" charset="0"/>
-            </a:endParaRPr>
-          </a:p>
-          <a:p>
-            <a:pPr marL="0" indent="0">
-              <a:buNone/>
-            </a:pPr>
-            <a:endParaRPr lang="en-US" sz="2400" dirty="0">
-              <a:latin typeface="Courier" pitchFamily="2" charset="0"/>
-            </a:endParaRPr>
-          </a:p>
-          <a:p>
-            <a:pPr marL="0" indent="0">
-              <a:buNone/>
-            </a:pPr>
-            <a:r>
-              <a:rPr lang="en-US" sz="2400" dirty="0">
-                <a:latin typeface="Courier" pitchFamily="2" charset="0"/>
-              </a:rPr>
-              <a:t>class </a:t>
-            </a:r>
-            <a:r>
-              <a:rPr lang="en-US" sz="2400" dirty="0" err="1">
-                <a:latin typeface="Courier" pitchFamily="2" charset="0"/>
-              </a:rPr>
-              <a:t>MyTest</a:t>
-            </a:r>
-            <a:r>
-              <a:rPr lang="en-US" sz="2400" dirty="0">
-                <a:latin typeface="Courier" pitchFamily="2" charset="0"/>
-              </a:rPr>
-              <a:t>(</a:t>
-            </a:r>
-            <a:r>
-              <a:rPr lang="en-US" sz="2400" dirty="0" err="1">
-                <a:latin typeface="Courier" pitchFamily="2" charset="0"/>
-              </a:rPr>
-              <a:t>unittest.TestCase</a:t>
-            </a:r>
-            <a:r>
-              <a:rPr lang="en-US" sz="2400" dirty="0">
-                <a:latin typeface="Courier" pitchFamily="2" charset="0"/>
-              </a:rPr>
-              <a:t>):</a:t>
-            </a:r>
-          </a:p>
-          <a:p>
-            <a:pPr marL="0" indent="0">
-              <a:buNone/>
-            </a:pPr>
-            <a:r>
-              <a:rPr lang="en-US" sz="2400" dirty="0">
-                <a:latin typeface="Courier" pitchFamily="2" charset="0"/>
-              </a:rPr>
-              <a:t>	def </a:t>
-            </a:r>
-            <a:r>
-              <a:rPr lang="en-US" sz="2400" dirty="0" err="1">
-                <a:latin typeface="Courier" pitchFamily="2" charset="0"/>
-              </a:rPr>
-              <a:t>test_values</a:t>
-            </a:r>
-            <a:r>
-              <a:rPr lang="en-US" sz="2400" dirty="0">
-                <a:latin typeface="Courier" pitchFamily="2" charset="0"/>
-              </a:rPr>
-              <a:t>(self):</a:t>
-            </a:r>
-          </a:p>
-          <a:p>
-            <a:pPr marL="0" indent="0">
-              <a:buNone/>
-            </a:pPr>
-            <a:r>
-              <a:rPr lang="en-US" sz="2400" dirty="0">
-                <a:latin typeface="Courier" pitchFamily="2" charset="0"/>
-              </a:rPr>
-              <a:t>		with </a:t>
-            </a:r>
-            <a:r>
-              <a:rPr lang="en-US" sz="2400" dirty="0" err="1">
-                <a:latin typeface="Courier" pitchFamily="2" charset="0"/>
-              </a:rPr>
-              <a:t>self.assertRaises</a:t>
-            </a:r>
-            <a:r>
-              <a:rPr lang="en-US" sz="2400" dirty="0">
-                <a:latin typeface="Courier" pitchFamily="2" charset="0"/>
-              </a:rPr>
-              <a:t>(</a:t>
-            </a:r>
-            <a:r>
-              <a:rPr lang="en-US" sz="2400" dirty="0" err="1">
-                <a:latin typeface="Courier" pitchFamily="2" charset="0"/>
-              </a:rPr>
-              <a:t>ValueError</a:t>
-            </a:r>
-            <a:r>
-              <a:rPr lang="en-US" sz="2400" dirty="0">
-                <a:latin typeface="Courier" pitchFamily="2" charset="0"/>
-              </a:rPr>
-              <a:t>):</a:t>
-            </a:r>
-          </a:p>
-          <a:p>
-            <a:pPr marL="0" indent="0">
-              <a:buNone/>
-            </a:pPr>
-            <a:r>
-              <a:rPr lang="en-US" sz="2400" dirty="0">
-                <a:latin typeface="Courier" pitchFamily="2" charset="0"/>
-              </a:rPr>
-              <a:t>			</a:t>
-            </a:r>
-            <a:r>
-              <a:rPr lang="en-US" sz="2400" dirty="0" err="1">
-                <a:latin typeface="Courier" pitchFamily="2" charset="0"/>
-              </a:rPr>
-              <a:t>bmi</a:t>
-            </a:r>
-            <a:r>
-              <a:rPr lang="en-US" sz="2400" dirty="0">
-                <a:latin typeface="Courier" pitchFamily="2" charset="0"/>
-              </a:rPr>
-              <a:t>(-1, 3)</a:t>
-            </a:r>
+              <a:rPr lang="en-US" dirty="0"/>
+              <a:t>	$ </a:t>
+            </a:r>
+            <a:r>
+              <a:rPr lang="en-US" dirty="0" err="1"/>
+              <a:t>pytest</a:t>
+            </a:r>
+            <a:endParaRPr lang="en-US" dirty="0"/>
           </a:p>
         </p:txBody>
       </p:sp>
     </p:spTree>
     <p:extLst>
       <p:ext uri="{BB962C8B-B14F-4D97-AF65-F5344CB8AC3E}">
-        <p14:creationId xmlns:p14="http://schemas.microsoft.com/office/powerpoint/2010/main" val="4112208798"/>
+        <p14:creationId xmlns:p14="http://schemas.microsoft.com/office/powerpoint/2010/main" val="3229755496"/>
       </p:ext>
     </p:extLst>
   </p:cSld>
   <p:clrMapOvr>
     <a:masterClrMapping/>
   </p:clrMapOvr>
-  <p:timing>
-    <p:tnLst>
-      <p:par>
-        <p:cTn id="1" dur="indefinite" restart="never" nodeType="tmRoot">
-          <p:childTnLst>
-            <p:seq concurrent="1" nextAc="seek">
-              <p:cTn id="2" dur="indefinite" nodeType="mainSeq">
-                <p:childTnLst>
-                  <p:par>
-                    <p:cTn id="3" fill="hold">
-                      <p:stCondLst>
-                        <p:cond delay="indefinite"/>
-                      </p:stCondLst>
-                      <p:childTnLst>
-                        <p:par>
-                          <p:cTn id="4" fill="hold">
-                            <p:stCondLst>
-                              <p:cond delay="0"/>
-                            </p:stCondLst>
-                            <p:childTnLst>
-                              <p:par>
-                                <p:cTn id="5" presetID="1" presetClass="entr" presetSubtype="0" fill="hold" nodeType="clickEffect">
-                                  <p:stCondLst>
-                                    <p:cond delay="0"/>
-                                  </p:stCondLst>
-                                  <p:childTnLst>
-                                    <p:set>
-                                      <p:cBhvr>
-                                        <p:cTn id="6" dur="1" fill="hold">
-                                          <p:stCondLst>
-                                            <p:cond delay="0"/>
-                                          </p:stCondLst>
-                                        </p:cTn>
-                                        <p:tgtEl>
-                                          <p:spTgt spid="5">
-                                            <p:txEl>
-                                              <p:pRg st="0" end="0"/>
-                                            </p:txEl>
-                                          </p:spTgt>
-                                        </p:tgtEl>
-                                        <p:attrNameLst>
-                                          <p:attrName>style.visibility</p:attrName>
-                                        </p:attrNameLst>
-                                      </p:cBhvr>
-                                      <p:to>
-                                        <p:strVal val="visible"/>
-                                      </p:to>
-                                    </p:set>
-                                  </p:childTnLst>
-                                </p:cTn>
-                              </p:par>
-                              <p:par>
-                                <p:cTn id="7" presetID="1" presetClass="entr" presetSubtype="0" fill="hold" nodeType="withEffect">
-                                  <p:stCondLst>
-                                    <p:cond delay="0"/>
-                                  </p:stCondLst>
-                                  <p:childTnLst>
-                                    <p:set>
-                                      <p:cBhvr>
-                                        <p:cTn id="8" dur="1" fill="hold">
-                                          <p:stCondLst>
-                                            <p:cond delay="0"/>
-                                          </p:stCondLst>
-                                        </p:cTn>
-                                        <p:tgtEl>
-                                          <p:spTgt spid="5">
-                                            <p:txEl>
-                                              <p:pRg st="1" end="1"/>
-                                            </p:txEl>
-                                          </p:spTgt>
-                                        </p:tgtEl>
-                                        <p:attrNameLst>
-                                          <p:attrName>style.visibility</p:attrName>
-                                        </p:attrNameLst>
-                                      </p:cBhvr>
-                                      <p:to>
-                                        <p:strVal val="visible"/>
-                                      </p:to>
-                                    </p:set>
-                                  </p:childTnLst>
-                                </p:cTn>
-                              </p:par>
-                              <p:par>
-                                <p:cTn id="9" presetID="1" presetClass="entr" presetSubtype="0" fill="hold" nodeType="withEffect">
-                                  <p:stCondLst>
-                                    <p:cond delay="0"/>
-                                  </p:stCondLst>
-                                  <p:childTnLst>
-                                    <p:set>
-                                      <p:cBhvr>
-                                        <p:cTn id="10" dur="1" fill="hold">
-                                          <p:stCondLst>
-                                            <p:cond delay="0"/>
-                                          </p:stCondLst>
-                                        </p:cTn>
-                                        <p:tgtEl>
-                                          <p:spTgt spid="5">
-                                            <p:txEl>
-                                              <p:pRg st="3" end="3"/>
-                                            </p:txEl>
-                                          </p:spTgt>
-                                        </p:tgtEl>
-                                        <p:attrNameLst>
-                                          <p:attrName>style.visibility</p:attrName>
-                                        </p:attrNameLst>
-                                      </p:cBhvr>
-                                      <p:to>
-                                        <p:strVal val="visible"/>
-                                      </p:to>
-                                    </p:set>
-                                  </p:childTnLst>
-                                </p:cTn>
-                              </p:par>
-                              <p:par>
-                                <p:cTn id="11" presetID="1" presetClass="entr" presetSubtype="0" fill="hold" nodeType="withEffect">
-                                  <p:stCondLst>
-                                    <p:cond delay="0"/>
-                                  </p:stCondLst>
-                                  <p:childTnLst>
-                                    <p:set>
-                                      <p:cBhvr>
-                                        <p:cTn id="12" dur="1" fill="hold">
-                                          <p:stCondLst>
-                                            <p:cond delay="0"/>
-                                          </p:stCondLst>
-                                        </p:cTn>
-                                        <p:tgtEl>
-                                          <p:spTgt spid="5">
-                                            <p:txEl>
-                                              <p:pRg st="4" end="4"/>
-                                            </p:txEl>
-                                          </p:spTgt>
-                                        </p:tgtEl>
-                                        <p:attrNameLst>
-                                          <p:attrName>style.visibility</p:attrName>
-                                        </p:attrNameLst>
-                                      </p:cBhvr>
-                                      <p:to>
-                                        <p:strVal val="visible"/>
-                                      </p:to>
-                                    </p:set>
-                                  </p:childTnLst>
-                                </p:cTn>
-                              </p:par>
-                              <p:par>
-                                <p:cTn id="13" presetID="1" presetClass="entr" presetSubtype="0" fill="hold" nodeType="withEffect">
-                                  <p:stCondLst>
-                                    <p:cond delay="0"/>
-                                  </p:stCondLst>
-                                  <p:childTnLst>
-                                    <p:set>
-                                      <p:cBhvr>
-                                        <p:cTn id="14" dur="1" fill="hold">
-                                          <p:stCondLst>
-                                            <p:cond delay="0"/>
-                                          </p:stCondLst>
-                                        </p:cTn>
-                                        <p:tgtEl>
-                                          <p:spTgt spid="5">
-                                            <p:txEl>
-                                              <p:pRg st="5" end="5"/>
-                                            </p:txEl>
-                                          </p:spTgt>
-                                        </p:tgtEl>
-                                        <p:attrNameLst>
-                                          <p:attrName>style.visibility</p:attrName>
-                                        </p:attrNameLst>
-                                      </p:cBhvr>
-                                      <p:to>
-                                        <p:strVal val="visible"/>
-                                      </p:to>
-                                    </p:set>
-                                  </p:childTnLst>
-                                </p:cTn>
-                              </p:par>
-                              <p:par>
-                                <p:cTn id="15" presetID="1" presetClass="entr" presetSubtype="0" fill="hold" nodeType="withEffect">
-                                  <p:stCondLst>
-                                    <p:cond delay="0"/>
-                                  </p:stCondLst>
-                                  <p:childTnLst>
-                                    <p:set>
-                                      <p:cBhvr>
-                                        <p:cTn id="16" dur="1" fill="hold">
-                                          <p:stCondLst>
-                                            <p:cond delay="0"/>
-                                          </p:stCondLst>
-                                        </p:cTn>
-                                        <p:tgtEl>
-                                          <p:spTgt spid="5">
-                                            <p:txEl>
-                                              <p:pRg st="6" end="6"/>
-                                            </p:txEl>
-                                          </p:spTgt>
-                                        </p:tgtEl>
-                                        <p:attrNameLst>
-                                          <p:attrName>style.visibility</p:attrName>
-                                        </p:attrNameLst>
-                                      </p:cBhvr>
-                                      <p:to>
-                                        <p:strVal val="visible"/>
-                                      </p:to>
-                                    </p:set>
-                                  </p:childTnLst>
-                                </p:cTn>
-                              </p:par>
-                            </p:childTnLst>
-                          </p:cTn>
-                        </p:par>
-                      </p:childTnLst>
-                    </p:cTn>
-                  </p:par>
-                </p:childTnLst>
-              </p:cTn>
-              <p:prevCondLst>
-                <p:cond evt="onPrev" delay="0">
-                  <p:tgtEl>
-                    <p:sldTgt/>
-                  </p:tgtEl>
-                </p:cond>
-              </p:prevCondLst>
-              <p:nextCondLst>
-                <p:cond evt="onNext" delay="0">
-                  <p:tgtEl>
-                    <p:sldTgt/>
-                  </p:tgtEl>
-                </p:cond>
-              </p:nextCondLst>
-            </p:seq>
-          </p:childTnLst>
-        </p:cTn>
-      </p:par>
-    </p:tnLst>
-  </p:timing>
 </p:sld>
 </file>
 

</xml_diff>

<commit_message>
add module load to slide
</commit_message>
<xml_diff>
--- a/UnitTestingSlides.pptx
+++ b/UnitTestingSlides.pptx
@@ -13563,8 +13563,8 @@
         </p:nvSpPr>
         <p:spPr>
           <a:xfrm>
-            <a:off x="235527" y="2336873"/>
-            <a:ext cx="11734800" cy="4285600"/>
+            <a:off x="235527" y="2092036"/>
+            <a:ext cx="11734800" cy="4765963"/>
           </a:xfrm>
         </p:spPr>
         <p:txBody>
@@ -13573,8 +13573,11 @@
           </a:bodyPr>
           <a:lstStyle/>
           <a:p>
-            <a:r>
-              <a:rPr lang="en-US" sz="2800" dirty="0"/>
+            <a:pPr marL="0" indent="0">
+              <a:buNone/>
+            </a:pPr>
+            <a:r>
+              <a:rPr lang="en-US" dirty="0"/>
               <a:t>Clone Public Repo</a:t>
             </a:r>
           </a:p>
@@ -13583,23 +13586,23 @@
               <a:buNone/>
             </a:pPr>
             <a:r>
-              <a:rPr lang="en-US" sz="2800" dirty="0"/>
+              <a:rPr lang="en-US" dirty="0"/>
               <a:t>  git clone </a:t>
             </a:r>
             <a:r>
-              <a:rPr lang="en-US" sz="2800" dirty="0">
+              <a:rPr lang="en-US" dirty="0">
                 <a:hlinkClick r:id="rId2"/>
               </a:rPr>
               <a:t>https://github.com/PrincetonUniversity/software_testing.git</a:t>
             </a:r>
-            <a:endParaRPr lang="en-US" sz="2800" dirty="0"/>
+            <a:endParaRPr lang="en-US" dirty="0"/>
           </a:p>
           <a:p>
             <a:pPr marL="0" indent="0">
               <a:buNone/>
             </a:pPr>
             <a:r>
-              <a:rPr lang="en-US" sz="2800" dirty="0"/>
+              <a:rPr lang="en-US" dirty="0"/>
               <a:t>OR SSH</a:t>
             </a:r>
           </a:p>
@@ -13608,31 +13611,16 @@
               <a:buNone/>
             </a:pPr>
             <a:r>
-              <a:rPr lang="en-US" sz="2800" dirty="0"/>
+              <a:rPr lang="en-US" dirty="0"/>
               <a:t>  git clone	</a:t>
             </a:r>
             <a:r>
-              <a:rPr lang="en-US" sz="2800" dirty="0">
+              <a:rPr lang="en-US" dirty="0">
                 <a:hlinkClick r:id="rId3"/>
               </a:rPr>
               <a:t>git@github.com:PrincetonUniversity/software_testing.git</a:t>
             </a:r>
-            <a:endParaRPr lang="en-US" sz="2800" dirty="0"/>
-          </a:p>
-          <a:p>
-            <a:pPr marL="0" indent="0">
-              <a:buNone/>
-            </a:pPr>
-            <a:endParaRPr lang="en-US" sz="2800" dirty="0"/>
-          </a:p>
-          <a:p>
-            <a:pPr marL="0" indent="0">
-              <a:buNone/>
-            </a:pPr>
-            <a:r>
-              <a:rPr lang="en-US" sz="2800" dirty="0"/>
-              <a:t>Slides in Root Folder *.pptx, examples in */examples</a:t>
-            </a:r>
+            <a:endParaRPr lang="en-US" dirty="0"/>
           </a:p>
           <a:p>
             <a:pPr marL="0" indent="0">
@@ -13644,6 +13632,18 @@
             <a:pPr marL="0" indent="0">
               <a:buNone/>
             </a:pPr>
+            <a:r>
+              <a:rPr lang="en-US" sz="2800" dirty="0"/>
+              <a:t>Slides in Root Folder *.pptx</a:t>
+            </a:r>
+          </a:p>
+          <a:p>
+            <a:pPr marL="0" indent="0">
+              <a:buNone/>
+            </a:pPr>
+            <a:br>
+              <a:rPr lang="en-US" dirty="0"/>
+            </a:br>
             <a:r>
               <a:rPr lang="en-US" dirty="0"/>
               <a:t>On Adroit execute:</a:t>
@@ -13664,6 +13664,66 @@
               </a:rPr>
               <a:t>module load anaconda3/2022.5</a:t>
             </a:r>
+          </a:p>
+          <a:p>
+            <a:pPr marL="0" indent="0">
+              <a:buNone/>
+            </a:pPr>
+            <a:r>
+              <a:rPr lang="en-US" b="0" dirty="0">
+                <a:effectLst/>
+                <a:latin typeface="Menlo" panose="020B0609030804020204" pitchFamily="49" charset="0"/>
+              </a:rPr>
+              <a:t>On laptop:</a:t>
+            </a:r>
+          </a:p>
+          <a:p>
+            <a:pPr marL="0" indent="0">
+              <a:buNone/>
+            </a:pPr>
+            <a:r>
+              <a:rPr lang="en-US" dirty="0">
+                <a:latin typeface="Menlo" panose="020B0609030804020204" pitchFamily="49" charset="0"/>
+              </a:rPr>
+              <a:t>	python –m pip install </a:t>
+            </a:r>
+            <a:r>
+              <a:rPr lang="en-US" dirty="0" err="1">
+                <a:latin typeface="Menlo" panose="020B0609030804020204" pitchFamily="49" charset="0"/>
+              </a:rPr>
+              <a:t>pytest</a:t>
+            </a:r>
+            <a:r>
+              <a:rPr lang="en-US" dirty="0">
+                <a:latin typeface="Menlo" panose="020B0609030804020204" pitchFamily="49" charset="0"/>
+              </a:rPr>
+              <a:t> </a:t>
+            </a:r>
+            <a:r>
+              <a:rPr lang="en-US" dirty="0" err="1">
+                <a:latin typeface="Menlo" panose="020B0609030804020204" pitchFamily="49" charset="0"/>
+              </a:rPr>
+              <a:t>pytest</a:t>
+            </a:r>
+            <a:r>
+              <a:rPr lang="en-US" dirty="0">
+                <a:latin typeface="Menlo" panose="020B0609030804020204" pitchFamily="49" charset="0"/>
+              </a:rPr>
+              <a:t>-mock</a:t>
+            </a:r>
+            <a:endParaRPr lang="en-US" b="0" dirty="0">
+              <a:effectLst/>
+              <a:latin typeface="Menlo" panose="020B0609030804020204" pitchFamily="49" charset="0"/>
+            </a:endParaRPr>
+          </a:p>
+          <a:p>
+            <a:pPr marL="0" indent="0">
+              <a:buNone/>
+            </a:pPr>
+            <a:endParaRPr lang="en-US" b="0" dirty="0">
+              <a:effectLst/>
+              <a:latin typeface="Menlo" panose="020B0609030804020204" pitchFamily="49" charset="0"/>
+            </a:endParaRPr>
           </a:p>
           <a:p>
             <a:pPr marL="0" indent="0">

</xml_diff>

<commit_message>
update text for Software Quality Assurance Tooling talk in slides
</commit_message>
<xml_diff>
--- a/UnitTestingSlides.pptx
+++ b/UnitTestingSlides.pptx
@@ -217,7 +217,7 @@
           <a:p>
             <a:fld id="{EF6A6A60-C693-BC49-85A7-98B318EF45A1}" type="datetimeFigureOut">
               <a:rPr lang="en-US" smtClean="0"/>
-              <a:t>1/22/23</a:t>
+              <a:t>1/23/23</a:t>
             </a:fld>
             <a:endParaRPr lang="en-US"/>
           </a:p>
@@ -1346,7 +1346,7 @@
           <a:p>
             <a:fld id="{78ABE3C1-DBE1-495D-B57B-2849774B866A}" type="datetimeFigureOut">
               <a:rPr lang="en-US" dirty="0"/>
-              <a:t>1/22/23</a:t>
+              <a:t>1/23/23</a:t>
             </a:fld>
             <a:endParaRPr lang="en-US" dirty="0"/>
           </a:p>
@@ -1755,7 +1755,7 @@
           <a:p>
             <a:fld id="{446C117F-5CCF-4837-BE5F-2B92066CAFAF}" type="datetimeFigureOut">
               <a:rPr lang="en-US" dirty="0"/>
-              <a:t>1/22/23</a:t>
+              <a:t>1/23/23</a:t>
             </a:fld>
             <a:endParaRPr lang="en-US" dirty="0"/>
           </a:p>
@@ -2086,7 +2086,7 @@
           <a:p>
             <a:fld id="{84EB90BD-B6CE-46B7-997F-7313B992CCDC}" type="datetimeFigureOut">
               <a:rPr lang="en-US" dirty="0"/>
-              <a:t>1/22/23</a:t>
+              <a:t>1/23/23</a:t>
             </a:fld>
             <a:endParaRPr lang="en-US" dirty="0"/>
           </a:p>
@@ -2486,7 +2486,7 @@
           <a:p>
             <a:fld id="{CDB9D11F-B188-461D-B23F-39381795C052}" type="datetimeFigureOut">
               <a:rPr lang="en-US" dirty="0"/>
-              <a:t>1/22/23</a:t>
+              <a:t>1/23/23</a:t>
             </a:fld>
             <a:endParaRPr lang="en-US" dirty="0"/>
           </a:p>
@@ -3049,7 +3049,7 @@
           <a:p>
             <a:fld id="{52E6D8D9-55A2-4063-B0F3-121F44549695}" type="datetimeFigureOut">
               <a:rPr lang="en-US" dirty="0"/>
-              <a:t>1/22/23</a:t>
+              <a:t>1/23/23</a:t>
             </a:fld>
             <a:endParaRPr lang="en-US" dirty="0"/>
           </a:p>
@@ -3725,7 +3725,7 @@
           <a:p>
             <a:fld id="{D4B24536-994D-4021-A283-9F449C0DB509}" type="datetimeFigureOut">
               <a:rPr lang="en-US" dirty="0"/>
-              <a:t>1/22/23</a:t>
+              <a:t>1/23/23</a:t>
             </a:fld>
             <a:endParaRPr lang="en-US" dirty="0"/>
           </a:p>
@@ -4633,7 +4633,7 @@
           <a:p>
             <a:fld id="{3CBBBB78-C96F-47B7-AB17-D852CA960AC9}" type="datetimeFigureOut">
               <a:rPr lang="en-US" dirty="0"/>
-              <a:t>1/22/23</a:t>
+              <a:t>1/23/23</a:t>
             </a:fld>
             <a:endParaRPr lang="en-US" dirty="0"/>
           </a:p>
@@ -4941,7 +4941,7 @@
           <a:p>
             <a:fld id="{1FA3F48C-C7C6-4055-9F49-3777875E72AE}" type="datetimeFigureOut">
               <a:rPr lang="en-US" dirty="0"/>
-              <a:t>1/22/23</a:t>
+              <a:t>1/23/23</a:t>
             </a:fld>
             <a:endParaRPr lang="en-US" dirty="0"/>
           </a:p>
@@ -5200,7 +5200,7 @@
           <a:p>
             <a:fld id="{6178E61D-D431-422C-9764-11DAFE33AB63}" type="datetimeFigureOut">
               <a:rPr lang="en-US" dirty="0"/>
-              <a:t>1/22/23</a:t>
+              <a:t>1/23/23</a:t>
             </a:fld>
             <a:endParaRPr lang="en-US" dirty="0"/>
           </a:p>
@@ -5519,7 +5519,7 @@
           <a:p>
             <a:fld id="{12DE42F4-6EEF-4EF7-8ED4-2208F0F89A08}" type="datetimeFigureOut">
               <a:rPr lang="en-US" dirty="0"/>
-              <a:t>1/22/23</a:t>
+              <a:t>1/23/23</a:t>
             </a:fld>
             <a:endParaRPr lang="en-US" dirty="0"/>
           </a:p>
@@ -5903,7 +5903,7 @@
           <a:p>
             <a:fld id="{30578ACC-22D6-47C1-A373-4FD133E34F3C}" type="datetimeFigureOut">
               <a:rPr lang="en-US" dirty="0"/>
-              <a:t>1/22/23</a:t>
+              <a:t>1/23/23</a:t>
             </a:fld>
             <a:endParaRPr lang="en-US" dirty="0"/>
           </a:p>
@@ -6274,7 +6274,7 @@
           <a:p>
             <a:fld id="{4E5A6C69-6797-4E8A-BF37-F2C3751466E9}" type="datetimeFigureOut">
               <a:rPr lang="en-US" dirty="0"/>
-              <a:t>1/22/23</a:t>
+              <a:t>1/23/23</a:t>
             </a:fld>
             <a:endParaRPr lang="en-US" dirty="0"/>
           </a:p>
@@ -6775,7 +6775,7 @@
           <a:p>
             <a:fld id="{D82014A1-A632-4878-A0D3-F52BA7563730}" type="datetimeFigureOut">
               <a:rPr lang="en-US" dirty="0"/>
-              <a:t>1/22/23</a:t>
+              <a:t>1/23/23</a:t>
             </a:fld>
             <a:endParaRPr lang="en-US" dirty="0"/>
           </a:p>
@@ -7027,7 +7027,7 @@
           <a:p>
             <a:fld id="{CE99F462-093F-4566-844B-4C71F2739DA5}" type="datetimeFigureOut">
               <a:rPr lang="en-US" dirty="0"/>
-              <a:t>1/22/23</a:t>
+              <a:t>1/23/23</a:t>
             </a:fld>
             <a:endParaRPr lang="en-US" dirty="0"/>
           </a:p>
@@ -7185,7 +7185,7 @@
           <a:p>
             <a:fld id="{3D24A7AC-904D-4781-85BA-7D10C17ED021}" type="datetimeFigureOut">
               <a:rPr lang="en-US" dirty="0"/>
-              <a:t>1/22/23</a:t>
+              <a:t>1/23/23</a:t>
             </a:fld>
             <a:endParaRPr lang="en-US" dirty="0"/>
           </a:p>
@@ -7570,7 +7570,7 @@
           <a:p>
             <a:fld id="{E331444B-B92B-4E27-8C94-BB93EAF5CB18}" type="datetimeFigureOut">
               <a:rPr lang="en-US" dirty="0"/>
-              <a:t>1/22/23</a:t>
+              <a:t>1/23/23</a:t>
             </a:fld>
             <a:endParaRPr lang="en-US" dirty="0"/>
           </a:p>
@@ -7974,7 +7974,7 @@
           <a:p>
             <a:fld id="{363EFA5E-FA76-400D-B3DC-F0BA90E6D107}" type="datetimeFigureOut">
               <a:rPr lang="en-US" dirty="0"/>
-              <a:t>1/22/23</a:t>
+              <a:t>1/23/23</a:t>
             </a:fld>
             <a:endParaRPr lang="en-US" dirty="0"/>
           </a:p>
@@ -8213,7 +8213,7 @@
           <a:p>
             <a:fld id="{9D6E9DEC-419B-4CC5-A080-3B06BD5A8291}" type="datetimeFigureOut">
               <a:rPr lang="en-US" dirty="0"/>
-              <a:t>1/22/23</a:t>
+              <a:t>1/23/23</a:t>
             </a:fld>
             <a:endParaRPr lang="en-US" dirty="0"/>
           </a:p>
@@ -13476,7 +13476,7 @@
             </a:pPr>
             <a:r>
               <a:rPr lang="en-US" dirty="0"/>
-              <a:t>Reminder: The next talk on “Quality Assistance Tooling” in this room right after and is related and useful too.</a:t>
+              <a:t>Reminder: The next talk on “Software Quality Assurance Tooling” in this room right after and is related and useful too.</a:t>
             </a:r>
           </a:p>
           <a:p>

</xml_diff>

<commit_message>
update readme for 2024
</commit_message>
<xml_diff>
--- a/UnitTestingSlides.pptx
+++ b/UnitTestingSlides.pptx
@@ -221,7 +221,7 @@
           <a:p>
             <a:fld id="{EF6A6A60-C693-BC49-85A7-98B318EF45A1}" type="datetimeFigureOut">
               <a:rPr lang="en-US" smtClean="0"/>
-              <a:t>12/15/23</a:t>
+              <a:t>12/19/23</a:t>
             </a:fld>
             <a:endParaRPr lang="en-US"/>
           </a:p>
@@ -1350,7 +1350,7 @@
           <a:p>
             <a:fld id="{78ABE3C1-DBE1-495D-B57B-2849774B866A}" type="datetimeFigureOut">
               <a:rPr lang="en-US" dirty="0"/>
-              <a:t>12/15/23</a:t>
+              <a:t>12/19/23</a:t>
             </a:fld>
             <a:endParaRPr lang="en-US" dirty="0"/>
           </a:p>
@@ -1759,7 +1759,7 @@
           <a:p>
             <a:fld id="{446C117F-5CCF-4837-BE5F-2B92066CAFAF}" type="datetimeFigureOut">
               <a:rPr lang="en-US" dirty="0"/>
-              <a:t>12/15/23</a:t>
+              <a:t>12/19/23</a:t>
             </a:fld>
             <a:endParaRPr lang="en-US" dirty="0"/>
           </a:p>
@@ -2090,7 +2090,7 @@
           <a:p>
             <a:fld id="{84EB90BD-B6CE-46B7-997F-7313B992CCDC}" type="datetimeFigureOut">
               <a:rPr lang="en-US" dirty="0"/>
-              <a:t>12/15/23</a:t>
+              <a:t>12/19/23</a:t>
             </a:fld>
             <a:endParaRPr lang="en-US" dirty="0"/>
           </a:p>
@@ -2490,7 +2490,7 @@
           <a:p>
             <a:fld id="{CDB9D11F-B188-461D-B23F-39381795C052}" type="datetimeFigureOut">
               <a:rPr lang="en-US" dirty="0"/>
-              <a:t>12/15/23</a:t>
+              <a:t>12/19/23</a:t>
             </a:fld>
             <a:endParaRPr lang="en-US" dirty="0"/>
           </a:p>
@@ -3053,7 +3053,7 @@
           <a:p>
             <a:fld id="{52E6D8D9-55A2-4063-B0F3-121F44549695}" type="datetimeFigureOut">
               <a:rPr lang="en-US" dirty="0"/>
-              <a:t>12/15/23</a:t>
+              <a:t>12/19/23</a:t>
             </a:fld>
             <a:endParaRPr lang="en-US" dirty="0"/>
           </a:p>
@@ -3729,7 +3729,7 @@
           <a:p>
             <a:fld id="{D4B24536-994D-4021-A283-9F449C0DB509}" type="datetimeFigureOut">
               <a:rPr lang="en-US" dirty="0"/>
-              <a:t>12/15/23</a:t>
+              <a:t>12/19/23</a:t>
             </a:fld>
             <a:endParaRPr lang="en-US" dirty="0"/>
           </a:p>
@@ -4637,7 +4637,7 @@
           <a:p>
             <a:fld id="{3CBBBB78-C96F-47B7-AB17-D852CA960AC9}" type="datetimeFigureOut">
               <a:rPr lang="en-US" dirty="0"/>
-              <a:t>12/15/23</a:t>
+              <a:t>12/19/23</a:t>
             </a:fld>
             <a:endParaRPr lang="en-US" dirty="0"/>
           </a:p>
@@ -4945,7 +4945,7 @@
           <a:p>
             <a:fld id="{1FA3F48C-C7C6-4055-9F49-3777875E72AE}" type="datetimeFigureOut">
               <a:rPr lang="en-US" dirty="0"/>
-              <a:t>12/15/23</a:t>
+              <a:t>12/19/23</a:t>
             </a:fld>
             <a:endParaRPr lang="en-US" dirty="0"/>
           </a:p>
@@ -5204,7 +5204,7 @@
           <a:p>
             <a:fld id="{6178E61D-D431-422C-9764-11DAFE33AB63}" type="datetimeFigureOut">
               <a:rPr lang="en-US" dirty="0"/>
-              <a:t>12/15/23</a:t>
+              <a:t>12/19/23</a:t>
             </a:fld>
             <a:endParaRPr lang="en-US" dirty="0"/>
           </a:p>
@@ -5523,7 +5523,7 @@
           <a:p>
             <a:fld id="{12DE42F4-6EEF-4EF7-8ED4-2208F0F89A08}" type="datetimeFigureOut">
               <a:rPr lang="en-US" dirty="0"/>
-              <a:t>12/15/23</a:t>
+              <a:t>12/19/23</a:t>
             </a:fld>
             <a:endParaRPr lang="en-US" dirty="0"/>
           </a:p>
@@ -5907,7 +5907,7 @@
           <a:p>
             <a:fld id="{30578ACC-22D6-47C1-A373-4FD133E34F3C}" type="datetimeFigureOut">
               <a:rPr lang="en-US" dirty="0"/>
-              <a:t>12/15/23</a:t>
+              <a:t>12/19/23</a:t>
             </a:fld>
             <a:endParaRPr lang="en-US" dirty="0"/>
           </a:p>
@@ -6278,7 +6278,7 @@
           <a:p>
             <a:fld id="{4E5A6C69-6797-4E8A-BF37-F2C3751466E9}" type="datetimeFigureOut">
               <a:rPr lang="en-US" dirty="0"/>
-              <a:t>12/15/23</a:t>
+              <a:t>12/19/23</a:t>
             </a:fld>
             <a:endParaRPr lang="en-US" dirty="0"/>
           </a:p>
@@ -6779,7 +6779,7 @@
           <a:p>
             <a:fld id="{D82014A1-A632-4878-A0D3-F52BA7563730}" type="datetimeFigureOut">
               <a:rPr lang="en-US" dirty="0"/>
-              <a:t>12/15/23</a:t>
+              <a:t>12/19/23</a:t>
             </a:fld>
             <a:endParaRPr lang="en-US" dirty="0"/>
           </a:p>
@@ -7031,7 +7031,7 @@
           <a:p>
             <a:fld id="{CE99F462-093F-4566-844B-4C71F2739DA5}" type="datetimeFigureOut">
               <a:rPr lang="en-US" dirty="0"/>
-              <a:t>12/15/23</a:t>
+              <a:t>12/19/23</a:t>
             </a:fld>
             <a:endParaRPr lang="en-US" dirty="0"/>
           </a:p>
@@ -7189,7 +7189,7 @@
           <a:p>
             <a:fld id="{3D24A7AC-904D-4781-85BA-7D10C17ED021}" type="datetimeFigureOut">
               <a:rPr lang="en-US" dirty="0"/>
-              <a:t>12/15/23</a:t>
+              <a:t>12/19/23</a:t>
             </a:fld>
             <a:endParaRPr lang="en-US" dirty="0"/>
           </a:p>
@@ -7574,7 +7574,7 @@
           <a:p>
             <a:fld id="{E331444B-B92B-4E27-8C94-BB93EAF5CB18}" type="datetimeFigureOut">
               <a:rPr lang="en-US" dirty="0"/>
-              <a:t>12/15/23</a:t>
+              <a:t>12/19/23</a:t>
             </a:fld>
             <a:endParaRPr lang="en-US" dirty="0"/>
           </a:p>
@@ -7978,7 +7978,7 @@
           <a:p>
             <a:fld id="{363EFA5E-FA76-400D-B3DC-F0BA90E6D107}" type="datetimeFigureOut">
               <a:rPr lang="en-US" dirty="0"/>
-              <a:t>12/15/23</a:t>
+              <a:t>12/19/23</a:t>
             </a:fld>
             <a:endParaRPr lang="en-US" dirty="0"/>
           </a:p>
@@ -8217,7 +8217,7 @@
           <a:p>
             <a:fld id="{9D6E9DEC-419B-4CC5-A080-3B06BD5A8291}" type="datetimeFigureOut">
               <a:rPr lang="en-US" dirty="0"/>
-              <a:t>12/15/23</a:t>
+              <a:t>12/19/23</a:t>
             </a:fld>
             <a:endParaRPr lang="en-US" dirty="0"/>
           </a:p>
@@ -15794,7 +15794,9 @@
           </a:xfrm>
         </p:spPr>
         <p:txBody>
-          <a:bodyPr/>
+          <a:bodyPr>
+            <a:normAutofit fontScale="92500" lnSpcReduction="10000"/>
+          </a:bodyPr>
           <a:lstStyle/>
           <a:p>
             <a:r>
@@ -15840,6 +15842,12 @@
             <a:r>
               <a:rPr lang="en-US" dirty="0"/>
               <a:t>Unit tests make debugging easier.</a:t>
+            </a:r>
+          </a:p>
+          <a:p>
+            <a:r>
+              <a:rPr lang="en-US" dirty="0"/>
+              <a:t>Unit tests make refactoring possible.</a:t>
             </a:r>
           </a:p>
           <a:p>
@@ -16163,33 +16171,15 @@
                                   </p:childTnLst>
                                 </p:cTn>
                               </p:par>
-                            </p:childTnLst>
-                          </p:cTn>
-                        </p:par>
-                      </p:childTnLst>
-                    </p:cTn>
-                  </p:par>
-                  <p:par>
-                    <p:cTn id="25" fill="hold">
-                      <p:stCondLst>
-                        <p:cond delay="indefinite"/>
-                      </p:stCondLst>
-                      <p:childTnLst>
-                        <p:par>
-                          <p:cTn id="26" fill="hold">
-                            <p:stCondLst>
-                              <p:cond delay="0"/>
-                            </p:stCondLst>
-                            <p:childTnLst>
                               <p:par>
-                                <p:cTn id="27" presetID="1" presetClass="entr" presetSubtype="0" fill="hold" nodeType="clickEffect">
+                                <p:cTn id="25" presetID="1" presetClass="entr" presetSubtype="0" fill="hold" nodeType="withEffect">
                                   <p:stCondLst>
                                     <p:cond delay="0"/>
                                   </p:stCondLst>
                                   <p:childTnLst>
                                     <p:set>
                                       <p:cBhvr>
-                                        <p:cTn id="28" dur="1" fill="hold">
+                                        <p:cTn id="26" dur="1" fill="hold">
                                           <p:stCondLst>
                                             <p:cond delay="0"/>
                                           </p:stCondLst>
@@ -16198,6 +16188,55 @@
                                           <p:spTgt spid="3">
                                             <p:txEl>
                                               <p:pRg st="8" end="8"/>
+                                            </p:txEl>
+                                          </p:spTgt>
+                                        </p:tgtEl>
+                                        <p:attrNameLst>
+                                          <p:attrName>style.visibility</p:attrName>
+                                        </p:attrNameLst>
+                                      </p:cBhvr>
+                                      <p:to>
+                                        <p:strVal val="visible"/>
+                                      </p:to>
+                                    </p:set>
+                                  </p:childTnLst>
+                                </p:cTn>
+                              </p:par>
+                            </p:childTnLst>
+                          </p:cTn>
+                        </p:par>
+                      </p:childTnLst>
+                    </p:cTn>
+                  </p:par>
+                  <p:par>
+                    <p:cTn id="27" fill="hold">
+                      <p:stCondLst>
+                        <p:cond delay="indefinite"/>
+                      </p:stCondLst>
+                      <p:childTnLst>
+                        <p:par>
+                          <p:cTn id="28" fill="hold">
+                            <p:stCondLst>
+                              <p:cond delay="0"/>
+                            </p:stCondLst>
+                            <p:childTnLst>
+                              <p:par>
+                                <p:cTn id="29" presetID="1" presetClass="entr" presetSubtype="0" fill="hold" nodeType="clickEffect">
+                                  <p:stCondLst>
+                                    <p:cond delay="0"/>
+                                  </p:stCondLst>
+                                  <p:childTnLst>
+                                    <p:set>
+                                      <p:cBhvr>
+                                        <p:cTn id="30" dur="1" fill="hold">
+                                          <p:stCondLst>
+                                            <p:cond delay="0"/>
+                                          </p:stCondLst>
+                                        </p:cTn>
+                                        <p:tgtEl>
+                                          <p:spTgt spid="3">
+                                            <p:txEl>
+                                              <p:pRg st="9" end="9"/>
                                             </p:txEl>
                                           </p:spTgt>
                                         </p:tgtEl>
@@ -16922,7 +16961,7 @@
           <a:p>
             <a:r>
               <a:rPr lang="en-US" dirty="0"/>
-              <a:t>Python Test Libraries</a:t>
+              <a:t>Test Frameworks</a:t>
             </a:r>
           </a:p>
         </p:txBody>

</xml_diff>

<commit_message>
update slides and comments in examples
</commit_message>
<xml_diff>
--- a/UnitTestingSlides.pptx
+++ b/UnitTestingSlides.pptx
@@ -19,11 +19,11 @@
     <p:sldId id="277" r:id="rId10"/>
     <p:sldId id="272" r:id="rId11"/>
     <p:sldId id="278" r:id="rId12"/>
-    <p:sldId id="266" r:id="rId13"/>
-    <p:sldId id="267" r:id="rId14"/>
-    <p:sldId id="268" r:id="rId15"/>
-    <p:sldId id="265" r:id="rId16"/>
-    <p:sldId id="279" r:id="rId17"/>
+    <p:sldId id="265" r:id="rId13"/>
+    <p:sldId id="279" r:id="rId14"/>
+    <p:sldId id="266" r:id="rId15"/>
+    <p:sldId id="267" r:id="rId16"/>
+    <p:sldId id="268" r:id="rId17"/>
     <p:sldId id="280" r:id="rId18"/>
     <p:sldId id="262" r:id="rId19"/>
     <p:sldId id="276" r:id="rId20"/>
@@ -221,7 +221,7 @@
           <a:p>
             <a:fld id="{EF6A6A60-C693-BC49-85A7-98B318EF45A1}" type="datetimeFigureOut">
               <a:rPr lang="en-US" smtClean="0"/>
-              <a:t>1/11/24</a:t>
+              <a:t>1/17/24</a:t>
             </a:fld>
             <a:endParaRPr lang="en-US"/>
           </a:p>
@@ -1350,7 +1350,7 @@
           <a:p>
             <a:fld id="{78ABE3C1-DBE1-495D-B57B-2849774B866A}" type="datetimeFigureOut">
               <a:rPr lang="en-US" dirty="0"/>
-              <a:t>1/11/24</a:t>
+              <a:t>1/17/24</a:t>
             </a:fld>
             <a:endParaRPr lang="en-US" dirty="0"/>
           </a:p>
@@ -1759,7 +1759,7 @@
           <a:p>
             <a:fld id="{446C117F-5CCF-4837-BE5F-2B92066CAFAF}" type="datetimeFigureOut">
               <a:rPr lang="en-US" dirty="0"/>
-              <a:t>1/11/24</a:t>
+              <a:t>1/17/24</a:t>
             </a:fld>
             <a:endParaRPr lang="en-US" dirty="0"/>
           </a:p>
@@ -2090,7 +2090,7 @@
           <a:p>
             <a:fld id="{84EB90BD-B6CE-46B7-997F-7313B992CCDC}" type="datetimeFigureOut">
               <a:rPr lang="en-US" dirty="0"/>
-              <a:t>1/11/24</a:t>
+              <a:t>1/17/24</a:t>
             </a:fld>
             <a:endParaRPr lang="en-US" dirty="0"/>
           </a:p>
@@ -2490,7 +2490,7 @@
           <a:p>
             <a:fld id="{CDB9D11F-B188-461D-B23F-39381795C052}" type="datetimeFigureOut">
               <a:rPr lang="en-US" dirty="0"/>
-              <a:t>1/11/24</a:t>
+              <a:t>1/17/24</a:t>
             </a:fld>
             <a:endParaRPr lang="en-US" dirty="0"/>
           </a:p>
@@ -3053,7 +3053,7 @@
           <a:p>
             <a:fld id="{52E6D8D9-55A2-4063-B0F3-121F44549695}" type="datetimeFigureOut">
               <a:rPr lang="en-US" dirty="0"/>
-              <a:t>1/11/24</a:t>
+              <a:t>1/17/24</a:t>
             </a:fld>
             <a:endParaRPr lang="en-US" dirty="0"/>
           </a:p>
@@ -3729,7 +3729,7 @@
           <a:p>
             <a:fld id="{D4B24536-994D-4021-A283-9F449C0DB509}" type="datetimeFigureOut">
               <a:rPr lang="en-US" dirty="0"/>
-              <a:t>1/11/24</a:t>
+              <a:t>1/17/24</a:t>
             </a:fld>
             <a:endParaRPr lang="en-US" dirty="0"/>
           </a:p>
@@ -4637,7 +4637,7 @@
           <a:p>
             <a:fld id="{3CBBBB78-C96F-47B7-AB17-D852CA960AC9}" type="datetimeFigureOut">
               <a:rPr lang="en-US" dirty="0"/>
-              <a:t>1/11/24</a:t>
+              <a:t>1/17/24</a:t>
             </a:fld>
             <a:endParaRPr lang="en-US" dirty="0"/>
           </a:p>
@@ -4945,7 +4945,7 @@
           <a:p>
             <a:fld id="{1FA3F48C-C7C6-4055-9F49-3777875E72AE}" type="datetimeFigureOut">
               <a:rPr lang="en-US" dirty="0"/>
-              <a:t>1/11/24</a:t>
+              <a:t>1/17/24</a:t>
             </a:fld>
             <a:endParaRPr lang="en-US" dirty="0"/>
           </a:p>
@@ -5204,7 +5204,7 @@
           <a:p>
             <a:fld id="{6178E61D-D431-422C-9764-11DAFE33AB63}" type="datetimeFigureOut">
               <a:rPr lang="en-US" dirty="0"/>
-              <a:t>1/11/24</a:t>
+              <a:t>1/17/24</a:t>
             </a:fld>
             <a:endParaRPr lang="en-US" dirty="0"/>
           </a:p>
@@ -5523,7 +5523,7 @@
           <a:p>
             <a:fld id="{12DE42F4-6EEF-4EF7-8ED4-2208F0F89A08}" type="datetimeFigureOut">
               <a:rPr lang="en-US" dirty="0"/>
-              <a:t>1/11/24</a:t>
+              <a:t>1/17/24</a:t>
             </a:fld>
             <a:endParaRPr lang="en-US" dirty="0"/>
           </a:p>
@@ -5907,7 +5907,7 @@
           <a:p>
             <a:fld id="{30578ACC-22D6-47C1-A373-4FD133E34F3C}" type="datetimeFigureOut">
               <a:rPr lang="en-US" dirty="0"/>
-              <a:t>1/11/24</a:t>
+              <a:t>1/17/24</a:t>
             </a:fld>
             <a:endParaRPr lang="en-US" dirty="0"/>
           </a:p>
@@ -6278,7 +6278,7 @@
           <a:p>
             <a:fld id="{4E5A6C69-6797-4E8A-BF37-F2C3751466E9}" type="datetimeFigureOut">
               <a:rPr lang="en-US" dirty="0"/>
-              <a:t>1/11/24</a:t>
+              <a:t>1/17/24</a:t>
             </a:fld>
             <a:endParaRPr lang="en-US" dirty="0"/>
           </a:p>
@@ -6779,7 +6779,7 @@
           <a:p>
             <a:fld id="{D82014A1-A632-4878-A0D3-F52BA7563730}" type="datetimeFigureOut">
               <a:rPr lang="en-US" dirty="0"/>
-              <a:t>1/11/24</a:t>
+              <a:t>1/17/24</a:t>
             </a:fld>
             <a:endParaRPr lang="en-US" dirty="0"/>
           </a:p>
@@ -7031,7 +7031,7 @@
           <a:p>
             <a:fld id="{CE99F462-093F-4566-844B-4C71F2739DA5}" type="datetimeFigureOut">
               <a:rPr lang="en-US" dirty="0"/>
-              <a:t>1/11/24</a:t>
+              <a:t>1/17/24</a:t>
             </a:fld>
             <a:endParaRPr lang="en-US" dirty="0"/>
           </a:p>
@@ -7189,7 +7189,7 @@
           <a:p>
             <a:fld id="{3D24A7AC-904D-4781-85BA-7D10C17ED021}" type="datetimeFigureOut">
               <a:rPr lang="en-US" dirty="0"/>
-              <a:t>1/11/24</a:t>
+              <a:t>1/17/24</a:t>
             </a:fld>
             <a:endParaRPr lang="en-US" dirty="0"/>
           </a:p>
@@ -7574,7 +7574,7 @@
           <a:p>
             <a:fld id="{E331444B-B92B-4E27-8C94-BB93EAF5CB18}" type="datetimeFigureOut">
               <a:rPr lang="en-US" dirty="0"/>
-              <a:t>1/11/24</a:t>
+              <a:t>1/17/24</a:t>
             </a:fld>
             <a:endParaRPr lang="en-US" dirty="0"/>
           </a:p>
@@ -7978,7 +7978,7 @@
           <a:p>
             <a:fld id="{363EFA5E-FA76-400D-B3DC-F0BA90E6D107}" type="datetimeFigureOut">
               <a:rPr lang="en-US" dirty="0"/>
-              <a:t>1/11/24</a:t>
+              <a:t>1/17/24</a:t>
             </a:fld>
             <a:endParaRPr lang="en-US" dirty="0"/>
           </a:p>
@@ -8217,7 +8217,7 @@
           <a:p>
             <a:fld id="{9D6E9DEC-419B-4CC5-A080-3B06BD5A8291}" type="datetimeFigureOut">
               <a:rPr lang="en-US" dirty="0"/>
-              <a:t>1/11/24</a:t>
+              <a:t>1/17/24</a:t>
             </a:fld>
             <a:endParaRPr lang="en-US" dirty="0"/>
           </a:p>
@@ -8724,7 +8724,7 @@
         </p:nvSpPr>
         <p:spPr>
           <a:xfrm>
-            <a:off x="0" y="4903229"/>
+            <a:off x="338484" y="5129259"/>
             <a:ext cx="12192000" cy="461665"/>
           </a:xfrm>
           <a:prstGeom prst="rect">
@@ -8922,8 +8922,8 @@
         </p:nvSpPr>
         <p:spPr>
           <a:xfrm>
-            <a:off x="351184" y="5267469"/>
-            <a:ext cx="10501593" cy="1846659"/>
+            <a:off x="338484" y="5865670"/>
+            <a:ext cx="10501593" cy="1107996"/>
           </a:xfrm>
           <a:prstGeom prst="rect">
             <a:avLst/>
@@ -8941,7 +8941,7 @@
             </a:pPr>
             <a:r>
               <a:rPr lang="en-US" sz="2400" dirty="0"/>
-              <a:t>On Adroit execute:</a:t>
+              <a:t>On Adroit execute: (to load python virtual environment)</a:t>
             </a:r>
           </a:p>
           <a:p>
@@ -8973,57 +8973,6 @@
               </a:rPr>
               <a:t>/bin/activate</a:t>
             </a:r>
-          </a:p>
-          <a:p>
-            <a:pPr marL="0" indent="0">
-              <a:buNone/>
-            </a:pPr>
-            <a:r>
-              <a:rPr lang="en-US" sz="2400" b="0" dirty="0">
-                <a:effectLst/>
-                <a:latin typeface="Menlo" panose="020B0609030804020204" pitchFamily="49" charset="0"/>
-              </a:rPr>
-              <a:t>On laptop:</a:t>
-            </a:r>
-          </a:p>
-          <a:p>
-            <a:pPr marL="0" indent="0">
-              <a:buNone/>
-            </a:pPr>
-            <a:r>
-              <a:rPr lang="en-US" sz="2400" dirty="0">
-                <a:latin typeface="Menlo" panose="020B0609030804020204" pitchFamily="49" charset="0"/>
-              </a:rPr>
-              <a:t>	pip install </a:t>
-            </a:r>
-            <a:r>
-              <a:rPr lang="en-US" sz="2400" dirty="0" err="1">
-                <a:latin typeface="Menlo" panose="020B0609030804020204" pitchFamily="49" charset="0"/>
-              </a:rPr>
-              <a:t>pytest</a:t>
-            </a:r>
-            <a:r>
-              <a:rPr lang="en-US" sz="2400" dirty="0">
-                <a:latin typeface="Menlo" panose="020B0609030804020204" pitchFamily="49" charset="0"/>
-              </a:rPr>
-              <a:t> </a:t>
-            </a:r>
-            <a:r>
-              <a:rPr lang="en-US" sz="2400" dirty="0" err="1">
-                <a:latin typeface="Menlo" panose="020B0609030804020204" pitchFamily="49" charset="0"/>
-              </a:rPr>
-              <a:t>pytest</a:t>
-            </a:r>
-            <a:r>
-              <a:rPr lang="en-US" sz="2400" dirty="0">
-                <a:latin typeface="Menlo" panose="020B0609030804020204" pitchFamily="49" charset="0"/>
-              </a:rPr>
-              <a:t>-mock flask requests</a:t>
-            </a:r>
-            <a:endParaRPr lang="en-US" sz="2400" b="0" dirty="0">
-              <a:effectLst/>
-              <a:latin typeface="Menlo" panose="020B0609030804020204" pitchFamily="49" charset="0"/>
-            </a:endParaRPr>
           </a:p>
           <a:p>
             <a:endParaRPr lang="en-US" dirty="0"/>
@@ -10014,6 +9963,1009 @@
           <p:cNvPr id="2" name="Title 1">
             <a:extLst>
               <a:ext uri="{FF2B5EF4-FFF2-40B4-BE49-F238E27FC236}">
+                <a16:creationId xmlns:a16="http://schemas.microsoft.com/office/drawing/2014/main" id="{66BD9AD9-672C-A2D1-FA72-61197115C966}"/>
+              </a:ext>
+            </a:extLst>
+          </p:cNvPr>
+          <p:cNvSpPr>
+            <a:spLocks noGrp="1"/>
+          </p:cNvSpPr>
+          <p:nvPr>
+            <p:ph type="title"/>
+          </p:nvPr>
+        </p:nvSpPr>
+        <p:spPr/>
+        <p:txBody>
+          <a:bodyPr/>
+          <a:lstStyle/>
+          <a:p>
+            <a:r>
+              <a:rPr lang="en-US" dirty="0"/>
+              <a:t>Mocks</a:t>
+            </a:r>
+          </a:p>
+        </p:txBody>
+      </p:sp>
+      <p:sp>
+        <p:nvSpPr>
+          <p:cNvPr id="3" name="Content Placeholder 2">
+            <a:extLst>
+              <a:ext uri="{FF2B5EF4-FFF2-40B4-BE49-F238E27FC236}">
+                <a16:creationId xmlns:a16="http://schemas.microsoft.com/office/drawing/2014/main" id="{24586C43-62D7-4038-7910-C54F82FDE39B}"/>
+              </a:ext>
+            </a:extLst>
+          </p:cNvPr>
+          <p:cNvSpPr>
+            <a:spLocks noGrp="1"/>
+          </p:cNvSpPr>
+          <p:nvPr>
+            <p:ph idx="1"/>
+          </p:nvPr>
+        </p:nvSpPr>
+        <p:spPr/>
+        <p:txBody>
+          <a:bodyPr>
+            <a:normAutofit lnSpcReduction="10000"/>
+          </a:bodyPr>
+          <a:lstStyle/>
+          <a:p>
+            <a:pPr marL="0" indent="0">
+              <a:buNone/>
+            </a:pPr>
+            <a:r>
+              <a:rPr lang="en-US" dirty="0"/>
+              <a:t>Problem:</a:t>
+            </a:r>
+          </a:p>
+          <a:p>
+            <a:pPr marL="0" indent="0">
+              <a:buNone/>
+            </a:pPr>
+            <a:r>
+              <a:rPr lang="en-US" dirty="0"/>
+              <a:t>	How do you write unit tests when your code…</a:t>
+            </a:r>
+          </a:p>
+          <a:p>
+            <a:pPr marL="0" indent="0">
+              <a:buNone/>
+            </a:pPr>
+            <a:r>
+              <a:rPr lang="en-US" dirty="0"/>
+              <a:t>		* Reads and writes from a database.</a:t>
+            </a:r>
+          </a:p>
+          <a:p>
+            <a:pPr marL="0" indent="0">
+              <a:buNone/>
+            </a:pPr>
+            <a:r>
+              <a:rPr lang="en-US" dirty="0"/>
+              <a:t>		* Reads or writes to a GPFS file on a specific server.</a:t>
+            </a:r>
+          </a:p>
+          <a:p>
+            <a:pPr marL="0" indent="0">
+              <a:buNone/>
+            </a:pPr>
+            <a:r>
+              <a:rPr lang="en-US" dirty="0"/>
+              <a:t>		* Makes API calls to an external server.</a:t>
+            </a:r>
+          </a:p>
+          <a:p>
+            <a:pPr marL="0" indent="0">
+              <a:buNone/>
+            </a:pPr>
+            <a:r>
+              <a:rPr lang="en-US" dirty="0"/>
+              <a:t>		* Makes calls to other complex packages.</a:t>
+            </a:r>
+          </a:p>
+          <a:p>
+            <a:pPr marL="0" indent="0">
+              <a:buNone/>
+            </a:pPr>
+            <a:endParaRPr lang="en-US" dirty="0"/>
+          </a:p>
+          <a:p>
+            <a:pPr marL="0" indent="0">
+              <a:buNone/>
+            </a:pPr>
+            <a:r>
+              <a:rPr lang="en-US" dirty="0"/>
+              <a:t>Mocks to the rescue!</a:t>
+            </a:r>
+          </a:p>
+        </p:txBody>
+      </p:sp>
+    </p:spTree>
+    <p:extLst>
+      <p:ext uri="{BB962C8B-B14F-4D97-AF65-F5344CB8AC3E}">
+        <p14:creationId xmlns:p14="http://schemas.microsoft.com/office/powerpoint/2010/main" val="4189516893"/>
+      </p:ext>
+    </p:extLst>
+  </p:cSld>
+  <p:clrMapOvr>
+    <a:masterClrMapping/>
+  </p:clrMapOvr>
+  <p:timing>
+    <p:tnLst>
+      <p:par>
+        <p:cTn id="1" dur="indefinite" restart="never" nodeType="tmRoot">
+          <p:childTnLst>
+            <p:seq concurrent="1" nextAc="seek">
+              <p:cTn id="2" dur="indefinite" nodeType="mainSeq">
+                <p:childTnLst>
+                  <p:par>
+                    <p:cTn id="3" fill="hold">
+                      <p:stCondLst>
+                        <p:cond delay="indefinite"/>
+                      </p:stCondLst>
+                      <p:childTnLst>
+                        <p:par>
+                          <p:cTn id="4" fill="hold">
+                            <p:stCondLst>
+                              <p:cond delay="0"/>
+                            </p:stCondLst>
+                            <p:childTnLst>
+                              <p:par>
+                                <p:cTn id="5" presetID="1" presetClass="entr" presetSubtype="0" fill="hold" nodeType="clickEffect">
+                                  <p:stCondLst>
+                                    <p:cond delay="0"/>
+                                  </p:stCondLst>
+                                  <p:childTnLst>
+                                    <p:set>
+                                      <p:cBhvr>
+                                        <p:cTn id="6" dur="1" fill="hold">
+                                          <p:stCondLst>
+                                            <p:cond delay="0"/>
+                                          </p:stCondLst>
+                                        </p:cTn>
+                                        <p:tgtEl>
+                                          <p:spTgt spid="3">
+                                            <p:txEl>
+                                              <p:pRg st="7" end="7"/>
+                                            </p:txEl>
+                                          </p:spTgt>
+                                        </p:tgtEl>
+                                        <p:attrNameLst>
+                                          <p:attrName>style.visibility</p:attrName>
+                                        </p:attrNameLst>
+                                      </p:cBhvr>
+                                      <p:to>
+                                        <p:strVal val="visible"/>
+                                      </p:to>
+                                    </p:set>
+                                  </p:childTnLst>
+                                </p:cTn>
+                              </p:par>
+                            </p:childTnLst>
+                          </p:cTn>
+                        </p:par>
+                      </p:childTnLst>
+                    </p:cTn>
+                  </p:par>
+                </p:childTnLst>
+              </p:cTn>
+              <p:prevCondLst>
+                <p:cond evt="onPrev" delay="0">
+                  <p:tgtEl>
+                    <p:sldTgt/>
+                  </p:tgtEl>
+                </p:cond>
+              </p:prevCondLst>
+              <p:nextCondLst>
+                <p:cond evt="onNext" delay="0">
+                  <p:tgtEl>
+                    <p:sldTgt/>
+                  </p:tgtEl>
+                </p:cond>
+              </p:nextCondLst>
+            </p:seq>
+          </p:childTnLst>
+        </p:cTn>
+      </p:par>
+    </p:tnLst>
+  </p:timing>
+</p:sld>
+</file>
+
+<file path=ppt/slides/slide13.xml><?xml version="1.0" encoding="utf-8"?>
+<p:sld xmlns:a="http://schemas.openxmlformats.org/drawingml/2006/main" xmlns:r="http://schemas.openxmlformats.org/officeDocument/2006/relationships" xmlns:p="http://schemas.openxmlformats.org/presentationml/2006/main">
+  <p:cSld>
+    <p:spTree>
+      <p:nvGrpSpPr>
+        <p:cNvPr id="1" name=""/>
+        <p:cNvGrpSpPr/>
+        <p:nvPr/>
+      </p:nvGrpSpPr>
+      <p:grpSpPr>
+        <a:xfrm>
+          <a:off x="0" y="0"/>
+          <a:ext cx="0" cy="0"/>
+          <a:chOff x="0" y="0"/>
+          <a:chExt cx="0" cy="0"/>
+        </a:xfrm>
+      </p:grpSpPr>
+      <p:sp>
+        <p:nvSpPr>
+          <p:cNvPr id="2" name="Title 1">
+            <a:extLst>
+              <a:ext uri="{FF2B5EF4-FFF2-40B4-BE49-F238E27FC236}">
+                <a16:creationId xmlns:a16="http://schemas.microsoft.com/office/drawing/2014/main" id="{1214BFEF-DE70-D65F-9F8C-D69BAA391C9E}"/>
+              </a:ext>
+            </a:extLst>
+          </p:cNvPr>
+          <p:cNvSpPr>
+            <a:spLocks noGrp="1"/>
+          </p:cNvSpPr>
+          <p:nvPr>
+            <p:ph type="title"/>
+          </p:nvPr>
+        </p:nvSpPr>
+        <p:spPr/>
+        <p:txBody>
+          <a:bodyPr/>
+          <a:lstStyle/>
+          <a:p>
+            <a:r>
+              <a:rPr lang="en-US" dirty="0"/>
+              <a:t>02 </a:t>
+            </a:r>
+            <a:r>
+              <a:rPr lang="en-US" dirty="0" err="1"/>
+              <a:t>Pytest</a:t>
+            </a:r>
+            <a:r>
+              <a:rPr lang="en-US" dirty="0"/>
+              <a:t> Mocks</a:t>
+            </a:r>
+          </a:p>
+        </p:txBody>
+      </p:sp>
+      <p:sp>
+        <p:nvSpPr>
+          <p:cNvPr id="4" name="Content Placeholder 2">
+            <a:extLst>
+              <a:ext uri="{FF2B5EF4-FFF2-40B4-BE49-F238E27FC236}">
+                <a16:creationId xmlns:a16="http://schemas.microsoft.com/office/drawing/2014/main" id="{27F17B72-0F00-CCA8-28AF-E05D098A321B}"/>
+              </a:ext>
+            </a:extLst>
+          </p:cNvPr>
+          <p:cNvSpPr txBox="1">
+            <a:spLocks/>
+          </p:cNvSpPr>
+          <p:nvPr/>
+        </p:nvSpPr>
+        <p:spPr>
+          <a:xfrm>
+            <a:off x="444794" y="2008909"/>
+            <a:ext cx="10747975" cy="4655127"/>
+          </a:xfrm>
+          <a:prstGeom prst="rect">
+            <a:avLst/>
+          </a:prstGeom>
+        </p:spPr>
+        <p:txBody>
+          <a:bodyPr vert="horz" lIns="91440" tIns="45720" rIns="91440" bIns="45720" rtlCol="0">
+            <a:normAutofit fontScale="92500" lnSpcReduction="10000"/>
+          </a:bodyPr>
+          <a:lstStyle>
+            <a:lvl1pPr marL="228600" indent="-228600" algn="l" defTabSz="914400" rtl="0" eaLnBrk="1" latinLnBrk="0" hangingPunct="1">
+              <a:lnSpc>
+                <a:spcPct val="90000"/>
+              </a:lnSpc>
+              <a:spcBef>
+                <a:spcPts val="1000"/>
+              </a:spcBef>
+              <a:buFont typeface="Arial" panose="020B0604020202020204" pitchFamily="34" charset="0"/>
+              <a:buChar char="•"/>
+              <a:defRPr sz="2400" kern="1200">
+                <a:solidFill>
+                  <a:schemeClr val="tx1"/>
+                </a:solidFill>
+                <a:latin typeface="+mn-lt"/>
+                <a:ea typeface="+mn-ea"/>
+                <a:cs typeface="+mn-cs"/>
+              </a:defRPr>
+            </a:lvl1pPr>
+            <a:lvl2pPr marL="685800" indent="-228600" algn="l" defTabSz="914400" rtl="0" eaLnBrk="1" latinLnBrk="0" hangingPunct="1">
+              <a:lnSpc>
+                <a:spcPct val="90000"/>
+              </a:lnSpc>
+              <a:spcBef>
+                <a:spcPts val="500"/>
+              </a:spcBef>
+              <a:buFont typeface="Arial" panose="020B0604020202020204" pitchFamily="34" charset="0"/>
+              <a:buChar char="•"/>
+              <a:defRPr sz="2000" kern="1200">
+                <a:solidFill>
+                  <a:schemeClr val="tx1"/>
+                </a:solidFill>
+                <a:latin typeface="+mn-lt"/>
+                <a:ea typeface="+mn-ea"/>
+                <a:cs typeface="+mn-cs"/>
+              </a:defRPr>
+            </a:lvl2pPr>
+            <a:lvl3pPr marL="1143000" indent="-228600" algn="l" defTabSz="914400" rtl="0" eaLnBrk="1" latinLnBrk="0" hangingPunct="1">
+              <a:lnSpc>
+                <a:spcPct val="90000"/>
+              </a:lnSpc>
+              <a:spcBef>
+                <a:spcPts val="500"/>
+              </a:spcBef>
+              <a:buFont typeface="Arial" panose="020B0604020202020204" pitchFamily="34" charset="0"/>
+              <a:buChar char="•"/>
+              <a:defRPr sz="1800" kern="1200">
+                <a:solidFill>
+                  <a:schemeClr val="tx1"/>
+                </a:solidFill>
+                <a:latin typeface="+mn-lt"/>
+                <a:ea typeface="+mn-ea"/>
+                <a:cs typeface="+mn-cs"/>
+              </a:defRPr>
+            </a:lvl3pPr>
+            <a:lvl4pPr marL="1600200" indent="-228600" algn="l" defTabSz="914400" rtl="0" eaLnBrk="1" latinLnBrk="0" hangingPunct="1">
+              <a:lnSpc>
+                <a:spcPct val="90000"/>
+              </a:lnSpc>
+              <a:spcBef>
+                <a:spcPts val="500"/>
+              </a:spcBef>
+              <a:buFont typeface="Arial" panose="020B0604020202020204" pitchFamily="34" charset="0"/>
+              <a:buChar char="•"/>
+              <a:defRPr sz="1600" kern="1200">
+                <a:solidFill>
+                  <a:schemeClr val="tx1"/>
+                </a:solidFill>
+                <a:latin typeface="+mn-lt"/>
+                <a:ea typeface="+mn-ea"/>
+                <a:cs typeface="+mn-cs"/>
+              </a:defRPr>
+            </a:lvl4pPr>
+            <a:lvl5pPr marL="2057400" indent="-228600" algn="l" defTabSz="914400" rtl="0" eaLnBrk="1" latinLnBrk="0" hangingPunct="1">
+              <a:lnSpc>
+                <a:spcPct val="90000"/>
+              </a:lnSpc>
+              <a:spcBef>
+                <a:spcPts val="500"/>
+              </a:spcBef>
+              <a:buFont typeface="Arial" panose="020B0604020202020204" pitchFamily="34" charset="0"/>
+              <a:buChar char="•"/>
+              <a:defRPr sz="1600" kern="1200">
+                <a:solidFill>
+                  <a:schemeClr val="tx1"/>
+                </a:solidFill>
+                <a:latin typeface="+mn-lt"/>
+                <a:ea typeface="+mn-ea"/>
+                <a:cs typeface="+mn-cs"/>
+              </a:defRPr>
+            </a:lvl5pPr>
+            <a:lvl6pPr marL="2514600" indent="-228600" algn="l" defTabSz="914400" rtl="0" eaLnBrk="1" latinLnBrk="0" hangingPunct="1">
+              <a:lnSpc>
+                <a:spcPct val="90000"/>
+              </a:lnSpc>
+              <a:spcBef>
+                <a:spcPts val="500"/>
+              </a:spcBef>
+              <a:buFont typeface="Arial" panose="020B0604020202020204" pitchFamily="34" charset="0"/>
+              <a:buChar char="•"/>
+              <a:defRPr sz="1400" kern="1200">
+                <a:solidFill>
+                  <a:schemeClr val="tx1"/>
+                </a:solidFill>
+                <a:latin typeface="+mn-lt"/>
+                <a:ea typeface="+mn-ea"/>
+                <a:cs typeface="+mn-cs"/>
+              </a:defRPr>
+            </a:lvl6pPr>
+            <a:lvl7pPr marL="2971800" indent="-228600" algn="l" defTabSz="914400" rtl="0" eaLnBrk="1" latinLnBrk="0" hangingPunct="1">
+              <a:lnSpc>
+                <a:spcPct val="90000"/>
+              </a:lnSpc>
+              <a:spcBef>
+                <a:spcPts val="500"/>
+              </a:spcBef>
+              <a:buFont typeface="Arial" panose="020B0604020202020204" pitchFamily="34" charset="0"/>
+              <a:buChar char="•"/>
+              <a:defRPr sz="1400" kern="1200">
+                <a:solidFill>
+                  <a:schemeClr val="tx1"/>
+                </a:solidFill>
+                <a:latin typeface="+mn-lt"/>
+                <a:ea typeface="+mn-ea"/>
+                <a:cs typeface="+mn-cs"/>
+              </a:defRPr>
+            </a:lvl7pPr>
+            <a:lvl8pPr marL="3429000" indent="-228600" algn="l" defTabSz="914400" rtl="0" eaLnBrk="1" latinLnBrk="0" hangingPunct="1">
+              <a:lnSpc>
+                <a:spcPct val="90000"/>
+              </a:lnSpc>
+              <a:spcBef>
+                <a:spcPts val="500"/>
+              </a:spcBef>
+              <a:buFont typeface="Arial" panose="020B0604020202020204" pitchFamily="34" charset="0"/>
+              <a:buChar char="•"/>
+              <a:defRPr sz="1400" kern="1200">
+                <a:solidFill>
+                  <a:schemeClr val="tx1"/>
+                </a:solidFill>
+                <a:latin typeface="+mn-lt"/>
+                <a:ea typeface="+mn-ea"/>
+                <a:cs typeface="+mn-cs"/>
+              </a:defRPr>
+            </a:lvl8pPr>
+            <a:lvl9pPr marL="3886200" indent="-228600" algn="l" defTabSz="914400" rtl="0" eaLnBrk="1" latinLnBrk="0" hangingPunct="1">
+              <a:lnSpc>
+                <a:spcPct val="90000"/>
+              </a:lnSpc>
+              <a:spcBef>
+                <a:spcPts val="500"/>
+              </a:spcBef>
+              <a:buFont typeface="Arial" panose="020B0604020202020204" pitchFamily="34" charset="0"/>
+              <a:buChar char="•"/>
+              <a:defRPr sz="1400" kern="1200">
+                <a:solidFill>
+                  <a:schemeClr val="tx1"/>
+                </a:solidFill>
+                <a:latin typeface="+mn-lt"/>
+                <a:ea typeface="+mn-ea"/>
+                <a:cs typeface="+mn-cs"/>
+              </a:defRPr>
+            </a:lvl9pPr>
+          </a:lstStyle>
+          <a:p>
+            <a:pPr marL="0" indent="0">
+              <a:buFont typeface="Arial" panose="020B0604020202020204" pitchFamily="34" charset="0"/>
+              <a:buNone/>
+            </a:pPr>
+            <a:r>
+              <a:rPr lang="en-US" dirty="0"/>
+              <a:t>Mocking can intercept application code for unit testing purposes.</a:t>
+            </a:r>
+          </a:p>
+          <a:p>
+            <a:pPr marL="0" indent="0">
+              <a:buFont typeface="Arial" panose="020B0604020202020204" pitchFamily="34" charset="0"/>
+              <a:buNone/>
+            </a:pPr>
+            <a:r>
+              <a:rPr lang="en-US" dirty="0"/>
+              <a:t>Pass the built-in fixture named “mocker” to your test case.</a:t>
+            </a:r>
+          </a:p>
+          <a:p>
+            <a:pPr marL="0" indent="0">
+              <a:buFont typeface="Arial" panose="020B0604020202020204" pitchFamily="34" charset="0"/>
+              <a:buNone/>
+            </a:pPr>
+            <a:r>
+              <a:rPr lang="en-US" dirty="0"/>
+              <a:t>Use </a:t>
+            </a:r>
+            <a:r>
+              <a:rPr lang="en-US" dirty="0" err="1"/>
+              <a:t>mocker.patch</a:t>
+            </a:r>
+            <a:r>
+              <a:rPr lang="en-US" dirty="0"/>
+              <a:t> to replace application code with a mock function.</a:t>
+            </a:r>
+          </a:p>
+          <a:p>
+            <a:pPr marL="0" indent="0">
+              <a:buFont typeface="Arial" panose="020B0604020202020204" pitchFamily="34" charset="0"/>
+              <a:buNone/>
+            </a:pPr>
+            <a:endParaRPr lang="en-US" dirty="0"/>
+          </a:p>
+          <a:p>
+            <a:pPr marL="0" indent="0">
+              <a:buFont typeface="Arial" panose="020B0604020202020204" pitchFamily="34" charset="0"/>
+              <a:buNone/>
+            </a:pPr>
+            <a:endParaRPr lang="en-US" dirty="0"/>
+          </a:p>
+          <a:p>
+            <a:pPr marL="0" indent="0">
+              <a:buFont typeface="Arial" panose="020B0604020202020204" pitchFamily="34" charset="0"/>
+              <a:buNone/>
+            </a:pPr>
+            <a:endParaRPr lang="en-US" dirty="0"/>
+          </a:p>
+          <a:p>
+            <a:pPr marL="0" indent="0">
+              <a:buFont typeface="Arial" panose="020B0604020202020204" pitchFamily="34" charset="0"/>
+              <a:buNone/>
+            </a:pPr>
+            <a:endParaRPr lang="en-US" dirty="0"/>
+          </a:p>
+          <a:p>
+            <a:pPr marL="0" indent="0">
+              <a:buFont typeface="Arial" panose="020B0604020202020204" pitchFamily="34" charset="0"/>
+              <a:buNone/>
+            </a:pPr>
+            <a:endParaRPr lang="en-US" dirty="0"/>
+          </a:p>
+          <a:p>
+            <a:pPr marL="0" indent="0">
+              <a:buFont typeface="Arial" panose="020B0604020202020204" pitchFamily="34" charset="0"/>
+              <a:buNone/>
+            </a:pPr>
+            <a:endParaRPr lang="en-US" dirty="0"/>
+          </a:p>
+          <a:p>
+            <a:pPr marL="0" indent="0">
+              <a:buFont typeface="Arial" panose="020B0604020202020204" pitchFamily="34" charset="0"/>
+              <a:buNone/>
+            </a:pPr>
+            <a:endParaRPr lang="en-US" dirty="0"/>
+          </a:p>
+          <a:p>
+            <a:pPr marL="0" indent="0">
+              <a:buFont typeface="Arial" panose="020B0604020202020204" pitchFamily="34" charset="0"/>
+              <a:buNone/>
+            </a:pPr>
+            <a:r>
+              <a:rPr lang="en-US" dirty="0"/>
+              <a:t>When the application code constructs the </a:t>
+            </a:r>
+            <a:r>
+              <a:rPr lang="en-US" dirty="0" err="1"/>
+              <a:t>flask.Response</a:t>
+            </a:r>
+            <a:r>
+              <a:rPr lang="en-US" dirty="0"/>
+              <a:t>() we intercept and assert.</a:t>
+            </a:r>
+          </a:p>
+        </p:txBody>
+      </p:sp>
+      <p:sp>
+        <p:nvSpPr>
+          <p:cNvPr id="6" name="TextBox 5">
+            <a:extLst>
+              <a:ext uri="{FF2B5EF4-FFF2-40B4-BE49-F238E27FC236}">
+                <a16:creationId xmlns:a16="http://schemas.microsoft.com/office/drawing/2014/main" id="{D5CA6394-07D3-0950-91DC-E228A78B252B}"/>
+              </a:ext>
+            </a:extLst>
+          </p:cNvPr>
+          <p:cNvSpPr txBox="1"/>
+          <p:nvPr/>
+        </p:nvSpPr>
+        <p:spPr>
+          <a:xfrm>
+            <a:off x="999231" y="3278992"/>
+            <a:ext cx="9712291" cy="2554545"/>
+          </a:xfrm>
+          <a:prstGeom prst="rect">
+            <a:avLst/>
+          </a:prstGeom>
+          <a:noFill/>
+        </p:spPr>
+        <p:txBody>
+          <a:bodyPr wrap="square">
+            <a:spAutoFit/>
+          </a:bodyPr>
+          <a:lstStyle/>
+          <a:p>
+            <a:r>
+              <a:rPr lang="en-US" sz="2000" b="0" dirty="0">
+                <a:solidFill>
+                  <a:srgbClr val="0000FF"/>
+                </a:solidFill>
+                <a:effectLst/>
+                <a:latin typeface="Menlo" panose="020B0609030804020204" pitchFamily="49" charset="0"/>
+              </a:rPr>
+              <a:t>def</a:t>
+            </a:r>
+            <a:r>
+              <a:rPr lang="en-US" sz="2000" b="0" dirty="0">
+                <a:solidFill>
+                  <a:srgbClr val="000000"/>
+                </a:solidFill>
+                <a:effectLst/>
+                <a:latin typeface="Menlo" panose="020B0609030804020204" pitchFamily="49" charset="0"/>
+              </a:rPr>
+              <a:t> </a:t>
+            </a:r>
+            <a:r>
+              <a:rPr lang="en-US" sz="2000" b="0" dirty="0" err="1">
+                <a:solidFill>
+                  <a:srgbClr val="000000"/>
+                </a:solidFill>
+                <a:effectLst/>
+                <a:latin typeface="Menlo" panose="020B0609030804020204" pitchFamily="49" charset="0"/>
+              </a:rPr>
+              <a:t>test_lookup_id</a:t>
+            </a:r>
+            <a:r>
+              <a:rPr lang="en-US" sz="2000" b="0" dirty="0">
+                <a:solidFill>
+                  <a:srgbClr val="000000"/>
+                </a:solidFill>
+                <a:effectLst/>
+                <a:latin typeface="Menlo" panose="020B0609030804020204" pitchFamily="49" charset="0"/>
+              </a:rPr>
+              <a:t>(mocker):</a:t>
+            </a:r>
+          </a:p>
+          <a:p>
+            <a:br>
+              <a:rPr lang="en-US" sz="2000" b="0" dirty="0">
+                <a:solidFill>
+                  <a:srgbClr val="000000"/>
+                </a:solidFill>
+                <a:effectLst/>
+                <a:latin typeface="Menlo" panose="020B0609030804020204" pitchFamily="49" charset="0"/>
+              </a:rPr>
+            </a:br>
+            <a:r>
+              <a:rPr lang="en-US" sz="2000" b="0" dirty="0">
+                <a:solidFill>
+                  <a:srgbClr val="000000"/>
+                </a:solidFill>
+                <a:effectLst/>
+                <a:latin typeface="Menlo" panose="020B0609030804020204" pitchFamily="49" charset="0"/>
+              </a:rPr>
+              <a:t>	</a:t>
+            </a:r>
+            <a:r>
+              <a:rPr lang="en-US" sz="2000" b="0" dirty="0">
+                <a:solidFill>
+                  <a:srgbClr val="0000FF"/>
+                </a:solidFill>
+                <a:effectLst/>
+                <a:latin typeface="Menlo" panose="020B0609030804020204" pitchFamily="49" charset="0"/>
+              </a:rPr>
+              <a:t>def</a:t>
+            </a:r>
+            <a:r>
+              <a:rPr lang="en-US" sz="2000" b="0" dirty="0">
+                <a:solidFill>
+                  <a:srgbClr val="000000"/>
+                </a:solidFill>
+                <a:effectLst/>
+                <a:latin typeface="Menlo" panose="020B0609030804020204" pitchFamily="49" charset="0"/>
+              </a:rPr>
+              <a:t> </a:t>
+            </a:r>
+            <a:r>
+              <a:rPr lang="en-US" sz="2000" b="0" dirty="0" err="1">
+                <a:solidFill>
+                  <a:srgbClr val="000000"/>
+                </a:solidFill>
+                <a:effectLst/>
+                <a:latin typeface="Menlo" panose="020B0609030804020204" pitchFamily="49" charset="0"/>
+              </a:rPr>
+              <a:t>mock_response</a:t>
+            </a:r>
+            <a:r>
+              <a:rPr lang="en-US" sz="2000" b="0" dirty="0">
+                <a:solidFill>
+                  <a:srgbClr val="000000"/>
+                </a:solidFill>
+                <a:effectLst/>
+                <a:latin typeface="Menlo" panose="020B0609030804020204" pitchFamily="49" charset="0"/>
+              </a:rPr>
+              <a:t>(content):</a:t>
+            </a:r>
+          </a:p>
+          <a:p>
+            <a:r>
+              <a:rPr lang="en-US" sz="2000" b="0" dirty="0">
+                <a:solidFill>
+                  <a:srgbClr val="0000FF"/>
+                </a:solidFill>
+                <a:effectLst/>
+                <a:latin typeface="Menlo" panose="020B0609030804020204" pitchFamily="49" charset="0"/>
+              </a:rPr>
+              <a:t>		assert</a:t>
+            </a:r>
+            <a:r>
+              <a:rPr lang="en-US" sz="2000" b="0" dirty="0">
+                <a:solidFill>
+                  <a:srgbClr val="000000"/>
+                </a:solidFill>
+                <a:effectLst/>
+                <a:latin typeface="Menlo" panose="020B0609030804020204" pitchFamily="49" charset="0"/>
+              </a:rPr>
+              <a:t> </a:t>
+            </a:r>
+            <a:r>
+              <a:rPr lang="en-US" sz="2000" b="0" dirty="0">
+                <a:solidFill>
+                  <a:srgbClr val="A31515"/>
+                </a:solidFill>
+                <a:effectLst/>
+                <a:latin typeface="Menlo" panose="020B0609030804020204" pitchFamily="49" charset="0"/>
+              </a:rPr>
+              <a:t>"How many dwarfs are not happy"</a:t>
+            </a:r>
+            <a:r>
+              <a:rPr lang="en-US" sz="2000" b="0" dirty="0">
+                <a:solidFill>
+                  <a:srgbClr val="000000"/>
+                </a:solidFill>
+                <a:effectLst/>
+                <a:latin typeface="Menlo" panose="020B0609030804020204" pitchFamily="49" charset="0"/>
+              </a:rPr>
+              <a:t> </a:t>
+            </a:r>
+            <a:r>
+              <a:rPr lang="en-US" sz="2000" b="0" dirty="0">
+                <a:solidFill>
+                  <a:srgbClr val="0000FF"/>
+                </a:solidFill>
+                <a:effectLst/>
+                <a:latin typeface="Menlo" panose="020B0609030804020204" pitchFamily="49" charset="0"/>
+              </a:rPr>
+              <a:t>in</a:t>
+            </a:r>
+            <a:r>
+              <a:rPr lang="en-US" sz="2000" b="0" dirty="0">
+                <a:solidFill>
+                  <a:srgbClr val="000000"/>
+                </a:solidFill>
+                <a:effectLst/>
+                <a:latin typeface="Menlo" panose="020B0609030804020204" pitchFamily="49" charset="0"/>
+              </a:rPr>
+              <a:t> str(content)</a:t>
+            </a:r>
+          </a:p>
+          <a:p>
+            <a:r>
+              <a:rPr lang="en-US" sz="2000" b="0" dirty="0">
+                <a:solidFill>
+                  <a:srgbClr val="0000FF"/>
+                </a:solidFill>
+                <a:effectLst/>
+                <a:latin typeface="Menlo" panose="020B0609030804020204" pitchFamily="49" charset="0"/>
+              </a:rPr>
+              <a:t>		assert</a:t>
+            </a:r>
+            <a:r>
+              <a:rPr lang="en-US" sz="2000" b="0" dirty="0">
+                <a:solidFill>
+                  <a:srgbClr val="000000"/>
+                </a:solidFill>
+                <a:effectLst/>
+                <a:latin typeface="Menlo" panose="020B0609030804020204" pitchFamily="49" charset="0"/>
+              </a:rPr>
+              <a:t> </a:t>
+            </a:r>
+            <a:r>
+              <a:rPr lang="en-US" sz="2000" b="0" dirty="0">
+                <a:solidFill>
+                  <a:srgbClr val="A31515"/>
+                </a:solidFill>
+                <a:effectLst/>
+                <a:latin typeface="Menlo" panose="020B0609030804020204" pitchFamily="49" charset="0"/>
+              </a:rPr>
+              <a:t>"6"</a:t>
+            </a:r>
+            <a:r>
+              <a:rPr lang="en-US" sz="2000" b="0" dirty="0">
+                <a:solidFill>
+                  <a:srgbClr val="000000"/>
+                </a:solidFill>
+                <a:effectLst/>
+                <a:latin typeface="Menlo" panose="020B0609030804020204" pitchFamily="49" charset="0"/>
+              </a:rPr>
+              <a:t> </a:t>
+            </a:r>
+            <a:r>
+              <a:rPr lang="en-US" sz="2000" b="0" dirty="0">
+                <a:solidFill>
+                  <a:srgbClr val="0000FF"/>
+                </a:solidFill>
+                <a:effectLst/>
+                <a:latin typeface="Menlo" panose="020B0609030804020204" pitchFamily="49" charset="0"/>
+              </a:rPr>
+              <a:t>in</a:t>
+            </a:r>
+            <a:r>
+              <a:rPr lang="en-US" sz="2000" b="0" dirty="0">
+                <a:solidFill>
+                  <a:srgbClr val="000000"/>
+                </a:solidFill>
+                <a:effectLst/>
+                <a:latin typeface="Menlo" panose="020B0609030804020204" pitchFamily="49" charset="0"/>
+              </a:rPr>
+              <a:t> str(content)</a:t>
+            </a:r>
+          </a:p>
+          <a:p>
+            <a:br>
+              <a:rPr lang="en-US" sz="2000" b="0" dirty="0">
+                <a:solidFill>
+                  <a:srgbClr val="000000"/>
+                </a:solidFill>
+                <a:effectLst/>
+                <a:latin typeface="Menlo" panose="020B0609030804020204" pitchFamily="49" charset="0"/>
+              </a:rPr>
+            </a:br>
+            <a:r>
+              <a:rPr lang="en-US" sz="2000" b="0" dirty="0">
+                <a:solidFill>
+                  <a:srgbClr val="000000"/>
+                </a:solidFill>
+                <a:effectLst/>
+                <a:latin typeface="Menlo" panose="020B0609030804020204" pitchFamily="49" charset="0"/>
+              </a:rPr>
+              <a:t>	</a:t>
+            </a:r>
+            <a:r>
+              <a:rPr lang="en-US" sz="2000" b="0" dirty="0" err="1">
+                <a:solidFill>
+                  <a:srgbClr val="000000"/>
+                </a:solidFill>
+                <a:effectLst/>
+                <a:latin typeface="Menlo" panose="020B0609030804020204" pitchFamily="49" charset="0"/>
+              </a:rPr>
+              <a:t>mocker.patch</a:t>
+            </a:r>
+            <a:r>
+              <a:rPr lang="en-US" sz="2000" b="0" dirty="0">
+                <a:solidFill>
+                  <a:srgbClr val="000000"/>
+                </a:solidFill>
+                <a:effectLst/>
+                <a:latin typeface="Menlo" panose="020B0609030804020204" pitchFamily="49" charset="0"/>
+              </a:rPr>
+              <a:t>(</a:t>
+            </a:r>
+            <a:r>
+              <a:rPr lang="en-US" sz="2000" b="0" dirty="0">
+                <a:solidFill>
+                  <a:srgbClr val="A31515"/>
+                </a:solidFill>
+                <a:effectLst/>
+                <a:latin typeface="Menlo" panose="020B0609030804020204" pitchFamily="49" charset="0"/>
+              </a:rPr>
+              <a:t>"</a:t>
+            </a:r>
+            <a:r>
+              <a:rPr lang="en-US" sz="2000" b="0" dirty="0" err="1">
+                <a:solidFill>
+                  <a:srgbClr val="A31515"/>
+                </a:solidFill>
+                <a:effectLst/>
+                <a:latin typeface="Menlo" panose="020B0609030804020204" pitchFamily="49" charset="0"/>
+              </a:rPr>
+              <a:t>flask.Response</a:t>
+            </a:r>
+            <a:r>
+              <a:rPr lang="en-US" sz="2000" b="0" dirty="0">
+                <a:solidFill>
+                  <a:srgbClr val="A31515"/>
+                </a:solidFill>
+                <a:effectLst/>
+                <a:latin typeface="Menlo" panose="020B0609030804020204" pitchFamily="49" charset="0"/>
+              </a:rPr>
+              <a:t>"</a:t>
+            </a:r>
+            <a:r>
+              <a:rPr lang="en-US" sz="2000" b="0" dirty="0">
+                <a:solidFill>
+                  <a:srgbClr val="000000"/>
+                </a:solidFill>
+                <a:effectLst/>
+                <a:latin typeface="Menlo" panose="020B0609030804020204" pitchFamily="49" charset="0"/>
+              </a:rPr>
+              <a:t>, </a:t>
+            </a:r>
+            <a:r>
+              <a:rPr lang="en-US" sz="2000" b="0" dirty="0" err="1">
+                <a:solidFill>
+                  <a:srgbClr val="000000"/>
+                </a:solidFill>
+                <a:effectLst/>
+                <a:latin typeface="Menlo" panose="020B0609030804020204" pitchFamily="49" charset="0"/>
+              </a:rPr>
+              <a:t>side_effect</a:t>
+            </a:r>
+            <a:r>
+              <a:rPr lang="en-US" sz="2000" b="0" dirty="0">
+                <a:solidFill>
+                  <a:srgbClr val="000000"/>
+                </a:solidFill>
+                <a:effectLst/>
+                <a:latin typeface="Menlo" panose="020B0609030804020204" pitchFamily="49" charset="0"/>
+              </a:rPr>
+              <a:t>=</a:t>
+            </a:r>
+            <a:r>
+              <a:rPr lang="en-US" sz="2000" b="0" dirty="0" err="1">
+                <a:solidFill>
+                  <a:srgbClr val="000000"/>
+                </a:solidFill>
+                <a:effectLst/>
+                <a:latin typeface="Menlo" panose="020B0609030804020204" pitchFamily="49" charset="0"/>
+              </a:rPr>
+              <a:t>mock_response</a:t>
+            </a:r>
+            <a:r>
+              <a:rPr lang="en-US" sz="2000" b="0" dirty="0">
+                <a:solidFill>
+                  <a:srgbClr val="000000"/>
+                </a:solidFill>
+                <a:effectLst/>
+                <a:latin typeface="Menlo" panose="020B0609030804020204" pitchFamily="49" charset="0"/>
+              </a:rPr>
+              <a:t>)</a:t>
+            </a:r>
+          </a:p>
+          <a:p>
+            <a:r>
+              <a:rPr lang="en-US" sz="2000" b="0" dirty="0">
+                <a:solidFill>
+                  <a:srgbClr val="000000"/>
+                </a:solidFill>
+                <a:effectLst/>
+                <a:latin typeface="Menlo" panose="020B0609030804020204" pitchFamily="49" charset="0"/>
+              </a:rPr>
+              <a:t>	</a:t>
+            </a:r>
+            <a:r>
+              <a:rPr lang="en-US" sz="2000" b="0" dirty="0" err="1">
+                <a:solidFill>
+                  <a:srgbClr val="000000"/>
+                </a:solidFill>
+                <a:effectLst/>
+                <a:latin typeface="Menlo" panose="020B0609030804020204" pitchFamily="49" charset="0"/>
+              </a:rPr>
+              <a:t>flask_app.get_questions</a:t>
+            </a:r>
+            <a:r>
+              <a:rPr lang="en-US" sz="2000" b="0" dirty="0">
+                <a:solidFill>
+                  <a:srgbClr val="000000"/>
+                </a:solidFill>
+                <a:effectLst/>
+                <a:latin typeface="Menlo" panose="020B0609030804020204" pitchFamily="49" charset="0"/>
+              </a:rPr>
+              <a:t>()</a:t>
+            </a:r>
+          </a:p>
+        </p:txBody>
+      </p:sp>
+    </p:spTree>
+    <p:extLst>
+      <p:ext uri="{BB962C8B-B14F-4D97-AF65-F5344CB8AC3E}">
+        <p14:creationId xmlns:p14="http://schemas.microsoft.com/office/powerpoint/2010/main" val="3094346168"/>
+      </p:ext>
+    </p:extLst>
+  </p:cSld>
+  <p:clrMapOvr>
+    <a:masterClrMapping/>
+  </p:clrMapOvr>
+</p:sld>
+</file>
+
+<file path=ppt/slides/slide14.xml><?xml version="1.0" encoding="utf-8"?>
+<p:sld xmlns:a="http://schemas.openxmlformats.org/drawingml/2006/main" xmlns:r="http://schemas.openxmlformats.org/officeDocument/2006/relationships" xmlns:p="http://schemas.openxmlformats.org/presentationml/2006/main">
+  <p:cSld>
+    <p:spTree>
+      <p:nvGrpSpPr>
+        <p:cNvPr id="1" name=""/>
+        <p:cNvGrpSpPr/>
+        <p:nvPr/>
+      </p:nvGrpSpPr>
+      <p:grpSpPr>
+        <a:xfrm>
+          <a:off x="0" y="0"/>
+          <a:ext cx="0" cy="0"/>
+          <a:chOff x="0" y="0"/>
+          <a:chExt cx="0" cy="0"/>
+        </a:xfrm>
+      </p:grpSpPr>
+      <p:sp>
+        <p:nvSpPr>
+          <p:cNvPr id="2" name="Title 1">
+            <a:extLst>
+              <a:ext uri="{FF2B5EF4-FFF2-40B4-BE49-F238E27FC236}">
                 <a16:creationId xmlns:a16="http://schemas.microsoft.com/office/drawing/2014/main" id="{2EDB1030-15CE-F6DC-C139-A0BC21ED159D}"/>
               </a:ext>
             </a:extLst>
@@ -10427,7 +11379,7 @@
 </p:sld>
 </file>
 
-<file path=ppt/slides/slide13.xml><?xml version="1.0" encoding="utf-8"?>
+<file path=ppt/slides/slide15.xml><?xml version="1.0" encoding="utf-8"?>
 <p:sld xmlns:a="http://schemas.openxmlformats.org/drawingml/2006/main" xmlns:r="http://schemas.openxmlformats.org/officeDocument/2006/relationships" xmlns:p="http://schemas.openxmlformats.org/presentationml/2006/main">
   <p:cSld>
     <p:spTree>
@@ -10922,7 +11874,7 @@
 </p:sld>
 </file>
 
-<file path=ppt/slides/slide14.xml><?xml version="1.0" encoding="utf-8"?>
+<file path=ppt/slides/slide16.xml><?xml version="1.0" encoding="utf-8"?>
 <p:sld xmlns:a="http://schemas.openxmlformats.org/drawingml/2006/main" xmlns:r="http://schemas.openxmlformats.org/officeDocument/2006/relationships" xmlns:p="http://schemas.openxmlformats.org/presentationml/2006/main">
   <p:cSld>
     <p:spTree>
@@ -11213,1009 +12165,6 @@
       </p:par>
     </p:tnLst>
   </p:timing>
-</p:sld>
-</file>
-
-<file path=ppt/slides/slide15.xml><?xml version="1.0" encoding="utf-8"?>
-<p:sld xmlns:a="http://schemas.openxmlformats.org/drawingml/2006/main" xmlns:r="http://schemas.openxmlformats.org/officeDocument/2006/relationships" xmlns:p="http://schemas.openxmlformats.org/presentationml/2006/main">
-  <p:cSld>
-    <p:spTree>
-      <p:nvGrpSpPr>
-        <p:cNvPr id="1" name=""/>
-        <p:cNvGrpSpPr/>
-        <p:nvPr/>
-      </p:nvGrpSpPr>
-      <p:grpSpPr>
-        <a:xfrm>
-          <a:off x="0" y="0"/>
-          <a:ext cx="0" cy="0"/>
-          <a:chOff x="0" y="0"/>
-          <a:chExt cx="0" cy="0"/>
-        </a:xfrm>
-      </p:grpSpPr>
-      <p:sp>
-        <p:nvSpPr>
-          <p:cNvPr id="2" name="Title 1">
-            <a:extLst>
-              <a:ext uri="{FF2B5EF4-FFF2-40B4-BE49-F238E27FC236}">
-                <a16:creationId xmlns:a16="http://schemas.microsoft.com/office/drawing/2014/main" id="{66BD9AD9-672C-A2D1-FA72-61197115C966}"/>
-              </a:ext>
-            </a:extLst>
-          </p:cNvPr>
-          <p:cNvSpPr>
-            <a:spLocks noGrp="1"/>
-          </p:cNvSpPr>
-          <p:nvPr>
-            <p:ph type="title"/>
-          </p:nvPr>
-        </p:nvSpPr>
-        <p:spPr/>
-        <p:txBody>
-          <a:bodyPr/>
-          <a:lstStyle/>
-          <a:p>
-            <a:r>
-              <a:rPr lang="en-US" dirty="0"/>
-              <a:t>Mocks</a:t>
-            </a:r>
-          </a:p>
-        </p:txBody>
-      </p:sp>
-      <p:sp>
-        <p:nvSpPr>
-          <p:cNvPr id="3" name="Content Placeholder 2">
-            <a:extLst>
-              <a:ext uri="{FF2B5EF4-FFF2-40B4-BE49-F238E27FC236}">
-                <a16:creationId xmlns:a16="http://schemas.microsoft.com/office/drawing/2014/main" id="{24586C43-62D7-4038-7910-C54F82FDE39B}"/>
-              </a:ext>
-            </a:extLst>
-          </p:cNvPr>
-          <p:cNvSpPr>
-            <a:spLocks noGrp="1"/>
-          </p:cNvSpPr>
-          <p:nvPr>
-            <p:ph idx="1"/>
-          </p:nvPr>
-        </p:nvSpPr>
-        <p:spPr/>
-        <p:txBody>
-          <a:bodyPr>
-            <a:normAutofit lnSpcReduction="10000"/>
-          </a:bodyPr>
-          <a:lstStyle/>
-          <a:p>
-            <a:pPr marL="0" indent="0">
-              <a:buNone/>
-            </a:pPr>
-            <a:r>
-              <a:rPr lang="en-US" dirty="0"/>
-              <a:t>Problem:</a:t>
-            </a:r>
-          </a:p>
-          <a:p>
-            <a:pPr marL="0" indent="0">
-              <a:buNone/>
-            </a:pPr>
-            <a:r>
-              <a:rPr lang="en-US" dirty="0"/>
-              <a:t>	How do you write unit tests when your code…</a:t>
-            </a:r>
-          </a:p>
-          <a:p>
-            <a:pPr marL="0" indent="0">
-              <a:buNone/>
-            </a:pPr>
-            <a:r>
-              <a:rPr lang="en-US" dirty="0"/>
-              <a:t>		* Reads and writes from a database.</a:t>
-            </a:r>
-          </a:p>
-          <a:p>
-            <a:pPr marL="0" indent="0">
-              <a:buNone/>
-            </a:pPr>
-            <a:r>
-              <a:rPr lang="en-US" dirty="0"/>
-              <a:t>		* Reads or writes to a GPFS file on a specific server.</a:t>
-            </a:r>
-          </a:p>
-          <a:p>
-            <a:pPr marL="0" indent="0">
-              <a:buNone/>
-            </a:pPr>
-            <a:r>
-              <a:rPr lang="en-US" dirty="0"/>
-              <a:t>		* Makes API calls to an external server.</a:t>
-            </a:r>
-          </a:p>
-          <a:p>
-            <a:pPr marL="0" indent="0">
-              <a:buNone/>
-            </a:pPr>
-            <a:r>
-              <a:rPr lang="en-US" dirty="0"/>
-              <a:t>		* Makes calls to other complex packages.</a:t>
-            </a:r>
-          </a:p>
-          <a:p>
-            <a:pPr marL="0" indent="0">
-              <a:buNone/>
-            </a:pPr>
-            <a:endParaRPr lang="en-US" dirty="0"/>
-          </a:p>
-          <a:p>
-            <a:pPr marL="0" indent="0">
-              <a:buNone/>
-            </a:pPr>
-            <a:r>
-              <a:rPr lang="en-US" dirty="0"/>
-              <a:t>Mocks to the rescue!</a:t>
-            </a:r>
-          </a:p>
-        </p:txBody>
-      </p:sp>
-    </p:spTree>
-    <p:extLst>
-      <p:ext uri="{BB962C8B-B14F-4D97-AF65-F5344CB8AC3E}">
-        <p14:creationId xmlns:p14="http://schemas.microsoft.com/office/powerpoint/2010/main" val="4189516893"/>
-      </p:ext>
-    </p:extLst>
-  </p:cSld>
-  <p:clrMapOvr>
-    <a:masterClrMapping/>
-  </p:clrMapOvr>
-  <p:timing>
-    <p:tnLst>
-      <p:par>
-        <p:cTn id="1" dur="indefinite" restart="never" nodeType="tmRoot">
-          <p:childTnLst>
-            <p:seq concurrent="1" nextAc="seek">
-              <p:cTn id="2" dur="indefinite" nodeType="mainSeq">
-                <p:childTnLst>
-                  <p:par>
-                    <p:cTn id="3" fill="hold">
-                      <p:stCondLst>
-                        <p:cond delay="indefinite"/>
-                      </p:stCondLst>
-                      <p:childTnLst>
-                        <p:par>
-                          <p:cTn id="4" fill="hold">
-                            <p:stCondLst>
-                              <p:cond delay="0"/>
-                            </p:stCondLst>
-                            <p:childTnLst>
-                              <p:par>
-                                <p:cTn id="5" presetID="1" presetClass="entr" presetSubtype="0" fill="hold" nodeType="clickEffect">
-                                  <p:stCondLst>
-                                    <p:cond delay="0"/>
-                                  </p:stCondLst>
-                                  <p:childTnLst>
-                                    <p:set>
-                                      <p:cBhvr>
-                                        <p:cTn id="6" dur="1" fill="hold">
-                                          <p:stCondLst>
-                                            <p:cond delay="0"/>
-                                          </p:stCondLst>
-                                        </p:cTn>
-                                        <p:tgtEl>
-                                          <p:spTgt spid="3">
-                                            <p:txEl>
-                                              <p:pRg st="7" end="7"/>
-                                            </p:txEl>
-                                          </p:spTgt>
-                                        </p:tgtEl>
-                                        <p:attrNameLst>
-                                          <p:attrName>style.visibility</p:attrName>
-                                        </p:attrNameLst>
-                                      </p:cBhvr>
-                                      <p:to>
-                                        <p:strVal val="visible"/>
-                                      </p:to>
-                                    </p:set>
-                                  </p:childTnLst>
-                                </p:cTn>
-                              </p:par>
-                            </p:childTnLst>
-                          </p:cTn>
-                        </p:par>
-                      </p:childTnLst>
-                    </p:cTn>
-                  </p:par>
-                </p:childTnLst>
-              </p:cTn>
-              <p:prevCondLst>
-                <p:cond evt="onPrev" delay="0">
-                  <p:tgtEl>
-                    <p:sldTgt/>
-                  </p:tgtEl>
-                </p:cond>
-              </p:prevCondLst>
-              <p:nextCondLst>
-                <p:cond evt="onNext" delay="0">
-                  <p:tgtEl>
-                    <p:sldTgt/>
-                  </p:tgtEl>
-                </p:cond>
-              </p:nextCondLst>
-            </p:seq>
-          </p:childTnLst>
-        </p:cTn>
-      </p:par>
-    </p:tnLst>
-  </p:timing>
-</p:sld>
-</file>
-
-<file path=ppt/slides/slide16.xml><?xml version="1.0" encoding="utf-8"?>
-<p:sld xmlns:a="http://schemas.openxmlformats.org/drawingml/2006/main" xmlns:r="http://schemas.openxmlformats.org/officeDocument/2006/relationships" xmlns:p="http://schemas.openxmlformats.org/presentationml/2006/main">
-  <p:cSld>
-    <p:spTree>
-      <p:nvGrpSpPr>
-        <p:cNvPr id="1" name=""/>
-        <p:cNvGrpSpPr/>
-        <p:nvPr/>
-      </p:nvGrpSpPr>
-      <p:grpSpPr>
-        <a:xfrm>
-          <a:off x="0" y="0"/>
-          <a:ext cx="0" cy="0"/>
-          <a:chOff x="0" y="0"/>
-          <a:chExt cx="0" cy="0"/>
-        </a:xfrm>
-      </p:grpSpPr>
-      <p:sp>
-        <p:nvSpPr>
-          <p:cNvPr id="2" name="Title 1">
-            <a:extLst>
-              <a:ext uri="{FF2B5EF4-FFF2-40B4-BE49-F238E27FC236}">
-                <a16:creationId xmlns:a16="http://schemas.microsoft.com/office/drawing/2014/main" id="{1214BFEF-DE70-D65F-9F8C-D69BAA391C9E}"/>
-              </a:ext>
-            </a:extLst>
-          </p:cNvPr>
-          <p:cNvSpPr>
-            <a:spLocks noGrp="1"/>
-          </p:cNvSpPr>
-          <p:nvPr>
-            <p:ph type="title"/>
-          </p:nvPr>
-        </p:nvSpPr>
-        <p:spPr/>
-        <p:txBody>
-          <a:bodyPr/>
-          <a:lstStyle/>
-          <a:p>
-            <a:r>
-              <a:rPr lang="en-US" dirty="0"/>
-              <a:t>02 </a:t>
-            </a:r>
-            <a:r>
-              <a:rPr lang="en-US" dirty="0" err="1"/>
-              <a:t>Pytest</a:t>
-            </a:r>
-            <a:r>
-              <a:rPr lang="en-US" dirty="0"/>
-              <a:t> Mocks</a:t>
-            </a:r>
-          </a:p>
-        </p:txBody>
-      </p:sp>
-      <p:sp>
-        <p:nvSpPr>
-          <p:cNvPr id="4" name="Content Placeholder 2">
-            <a:extLst>
-              <a:ext uri="{FF2B5EF4-FFF2-40B4-BE49-F238E27FC236}">
-                <a16:creationId xmlns:a16="http://schemas.microsoft.com/office/drawing/2014/main" id="{27F17B72-0F00-CCA8-28AF-E05D098A321B}"/>
-              </a:ext>
-            </a:extLst>
-          </p:cNvPr>
-          <p:cNvSpPr txBox="1">
-            <a:spLocks/>
-          </p:cNvSpPr>
-          <p:nvPr/>
-        </p:nvSpPr>
-        <p:spPr>
-          <a:xfrm>
-            <a:off x="444794" y="2008909"/>
-            <a:ext cx="10747975" cy="4655127"/>
-          </a:xfrm>
-          <a:prstGeom prst="rect">
-            <a:avLst/>
-          </a:prstGeom>
-        </p:spPr>
-        <p:txBody>
-          <a:bodyPr vert="horz" lIns="91440" tIns="45720" rIns="91440" bIns="45720" rtlCol="0">
-            <a:normAutofit fontScale="92500" lnSpcReduction="10000"/>
-          </a:bodyPr>
-          <a:lstStyle>
-            <a:lvl1pPr marL="228600" indent="-228600" algn="l" defTabSz="914400" rtl="0" eaLnBrk="1" latinLnBrk="0" hangingPunct="1">
-              <a:lnSpc>
-                <a:spcPct val="90000"/>
-              </a:lnSpc>
-              <a:spcBef>
-                <a:spcPts val="1000"/>
-              </a:spcBef>
-              <a:buFont typeface="Arial" panose="020B0604020202020204" pitchFamily="34" charset="0"/>
-              <a:buChar char="•"/>
-              <a:defRPr sz="2400" kern="1200">
-                <a:solidFill>
-                  <a:schemeClr val="tx1"/>
-                </a:solidFill>
-                <a:latin typeface="+mn-lt"/>
-                <a:ea typeface="+mn-ea"/>
-                <a:cs typeface="+mn-cs"/>
-              </a:defRPr>
-            </a:lvl1pPr>
-            <a:lvl2pPr marL="685800" indent="-228600" algn="l" defTabSz="914400" rtl="0" eaLnBrk="1" latinLnBrk="0" hangingPunct="1">
-              <a:lnSpc>
-                <a:spcPct val="90000"/>
-              </a:lnSpc>
-              <a:spcBef>
-                <a:spcPts val="500"/>
-              </a:spcBef>
-              <a:buFont typeface="Arial" panose="020B0604020202020204" pitchFamily="34" charset="0"/>
-              <a:buChar char="•"/>
-              <a:defRPr sz="2000" kern="1200">
-                <a:solidFill>
-                  <a:schemeClr val="tx1"/>
-                </a:solidFill>
-                <a:latin typeface="+mn-lt"/>
-                <a:ea typeface="+mn-ea"/>
-                <a:cs typeface="+mn-cs"/>
-              </a:defRPr>
-            </a:lvl2pPr>
-            <a:lvl3pPr marL="1143000" indent="-228600" algn="l" defTabSz="914400" rtl="0" eaLnBrk="1" latinLnBrk="0" hangingPunct="1">
-              <a:lnSpc>
-                <a:spcPct val="90000"/>
-              </a:lnSpc>
-              <a:spcBef>
-                <a:spcPts val="500"/>
-              </a:spcBef>
-              <a:buFont typeface="Arial" panose="020B0604020202020204" pitchFamily="34" charset="0"/>
-              <a:buChar char="•"/>
-              <a:defRPr sz="1800" kern="1200">
-                <a:solidFill>
-                  <a:schemeClr val="tx1"/>
-                </a:solidFill>
-                <a:latin typeface="+mn-lt"/>
-                <a:ea typeface="+mn-ea"/>
-                <a:cs typeface="+mn-cs"/>
-              </a:defRPr>
-            </a:lvl3pPr>
-            <a:lvl4pPr marL="1600200" indent="-228600" algn="l" defTabSz="914400" rtl="0" eaLnBrk="1" latinLnBrk="0" hangingPunct="1">
-              <a:lnSpc>
-                <a:spcPct val="90000"/>
-              </a:lnSpc>
-              <a:spcBef>
-                <a:spcPts val="500"/>
-              </a:spcBef>
-              <a:buFont typeface="Arial" panose="020B0604020202020204" pitchFamily="34" charset="0"/>
-              <a:buChar char="•"/>
-              <a:defRPr sz="1600" kern="1200">
-                <a:solidFill>
-                  <a:schemeClr val="tx1"/>
-                </a:solidFill>
-                <a:latin typeface="+mn-lt"/>
-                <a:ea typeface="+mn-ea"/>
-                <a:cs typeface="+mn-cs"/>
-              </a:defRPr>
-            </a:lvl4pPr>
-            <a:lvl5pPr marL="2057400" indent="-228600" algn="l" defTabSz="914400" rtl="0" eaLnBrk="1" latinLnBrk="0" hangingPunct="1">
-              <a:lnSpc>
-                <a:spcPct val="90000"/>
-              </a:lnSpc>
-              <a:spcBef>
-                <a:spcPts val="500"/>
-              </a:spcBef>
-              <a:buFont typeface="Arial" panose="020B0604020202020204" pitchFamily="34" charset="0"/>
-              <a:buChar char="•"/>
-              <a:defRPr sz="1600" kern="1200">
-                <a:solidFill>
-                  <a:schemeClr val="tx1"/>
-                </a:solidFill>
-                <a:latin typeface="+mn-lt"/>
-                <a:ea typeface="+mn-ea"/>
-                <a:cs typeface="+mn-cs"/>
-              </a:defRPr>
-            </a:lvl5pPr>
-            <a:lvl6pPr marL="2514600" indent="-228600" algn="l" defTabSz="914400" rtl="0" eaLnBrk="1" latinLnBrk="0" hangingPunct="1">
-              <a:lnSpc>
-                <a:spcPct val="90000"/>
-              </a:lnSpc>
-              <a:spcBef>
-                <a:spcPts val="500"/>
-              </a:spcBef>
-              <a:buFont typeface="Arial" panose="020B0604020202020204" pitchFamily="34" charset="0"/>
-              <a:buChar char="•"/>
-              <a:defRPr sz="1400" kern="1200">
-                <a:solidFill>
-                  <a:schemeClr val="tx1"/>
-                </a:solidFill>
-                <a:latin typeface="+mn-lt"/>
-                <a:ea typeface="+mn-ea"/>
-                <a:cs typeface="+mn-cs"/>
-              </a:defRPr>
-            </a:lvl6pPr>
-            <a:lvl7pPr marL="2971800" indent="-228600" algn="l" defTabSz="914400" rtl="0" eaLnBrk="1" latinLnBrk="0" hangingPunct="1">
-              <a:lnSpc>
-                <a:spcPct val="90000"/>
-              </a:lnSpc>
-              <a:spcBef>
-                <a:spcPts val="500"/>
-              </a:spcBef>
-              <a:buFont typeface="Arial" panose="020B0604020202020204" pitchFamily="34" charset="0"/>
-              <a:buChar char="•"/>
-              <a:defRPr sz="1400" kern="1200">
-                <a:solidFill>
-                  <a:schemeClr val="tx1"/>
-                </a:solidFill>
-                <a:latin typeface="+mn-lt"/>
-                <a:ea typeface="+mn-ea"/>
-                <a:cs typeface="+mn-cs"/>
-              </a:defRPr>
-            </a:lvl7pPr>
-            <a:lvl8pPr marL="3429000" indent="-228600" algn="l" defTabSz="914400" rtl="0" eaLnBrk="1" latinLnBrk="0" hangingPunct="1">
-              <a:lnSpc>
-                <a:spcPct val="90000"/>
-              </a:lnSpc>
-              <a:spcBef>
-                <a:spcPts val="500"/>
-              </a:spcBef>
-              <a:buFont typeface="Arial" panose="020B0604020202020204" pitchFamily="34" charset="0"/>
-              <a:buChar char="•"/>
-              <a:defRPr sz="1400" kern="1200">
-                <a:solidFill>
-                  <a:schemeClr val="tx1"/>
-                </a:solidFill>
-                <a:latin typeface="+mn-lt"/>
-                <a:ea typeface="+mn-ea"/>
-                <a:cs typeface="+mn-cs"/>
-              </a:defRPr>
-            </a:lvl8pPr>
-            <a:lvl9pPr marL="3886200" indent="-228600" algn="l" defTabSz="914400" rtl="0" eaLnBrk="1" latinLnBrk="0" hangingPunct="1">
-              <a:lnSpc>
-                <a:spcPct val="90000"/>
-              </a:lnSpc>
-              <a:spcBef>
-                <a:spcPts val="500"/>
-              </a:spcBef>
-              <a:buFont typeface="Arial" panose="020B0604020202020204" pitchFamily="34" charset="0"/>
-              <a:buChar char="•"/>
-              <a:defRPr sz="1400" kern="1200">
-                <a:solidFill>
-                  <a:schemeClr val="tx1"/>
-                </a:solidFill>
-                <a:latin typeface="+mn-lt"/>
-                <a:ea typeface="+mn-ea"/>
-                <a:cs typeface="+mn-cs"/>
-              </a:defRPr>
-            </a:lvl9pPr>
-          </a:lstStyle>
-          <a:p>
-            <a:pPr marL="0" indent="0">
-              <a:buFont typeface="Arial" panose="020B0604020202020204" pitchFamily="34" charset="0"/>
-              <a:buNone/>
-            </a:pPr>
-            <a:r>
-              <a:rPr lang="en-US" dirty="0"/>
-              <a:t>Mocking can intercept application code for unit testing purposes.</a:t>
-            </a:r>
-          </a:p>
-          <a:p>
-            <a:pPr marL="0" indent="0">
-              <a:buFont typeface="Arial" panose="020B0604020202020204" pitchFamily="34" charset="0"/>
-              <a:buNone/>
-            </a:pPr>
-            <a:r>
-              <a:rPr lang="en-US" dirty="0"/>
-              <a:t>Pass the built-in fixture named “mocker” to your test case.</a:t>
-            </a:r>
-          </a:p>
-          <a:p>
-            <a:pPr marL="0" indent="0">
-              <a:buFont typeface="Arial" panose="020B0604020202020204" pitchFamily="34" charset="0"/>
-              <a:buNone/>
-            </a:pPr>
-            <a:r>
-              <a:rPr lang="en-US" dirty="0"/>
-              <a:t>Use </a:t>
-            </a:r>
-            <a:r>
-              <a:rPr lang="en-US" dirty="0" err="1"/>
-              <a:t>mocker.patch</a:t>
-            </a:r>
-            <a:r>
-              <a:rPr lang="en-US" dirty="0"/>
-              <a:t> to replace application code with a mock function.</a:t>
-            </a:r>
-          </a:p>
-          <a:p>
-            <a:pPr marL="0" indent="0">
-              <a:buFont typeface="Arial" panose="020B0604020202020204" pitchFamily="34" charset="0"/>
-              <a:buNone/>
-            </a:pPr>
-            <a:endParaRPr lang="en-US" dirty="0"/>
-          </a:p>
-          <a:p>
-            <a:pPr marL="0" indent="0">
-              <a:buFont typeface="Arial" panose="020B0604020202020204" pitchFamily="34" charset="0"/>
-              <a:buNone/>
-            </a:pPr>
-            <a:endParaRPr lang="en-US" dirty="0"/>
-          </a:p>
-          <a:p>
-            <a:pPr marL="0" indent="0">
-              <a:buFont typeface="Arial" panose="020B0604020202020204" pitchFamily="34" charset="0"/>
-              <a:buNone/>
-            </a:pPr>
-            <a:endParaRPr lang="en-US" dirty="0"/>
-          </a:p>
-          <a:p>
-            <a:pPr marL="0" indent="0">
-              <a:buFont typeface="Arial" panose="020B0604020202020204" pitchFamily="34" charset="0"/>
-              <a:buNone/>
-            </a:pPr>
-            <a:endParaRPr lang="en-US" dirty="0"/>
-          </a:p>
-          <a:p>
-            <a:pPr marL="0" indent="0">
-              <a:buFont typeface="Arial" panose="020B0604020202020204" pitchFamily="34" charset="0"/>
-              <a:buNone/>
-            </a:pPr>
-            <a:endParaRPr lang="en-US" dirty="0"/>
-          </a:p>
-          <a:p>
-            <a:pPr marL="0" indent="0">
-              <a:buFont typeface="Arial" panose="020B0604020202020204" pitchFamily="34" charset="0"/>
-              <a:buNone/>
-            </a:pPr>
-            <a:endParaRPr lang="en-US" dirty="0"/>
-          </a:p>
-          <a:p>
-            <a:pPr marL="0" indent="0">
-              <a:buFont typeface="Arial" panose="020B0604020202020204" pitchFamily="34" charset="0"/>
-              <a:buNone/>
-            </a:pPr>
-            <a:endParaRPr lang="en-US" dirty="0"/>
-          </a:p>
-          <a:p>
-            <a:pPr marL="0" indent="0">
-              <a:buFont typeface="Arial" panose="020B0604020202020204" pitchFamily="34" charset="0"/>
-              <a:buNone/>
-            </a:pPr>
-            <a:r>
-              <a:rPr lang="en-US" dirty="0"/>
-              <a:t>When the application code constructs the </a:t>
-            </a:r>
-            <a:r>
-              <a:rPr lang="en-US" dirty="0" err="1"/>
-              <a:t>flask.Response</a:t>
-            </a:r>
-            <a:r>
-              <a:rPr lang="en-US" dirty="0"/>
-              <a:t>() we intercept and assert.</a:t>
-            </a:r>
-          </a:p>
-        </p:txBody>
-      </p:sp>
-      <p:sp>
-        <p:nvSpPr>
-          <p:cNvPr id="6" name="TextBox 5">
-            <a:extLst>
-              <a:ext uri="{FF2B5EF4-FFF2-40B4-BE49-F238E27FC236}">
-                <a16:creationId xmlns:a16="http://schemas.microsoft.com/office/drawing/2014/main" id="{D5CA6394-07D3-0950-91DC-E228A78B252B}"/>
-              </a:ext>
-            </a:extLst>
-          </p:cNvPr>
-          <p:cNvSpPr txBox="1"/>
-          <p:nvPr/>
-        </p:nvSpPr>
-        <p:spPr>
-          <a:xfrm>
-            <a:off x="999231" y="3278992"/>
-            <a:ext cx="9712291" cy="2554545"/>
-          </a:xfrm>
-          <a:prstGeom prst="rect">
-            <a:avLst/>
-          </a:prstGeom>
-          <a:noFill/>
-        </p:spPr>
-        <p:txBody>
-          <a:bodyPr wrap="square">
-            <a:spAutoFit/>
-          </a:bodyPr>
-          <a:lstStyle/>
-          <a:p>
-            <a:r>
-              <a:rPr lang="en-US" sz="2000" b="0" dirty="0">
-                <a:solidFill>
-                  <a:srgbClr val="0000FF"/>
-                </a:solidFill>
-                <a:effectLst/>
-                <a:latin typeface="Menlo" panose="020B0609030804020204" pitchFamily="49" charset="0"/>
-              </a:rPr>
-              <a:t>def</a:t>
-            </a:r>
-            <a:r>
-              <a:rPr lang="en-US" sz="2000" b="0" dirty="0">
-                <a:solidFill>
-                  <a:srgbClr val="000000"/>
-                </a:solidFill>
-                <a:effectLst/>
-                <a:latin typeface="Menlo" panose="020B0609030804020204" pitchFamily="49" charset="0"/>
-              </a:rPr>
-              <a:t> </a:t>
-            </a:r>
-            <a:r>
-              <a:rPr lang="en-US" sz="2000" b="0" dirty="0" err="1">
-                <a:solidFill>
-                  <a:srgbClr val="000000"/>
-                </a:solidFill>
-                <a:effectLst/>
-                <a:latin typeface="Menlo" panose="020B0609030804020204" pitchFamily="49" charset="0"/>
-              </a:rPr>
-              <a:t>test_lookup_id</a:t>
-            </a:r>
-            <a:r>
-              <a:rPr lang="en-US" sz="2000" b="0" dirty="0">
-                <a:solidFill>
-                  <a:srgbClr val="000000"/>
-                </a:solidFill>
-                <a:effectLst/>
-                <a:latin typeface="Menlo" panose="020B0609030804020204" pitchFamily="49" charset="0"/>
-              </a:rPr>
-              <a:t>(mocker):</a:t>
-            </a:r>
-          </a:p>
-          <a:p>
-            <a:br>
-              <a:rPr lang="en-US" sz="2000" b="0" dirty="0">
-                <a:solidFill>
-                  <a:srgbClr val="000000"/>
-                </a:solidFill>
-                <a:effectLst/>
-                <a:latin typeface="Menlo" panose="020B0609030804020204" pitchFamily="49" charset="0"/>
-              </a:rPr>
-            </a:br>
-            <a:r>
-              <a:rPr lang="en-US" sz="2000" b="0" dirty="0">
-                <a:solidFill>
-                  <a:srgbClr val="000000"/>
-                </a:solidFill>
-                <a:effectLst/>
-                <a:latin typeface="Menlo" panose="020B0609030804020204" pitchFamily="49" charset="0"/>
-              </a:rPr>
-              <a:t>	</a:t>
-            </a:r>
-            <a:r>
-              <a:rPr lang="en-US" sz="2000" b="0" dirty="0">
-                <a:solidFill>
-                  <a:srgbClr val="0000FF"/>
-                </a:solidFill>
-                <a:effectLst/>
-                <a:latin typeface="Menlo" panose="020B0609030804020204" pitchFamily="49" charset="0"/>
-              </a:rPr>
-              <a:t>def</a:t>
-            </a:r>
-            <a:r>
-              <a:rPr lang="en-US" sz="2000" b="0" dirty="0">
-                <a:solidFill>
-                  <a:srgbClr val="000000"/>
-                </a:solidFill>
-                <a:effectLst/>
-                <a:latin typeface="Menlo" panose="020B0609030804020204" pitchFamily="49" charset="0"/>
-              </a:rPr>
-              <a:t> </a:t>
-            </a:r>
-            <a:r>
-              <a:rPr lang="en-US" sz="2000" b="0" dirty="0" err="1">
-                <a:solidFill>
-                  <a:srgbClr val="000000"/>
-                </a:solidFill>
-                <a:effectLst/>
-                <a:latin typeface="Menlo" panose="020B0609030804020204" pitchFamily="49" charset="0"/>
-              </a:rPr>
-              <a:t>mock_response</a:t>
-            </a:r>
-            <a:r>
-              <a:rPr lang="en-US" sz="2000" b="0" dirty="0">
-                <a:solidFill>
-                  <a:srgbClr val="000000"/>
-                </a:solidFill>
-                <a:effectLst/>
-                <a:latin typeface="Menlo" panose="020B0609030804020204" pitchFamily="49" charset="0"/>
-              </a:rPr>
-              <a:t>(content):</a:t>
-            </a:r>
-          </a:p>
-          <a:p>
-            <a:r>
-              <a:rPr lang="en-US" sz="2000" b="0" dirty="0">
-                <a:solidFill>
-                  <a:srgbClr val="0000FF"/>
-                </a:solidFill>
-                <a:effectLst/>
-                <a:latin typeface="Menlo" panose="020B0609030804020204" pitchFamily="49" charset="0"/>
-              </a:rPr>
-              <a:t>		assert</a:t>
-            </a:r>
-            <a:r>
-              <a:rPr lang="en-US" sz="2000" b="0" dirty="0">
-                <a:solidFill>
-                  <a:srgbClr val="000000"/>
-                </a:solidFill>
-                <a:effectLst/>
-                <a:latin typeface="Menlo" panose="020B0609030804020204" pitchFamily="49" charset="0"/>
-              </a:rPr>
-              <a:t> </a:t>
-            </a:r>
-            <a:r>
-              <a:rPr lang="en-US" sz="2000" b="0" dirty="0">
-                <a:solidFill>
-                  <a:srgbClr val="A31515"/>
-                </a:solidFill>
-                <a:effectLst/>
-                <a:latin typeface="Menlo" panose="020B0609030804020204" pitchFamily="49" charset="0"/>
-              </a:rPr>
-              <a:t>"How many dwarfs are not happy"</a:t>
-            </a:r>
-            <a:r>
-              <a:rPr lang="en-US" sz="2000" b="0" dirty="0">
-                <a:solidFill>
-                  <a:srgbClr val="000000"/>
-                </a:solidFill>
-                <a:effectLst/>
-                <a:latin typeface="Menlo" panose="020B0609030804020204" pitchFamily="49" charset="0"/>
-              </a:rPr>
-              <a:t> </a:t>
-            </a:r>
-            <a:r>
-              <a:rPr lang="en-US" sz="2000" b="0" dirty="0">
-                <a:solidFill>
-                  <a:srgbClr val="0000FF"/>
-                </a:solidFill>
-                <a:effectLst/>
-                <a:latin typeface="Menlo" panose="020B0609030804020204" pitchFamily="49" charset="0"/>
-              </a:rPr>
-              <a:t>in</a:t>
-            </a:r>
-            <a:r>
-              <a:rPr lang="en-US" sz="2000" b="0" dirty="0">
-                <a:solidFill>
-                  <a:srgbClr val="000000"/>
-                </a:solidFill>
-                <a:effectLst/>
-                <a:latin typeface="Menlo" panose="020B0609030804020204" pitchFamily="49" charset="0"/>
-              </a:rPr>
-              <a:t> str(content)</a:t>
-            </a:r>
-          </a:p>
-          <a:p>
-            <a:r>
-              <a:rPr lang="en-US" sz="2000" b="0" dirty="0">
-                <a:solidFill>
-                  <a:srgbClr val="0000FF"/>
-                </a:solidFill>
-                <a:effectLst/>
-                <a:latin typeface="Menlo" panose="020B0609030804020204" pitchFamily="49" charset="0"/>
-              </a:rPr>
-              <a:t>		assert</a:t>
-            </a:r>
-            <a:r>
-              <a:rPr lang="en-US" sz="2000" b="0" dirty="0">
-                <a:solidFill>
-                  <a:srgbClr val="000000"/>
-                </a:solidFill>
-                <a:effectLst/>
-                <a:latin typeface="Menlo" panose="020B0609030804020204" pitchFamily="49" charset="0"/>
-              </a:rPr>
-              <a:t> </a:t>
-            </a:r>
-            <a:r>
-              <a:rPr lang="en-US" sz="2000" b="0" dirty="0">
-                <a:solidFill>
-                  <a:srgbClr val="A31515"/>
-                </a:solidFill>
-                <a:effectLst/>
-                <a:latin typeface="Menlo" panose="020B0609030804020204" pitchFamily="49" charset="0"/>
-              </a:rPr>
-              <a:t>"6"</a:t>
-            </a:r>
-            <a:r>
-              <a:rPr lang="en-US" sz="2000" b="0" dirty="0">
-                <a:solidFill>
-                  <a:srgbClr val="000000"/>
-                </a:solidFill>
-                <a:effectLst/>
-                <a:latin typeface="Menlo" panose="020B0609030804020204" pitchFamily="49" charset="0"/>
-              </a:rPr>
-              <a:t> </a:t>
-            </a:r>
-            <a:r>
-              <a:rPr lang="en-US" sz="2000" b="0" dirty="0">
-                <a:solidFill>
-                  <a:srgbClr val="0000FF"/>
-                </a:solidFill>
-                <a:effectLst/>
-                <a:latin typeface="Menlo" panose="020B0609030804020204" pitchFamily="49" charset="0"/>
-              </a:rPr>
-              <a:t>in</a:t>
-            </a:r>
-            <a:r>
-              <a:rPr lang="en-US" sz="2000" b="0" dirty="0">
-                <a:solidFill>
-                  <a:srgbClr val="000000"/>
-                </a:solidFill>
-                <a:effectLst/>
-                <a:latin typeface="Menlo" panose="020B0609030804020204" pitchFamily="49" charset="0"/>
-              </a:rPr>
-              <a:t> str(content)</a:t>
-            </a:r>
-          </a:p>
-          <a:p>
-            <a:br>
-              <a:rPr lang="en-US" sz="2000" b="0" dirty="0">
-                <a:solidFill>
-                  <a:srgbClr val="000000"/>
-                </a:solidFill>
-                <a:effectLst/>
-                <a:latin typeface="Menlo" panose="020B0609030804020204" pitchFamily="49" charset="0"/>
-              </a:rPr>
-            </a:br>
-            <a:r>
-              <a:rPr lang="en-US" sz="2000" b="0" dirty="0">
-                <a:solidFill>
-                  <a:srgbClr val="000000"/>
-                </a:solidFill>
-                <a:effectLst/>
-                <a:latin typeface="Menlo" panose="020B0609030804020204" pitchFamily="49" charset="0"/>
-              </a:rPr>
-              <a:t>	</a:t>
-            </a:r>
-            <a:r>
-              <a:rPr lang="en-US" sz="2000" b="0" dirty="0" err="1">
-                <a:solidFill>
-                  <a:srgbClr val="000000"/>
-                </a:solidFill>
-                <a:effectLst/>
-                <a:latin typeface="Menlo" panose="020B0609030804020204" pitchFamily="49" charset="0"/>
-              </a:rPr>
-              <a:t>mocker.patch</a:t>
-            </a:r>
-            <a:r>
-              <a:rPr lang="en-US" sz="2000" b="0" dirty="0">
-                <a:solidFill>
-                  <a:srgbClr val="000000"/>
-                </a:solidFill>
-                <a:effectLst/>
-                <a:latin typeface="Menlo" panose="020B0609030804020204" pitchFamily="49" charset="0"/>
-              </a:rPr>
-              <a:t>(</a:t>
-            </a:r>
-            <a:r>
-              <a:rPr lang="en-US" sz="2000" b="0" dirty="0">
-                <a:solidFill>
-                  <a:srgbClr val="A31515"/>
-                </a:solidFill>
-                <a:effectLst/>
-                <a:latin typeface="Menlo" panose="020B0609030804020204" pitchFamily="49" charset="0"/>
-              </a:rPr>
-              <a:t>"</a:t>
-            </a:r>
-            <a:r>
-              <a:rPr lang="en-US" sz="2000" b="0" dirty="0" err="1">
-                <a:solidFill>
-                  <a:srgbClr val="A31515"/>
-                </a:solidFill>
-                <a:effectLst/>
-                <a:latin typeface="Menlo" panose="020B0609030804020204" pitchFamily="49" charset="0"/>
-              </a:rPr>
-              <a:t>flask.Response</a:t>
-            </a:r>
-            <a:r>
-              <a:rPr lang="en-US" sz="2000" b="0" dirty="0">
-                <a:solidFill>
-                  <a:srgbClr val="A31515"/>
-                </a:solidFill>
-                <a:effectLst/>
-                <a:latin typeface="Menlo" panose="020B0609030804020204" pitchFamily="49" charset="0"/>
-              </a:rPr>
-              <a:t>"</a:t>
-            </a:r>
-            <a:r>
-              <a:rPr lang="en-US" sz="2000" b="0" dirty="0">
-                <a:solidFill>
-                  <a:srgbClr val="000000"/>
-                </a:solidFill>
-                <a:effectLst/>
-                <a:latin typeface="Menlo" panose="020B0609030804020204" pitchFamily="49" charset="0"/>
-              </a:rPr>
-              <a:t>, </a:t>
-            </a:r>
-            <a:r>
-              <a:rPr lang="en-US" sz="2000" b="0" dirty="0" err="1">
-                <a:solidFill>
-                  <a:srgbClr val="000000"/>
-                </a:solidFill>
-                <a:effectLst/>
-                <a:latin typeface="Menlo" panose="020B0609030804020204" pitchFamily="49" charset="0"/>
-              </a:rPr>
-              <a:t>side_effect</a:t>
-            </a:r>
-            <a:r>
-              <a:rPr lang="en-US" sz="2000" b="0" dirty="0">
-                <a:solidFill>
-                  <a:srgbClr val="000000"/>
-                </a:solidFill>
-                <a:effectLst/>
-                <a:latin typeface="Menlo" panose="020B0609030804020204" pitchFamily="49" charset="0"/>
-              </a:rPr>
-              <a:t>=</a:t>
-            </a:r>
-            <a:r>
-              <a:rPr lang="en-US" sz="2000" b="0" dirty="0" err="1">
-                <a:solidFill>
-                  <a:srgbClr val="000000"/>
-                </a:solidFill>
-                <a:effectLst/>
-                <a:latin typeface="Menlo" panose="020B0609030804020204" pitchFamily="49" charset="0"/>
-              </a:rPr>
-              <a:t>mock_response</a:t>
-            </a:r>
-            <a:r>
-              <a:rPr lang="en-US" sz="2000" b="0" dirty="0">
-                <a:solidFill>
-                  <a:srgbClr val="000000"/>
-                </a:solidFill>
-                <a:effectLst/>
-                <a:latin typeface="Menlo" panose="020B0609030804020204" pitchFamily="49" charset="0"/>
-              </a:rPr>
-              <a:t>)</a:t>
-            </a:r>
-          </a:p>
-          <a:p>
-            <a:r>
-              <a:rPr lang="en-US" sz="2000" b="0" dirty="0">
-                <a:solidFill>
-                  <a:srgbClr val="000000"/>
-                </a:solidFill>
-                <a:effectLst/>
-                <a:latin typeface="Menlo" panose="020B0609030804020204" pitchFamily="49" charset="0"/>
-              </a:rPr>
-              <a:t>	</a:t>
-            </a:r>
-            <a:r>
-              <a:rPr lang="en-US" sz="2000" b="0" dirty="0" err="1">
-                <a:solidFill>
-                  <a:srgbClr val="000000"/>
-                </a:solidFill>
-                <a:effectLst/>
-                <a:latin typeface="Menlo" panose="020B0609030804020204" pitchFamily="49" charset="0"/>
-              </a:rPr>
-              <a:t>flask_app.get_questions</a:t>
-            </a:r>
-            <a:r>
-              <a:rPr lang="en-US" sz="2000" b="0" dirty="0">
-                <a:solidFill>
-                  <a:srgbClr val="000000"/>
-                </a:solidFill>
-                <a:effectLst/>
-                <a:latin typeface="Menlo" panose="020B0609030804020204" pitchFamily="49" charset="0"/>
-              </a:rPr>
-              <a:t>()</a:t>
-            </a:r>
-          </a:p>
-        </p:txBody>
-      </p:sp>
-    </p:spTree>
-    <p:extLst>
-      <p:ext uri="{BB962C8B-B14F-4D97-AF65-F5344CB8AC3E}">
-        <p14:creationId xmlns:p14="http://schemas.microsoft.com/office/powerpoint/2010/main" val="3094346168"/>
-      </p:ext>
-    </p:extLst>
-  </p:cSld>
-  <p:clrMapOvr>
-    <a:masterClrMapping/>
-  </p:clrMapOvr>
 </p:sld>
 </file>
 
@@ -17602,7 +17551,7 @@
             </a:r>
             <a:r>
               <a:rPr lang="en-US" dirty="0" err="1"/>
-              <a:t>test_area.py</a:t>
+              <a:t>test_geometric_area.py</a:t>
             </a:r>
             <a:r>
               <a:rPr lang="en-US" dirty="0"/>
@@ -18120,6 +18069,35 @@
               <a:t>It is useful to test your error handling in unit tests.</a:t>
             </a:r>
           </a:p>
+          <a:p>
+            <a:pPr marL="0" indent="0">
+              <a:buNone/>
+            </a:pPr>
+            <a:endParaRPr lang="en-US" dirty="0"/>
+          </a:p>
+          <a:p>
+            <a:pPr marL="0" indent="0">
+              <a:buNone/>
+            </a:pPr>
+            <a:r>
+              <a:rPr lang="en-US" dirty="0"/>
+              <a:t>File: </a:t>
+            </a:r>
+            <a:r>
+              <a:rPr lang="en-US" dirty="0" err="1"/>
+              <a:t>test_geometric_area.py</a:t>
+            </a:r>
+            <a:r>
+              <a:rPr lang="en-US" dirty="0"/>
+              <a:t>:</a:t>
+            </a:r>
+          </a:p>
+          <a:p>
+            <a:pPr marL="0" indent="0">
+              <a:buNone/>
+            </a:pPr>
+            <a:endParaRPr lang="en-US" dirty="0"/>
+          </a:p>
         </p:txBody>
       </p:sp>
       <p:sp>
@@ -18136,7 +18114,7 @@
         </p:nvSpPr>
         <p:spPr>
           <a:xfrm>
-            <a:off x="1455324" y="2991406"/>
+            <a:off x="1391824" y="3685007"/>
             <a:ext cx="9613861" cy="2677656"/>
           </a:xfrm>
           <a:prstGeom prst="rect">

</xml_diff>

<commit_message>
add TDD to slides
</commit_message>
<xml_diff>
--- a/UnitTestingSlides.pptx
+++ b/UnitTestingSlides.pptx
@@ -5,7 +5,7 @@
     <p:sldMasterId id="2147483648" r:id="rId1"/>
   </p:sldMasterIdLst>
   <p:notesMasterIdLst>
-    <p:notesMasterId r:id="rId27"/>
+    <p:notesMasterId r:id="rId28"/>
   </p:notesMasterIdLst>
   <p:sldIdLst>
     <p:sldId id="256" r:id="rId2"/>
@@ -31,8 +31,9 @@
     <p:sldId id="271" r:id="rId22"/>
     <p:sldId id="264" r:id="rId23"/>
     <p:sldId id="275" r:id="rId24"/>
-    <p:sldId id="269" r:id="rId25"/>
-    <p:sldId id="270" r:id="rId26"/>
+    <p:sldId id="281" r:id="rId25"/>
+    <p:sldId id="269" r:id="rId26"/>
+    <p:sldId id="270" r:id="rId27"/>
   </p:sldIdLst>
   <p:sldSz cx="12192000" cy="6858000"/>
   <p:notesSz cx="6858000" cy="9144000"/>
@@ -8676,14 +8677,15 @@
         </p:nvSpPr>
         <p:spPr>
           <a:xfrm>
-            <a:off x="680322" y="4297054"/>
-            <a:ext cx="8144134" cy="1117687"/>
+            <a:off x="152399" y="4295669"/>
+            <a:ext cx="11896165" cy="1117687"/>
           </a:xfrm>
         </p:spPr>
         <p:txBody>
           <a:bodyPr/>
           <a:lstStyle/>
           <a:p>
+            <a:pPr algn="ctr"/>
             <a:r>
               <a:rPr lang="en-US" dirty="0"/>
               <a:t>Princeton University </a:t>
@@ -8698,7 +8700,7 @@
             </a:r>
           </a:p>
           <a:p>
-            <a:pPr>
+            <a:pPr algn="ctr">
               <a:spcBef>
                 <a:spcPts val="0"/>
               </a:spcBef>
@@ -12289,13 +12291,23 @@
             </a:r>
             <a:r>
               <a:rPr lang="en-US" dirty="0"/>
-              <a:t> the </a:t>
-            </a:r>
-            <a:r>
-              <a:rPr lang="en-US"/>
-              <a:t>helper modules</a:t>
-            </a:r>
-            <a:endParaRPr lang="en-US" dirty="0"/>
+              <a:t> the helper modules</a:t>
+            </a:r>
+          </a:p>
+          <a:p>
+            <a:pPr lvl="1"/>
+            <a:r>
+              <a:rPr lang="en-US" dirty="0"/>
+              <a:t>Put various cells in .</a:t>
+            </a:r>
+            <a:r>
+              <a:rPr lang="en-US" dirty="0" err="1"/>
+              <a:t>py</a:t>
+            </a:r>
+            <a:r>
+              <a:rPr lang="en-US" dirty="0"/>
+              <a:t> files and unit test the files.</a:t>
+            </a:r>
           </a:p>
         </p:txBody>
       </p:sp>
@@ -15446,7 +15458,7 @@
           <p:cNvPr id="2" name="Title 1">
             <a:extLst>
               <a:ext uri="{FF2B5EF4-FFF2-40B4-BE49-F238E27FC236}">
-                <a16:creationId xmlns:a16="http://schemas.microsoft.com/office/drawing/2014/main" id="{0584A545-6FA8-C91A-FCC4-AAB0B775D43F}"/>
+                <a16:creationId xmlns:a16="http://schemas.microsoft.com/office/drawing/2014/main" id="{F0323625-6E9D-8BD6-EF2A-3D3A89B4035B}"/>
               </a:ext>
             </a:extLst>
           </p:cNvPr>
@@ -15464,7 +15476,7 @@
           <a:p>
             <a:r>
               <a:rPr lang="en-US" dirty="0"/>
-              <a:t>Continuous Integration</a:t>
+              <a:t>TDD – Test Driven Design</a:t>
             </a:r>
           </a:p>
         </p:txBody>
@@ -15474,7 +15486,7 @@
           <p:cNvPr id="3" name="Content Placeholder 2">
             <a:extLst>
               <a:ext uri="{FF2B5EF4-FFF2-40B4-BE49-F238E27FC236}">
-                <a16:creationId xmlns:a16="http://schemas.microsoft.com/office/drawing/2014/main" id="{8D645834-C049-7179-9280-BB2B0F2430CC}"/>
+                <a16:creationId xmlns:a16="http://schemas.microsoft.com/office/drawing/2014/main" id="{2DD885AA-8633-4B1D-638C-C27E92A8A907}"/>
               </a:ext>
             </a:extLst>
           </p:cNvPr>
@@ -15485,16 +15497,9 @@
             <p:ph idx="1"/>
           </p:nvPr>
         </p:nvSpPr>
-        <p:spPr>
-          <a:xfrm>
-            <a:off x="680321" y="2336873"/>
-            <a:ext cx="10115498" cy="3599316"/>
-          </a:xfrm>
-        </p:spPr>
-        <p:txBody>
-          <a:bodyPr>
-            <a:normAutofit lnSpcReduction="10000"/>
-          </a:bodyPr>
+        <p:spPr/>
+        <p:txBody>
+          <a:bodyPr/>
           <a:lstStyle/>
           <a:p>
             <a:pPr marL="0" indent="0">
@@ -15502,62 +15507,40 @@
             </a:pPr>
             <a:r>
               <a:rPr lang="en-US" dirty="0"/>
-              <a:t>When to run tests?</a:t>
-            </a:r>
-          </a:p>
-          <a:p>
-            <a:pPr lvl="1"/>
-            <a:r>
-              <a:rPr lang="en-US" sz="2400" dirty="0"/>
-              <a:t>Manually run tests after you make changes.</a:t>
-            </a:r>
-          </a:p>
-          <a:p>
-            <a:pPr lvl="1"/>
-            <a:r>
-              <a:rPr lang="en-US" sz="2400" dirty="0"/>
-              <a:t>Write tests to replicate a bug and run test before you fix the bug.</a:t>
-            </a:r>
-          </a:p>
-          <a:p>
-            <a:pPr lvl="1"/>
-            <a:r>
-              <a:rPr lang="en-US" sz="2400" dirty="0"/>
-              <a:t>Run all tests before you release or commit code.</a:t>
-            </a:r>
-          </a:p>
-          <a:p>
-            <a:pPr lvl="1"/>
-            <a:endParaRPr lang="en-US" sz="2400" dirty="0"/>
+              <a:t>Refers to the practice of writing test BEFORE you write code.</a:t>
+            </a:r>
           </a:p>
           <a:p>
             <a:pPr marL="0" indent="0">
               <a:buNone/>
             </a:pPr>
-            <a:r>
-              <a:rPr lang="en-US" sz="2800" dirty="0"/>
-              <a:t>Continuous Integration</a:t>
-            </a:r>
-          </a:p>
-          <a:p>
-            <a:pPr lvl="1"/>
-            <a:r>
-              <a:rPr lang="en-US" sz="2400" dirty="0"/>
-              <a:t>Jenkins, GitHub Actions, Circle CI, ….</a:t>
-            </a:r>
-          </a:p>
-          <a:p>
-            <a:pPr lvl="1"/>
-            <a:r>
-              <a:rPr lang="en-US" sz="2400" dirty="0"/>
-              <a:t>Tools to automate the build and release of your project.</a:t>
-            </a:r>
-          </a:p>
-          <a:p>
-            <a:pPr lvl="1"/>
-            <a:r>
-              <a:rPr lang="en-US" sz="2400" dirty="0"/>
-              <a:t>Can run your unit tests to validate before a release.</a:t>
+            <a:endParaRPr lang="en-US" dirty="0"/>
+          </a:p>
+          <a:p>
+            <a:pPr marL="0" indent="0">
+              <a:buNone/>
+            </a:pPr>
+            <a:r>
+              <a:rPr lang="en-US" dirty="0"/>
+              <a:t>Benefits:</a:t>
+            </a:r>
+          </a:p>
+          <a:p>
+            <a:r>
+              <a:rPr lang="en-US" dirty="0"/>
+              <a:t>Writing tests first helps you understand the specification.</a:t>
+            </a:r>
+          </a:p>
+          <a:p>
+            <a:r>
+              <a:rPr lang="en-US" dirty="0"/>
+              <a:t>Writing test to reproduce a bug proves it is fixed by the change.</a:t>
+            </a:r>
+          </a:p>
+          <a:p>
+            <a:r>
+              <a:rPr lang="en-US" dirty="0"/>
+              <a:t>Running tests as you develop lets you fix bugs early (is faster).</a:t>
             </a:r>
           </a:p>
         </p:txBody>
@@ -15565,7 +15548,7 @@
     </p:spTree>
     <p:extLst>
       <p:ext uri="{BB962C8B-B14F-4D97-AF65-F5344CB8AC3E}">
-        <p14:creationId xmlns:p14="http://schemas.microsoft.com/office/powerpoint/2010/main" val="466547344"/>
+        <p14:creationId xmlns:p14="http://schemas.microsoft.com/office/powerpoint/2010/main" val="3767648746"/>
       </p:ext>
     </p:extLst>
   </p:cSld>
@@ -15597,6 +15580,163 @@
           <p:cNvPr id="2" name="Title 1">
             <a:extLst>
               <a:ext uri="{FF2B5EF4-FFF2-40B4-BE49-F238E27FC236}">
+                <a16:creationId xmlns:a16="http://schemas.microsoft.com/office/drawing/2014/main" id="{0584A545-6FA8-C91A-FCC4-AAB0B775D43F}"/>
+              </a:ext>
+            </a:extLst>
+          </p:cNvPr>
+          <p:cNvSpPr>
+            <a:spLocks noGrp="1"/>
+          </p:cNvSpPr>
+          <p:nvPr>
+            <p:ph type="title"/>
+          </p:nvPr>
+        </p:nvSpPr>
+        <p:spPr/>
+        <p:txBody>
+          <a:bodyPr/>
+          <a:lstStyle/>
+          <a:p>
+            <a:r>
+              <a:rPr lang="en-US" dirty="0"/>
+              <a:t>Continuous Integration</a:t>
+            </a:r>
+          </a:p>
+        </p:txBody>
+      </p:sp>
+      <p:sp>
+        <p:nvSpPr>
+          <p:cNvPr id="3" name="Content Placeholder 2">
+            <a:extLst>
+              <a:ext uri="{FF2B5EF4-FFF2-40B4-BE49-F238E27FC236}">
+                <a16:creationId xmlns:a16="http://schemas.microsoft.com/office/drawing/2014/main" id="{8D645834-C049-7179-9280-BB2B0F2430CC}"/>
+              </a:ext>
+            </a:extLst>
+          </p:cNvPr>
+          <p:cNvSpPr>
+            <a:spLocks noGrp="1"/>
+          </p:cNvSpPr>
+          <p:nvPr>
+            <p:ph idx="1"/>
+          </p:nvPr>
+        </p:nvSpPr>
+        <p:spPr>
+          <a:xfrm>
+            <a:off x="680321" y="2336873"/>
+            <a:ext cx="10115498" cy="4153574"/>
+          </a:xfrm>
+        </p:spPr>
+        <p:txBody>
+          <a:bodyPr>
+            <a:normAutofit/>
+          </a:bodyPr>
+          <a:lstStyle/>
+          <a:p>
+            <a:pPr marL="0" indent="0">
+              <a:buNone/>
+            </a:pPr>
+            <a:r>
+              <a:rPr lang="en-US" sz="2800" dirty="0"/>
+              <a:t>Continuous Integration</a:t>
+            </a:r>
+          </a:p>
+          <a:p>
+            <a:pPr lvl="1"/>
+            <a:r>
+              <a:rPr lang="en-US" sz="2400" dirty="0"/>
+              <a:t>Jenkins, GitHub Actions, Circle CI, ….</a:t>
+            </a:r>
+          </a:p>
+          <a:p>
+            <a:pPr lvl="1"/>
+            <a:r>
+              <a:rPr lang="en-US" sz="2400" dirty="0"/>
+              <a:t>Tools to automate the build and release of your project.</a:t>
+            </a:r>
+          </a:p>
+          <a:p>
+            <a:pPr lvl="1"/>
+            <a:r>
+              <a:rPr lang="en-US" sz="2400" dirty="0"/>
+              <a:t>Can run your unit tests to validate before a release.</a:t>
+            </a:r>
+          </a:p>
+          <a:p>
+            <a:pPr marL="0" indent="0">
+              <a:buNone/>
+            </a:pPr>
+            <a:endParaRPr lang="en-US" dirty="0"/>
+          </a:p>
+          <a:p>
+            <a:pPr marL="0" indent="0">
+              <a:buNone/>
+            </a:pPr>
+            <a:r>
+              <a:rPr lang="en-US" dirty="0"/>
+              <a:t>When to run tests?</a:t>
+            </a:r>
+          </a:p>
+          <a:p>
+            <a:pPr lvl="1"/>
+            <a:r>
+              <a:rPr lang="en-US" sz="2400" dirty="0"/>
+              <a:t>Run tests after create a pull request, before you merge to main.</a:t>
+            </a:r>
+          </a:p>
+          <a:p>
+            <a:pPr lvl="1"/>
+            <a:r>
+              <a:rPr lang="en-US" sz="2400" dirty="0"/>
+              <a:t>Run tests after you commit to main.</a:t>
+            </a:r>
+          </a:p>
+          <a:p>
+            <a:pPr lvl="1"/>
+            <a:r>
+              <a:rPr lang="en-US" sz="2400" dirty="0"/>
+              <a:t>Developers run tests manually before committing.</a:t>
+            </a:r>
+          </a:p>
+          <a:p>
+            <a:pPr lvl="1"/>
+            <a:endParaRPr lang="en-US" sz="2400" dirty="0"/>
+          </a:p>
+        </p:txBody>
+      </p:sp>
+    </p:spTree>
+    <p:extLst>
+      <p:ext uri="{BB962C8B-B14F-4D97-AF65-F5344CB8AC3E}">
+        <p14:creationId xmlns:p14="http://schemas.microsoft.com/office/powerpoint/2010/main" val="466547344"/>
+      </p:ext>
+    </p:extLst>
+  </p:cSld>
+  <p:clrMapOvr>
+    <a:masterClrMapping/>
+  </p:clrMapOvr>
+</p:sld>
+</file>
+
+<file path=ppt/slides/slide26.xml><?xml version="1.0" encoding="utf-8"?>
+<p:sld xmlns:a="http://schemas.openxmlformats.org/drawingml/2006/main" xmlns:r="http://schemas.openxmlformats.org/officeDocument/2006/relationships" xmlns:p="http://schemas.openxmlformats.org/presentationml/2006/main">
+  <p:cSld>
+    <p:spTree>
+      <p:nvGrpSpPr>
+        <p:cNvPr id="1" name=""/>
+        <p:cNvGrpSpPr/>
+        <p:nvPr/>
+      </p:nvGrpSpPr>
+      <p:grpSpPr>
+        <a:xfrm>
+          <a:off x="0" y="0"/>
+          <a:ext cx="0" cy="0"/>
+          <a:chOff x="0" y="0"/>
+          <a:chExt cx="0" cy="0"/>
+        </a:xfrm>
+      </p:grpSpPr>
+      <p:sp>
+        <p:nvSpPr>
+          <p:cNvPr id="2" name="Title 1">
+            <a:extLst>
+              <a:ext uri="{FF2B5EF4-FFF2-40B4-BE49-F238E27FC236}">
                 <a16:creationId xmlns:a16="http://schemas.microsoft.com/office/drawing/2014/main" id="{7174E1C3-D64C-7DF6-AC08-417C3A2F99A2}"/>
               </a:ext>
             </a:extLst>
@@ -15695,22 +15835,11 @@
             </a:pPr>
             <a:r>
               <a:rPr lang="en-US" dirty="0"/>
-              <a:t>FILL OUT EVALUTION FORMS. Put in BOX before you leave!</a:t>
-            </a:r>
-          </a:p>
-          <a:p>
-            <a:pPr marL="0" indent="0">
-              <a:buNone/>
-            </a:pPr>
-            <a:r>
-              <a:rPr lang="en-US" dirty="0"/>
-              <a:t>Reminder: The next talk on “Software Quality Assurance Tooling” in this room right after and is related and useful too.</a:t>
-            </a:r>
-          </a:p>
-          <a:p>
-            <a:pPr marL="0" indent="0">
-              <a:buNone/>
-            </a:pPr>
+              <a:t>FILL OUT EVALUTION FORMS. </a:t>
+            </a:r>
+            <a:br>
+              <a:rPr lang="en-US" dirty="0"/>
+            </a:br>
             <a:endParaRPr lang="en-US" dirty="0"/>
           </a:p>
         </p:txBody>
@@ -15796,7 +15925,12 @@
             <p:ph idx="1"/>
           </p:nvPr>
         </p:nvSpPr>
-        <p:spPr/>
+        <p:spPr>
+          <a:xfrm>
+            <a:off x="680321" y="2336872"/>
+            <a:ext cx="9613861" cy="4386657"/>
+          </a:xfrm>
+        </p:spPr>
         <p:txBody>
           <a:bodyPr>
             <a:normAutofit/>
@@ -15856,6 +15990,28 @@
               <a:rPr lang="en-US" dirty="0"/>
               <a:t>Types of Testing</a:t>
             </a:r>
+          </a:p>
+          <a:p>
+            <a:r>
+              <a:rPr lang="en-US" dirty="0" err="1"/>
+              <a:t>Jupyter</a:t>
+            </a:r>
+            <a:r>
+              <a:rPr lang="en-US" dirty="0"/>
+              <a:t> Notebooks</a:t>
+            </a:r>
+          </a:p>
+          <a:p>
+            <a:r>
+              <a:rPr lang="en-US" dirty="0"/>
+              <a:t>TDD</a:t>
+            </a:r>
+          </a:p>
+          <a:p>
+            <a:endParaRPr lang="en-US" dirty="0"/>
+          </a:p>
+          <a:p>
+            <a:endParaRPr lang="en-US" dirty="0"/>
           </a:p>
         </p:txBody>
       </p:sp>

</xml_diff>

<commit_message>
Update slides for SummerSession
</commit_message>
<xml_diff>
--- a/UnitTestingSlides.pptx
+++ b/UnitTestingSlides.pptx
@@ -18,14 +18,14 @@
     <p:sldId id="261" r:id="rId9"/>
     <p:sldId id="263" r:id="rId10"/>
     <p:sldId id="277" r:id="rId11"/>
-    <p:sldId id="272" r:id="rId12"/>
-    <p:sldId id="278" r:id="rId13"/>
-    <p:sldId id="265" r:id="rId14"/>
-    <p:sldId id="279" r:id="rId15"/>
-    <p:sldId id="266" r:id="rId16"/>
-    <p:sldId id="267" r:id="rId17"/>
-    <p:sldId id="268" r:id="rId18"/>
-    <p:sldId id="280" r:id="rId19"/>
+    <p:sldId id="280" r:id="rId12"/>
+    <p:sldId id="272" r:id="rId13"/>
+    <p:sldId id="278" r:id="rId14"/>
+    <p:sldId id="265" r:id="rId15"/>
+    <p:sldId id="279" r:id="rId16"/>
+    <p:sldId id="266" r:id="rId17"/>
+    <p:sldId id="267" r:id="rId18"/>
+    <p:sldId id="268" r:id="rId19"/>
     <p:sldId id="262" r:id="rId20"/>
     <p:sldId id="276" r:id="rId21"/>
     <p:sldId id="274" r:id="rId22"/>
@@ -223,7 +223,7 @@
           <a:p>
             <a:fld id="{EF6A6A60-C693-BC49-85A7-98B318EF45A1}" type="datetimeFigureOut">
               <a:rPr lang="en-US" smtClean="0"/>
-              <a:t>3/10/24</a:t>
+              <a:t>7/25/24</a:t>
             </a:fld>
             <a:endParaRPr lang="en-US"/>
           </a:p>
@@ -1059,7 +1059,7 @@
           <a:p>
             <a:fld id="{36CD89F0-D00C-704A-A77B-5E0A27D974ED}" type="slidenum">
               <a:rPr lang="en-US" smtClean="0"/>
-              <a:t>11</a:t>
+              <a:t>12</a:t>
             </a:fld>
             <a:endParaRPr lang="en-US"/>
           </a:p>
@@ -1352,7 +1352,7 @@
           <a:p>
             <a:fld id="{78ABE3C1-DBE1-495D-B57B-2849774B866A}" type="datetimeFigureOut">
               <a:rPr lang="en-US" dirty="0"/>
-              <a:t>3/10/24</a:t>
+              <a:t>7/25/24</a:t>
             </a:fld>
             <a:endParaRPr lang="en-US" dirty="0"/>
           </a:p>
@@ -1761,7 +1761,7 @@
           <a:p>
             <a:fld id="{446C117F-5CCF-4837-BE5F-2B92066CAFAF}" type="datetimeFigureOut">
               <a:rPr lang="en-US" dirty="0"/>
-              <a:t>3/10/24</a:t>
+              <a:t>7/25/24</a:t>
             </a:fld>
             <a:endParaRPr lang="en-US" dirty="0"/>
           </a:p>
@@ -2092,7 +2092,7 @@
           <a:p>
             <a:fld id="{84EB90BD-B6CE-46B7-997F-7313B992CCDC}" type="datetimeFigureOut">
               <a:rPr lang="en-US" dirty="0"/>
-              <a:t>3/10/24</a:t>
+              <a:t>7/25/24</a:t>
             </a:fld>
             <a:endParaRPr lang="en-US" dirty="0"/>
           </a:p>
@@ -2492,7 +2492,7 @@
           <a:p>
             <a:fld id="{CDB9D11F-B188-461D-B23F-39381795C052}" type="datetimeFigureOut">
               <a:rPr lang="en-US" dirty="0"/>
-              <a:t>3/10/24</a:t>
+              <a:t>7/25/24</a:t>
             </a:fld>
             <a:endParaRPr lang="en-US" dirty="0"/>
           </a:p>
@@ -3055,7 +3055,7 @@
           <a:p>
             <a:fld id="{52E6D8D9-55A2-4063-B0F3-121F44549695}" type="datetimeFigureOut">
               <a:rPr lang="en-US" dirty="0"/>
-              <a:t>3/10/24</a:t>
+              <a:t>7/25/24</a:t>
             </a:fld>
             <a:endParaRPr lang="en-US" dirty="0"/>
           </a:p>
@@ -3731,7 +3731,7 @@
           <a:p>
             <a:fld id="{D4B24536-994D-4021-A283-9F449C0DB509}" type="datetimeFigureOut">
               <a:rPr lang="en-US" dirty="0"/>
-              <a:t>3/10/24</a:t>
+              <a:t>7/25/24</a:t>
             </a:fld>
             <a:endParaRPr lang="en-US" dirty="0"/>
           </a:p>
@@ -4639,7 +4639,7 @@
           <a:p>
             <a:fld id="{3CBBBB78-C96F-47B7-AB17-D852CA960AC9}" type="datetimeFigureOut">
               <a:rPr lang="en-US" dirty="0"/>
-              <a:t>3/10/24</a:t>
+              <a:t>7/25/24</a:t>
             </a:fld>
             <a:endParaRPr lang="en-US" dirty="0"/>
           </a:p>
@@ -4947,7 +4947,7 @@
           <a:p>
             <a:fld id="{1FA3F48C-C7C6-4055-9F49-3777875E72AE}" type="datetimeFigureOut">
               <a:rPr lang="en-US" dirty="0"/>
-              <a:t>3/10/24</a:t>
+              <a:t>7/25/24</a:t>
             </a:fld>
             <a:endParaRPr lang="en-US" dirty="0"/>
           </a:p>
@@ -5206,7 +5206,7 @@
           <a:p>
             <a:fld id="{6178E61D-D431-422C-9764-11DAFE33AB63}" type="datetimeFigureOut">
               <a:rPr lang="en-US" dirty="0"/>
-              <a:t>3/10/24</a:t>
+              <a:t>7/25/24</a:t>
             </a:fld>
             <a:endParaRPr lang="en-US" dirty="0"/>
           </a:p>
@@ -5525,7 +5525,7 @@
           <a:p>
             <a:fld id="{12DE42F4-6EEF-4EF7-8ED4-2208F0F89A08}" type="datetimeFigureOut">
               <a:rPr lang="en-US" dirty="0"/>
-              <a:t>3/10/24</a:t>
+              <a:t>7/25/24</a:t>
             </a:fld>
             <a:endParaRPr lang="en-US" dirty="0"/>
           </a:p>
@@ -5909,7 +5909,7 @@
           <a:p>
             <a:fld id="{30578ACC-22D6-47C1-A373-4FD133E34F3C}" type="datetimeFigureOut">
               <a:rPr lang="en-US" dirty="0"/>
-              <a:t>3/10/24</a:t>
+              <a:t>7/25/24</a:t>
             </a:fld>
             <a:endParaRPr lang="en-US" dirty="0"/>
           </a:p>
@@ -6280,7 +6280,7 @@
           <a:p>
             <a:fld id="{4E5A6C69-6797-4E8A-BF37-F2C3751466E9}" type="datetimeFigureOut">
               <a:rPr lang="en-US" dirty="0"/>
-              <a:t>3/10/24</a:t>
+              <a:t>7/25/24</a:t>
             </a:fld>
             <a:endParaRPr lang="en-US" dirty="0"/>
           </a:p>
@@ -6781,7 +6781,7 @@
           <a:p>
             <a:fld id="{D82014A1-A632-4878-A0D3-F52BA7563730}" type="datetimeFigureOut">
               <a:rPr lang="en-US" dirty="0"/>
-              <a:t>3/10/24</a:t>
+              <a:t>7/25/24</a:t>
             </a:fld>
             <a:endParaRPr lang="en-US" dirty="0"/>
           </a:p>
@@ -7033,7 +7033,7 @@
           <a:p>
             <a:fld id="{CE99F462-093F-4566-844B-4C71F2739DA5}" type="datetimeFigureOut">
               <a:rPr lang="en-US" dirty="0"/>
-              <a:t>3/10/24</a:t>
+              <a:t>7/25/24</a:t>
             </a:fld>
             <a:endParaRPr lang="en-US" dirty="0"/>
           </a:p>
@@ -7191,7 +7191,7 @@
           <a:p>
             <a:fld id="{3D24A7AC-904D-4781-85BA-7D10C17ED021}" type="datetimeFigureOut">
               <a:rPr lang="en-US" dirty="0"/>
-              <a:t>3/10/24</a:t>
+              <a:t>7/25/24</a:t>
             </a:fld>
             <a:endParaRPr lang="en-US" dirty="0"/>
           </a:p>
@@ -7576,7 +7576,7 @@
           <a:p>
             <a:fld id="{E331444B-B92B-4E27-8C94-BB93EAF5CB18}" type="datetimeFigureOut">
               <a:rPr lang="en-US" dirty="0"/>
-              <a:t>3/10/24</a:t>
+              <a:t>7/25/24</a:t>
             </a:fld>
             <a:endParaRPr lang="en-US" dirty="0"/>
           </a:p>
@@ -7980,7 +7980,7 @@
           <a:p>
             <a:fld id="{363EFA5E-FA76-400D-B3DC-F0BA90E6D107}" type="datetimeFigureOut">
               <a:rPr lang="en-US" dirty="0"/>
-              <a:t>3/10/24</a:t>
+              <a:t>7/25/24</a:t>
             </a:fld>
             <a:endParaRPr lang="en-US" dirty="0"/>
           </a:p>
@@ -8219,7 +8219,7 @@
           <a:p>
             <a:fld id="{9D6E9DEC-419B-4CC5-A080-3B06BD5A8291}" type="datetimeFigureOut">
               <a:rPr lang="en-US" dirty="0"/>
-              <a:t>3/10/24</a:t>
+              <a:t>7/25/24</a:t>
             </a:fld>
             <a:endParaRPr lang="en-US" dirty="0"/>
           </a:p>
@@ -8693,7 +8693,7 @@
             </a:r>
             <a:r>
               <a:rPr lang="en-US" dirty="0" err="1"/>
-              <a:t>Wintersession</a:t>
+              <a:t>SummerSession</a:t>
             </a:r>
             <a:r>
               <a:rPr lang="en-US" dirty="0"/>
@@ -8766,86 +8766,6 @@
       </p:sp>
       <p:sp>
         <p:nvSpPr>
-          <p:cNvPr id="7" name="TextBox 6">
-            <a:extLst>
-              <a:ext uri="{FF2B5EF4-FFF2-40B4-BE49-F238E27FC236}">
-                <a16:creationId xmlns:a16="http://schemas.microsoft.com/office/drawing/2014/main" id="{B65024E7-AD5E-64E6-556F-D6D51B093CA0}"/>
-              </a:ext>
-            </a:extLst>
-          </p:cNvPr>
-          <p:cNvSpPr txBox="1"/>
-          <p:nvPr/>
-        </p:nvSpPr>
-        <p:spPr>
-          <a:xfrm>
-            <a:off x="-460498" y="992330"/>
-            <a:ext cx="6172200" cy="1015663"/>
-          </a:xfrm>
-          <a:prstGeom prst="rect">
-            <a:avLst/>
-          </a:prstGeom>
-          <a:noFill/>
-        </p:spPr>
-        <p:txBody>
-          <a:bodyPr wrap="square">
-            <a:spAutoFit/>
-          </a:bodyPr>
-          <a:lstStyle/>
-          <a:p>
-            <a:pPr algn="ctr"/>
-            <a:r>
-              <a:rPr lang="en-US" sz="2000" dirty="0"/>
-              <a:t>SCAN THE QR CODE</a:t>
-            </a:r>
-          </a:p>
-          <a:p>
-            <a:pPr algn="ctr"/>
-            <a:r>
-              <a:rPr lang="en-US" sz="2000" dirty="0"/>
-              <a:t>And Login with your NET ID to CHECK-IN</a:t>
-            </a:r>
-          </a:p>
-          <a:p>
-            <a:pPr algn="ctr"/>
-            <a:r>
-              <a:rPr lang="en-US" sz="2000" dirty="0"/>
-              <a:t>This is the on-line attendance sheet</a:t>
-            </a:r>
-          </a:p>
-        </p:txBody>
-      </p:sp>
-      <p:pic>
-        <p:nvPicPr>
-          <p:cNvPr id="6" name="Picture 5">
-            <a:extLst>
-              <a:ext uri="{FF2B5EF4-FFF2-40B4-BE49-F238E27FC236}">
-                <a16:creationId xmlns:a16="http://schemas.microsoft.com/office/drawing/2014/main" id="{55E48979-FD95-315B-2461-8197C8DED578}"/>
-              </a:ext>
-            </a:extLst>
-          </p:cNvPr>
-          <p:cNvPicPr>
-            <a:picLocks noChangeAspect="1"/>
-          </p:cNvPicPr>
-          <p:nvPr/>
-        </p:nvPicPr>
-        <p:blipFill>
-          <a:blip r:embed="rId4"/>
-          <a:stretch>
-            <a:fillRect/>
-          </a:stretch>
-        </p:blipFill>
-        <p:spPr>
-          <a:xfrm>
-            <a:off x="5102136" y="119752"/>
-            <a:ext cx="2328559" cy="2346001"/>
-          </a:xfrm>
-          <a:prstGeom prst="rect">
-            <a:avLst/>
-          </a:prstGeom>
-        </p:spPr>
-      </p:pic>
-      <p:sp>
-        <p:nvSpPr>
           <p:cNvPr id="8" name="TextBox 7">
             <a:extLst>
               <a:ext uri="{FF2B5EF4-FFF2-40B4-BE49-F238E27FC236}">
@@ -8859,7 +8779,7 @@
         <p:spPr>
           <a:xfrm>
             <a:off x="7513825" y="252384"/>
-            <a:ext cx="4666727" cy="923330"/>
+            <a:ext cx="256802" cy="646331"/>
           </a:xfrm>
           <a:prstGeom prst="rect">
             <a:avLst/>
@@ -8871,29 +8791,6 @@
             <a:spAutoFit/>
           </a:bodyPr>
           <a:lstStyle/>
-          <a:p>
-            <a:r>
-              <a:rPr lang="en-US" sz="1800" dirty="0">
-                <a:effectLst/>
-                <a:latin typeface="Tahoma" panose="020B0604030504040204" pitchFamily="34" charset="0"/>
-              </a:rPr>
-              <a:t>https://</a:t>
-            </a:r>
-            <a:r>
-              <a:rPr lang="en-US" sz="1800" dirty="0" err="1">
-                <a:effectLst/>
-                <a:latin typeface="Tahoma" panose="020B0604030504040204" pitchFamily="34" charset="0"/>
-              </a:rPr>
-              <a:t>cglink.me</a:t>
-            </a:r>
-            <a:r>
-              <a:rPr lang="en-US" sz="1800" dirty="0">
-                <a:effectLst/>
-                <a:latin typeface="Tahoma" panose="020B0604030504040204" pitchFamily="34" charset="0"/>
-              </a:rPr>
-              <a:t>/2gi/c19387791115114258</a:t>
-            </a:r>
-          </a:p>
           <a:p>
             <a:r>
               <a:rPr lang="en-US" sz="1800" dirty="0">
@@ -9515,6 +9412,204 @@
           <p:cNvPr id="2" name="Title 1">
             <a:extLst>
               <a:ext uri="{FF2B5EF4-FFF2-40B4-BE49-F238E27FC236}">
+                <a16:creationId xmlns:a16="http://schemas.microsoft.com/office/drawing/2014/main" id="{2F1138F9-32CF-98D5-B3A0-D592C6510B80}"/>
+              </a:ext>
+            </a:extLst>
+          </p:cNvPr>
+          <p:cNvSpPr>
+            <a:spLocks noGrp="1"/>
+          </p:cNvSpPr>
+          <p:nvPr>
+            <p:ph type="title"/>
+          </p:nvPr>
+        </p:nvSpPr>
+        <p:spPr/>
+        <p:txBody>
+          <a:bodyPr/>
+          <a:lstStyle/>
+          <a:p>
+            <a:r>
+              <a:rPr lang="en-US" dirty="0" err="1"/>
+              <a:t>Jupyter</a:t>
+            </a:r>
+            <a:r>
+              <a:rPr lang="en-US" dirty="0"/>
+              <a:t> Notebooks</a:t>
+            </a:r>
+          </a:p>
+        </p:txBody>
+      </p:sp>
+      <p:sp>
+        <p:nvSpPr>
+          <p:cNvPr id="3" name="Content Placeholder 2">
+            <a:extLst>
+              <a:ext uri="{FF2B5EF4-FFF2-40B4-BE49-F238E27FC236}">
+                <a16:creationId xmlns:a16="http://schemas.microsoft.com/office/drawing/2014/main" id="{91D54C1D-6092-56DC-5F3C-1FC851E87E5E}"/>
+              </a:ext>
+            </a:extLst>
+          </p:cNvPr>
+          <p:cNvSpPr>
+            <a:spLocks noGrp="1"/>
+          </p:cNvSpPr>
+          <p:nvPr>
+            <p:ph idx="1"/>
+          </p:nvPr>
+        </p:nvSpPr>
+        <p:spPr>
+          <a:xfrm>
+            <a:off x="680321" y="2336873"/>
+            <a:ext cx="10419801" cy="4318570"/>
+          </a:xfrm>
+        </p:spPr>
+        <p:txBody>
+          <a:bodyPr>
+            <a:normAutofit/>
+          </a:bodyPr>
+          <a:lstStyle/>
+          <a:p>
+            <a:pPr marL="0" indent="0">
+              <a:buNone/>
+            </a:pPr>
+            <a:r>
+              <a:rPr lang="en-US" dirty="0"/>
+              <a:t>How can I apply unit testing with </a:t>
+            </a:r>
+            <a:r>
+              <a:rPr lang="en-US" dirty="0" err="1"/>
+              <a:t>Jupyter</a:t>
+            </a:r>
+            <a:r>
+              <a:rPr lang="en-US" dirty="0"/>
+              <a:t> notebooks?</a:t>
+            </a:r>
+          </a:p>
+          <a:p>
+            <a:pPr marL="0" indent="0">
+              <a:buNone/>
+            </a:pPr>
+            <a:endParaRPr lang="en-US" dirty="0"/>
+          </a:p>
+          <a:p>
+            <a:pPr marL="0" indent="0">
+              <a:buNone/>
+            </a:pPr>
+            <a:r>
+              <a:rPr lang="en-US" dirty="0"/>
+              <a:t>My Recommendation:</a:t>
+            </a:r>
+          </a:p>
+          <a:p>
+            <a:pPr lvl="1"/>
+            <a:r>
+              <a:rPr lang="en-US" dirty="0"/>
+              <a:t>Create modules in the same directory as .</a:t>
+            </a:r>
+            <a:r>
+              <a:rPr lang="en-US" dirty="0" err="1"/>
+              <a:t>ipynb</a:t>
+            </a:r>
+            <a:r>
+              <a:rPr lang="en-US" dirty="0"/>
+              <a:t> with helpful functions.</a:t>
+            </a:r>
+          </a:p>
+          <a:p>
+            <a:pPr lvl="1"/>
+            <a:r>
+              <a:rPr lang="en-US" dirty="0"/>
+              <a:t>Write unit tests for the helpful functions</a:t>
+            </a:r>
+          </a:p>
+          <a:p>
+            <a:pPr lvl="1"/>
+            <a:r>
+              <a:rPr lang="en-US" dirty="0"/>
+              <a:t>Use the helpful function in your notebook to:</a:t>
+            </a:r>
+          </a:p>
+          <a:p>
+            <a:pPr lvl="2"/>
+            <a:r>
+              <a:rPr lang="en-US" dirty="0"/>
+              <a:t>Simplify your notebook code.</a:t>
+            </a:r>
+          </a:p>
+          <a:p>
+            <a:pPr lvl="2"/>
+            <a:r>
+              <a:rPr lang="en-US" dirty="0"/>
+              <a:t>Reduce debugging time by using tested shared functions.</a:t>
+            </a:r>
+          </a:p>
+          <a:p>
+            <a:pPr lvl="2"/>
+            <a:r>
+              <a:rPr lang="en-US" dirty="0"/>
+              <a:t>Applies principal of software module architecture</a:t>
+            </a:r>
+          </a:p>
+          <a:p>
+            <a:pPr marL="1371600" lvl="3" indent="0">
+              <a:buNone/>
+            </a:pPr>
+            <a:r>
+              <a:rPr lang="en-US" dirty="0">
+                <a:hlinkClick r:id="rId2"/>
+              </a:rPr>
+              <a:t>https://appmaster.io/blog/why-use-a-modular-architecture-in-software-design</a:t>
+            </a:r>
+            <a:endParaRPr lang="en-US" dirty="0"/>
+          </a:p>
+          <a:p>
+            <a:pPr lvl="1"/>
+            <a:r>
+              <a:rPr lang="en-US" dirty="0"/>
+              <a:t>Still retain advantages of fast prototyping and experimentation of Notebooks.</a:t>
+            </a:r>
+          </a:p>
+          <a:p>
+            <a:pPr marL="1371600" lvl="3" indent="0">
+              <a:buNone/>
+            </a:pPr>
+            <a:endParaRPr lang="en-US" dirty="0"/>
+          </a:p>
+        </p:txBody>
+      </p:sp>
+    </p:spTree>
+    <p:extLst>
+      <p:ext uri="{BB962C8B-B14F-4D97-AF65-F5344CB8AC3E}">
+        <p14:creationId xmlns:p14="http://schemas.microsoft.com/office/powerpoint/2010/main" val="819061628"/>
+      </p:ext>
+    </p:extLst>
+  </p:cSld>
+  <p:clrMapOvr>
+    <a:masterClrMapping/>
+  </p:clrMapOvr>
+</p:sld>
+</file>
+
+<file path=ppt/slides/slide12.xml><?xml version="1.0" encoding="utf-8"?>
+<p:sld xmlns:a="http://schemas.openxmlformats.org/drawingml/2006/main" xmlns:r="http://schemas.openxmlformats.org/officeDocument/2006/relationships" xmlns:p="http://schemas.openxmlformats.org/presentationml/2006/main">
+  <p:cSld>
+    <p:spTree>
+      <p:nvGrpSpPr>
+        <p:cNvPr id="1" name=""/>
+        <p:cNvGrpSpPr/>
+        <p:nvPr/>
+      </p:nvGrpSpPr>
+      <p:grpSpPr>
+        <a:xfrm>
+          <a:off x="0" y="0"/>
+          <a:ext cx="0" cy="0"/>
+          <a:chOff x="0" y="0"/>
+          <a:chExt cx="0" cy="0"/>
+        </a:xfrm>
+      </p:grpSpPr>
+      <p:sp>
+        <p:nvSpPr>
+          <p:cNvPr id="2" name="Title 1">
+            <a:extLst>
+              <a:ext uri="{FF2B5EF4-FFF2-40B4-BE49-F238E27FC236}">
                 <a16:creationId xmlns:a16="http://schemas.microsoft.com/office/drawing/2014/main" id="{73616EDE-C681-FF0F-08B5-A0FCB45FC85D}"/>
               </a:ext>
             </a:extLst>
@@ -9692,7 +9787,7 @@
 </p:sld>
 </file>
 
-<file path=ppt/slides/slide12.xml><?xml version="1.0" encoding="utf-8"?>
+<file path=ppt/slides/slide13.xml><?xml version="1.0" encoding="utf-8"?>
 <p:sld xmlns:a="http://schemas.openxmlformats.org/drawingml/2006/main" xmlns:r="http://schemas.openxmlformats.org/officeDocument/2006/relationships" xmlns:p="http://schemas.openxmlformats.org/presentationml/2006/main">
   <p:cSld>
     <p:spTree>
@@ -10442,7 +10537,7 @@
 </p:sld>
 </file>
 
-<file path=ppt/slides/slide13.xml><?xml version="1.0" encoding="utf-8"?>
+<file path=ppt/slides/slide14.xml><?xml version="1.0" encoding="utf-8"?>
 <p:sld xmlns:a="http://schemas.openxmlformats.org/drawingml/2006/main" xmlns:r="http://schemas.openxmlformats.org/officeDocument/2006/relationships" xmlns:p="http://schemas.openxmlformats.org/presentationml/2006/main">
   <p:cSld>
     <p:spTree>
@@ -10672,7 +10767,7 @@
 </p:sld>
 </file>
 
-<file path=ppt/slides/slide14.xml><?xml version="1.0" encoding="utf-8"?>
+<file path=ppt/slides/slide15.xml><?xml version="1.0" encoding="utf-8"?>
 <p:sld xmlns:a="http://schemas.openxmlformats.org/drawingml/2006/main" xmlns:r="http://schemas.openxmlformats.org/officeDocument/2006/relationships" xmlns:p="http://schemas.openxmlformats.org/presentationml/2006/main">
   <p:cSld>
     <p:spTree>
@@ -11445,7 +11540,7 @@
 </p:sld>
 </file>
 
-<file path=ppt/slides/slide15.xml><?xml version="1.0" encoding="utf-8"?>
+<file path=ppt/slides/slide16.xml><?xml version="1.0" encoding="utf-8"?>
 <p:sld xmlns:a="http://schemas.openxmlformats.org/drawingml/2006/main" xmlns:r="http://schemas.openxmlformats.org/officeDocument/2006/relationships" xmlns:p="http://schemas.openxmlformats.org/presentationml/2006/main">
   <p:cSld>
     <p:spTree>
@@ -11880,7 +11975,7 @@
 </p:sld>
 </file>
 
-<file path=ppt/slides/slide16.xml><?xml version="1.0" encoding="utf-8"?>
+<file path=ppt/slides/slide17.xml><?xml version="1.0" encoding="utf-8"?>
 <p:sld xmlns:a="http://schemas.openxmlformats.org/drawingml/2006/main" xmlns:r="http://schemas.openxmlformats.org/officeDocument/2006/relationships" xmlns:p="http://schemas.openxmlformats.org/presentationml/2006/main">
   <p:cSld>
     <p:spTree>
@@ -12375,7 +12470,7 @@
 </p:sld>
 </file>
 
-<file path=ppt/slides/slide17.xml><?xml version="1.0" encoding="utf-8"?>
+<file path=ppt/slides/slide18.xml><?xml version="1.0" encoding="utf-8"?>
 <p:sld xmlns:a="http://schemas.openxmlformats.org/drawingml/2006/main" xmlns:r="http://schemas.openxmlformats.org/officeDocument/2006/relationships" xmlns:p="http://schemas.openxmlformats.org/presentationml/2006/main">
   <p:cSld>
     <p:spTree>
@@ -12666,160 +12761,6 @@
       </p:par>
     </p:tnLst>
   </p:timing>
-</p:sld>
-</file>
-
-<file path=ppt/slides/slide18.xml><?xml version="1.0" encoding="utf-8"?>
-<p:sld xmlns:a="http://schemas.openxmlformats.org/drawingml/2006/main" xmlns:r="http://schemas.openxmlformats.org/officeDocument/2006/relationships" xmlns:p="http://schemas.openxmlformats.org/presentationml/2006/main">
-  <p:cSld>
-    <p:spTree>
-      <p:nvGrpSpPr>
-        <p:cNvPr id="1" name=""/>
-        <p:cNvGrpSpPr/>
-        <p:nvPr/>
-      </p:nvGrpSpPr>
-      <p:grpSpPr>
-        <a:xfrm>
-          <a:off x="0" y="0"/>
-          <a:ext cx="0" cy="0"/>
-          <a:chOff x="0" y="0"/>
-          <a:chExt cx="0" cy="0"/>
-        </a:xfrm>
-      </p:grpSpPr>
-      <p:sp>
-        <p:nvSpPr>
-          <p:cNvPr id="2" name="Title 1">
-            <a:extLst>
-              <a:ext uri="{FF2B5EF4-FFF2-40B4-BE49-F238E27FC236}">
-                <a16:creationId xmlns:a16="http://schemas.microsoft.com/office/drawing/2014/main" id="{2F1138F9-32CF-98D5-B3A0-D592C6510B80}"/>
-              </a:ext>
-            </a:extLst>
-          </p:cNvPr>
-          <p:cNvSpPr>
-            <a:spLocks noGrp="1"/>
-          </p:cNvSpPr>
-          <p:nvPr>
-            <p:ph type="title"/>
-          </p:nvPr>
-        </p:nvSpPr>
-        <p:spPr/>
-        <p:txBody>
-          <a:bodyPr/>
-          <a:lstStyle/>
-          <a:p>
-            <a:r>
-              <a:rPr lang="en-US" dirty="0" err="1"/>
-              <a:t>Jupyter</a:t>
-            </a:r>
-            <a:r>
-              <a:rPr lang="en-US" dirty="0"/>
-              <a:t> Notebooks</a:t>
-            </a:r>
-          </a:p>
-        </p:txBody>
-      </p:sp>
-      <p:sp>
-        <p:nvSpPr>
-          <p:cNvPr id="3" name="Content Placeholder 2">
-            <a:extLst>
-              <a:ext uri="{FF2B5EF4-FFF2-40B4-BE49-F238E27FC236}">
-                <a16:creationId xmlns:a16="http://schemas.microsoft.com/office/drawing/2014/main" id="{91D54C1D-6092-56DC-5F3C-1FC851E87E5E}"/>
-              </a:ext>
-            </a:extLst>
-          </p:cNvPr>
-          <p:cNvSpPr>
-            <a:spLocks noGrp="1"/>
-          </p:cNvSpPr>
-          <p:nvPr>
-            <p:ph idx="1"/>
-          </p:nvPr>
-        </p:nvSpPr>
-        <p:spPr/>
-        <p:txBody>
-          <a:bodyPr/>
-          <a:lstStyle/>
-          <a:p>
-            <a:pPr marL="0" indent="0">
-              <a:buNone/>
-            </a:pPr>
-            <a:r>
-              <a:rPr lang="en-US" dirty="0"/>
-              <a:t>How can I do unit testing with </a:t>
-            </a:r>
-            <a:r>
-              <a:rPr lang="en-US" dirty="0" err="1"/>
-              <a:t>Jupyter</a:t>
-            </a:r>
-            <a:r>
-              <a:rPr lang="en-US" dirty="0"/>
-              <a:t> notebooks?</a:t>
-            </a:r>
-          </a:p>
-          <a:p>
-            <a:pPr marL="0" indent="0">
-              <a:buNone/>
-            </a:pPr>
-            <a:endParaRPr lang="en-US" dirty="0"/>
-          </a:p>
-          <a:p>
-            <a:pPr marL="0" indent="0">
-              <a:buNone/>
-            </a:pPr>
-            <a:r>
-              <a:rPr lang="en-US" dirty="0"/>
-              <a:t>Options:</a:t>
-            </a:r>
-          </a:p>
-          <a:p>
-            <a:pPr lvl="1"/>
-            <a:r>
-              <a:rPr lang="en-US" dirty="0" err="1"/>
-              <a:t>NBMake</a:t>
-            </a:r>
-            <a:endParaRPr lang="en-US" dirty="0"/>
-          </a:p>
-          <a:p>
-            <a:pPr lvl="1"/>
-            <a:r>
-              <a:rPr lang="en-US" dirty="0"/>
-              <a:t>Use helper modules and </a:t>
-            </a:r>
-            <a:r>
-              <a:rPr lang="en-US" dirty="0" err="1"/>
-              <a:t>pytest</a:t>
-            </a:r>
-            <a:r>
-              <a:rPr lang="en-US" dirty="0"/>
-              <a:t> the helper modules</a:t>
-            </a:r>
-          </a:p>
-          <a:p>
-            <a:pPr lvl="1"/>
-            <a:r>
-              <a:rPr lang="en-US" dirty="0"/>
-              <a:t>Put various cells in .</a:t>
-            </a:r>
-            <a:r>
-              <a:rPr lang="en-US" dirty="0" err="1"/>
-              <a:t>py</a:t>
-            </a:r>
-            <a:r>
-              <a:rPr lang="en-US" dirty="0"/>
-              <a:t> files and unit test the files.</a:t>
-            </a:r>
-          </a:p>
-        </p:txBody>
-      </p:sp>
-    </p:spTree>
-    <p:extLst>
-      <p:ext uri="{BB962C8B-B14F-4D97-AF65-F5344CB8AC3E}">
-        <p14:creationId xmlns:p14="http://schemas.microsoft.com/office/powerpoint/2010/main" val="819061628"/>
-      </p:ext>
-    </p:extLst>
-  </p:cSld>
-  <p:clrMapOvr>
-    <a:masterClrMapping/>
-  </p:clrMapOvr>
 </p:sld>
 </file>
 
@@ -17197,7 +17138,7 @@
             </a:br>
             <a:r>
               <a:rPr lang="en-US" sz="2900" dirty="0"/>
-              <a:t>This is great. I’m testing every possible scenario.</a:t>
+              <a:t>This is great. I’m creating tests for every possible scenario.</a:t>
             </a:r>
             <a:br>
               <a:rPr lang="en-US" sz="2900" dirty="0"/>
@@ -18408,7 +18349,7 @@
             </a:r>
             <a:r>
               <a:rPr lang="en-US" dirty="0"/>
-              <a:t> command:</a:t>
+              <a:t> command (in directory 02_pytest/examples):</a:t>
             </a:r>
           </a:p>
           <a:p>
@@ -18425,11 +18366,11 @@
             </a:r>
             <a:r>
               <a:rPr lang="en-US" sz="2400" dirty="0"/>
-              <a:t> –s </a:t>
+              <a:t> </a:t>
             </a:r>
             <a:r>
               <a:rPr lang="en-US" sz="2400" dirty="0" err="1"/>
-              <a:t>test_area.py</a:t>
+              <a:t>test_geometric_area.py</a:t>
             </a:r>
             <a:endParaRPr lang="en-US" sz="2400" dirty="0"/>
           </a:p>

</xml_diff>

<commit_message>
update title slide for winter session 2025
</commit_message>
<xml_diff>
--- a/UnitTestingSlides.pptx
+++ b/UnitTestingSlides.pptx
@@ -223,7 +223,7 @@
           <a:p>
             <a:fld id="{EF6A6A60-C693-BC49-85A7-98B318EF45A1}" type="datetimeFigureOut">
               <a:rPr lang="en-US" smtClean="0"/>
-              <a:t>7/25/24</a:t>
+              <a:t>1/17/25</a:t>
             </a:fld>
             <a:endParaRPr lang="en-US"/>
           </a:p>
@@ -1352,7 +1352,7 @@
           <a:p>
             <a:fld id="{78ABE3C1-DBE1-495D-B57B-2849774B866A}" type="datetimeFigureOut">
               <a:rPr lang="en-US" dirty="0"/>
-              <a:t>7/25/24</a:t>
+              <a:t>1/17/25</a:t>
             </a:fld>
             <a:endParaRPr lang="en-US" dirty="0"/>
           </a:p>
@@ -1761,7 +1761,7 @@
           <a:p>
             <a:fld id="{446C117F-5CCF-4837-BE5F-2B92066CAFAF}" type="datetimeFigureOut">
               <a:rPr lang="en-US" dirty="0"/>
-              <a:t>7/25/24</a:t>
+              <a:t>1/17/25</a:t>
             </a:fld>
             <a:endParaRPr lang="en-US" dirty="0"/>
           </a:p>
@@ -2092,7 +2092,7 @@
           <a:p>
             <a:fld id="{84EB90BD-B6CE-46B7-997F-7313B992CCDC}" type="datetimeFigureOut">
               <a:rPr lang="en-US" dirty="0"/>
-              <a:t>7/25/24</a:t>
+              <a:t>1/17/25</a:t>
             </a:fld>
             <a:endParaRPr lang="en-US" dirty="0"/>
           </a:p>
@@ -2492,7 +2492,7 @@
           <a:p>
             <a:fld id="{CDB9D11F-B188-461D-B23F-39381795C052}" type="datetimeFigureOut">
               <a:rPr lang="en-US" dirty="0"/>
-              <a:t>7/25/24</a:t>
+              <a:t>1/17/25</a:t>
             </a:fld>
             <a:endParaRPr lang="en-US" dirty="0"/>
           </a:p>
@@ -3055,7 +3055,7 @@
           <a:p>
             <a:fld id="{52E6D8D9-55A2-4063-B0F3-121F44549695}" type="datetimeFigureOut">
               <a:rPr lang="en-US" dirty="0"/>
-              <a:t>7/25/24</a:t>
+              <a:t>1/17/25</a:t>
             </a:fld>
             <a:endParaRPr lang="en-US" dirty="0"/>
           </a:p>
@@ -3731,7 +3731,7 @@
           <a:p>
             <a:fld id="{D4B24536-994D-4021-A283-9F449C0DB509}" type="datetimeFigureOut">
               <a:rPr lang="en-US" dirty="0"/>
-              <a:t>7/25/24</a:t>
+              <a:t>1/17/25</a:t>
             </a:fld>
             <a:endParaRPr lang="en-US" dirty="0"/>
           </a:p>
@@ -4639,7 +4639,7 @@
           <a:p>
             <a:fld id="{3CBBBB78-C96F-47B7-AB17-D852CA960AC9}" type="datetimeFigureOut">
               <a:rPr lang="en-US" dirty="0"/>
-              <a:t>7/25/24</a:t>
+              <a:t>1/17/25</a:t>
             </a:fld>
             <a:endParaRPr lang="en-US" dirty="0"/>
           </a:p>
@@ -4947,7 +4947,7 @@
           <a:p>
             <a:fld id="{1FA3F48C-C7C6-4055-9F49-3777875E72AE}" type="datetimeFigureOut">
               <a:rPr lang="en-US" dirty="0"/>
-              <a:t>7/25/24</a:t>
+              <a:t>1/17/25</a:t>
             </a:fld>
             <a:endParaRPr lang="en-US" dirty="0"/>
           </a:p>
@@ -5206,7 +5206,7 @@
           <a:p>
             <a:fld id="{6178E61D-D431-422C-9764-11DAFE33AB63}" type="datetimeFigureOut">
               <a:rPr lang="en-US" dirty="0"/>
-              <a:t>7/25/24</a:t>
+              <a:t>1/17/25</a:t>
             </a:fld>
             <a:endParaRPr lang="en-US" dirty="0"/>
           </a:p>
@@ -5525,7 +5525,7 @@
           <a:p>
             <a:fld id="{12DE42F4-6EEF-4EF7-8ED4-2208F0F89A08}" type="datetimeFigureOut">
               <a:rPr lang="en-US" dirty="0"/>
-              <a:t>7/25/24</a:t>
+              <a:t>1/17/25</a:t>
             </a:fld>
             <a:endParaRPr lang="en-US" dirty="0"/>
           </a:p>
@@ -5909,7 +5909,7 @@
           <a:p>
             <a:fld id="{30578ACC-22D6-47C1-A373-4FD133E34F3C}" type="datetimeFigureOut">
               <a:rPr lang="en-US" dirty="0"/>
-              <a:t>7/25/24</a:t>
+              <a:t>1/17/25</a:t>
             </a:fld>
             <a:endParaRPr lang="en-US" dirty="0"/>
           </a:p>
@@ -6280,7 +6280,7 @@
           <a:p>
             <a:fld id="{4E5A6C69-6797-4E8A-BF37-F2C3751466E9}" type="datetimeFigureOut">
               <a:rPr lang="en-US" dirty="0"/>
-              <a:t>7/25/24</a:t>
+              <a:t>1/17/25</a:t>
             </a:fld>
             <a:endParaRPr lang="en-US" dirty="0"/>
           </a:p>
@@ -6781,7 +6781,7 @@
           <a:p>
             <a:fld id="{D82014A1-A632-4878-A0D3-F52BA7563730}" type="datetimeFigureOut">
               <a:rPr lang="en-US" dirty="0"/>
-              <a:t>7/25/24</a:t>
+              <a:t>1/17/25</a:t>
             </a:fld>
             <a:endParaRPr lang="en-US" dirty="0"/>
           </a:p>
@@ -7033,7 +7033,7 @@
           <a:p>
             <a:fld id="{CE99F462-093F-4566-844B-4C71F2739DA5}" type="datetimeFigureOut">
               <a:rPr lang="en-US" dirty="0"/>
-              <a:t>7/25/24</a:t>
+              <a:t>1/17/25</a:t>
             </a:fld>
             <a:endParaRPr lang="en-US" dirty="0"/>
           </a:p>
@@ -7191,7 +7191,7 @@
           <a:p>
             <a:fld id="{3D24A7AC-904D-4781-85BA-7D10C17ED021}" type="datetimeFigureOut">
               <a:rPr lang="en-US" dirty="0"/>
-              <a:t>7/25/24</a:t>
+              <a:t>1/17/25</a:t>
             </a:fld>
             <a:endParaRPr lang="en-US" dirty="0"/>
           </a:p>
@@ -7576,7 +7576,7 @@
           <a:p>
             <a:fld id="{E331444B-B92B-4E27-8C94-BB93EAF5CB18}" type="datetimeFigureOut">
               <a:rPr lang="en-US" dirty="0"/>
-              <a:t>7/25/24</a:t>
+              <a:t>1/17/25</a:t>
             </a:fld>
             <a:endParaRPr lang="en-US" dirty="0"/>
           </a:p>
@@ -7980,7 +7980,7 @@
           <a:p>
             <a:fld id="{363EFA5E-FA76-400D-B3DC-F0BA90E6D107}" type="datetimeFigureOut">
               <a:rPr lang="en-US" dirty="0"/>
-              <a:t>7/25/24</a:t>
+              <a:t>1/17/25</a:t>
             </a:fld>
             <a:endParaRPr lang="en-US" dirty="0"/>
           </a:p>
@@ -8219,7 +8219,7 @@
           <a:p>
             <a:fld id="{9D6E9DEC-419B-4CC5-A080-3B06BD5A8291}" type="datetimeFigureOut">
               <a:rPr lang="en-US" dirty="0"/>
-              <a:t>7/25/24</a:t>
+              <a:t>1/17/25</a:t>
             </a:fld>
             <a:endParaRPr lang="en-US" dirty="0"/>
           </a:p>
@@ -8693,11 +8693,11 @@
             </a:r>
             <a:r>
               <a:rPr lang="en-US" dirty="0" err="1"/>
-              <a:t>SummerSession</a:t>
-            </a:r>
-            <a:r>
-              <a:rPr lang="en-US" dirty="0"/>
-              <a:t> 2024</a:t>
+              <a:t>WinterSession</a:t>
+            </a:r>
+            <a:r>
+              <a:rPr lang="en-US" dirty="0"/>
+              <a:t> 2025</a:t>
             </a:r>
           </a:p>
           <a:p>

</xml_diff>

<commit_message>
update slides to reference example files
</commit_message>
<xml_diff>
--- a/UnitTestingSlides.pptx
+++ b/UnitTestingSlides.pptx
@@ -223,7 +223,7 @@
           <a:p>
             <a:fld id="{EF6A6A60-C693-BC49-85A7-98B318EF45A1}" type="datetimeFigureOut">
               <a:rPr lang="en-US" smtClean="0"/>
-              <a:t>1/17/25</a:t>
+              <a:t>1/20/25</a:t>
             </a:fld>
             <a:endParaRPr lang="en-US"/>
           </a:p>
@@ -1078,6 +1078,90 @@
 </p:notes>
 </file>
 
+<file path=ppt/notesSlides/notesSlide8.xml><?xml version="1.0" encoding="utf-8"?>
+<p:notes xmlns:a="http://schemas.openxmlformats.org/drawingml/2006/main" xmlns:r="http://schemas.openxmlformats.org/officeDocument/2006/relationships" xmlns:p="http://schemas.openxmlformats.org/presentationml/2006/main">
+  <p:cSld>
+    <p:spTree>
+      <p:nvGrpSpPr>
+        <p:cNvPr id="1" name=""/>
+        <p:cNvGrpSpPr/>
+        <p:nvPr/>
+      </p:nvGrpSpPr>
+      <p:grpSpPr>
+        <a:xfrm>
+          <a:off x="0" y="0"/>
+          <a:ext cx="0" cy="0"/>
+          <a:chOff x="0" y="0"/>
+          <a:chExt cx="0" cy="0"/>
+        </a:xfrm>
+      </p:grpSpPr>
+      <p:sp>
+        <p:nvSpPr>
+          <p:cNvPr id="2" name="Slide Image Placeholder 1"/>
+          <p:cNvSpPr>
+            <a:spLocks noGrp="1" noRot="1" noChangeAspect="1"/>
+          </p:cNvSpPr>
+          <p:nvPr>
+            <p:ph type="sldImg"/>
+          </p:nvPr>
+        </p:nvSpPr>
+        <p:spPr/>
+      </p:sp>
+      <p:sp>
+        <p:nvSpPr>
+          <p:cNvPr id="3" name="Notes Placeholder 2"/>
+          <p:cNvSpPr>
+            <a:spLocks noGrp="1"/>
+          </p:cNvSpPr>
+          <p:nvPr>
+            <p:ph type="body" idx="1"/>
+          </p:nvPr>
+        </p:nvSpPr>
+        <p:spPr/>
+        <p:txBody>
+          <a:bodyPr/>
+          <a:lstStyle/>
+          <a:p>
+            <a:endParaRPr lang="en-US" dirty="0"/>
+          </a:p>
+        </p:txBody>
+      </p:sp>
+      <p:sp>
+        <p:nvSpPr>
+          <p:cNvPr id="4" name="Slide Number Placeholder 3"/>
+          <p:cNvSpPr>
+            <a:spLocks noGrp="1"/>
+          </p:cNvSpPr>
+          <p:nvPr>
+            <p:ph type="sldNum" sz="quarter" idx="5"/>
+          </p:nvPr>
+        </p:nvSpPr>
+        <p:spPr/>
+        <p:txBody>
+          <a:bodyPr/>
+          <a:lstStyle/>
+          <a:p>
+            <a:fld id="{36CD89F0-D00C-704A-A77B-5E0A27D974ED}" type="slidenum">
+              <a:rPr lang="en-US" smtClean="0"/>
+              <a:t>15</a:t>
+            </a:fld>
+            <a:endParaRPr lang="en-US"/>
+          </a:p>
+        </p:txBody>
+      </p:sp>
+    </p:spTree>
+    <p:extLst>
+      <p:ext uri="{BB962C8B-B14F-4D97-AF65-F5344CB8AC3E}">
+        <p14:creationId xmlns:p14="http://schemas.microsoft.com/office/powerpoint/2010/main" val="2305822779"/>
+      </p:ext>
+    </p:extLst>
+  </p:cSld>
+  <p:clrMapOvr>
+    <a:masterClrMapping/>
+  </p:clrMapOvr>
+</p:notes>
+</file>
+
 <file path=ppt/slideLayouts/slideLayout1.xml><?xml version="1.0" encoding="utf-8"?>
 <p:sldLayout xmlns:a="http://schemas.openxmlformats.org/drawingml/2006/main" xmlns:r="http://schemas.openxmlformats.org/officeDocument/2006/relationships" xmlns:p="http://schemas.openxmlformats.org/presentationml/2006/main" type="title" preserve="1">
   <p:cSld name="Title Slide">
@@ -1352,7 +1436,7 @@
           <a:p>
             <a:fld id="{78ABE3C1-DBE1-495D-B57B-2849774B866A}" type="datetimeFigureOut">
               <a:rPr lang="en-US" dirty="0"/>
-              <a:t>1/17/25</a:t>
+              <a:t>1/20/25</a:t>
             </a:fld>
             <a:endParaRPr lang="en-US" dirty="0"/>
           </a:p>
@@ -1761,7 +1845,7 @@
           <a:p>
             <a:fld id="{446C117F-5CCF-4837-BE5F-2B92066CAFAF}" type="datetimeFigureOut">
               <a:rPr lang="en-US" dirty="0"/>
-              <a:t>1/17/25</a:t>
+              <a:t>1/20/25</a:t>
             </a:fld>
             <a:endParaRPr lang="en-US" dirty="0"/>
           </a:p>
@@ -2092,7 +2176,7 @@
           <a:p>
             <a:fld id="{84EB90BD-B6CE-46B7-997F-7313B992CCDC}" type="datetimeFigureOut">
               <a:rPr lang="en-US" dirty="0"/>
-              <a:t>1/17/25</a:t>
+              <a:t>1/20/25</a:t>
             </a:fld>
             <a:endParaRPr lang="en-US" dirty="0"/>
           </a:p>
@@ -2492,7 +2576,7 @@
           <a:p>
             <a:fld id="{CDB9D11F-B188-461D-B23F-39381795C052}" type="datetimeFigureOut">
               <a:rPr lang="en-US" dirty="0"/>
-              <a:t>1/17/25</a:t>
+              <a:t>1/20/25</a:t>
             </a:fld>
             <a:endParaRPr lang="en-US" dirty="0"/>
           </a:p>
@@ -3055,7 +3139,7 @@
           <a:p>
             <a:fld id="{52E6D8D9-55A2-4063-B0F3-121F44549695}" type="datetimeFigureOut">
               <a:rPr lang="en-US" dirty="0"/>
-              <a:t>1/17/25</a:t>
+              <a:t>1/20/25</a:t>
             </a:fld>
             <a:endParaRPr lang="en-US" dirty="0"/>
           </a:p>
@@ -3731,7 +3815,7 @@
           <a:p>
             <a:fld id="{D4B24536-994D-4021-A283-9F449C0DB509}" type="datetimeFigureOut">
               <a:rPr lang="en-US" dirty="0"/>
-              <a:t>1/17/25</a:t>
+              <a:t>1/20/25</a:t>
             </a:fld>
             <a:endParaRPr lang="en-US" dirty="0"/>
           </a:p>
@@ -4639,7 +4723,7 @@
           <a:p>
             <a:fld id="{3CBBBB78-C96F-47B7-AB17-D852CA960AC9}" type="datetimeFigureOut">
               <a:rPr lang="en-US" dirty="0"/>
-              <a:t>1/17/25</a:t>
+              <a:t>1/20/25</a:t>
             </a:fld>
             <a:endParaRPr lang="en-US" dirty="0"/>
           </a:p>
@@ -4947,7 +5031,7 @@
           <a:p>
             <a:fld id="{1FA3F48C-C7C6-4055-9F49-3777875E72AE}" type="datetimeFigureOut">
               <a:rPr lang="en-US" dirty="0"/>
-              <a:t>1/17/25</a:t>
+              <a:t>1/20/25</a:t>
             </a:fld>
             <a:endParaRPr lang="en-US" dirty="0"/>
           </a:p>
@@ -5206,7 +5290,7 @@
           <a:p>
             <a:fld id="{6178E61D-D431-422C-9764-11DAFE33AB63}" type="datetimeFigureOut">
               <a:rPr lang="en-US" dirty="0"/>
-              <a:t>1/17/25</a:t>
+              <a:t>1/20/25</a:t>
             </a:fld>
             <a:endParaRPr lang="en-US" dirty="0"/>
           </a:p>
@@ -5525,7 +5609,7 @@
           <a:p>
             <a:fld id="{12DE42F4-6EEF-4EF7-8ED4-2208F0F89A08}" type="datetimeFigureOut">
               <a:rPr lang="en-US" dirty="0"/>
-              <a:t>1/17/25</a:t>
+              <a:t>1/20/25</a:t>
             </a:fld>
             <a:endParaRPr lang="en-US" dirty="0"/>
           </a:p>
@@ -5909,7 +5993,7 @@
           <a:p>
             <a:fld id="{30578ACC-22D6-47C1-A373-4FD133E34F3C}" type="datetimeFigureOut">
               <a:rPr lang="en-US" dirty="0"/>
-              <a:t>1/17/25</a:t>
+              <a:t>1/20/25</a:t>
             </a:fld>
             <a:endParaRPr lang="en-US" dirty="0"/>
           </a:p>
@@ -6280,7 +6364,7 @@
           <a:p>
             <a:fld id="{4E5A6C69-6797-4E8A-BF37-F2C3751466E9}" type="datetimeFigureOut">
               <a:rPr lang="en-US" dirty="0"/>
-              <a:t>1/17/25</a:t>
+              <a:t>1/20/25</a:t>
             </a:fld>
             <a:endParaRPr lang="en-US" dirty="0"/>
           </a:p>
@@ -6781,7 +6865,7 @@
           <a:p>
             <a:fld id="{D82014A1-A632-4878-A0D3-F52BA7563730}" type="datetimeFigureOut">
               <a:rPr lang="en-US" dirty="0"/>
-              <a:t>1/17/25</a:t>
+              <a:t>1/20/25</a:t>
             </a:fld>
             <a:endParaRPr lang="en-US" dirty="0"/>
           </a:p>
@@ -7033,7 +7117,7 @@
           <a:p>
             <a:fld id="{CE99F462-093F-4566-844B-4C71F2739DA5}" type="datetimeFigureOut">
               <a:rPr lang="en-US" dirty="0"/>
-              <a:t>1/17/25</a:t>
+              <a:t>1/20/25</a:t>
             </a:fld>
             <a:endParaRPr lang="en-US" dirty="0"/>
           </a:p>
@@ -7191,7 +7275,7 @@
           <a:p>
             <a:fld id="{3D24A7AC-904D-4781-85BA-7D10C17ED021}" type="datetimeFigureOut">
               <a:rPr lang="en-US" dirty="0"/>
-              <a:t>1/17/25</a:t>
+              <a:t>1/20/25</a:t>
             </a:fld>
             <a:endParaRPr lang="en-US" dirty="0"/>
           </a:p>
@@ -7576,7 +7660,7 @@
           <a:p>
             <a:fld id="{E331444B-B92B-4E27-8C94-BB93EAF5CB18}" type="datetimeFigureOut">
               <a:rPr lang="en-US" dirty="0"/>
-              <a:t>1/17/25</a:t>
+              <a:t>1/20/25</a:t>
             </a:fld>
             <a:endParaRPr lang="en-US" dirty="0"/>
           </a:p>
@@ -7980,7 +8064,7 @@
           <a:p>
             <a:fld id="{363EFA5E-FA76-400D-B3DC-F0BA90E6D107}" type="datetimeFigureOut">
               <a:rPr lang="en-US" dirty="0"/>
-              <a:t>1/17/25</a:t>
+              <a:t>1/20/25</a:t>
             </a:fld>
             <a:endParaRPr lang="en-US" dirty="0"/>
           </a:p>
@@ -8219,7 +8303,7 @@
           <a:p>
             <a:fld id="{9D6E9DEC-419B-4CC5-A080-3B06BD5A8291}" type="datetimeFigureOut">
               <a:rPr lang="en-US" dirty="0"/>
-              <a:t>1/17/25</a:t>
+              <a:t>1/20/25</a:t>
             </a:fld>
             <a:endParaRPr lang="en-US" dirty="0"/>
           </a:p>
@@ -8978,6 +9062,23 @@
             <a:pPr marL="0" indent="0">
               <a:buNone/>
             </a:pPr>
+            <a:r>
+              <a:rPr lang="en-US" dirty="0"/>
+              <a:t>(See example 02_pytest/examples/</a:t>
+            </a:r>
+            <a:r>
+              <a:rPr lang="en-US" dirty="0" err="1"/>
+              <a:t>test_geometric_area.py</a:t>
+            </a:r>
+            <a:r>
+              <a:rPr lang="en-US" dirty="0"/>
+              <a:t>)</a:t>
+            </a:r>
+          </a:p>
+          <a:p>
+            <a:pPr marL="0" indent="0">
+              <a:buNone/>
+            </a:pPr>
             <a:endParaRPr lang="en-US" dirty="0"/>
           </a:p>
           <a:p>
@@ -9019,7 +9120,7 @@
         </p:nvSpPr>
         <p:spPr>
           <a:xfrm>
-            <a:off x="1391824" y="3685007"/>
+            <a:off x="1391824" y="4306799"/>
             <a:ext cx="9613861" cy="2677656"/>
           </a:xfrm>
           <a:prstGeom prst="rect">
@@ -9463,7 +9564,7 @@
         </p:spPr>
         <p:txBody>
           <a:bodyPr>
-            <a:normAutofit/>
+            <a:normAutofit lnSpcReduction="10000"/>
           </a:bodyPr>
           <a:lstStyle/>
           <a:p>
@@ -9481,6 +9582,23 @@
             <a:r>
               <a:rPr lang="en-US" dirty="0"/>
               <a:t> notebooks?</a:t>
+            </a:r>
+          </a:p>
+          <a:p>
+            <a:pPr marL="0" indent="0">
+              <a:buNone/>
+            </a:pPr>
+            <a:r>
+              <a:rPr lang="en-US" dirty="0"/>
+              <a:t>(See example 02_pytest/examples/</a:t>
+            </a:r>
+            <a:r>
+              <a:rPr lang="en-US" dirty="0" err="1"/>
+              <a:t>notebook.ipynb</a:t>
+            </a:r>
+            <a:r>
+              <a:rPr lang="en-US" dirty="0"/>
+              <a:t>)</a:t>
             </a:r>
           </a:p>
           <a:p>
@@ -9664,7 +9782,9 @@
           </a:xfrm>
         </p:spPr>
         <p:txBody>
-          <a:bodyPr/>
+          <a:bodyPr>
+            <a:normAutofit lnSpcReduction="10000"/>
+          </a:bodyPr>
           <a:lstStyle/>
           <a:p>
             <a:pPr marL="0" indent="0">
@@ -9673,6 +9793,31 @@
             <a:r>
               <a:rPr lang="en-US" dirty="0"/>
               <a:t>You can use fixtures to setup and tear down test environments</a:t>
+            </a:r>
+          </a:p>
+          <a:p>
+            <a:pPr marL="0" indent="0">
+              <a:buNone/>
+            </a:pPr>
+            <a:r>
+              <a:rPr lang="en-US" dirty="0"/>
+              <a:t>(See examples </a:t>
+            </a:r>
+            <a:r>
+              <a:rPr lang="en-US" dirty="0" err="1"/>
+              <a:t>test_bmi_health.py</a:t>
+            </a:r>
+            <a:r>
+              <a:rPr lang="en-US" dirty="0"/>
+              <a:t>  and </a:t>
+            </a:r>
+            <a:r>
+              <a:rPr lang="en-US" dirty="0" err="1"/>
+              <a:t>test_find_people.py</a:t>
+            </a:r>
+            <a:r>
+              <a:rPr lang="en-US" dirty="0"/>
+              <a:t>)</a:t>
             </a:r>
           </a:p>
           <a:p>
@@ -10845,7 +10990,7 @@
         </p:spPr>
         <p:txBody>
           <a:bodyPr vert="horz" lIns="91440" tIns="45720" rIns="91440" bIns="45720" rtlCol="0">
-            <a:normAutofit fontScale="92500" lnSpcReduction="10000"/>
+            <a:normAutofit fontScale="92500" lnSpcReduction="20000"/>
           </a:bodyPr>
           <a:lstStyle>
             <a:lvl1pPr marL="228600" indent="-228600" algn="l" defTabSz="914400" rtl="0" eaLnBrk="1" latinLnBrk="0" hangingPunct="1">
@@ -11054,6 +11199,36 @@
               <a:buFont typeface="Arial" panose="020B0604020202020204" pitchFamily="34" charset="0"/>
               <a:buNone/>
             </a:pPr>
+            <a:r>
+              <a:rPr lang="en-US" dirty="0"/>
+              <a:t>   (See </a:t>
+            </a:r>
+            <a:r>
+              <a:rPr lang="en-US" dirty="0" err="1"/>
+              <a:t>flask_app.py</a:t>
+            </a:r>
+            <a:r>
+              <a:rPr lang="en-US" dirty="0"/>
+              <a:t> and </a:t>
+            </a:r>
+            <a:r>
+              <a:rPr lang="en-US" dirty="0" err="1"/>
+              <a:t>test_flask_app.py</a:t>
+            </a:r>
+            <a:r>
+              <a:rPr lang="en-US" dirty="0"/>
+              <a:t> for examples)</a:t>
+            </a:r>
+            <a:br>
+              <a:rPr lang="en-US" dirty="0"/>
+            </a:br>
+            <a:endParaRPr lang="en-US" dirty="0"/>
+          </a:p>
+          <a:p>
+            <a:pPr marL="0" indent="0">
+              <a:buFont typeface="Arial" panose="020B0604020202020204" pitchFamily="34" charset="0"/>
+              <a:buNone/>
+            </a:pPr>
             <a:endParaRPr lang="en-US" dirty="0"/>
           </a:p>
           <a:p>
@@ -11132,7 +11307,7 @@
         </p:nvSpPr>
         <p:spPr>
           <a:xfrm>
-            <a:off x="999231" y="3278992"/>
+            <a:off x="999231" y="3498448"/>
             <a:ext cx="9712291" cy="2554545"/>
           </a:xfrm>
           <a:prstGeom prst="rect">
@@ -12844,12 +13019,12 @@
         <p:spPr>
           <a:xfrm>
             <a:off x="679469" y="2018829"/>
-            <a:ext cx="9613861" cy="1254723"/>
+            <a:ext cx="9613861" cy="1711923"/>
           </a:xfrm>
         </p:spPr>
         <p:txBody>
           <a:bodyPr>
-            <a:normAutofit lnSpcReduction="10000"/>
+            <a:normAutofit fontScale="92500" lnSpcReduction="20000"/>
           </a:bodyPr>
           <a:lstStyle/>
           <a:p>
@@ -12877,6 +13052,32 @@
               <a:rPr lang="en-US" dirty="0"/>
               <a:t> class.</a:t>
             </a:r>
+            <a:br>
+              <a:rPr lang="en-US" dirty="0"/>
+            </a:br>
+            <a:endParaRPr lang="en-US" dirty="0"/>
+          </a:p>
+          <a:p>
+            <a:pPr marL="0" indent="0">
+              <a:buNone/>
+            </a:pPr>
+            <a:r>
+              <a:rPr lang="en-US" dirty="0"/>
+              <a:t>(see 03_unittest/examples. </a:t>
+            </a:r>
+            <a:r>
+              <a:rPr lang="en-US" dirty="0" err="1"/>
+              <a:t>bmi.py</a:t>
+            </a:r>
+            <a:r>
+              <a:rPr lang="en-US" dirty="0"/>
+              <a:t> and </a:t>
+            </a:r>
+            <a:r>
+              <a:rPr lang="en-US" dirty="0" err="1"/>
+              <a:t>test_bmi.py</a:t>
+            </a:r>
+            <a:endParaRPr lang="en-US" dirty="0"/>
           </a:p>
         </p:txBody>
       </p:sp>
@@ -12894,7 +13095,7 @@
         </p:nvSpPr>
         <p:spPr>
           <a:xfrm>
-            <a:off x="1453661" y="3427116"/>
+            <a:off x="1453661" y="3884316"/>
             <a:ext cx="9613861" cy="2677656"/>
           </a:xfrm>
           <a:prstGeom prst="rect">
@@ -13010,19 +13211,7 @@
               <a:rPr lang="en-US" sz="2400" dirty="0">
                 <a:latin typeface="Courier" pitchFamily="2" charset="0"/>
               </a:rPr>
-              <a:t>	</a:t>
-            </a:r>
-            <a:r>
-              <a:rPr lang="en-US" sz="2400">
-                <a:latin typeface="Courier" pitchFamily="2" charset="0"/>
-              </a:rPr>
-              <a:t>def test_01</a:t>
-            </a:r>
-            <a:r>
-              <a:rPr lang="en-US" sz="2400" dirty="0">
-                <a:latin typeface="Courier" pitchFamily="2" charset="0"/>
-              </a:rPr>
-              <a:t>(self):</a:t>
+              <a:t>	def test_01(self):</a:t>
             </a:r>
           </a:p>
           <a:p>
@@ -13435,8 +13624,13 @@
             </a:pPr>
             <a:r>
               <a:rPr lang="en-US" sz="2800" dirty="0"/>
-              <a:t>Slides in Root Folder *.pptx</a:t>
-            </a:r>
+              <a:t>Slides in Repo Root Folder:  </a:t>
+            </a:r>
+            <a:r>
+              <a:rPr lang="en-US" sz="2800" dirty="0" err="1"/>
+              <a:t>UnitTestingSlides.pptx</a:t>
+            </a:r>
+            <a:endParaRPr lang="en-US" sz="2800" dirty="0"/>
           </a:p>
           <a:p>
             <a:pPr marL="0" indent="0">
@@ -13601,7 +13795,7 @@
           <a:p>
             <a:r>
               <a:rPr lang="en-US" dirty="0"/>
-              <a:t>03 Executing Unit test</a:t>
+              <a:t>03 Executing Unit tests</a:t>
             </a:r>
           </a:p>
         </p:txBody>
@@ -13712,7 +13906,15 @@
             </a:pPr>
             <a:r>
               <a:rPr lang="en-US" dirty="0"/>
-              <a:t>You can run a test suite with:</a:t>
+              <a:t>You can run a test suite with either with –m or with </a:t>
+            </a:r>
+            <a:r>
+              <a:rPr lang="en-US" dirty="0" err="1"/>
+              <a:t>pytest</a:t>
+            </a:r>
+            <a:r>
+              <a:rPr lang="en-US" dirty="0"/>
+              <a:t>:</a:t>
             </a:r>
           </a:p>
           <a:p>
@@ -18275,15 +18477,18 @@
         <p:spPr>
           <a:xfrm>
             <a:off x="680321" y="2184472"/>
-            <a:ext cx="10402718" cy="4479563"/>
+            <a:ext cx="10402718" cy="4673528"/>
           </a:xfrm>
         </p:spPr>
         <p:txBody>
           <a:bodyPr>
-            <a:normAutofit lnSpcReduction="10000"/>
+            <a:normAutofit/>
           </a:bodyPr>
           <a:lstStyle/>
           <a:p>
+            <a:pPr marL="0" indent="0">
+              <a:buNone/>
+            </a:pPr>
             <a:r>
               <a:rPr lang="en-US" dirty="0"/>
               <a:t>Requires “pip install </a:t>
@@ -18301,29 +18506,26 @@
             <a:pPr marL="0" indent="0">
               <a:buNone/>
             </a:pPr>
+            <a:r>
+              <a:rPr lang="en-US" dirty="0"/>
+              <a:t>(See example 02_pytest/examples/</a:t>
+            </a:r>
+            <a:r>
+              <a:rPr lang="en-US" dirty="0" err="1"/>
+              <a:t>test_geometric_area.py</a:t>
+            </a:r>
+            <a:r>
+              <a:rPr lang="en-US" dirty="0"/>
+              <a:t>)</a:t>
+            </a:r>
+          </a:p>
+          <a:p>
+            <a:pPr marL="0" indent="0">
+              <a:buNone/>
+            </a:pPr>
             <a:br>
               <a:rPr lang="en-US" dirty="0"/>
             </a:br>
-            <a:r>
-              <a:rPr lang="en-US" dirty="0"/>
-              <a:t>   File: </a:t>
-            </a:r>
-            <a:r>
-              <a:rPr lang="en-US" dirty="0" err="1"/>
-              <a:t>test_area.py</a:t>
-            </a:r>
-            <a:r>
-              <a:rPr lang="en-US" dirty="0"/>
-              <a:t>:</a:t>
-            </a:r>
-          </a:p>
-          <a:p>
-            <a:pPr marL="0" indent="0">
-              <a:buNone/>
-            </a:pPr>
-            <a:endParaRPr lang="en-US" dirty="0"/>
-          </a:p>
-          <a:p>
             <a:endParaRPr lang="en-US" dirty="0"/>
           </a:p>
           <a:p>

</xml_diff>